<commit_message>
Modifica funzione di Content Analysis per evitare duplicati e aggiornamento Powerpoint. Eliminazione di dataseTweetGenerici.csv
</commit_message>
<xml_diff>
--- a/Presentazione/Presentazione Progetto.pptx
+++ b/Presentazione/Presentazione Progetto.pptx
@@ -5,10 +5,10 @@
     <p:sldMasterId id="2147483660" r:id="rId4"/>
   </p:sldMasterIdLst>
   <p:notesMasterIdLst>
-    <p:notesMasterId r:id="rId21"/>
+    <p:notesMasterId r:id="rId29"/>
   </p:notesMasterIdLst>
   <p:handoutMasterIdLst>
-    <p:handoutMasterId r:id="rId22"/>
+    <p:handoutMasterId r:id="rId30"/>
   </p:handoutMasterIdLst>
   <p:sldIdLst>
     <p:sldId id="272" r:id="rId5"/>
@@ -26,7 +26,15 @@
     <p:sldId id="283" r:id="rId17"/>
     <p:sldId id="284" r:id="rId18"/>
     <p:sldId id="285" r:id="rId19"/>
-    <p:sldId id="267" r:id="rId20"/>
+    <p:sldId id="286" r:id="rId20"/>
+    <p:sldId id="287" r:id="rId21"/>
+    <p:sldId id="288" r:id="rId22"/>
+    <p:sldId id="289" r:id="rId23"/>
+    <p:sldId id="291" r:id="rId24"/>
+    <p:sldId id="292" r:id="rId25"/>
+    <p:sldId id="293" r:id="rId26"/>
+    <p:sldId id="294" r:id="rId27"/>
+    <p:sldId id="267" r:id="rId28"/>
   </p:sldIdLst>
   <p:sldSz cx="12188825" cy="6858000"/>
   <p:notesSz cx="6858000" cy="9144000"/>
@@ -1170,7 +1178,7 @@
             <a:pPr algn="r" rtl="0"/>
             <a:fld id="{221A1788-7372-4FAC-9AF0-00B54B8D9CBA}" type="datetime1">
               <a:rPr lang="it-IT" smtClean="0"/>
-              <a:t>24/02/2023</a:t>
+              <a:t>25/02/2023</a:t>
             </a:fld>
             <a:endParaRPr lang="it-IT" dirty="0"/>
           </a:p>
@@ -1340,7 +1348,7 @@
             <a:fld id="{D943A304-85CD-4257-B418-D8F889FE0DBC}" type="datetime1">
               <a:rPr lang="it-IT" smtClean="0"/>
               <a:pPr/>
-              <a:t>24/02/2023</a:t>
+              <a:t>25/02/2023</a:t>
             </a:fld>
             <a:endParaRPr lang="it-IT" dirty="0"/>
           </a:p>
@@ -2411,7 +2419,268 @@
     </p:spTree>
     <p:extLst>
       <p:ext uri="{BB962C8B-B14F-4D97-AF65-F5344CB8AC3E}">
-        <p14:creationId xmlns:p14="http://schemas.microsoft.com/office/powerpoint/2010/main" val="4149218938"/>
+        <p14:creationId xmlns:p14="http://schemas.microsoft.com/office/powerpoint/2010/main" val="1894627143"/>
+      </p:ext>
+    </p:extLst>
+  </p:cSld>
+  <p:clrMapOvr>
+    <a:masterClrMapping/>
+  </p:clrMapOvr>
+</p:notes>
+</file>
+
+<file path=ppt/notesSlides/notesSlide17.xml><?xml version="1.0" encoding="utf-8"?>
+<p:notes xmlns:a="http://schemas.openxmlformats.org/drawingml/2006/main" xmlns:r="http://schemas.openxmlformats.org/officeDocument/2006/relationships" xmlns:p="http://schemas.openxmlformats.org/presentationml/2006/main">
+  <p:cSld>
+    <p:spTree>
+      <p:nvGrpSpPr>
+        <p:cNvPr id="1" name=""/>
+        <p:cNvGrpSpPr/>
+        <p:nvPr/>
+      </p:nvGrpSpPr>
+      <p:grpSpPr>
+        <a:xfrm>
+          <a:off x="0" y="0"/>
+          <a:ext cx="0" cy="0"/>
+          <a:chOff x="0" y="0"/>
+          <a:chExt cx="0" cy="0"/>
+        </a:xfrm>
+      </p:grpSpPr>
+      <p:sp>
+        <p:nvSpPr>
+          <p:cNvPr id="2" name="Segnaposto immagine diapositiva 1"/>
+          <p:cNvSpPr>
+            <a:spLocks noGrp="1" noRot="1" noChangeAspect="1"/>
+          </p:cNvSpPr>
+          <p:nvPr>
+            <p:ph type="sldImg"/>
+          </p:nvPr>
+        </p:nvSpPr>
+        <p:spPr/>
+      </p:sp>
+      <p:sp>
+        <p:nvSpPr>
+          <p:cNvPr id="3" name="Segnaposto note 2"/>
+          <p:cNvSpPr>
+            <a:spLocks noGrp="1"/>
+          </p:cNvSpPr>
+          <p:nvPr>
+            <p:ph type="body" idx="1"/>
+          </p:nvPr>
+        </p:nvSpPr>
+        <p:spPr/>
+        <p:txBody>
+          <a:bodyPr/>
+          <a:lstStyle/>
+          <a:p>
+            <a:endParaRPr lang="it-IT" dirty="0"/>
+          </a:p>
+        </p:txBody>
+      </p:sp>
+      <p:sp>
+        <p:nvSpPr>
+          <p:cNvPr id="4" name="Segnaposto numero diapositiva 3"/>
+          <p:cNvSpPr>
+            <a:spLocks noGrp="1"/>
+          </p:cNvSpPr>
+          <p:nvPr>
+            <p:ph type="sldNum" sz="quarter" idx="10"/>
+          </p:nvPr>
+        </p:nvSpPr>
+        <p:spPr/>
+        <p:txBody>
+          <a:bodyPr/>
+          <a:lstStyle/>
+          <a:p>
+            <a:fld id="{3EBA5BD7-F043-4D1B-AA17-CD412FC534DE}" type="slidenum">
+              <a:rPr lang="it-IT" smtClean="0"/>
+              <a:pPr/>
+              <a:t>17</a:t>
+            </a:fld>
+            <a:endParaRPr lang="it-IT" dirty="0"/>
+          </a:p>
+        </p:txBody>
+      </p:sp>
+    </p:spTree>
+    <p:extLst>
+      <p:ext uri="{BB962C8B-B14F-4D97-AF65-F5344CB8AC3E}">
+        <p14:creationId xmlns:p14="http://schemas.microsoft.com/office/powerpoint/2010/main" val="3331015620"/>
+      </p:ext>
+    </p:extLst>
+  </p:cSld>
+  <p:clrMapOvr>
+    <a:masterClrMapping/>
+  </p:clrMapOvr>
+</p:notes>
+</file>
+
+<file path=ppt/notesSlides/notesSlide18.xml><?xml version="1.0" encoding="utf-8"?>
+<p:notes xmlns:a="http://schemas.openxmlformats.org/drawingml/2006/main" xmlns:r="http://schemas.openxmlformats.org/officeDocument/2006/relationships" xmlns:p="http://schemas.openxmlformats.org/presentationml/2006/main">
+  <p:cSld>
+    <p:spTree>
+      <p:nvGrpSpPr>
+        <p:cNvPr id="1" name=""/>
+        <p:cNvGrpSpPr/>
+        <p:nvPr/>
+      </p:nvGrpSpPr>
+      <p:grpSpPr>
+        <a:xfrm>
+          <a:off x="0" y="0"/>
+          <a:ext cx="0" cy="0"/>
+          <a:chOff x="0" y="0"/>
+          <a:chExt cx="0" cy="0"/>
+        </a:xfrm>
+      </p:grpSpPr>
+      <p:sp>
+        <p:nvSpPr>
+          <p:cNvPr id="2" name="Segnaposto immagine diapositiva 1"/>
+          <p:cNvSpPr>
+            <a:spLocks noGrp="1" noRot="1" noChangeAspect="1"/>
+          </p:cNvSpPr>
+          <p:nvPr>
+            <p:ph type="sldImg"/>
+          </p:nvPr>
+        </p:nvSpPr>
+        <p:spPr/>
+      </p:sp>
+      <p:sp>
+        <p:nvSpPr>
+          <p:cNvPr id="3" name="Segnaposto note 2"/>
+          <p:cNvSpPr>
+            <a:spLocks noGrp="1"/>
+          </p:cNvSpPr>
+          <p:nvPr>
+            <p:ph type="body" idx="1"/>
+          </p:nvPr>
+        </p:nvSpPr>
+        <p:spPr/>
+        <p:txBody>
+          <a:bodyPr/>
+          <a:lstStyle/>
+          <a:p>
+            <a:r>
+              <a:rPr lang="it-IT" dirty="0"/>
+              <a:t>Nel nostro caso positivo, negativo o neutro</a:t>
+            </a:r>
+          </a:p>
+        </p:txBody>
+      </p:sp>
+      <p:sp>
+        <p:nvSpPr>
+          <p:cNvPr id="4" name="Segnaposto numero diapositiva 3"/>
+          <p:cNvSpPr>
+            <a:spLocks noGrp="1"/>
+          </p:cNvSpPr>
+          <p:nvPr>
+            <p:ph type="sldNum" sz="quarter" idx="10"/>
+          </p:nvPr>
+        </p:nvSpPr>
+        <p:spPr/>
+        <p:txBody>
+          <a:bodyPr/>
+          <a:lstStyle/>
+          <a:p>
+            <a:fld id="{3EBA5BD7-F043-4D1B-AA17-CD412FC534DE}" type="slidenum">
+              <a:rPr lang="it-IT" smtClean="0"/>
+              <a:pPr/>
+              <a:t>18</a:t>
+            </a:fld>
+            <a:endParaRPr lang="it-IT" dirty="0"/>
+          </a:p>
+        </p:txBody>
+      </p:sp>
+    </p:spTree>
+    <p:extLst>
+      <p:ext uri="{BB962C8B-B14F-4D97-AF65-F5344CB8AC3E}">
+        <p14:creationId xmlns:p14="http://schemas.microsoft.com/office/powerpoint/2010/main" val="1626038331"/>
+      </p:ext>
+    </p:extLst>
+  </p:cSld>
+  <p:clrMapOvr>
+    <a:masterClrMapping/>
+  </p:clrMapOvr>
+</p:notes>
+</file>
+
+<file path=ppt/notesSlides/notesSlide19.xml><?xml version="1.0" encoding="utf-8"?>
+<p:notes xmlns:a="http://schemas.openxmlformats.org/drawingml/2006/main" xmlns:r="http://schemas.openxmlformats.org/officeDocument/2006/relationships" xmlns:p="http://schemas.openxmlformats.org/presentationml/2006/main">
+  <p:cSld>
+    <p:spTree>
+      <p:nvGrpSpPr>
+        <p:cNvPr id="1" name=""/>
+        <p:cNvGrpSpPr/>
+        <p:nvPr/>
+      </p:nvGrpSpPr>
+      <p:grpSpPr>
+        <a:xfrm>
+          <a:off x="0" y="0"/>
+          <a:ext cx="0" cy="0"/>
+          <a:chOff x="0" y="0"/>
+          <a:chExt cx="0" cy="0"/>
+        </a:xfrm>
+      </p:grpSpPr>
+      <p:sp>
+        <p:nvSpPr>
+          <p:cNvPr id="2" name="Segnaposto immagine diapositiva 1"/>
+          <p:cNvSpPr>
+            <a:spLocks noGrp="1" noRot="1" noChangeAspect="1"/>
+          </p:cNvSpPr>
+          <p:nvPr>
+            <p:ph type="sldImg"/>
+          </p:nvPr>
+        </p:nvSpPr>
+        <p:spPr/>
+      </p:sp>
+      <p:sp>
+        <p:nvSpPr>
+          <p:cNvPr id="3" name="Segnaposto note 2"/>
+          <p:cNvSpPr>
+            <a:spLocks noGrp="1"/>
+          </p:cNvSpPr>
+          <p:nvPr>
+            <p:ph type="body" idx="1"/>
+          </p:nvPr>
+        </p:nvSpPr>
+        <p:spPr/>
+        <p:txBody>
+          <a:bodyPr/>
+          <a:lstStyle/>
+          <a:p>
+            <a:r>
+              <a:rPr lang="it-IT" dirty="0"/>
+              <a:t>Nel nostro caso positivo, negativo o neutro</a:t>
+            </a:r>
+          </a:p>
+        </p:txBody>
+      </p:sp>
+      <p:sp>
+        <p:nvSpPr>
+          <p:cNvPr id="4" name="Segnaposto numero diapositiva 3"/>
+          <p:cNvSpPr>
+            <a:spLocks noGrp="1"/>
+          </p:cNvSpPr>
+          <p:nvPr>
+            <p:ph type="sldNum" sz="quarter" idx="10"/>
+          </p:nvPr>
+        </p:nvSpPr>
+        <p:spPr/>
+        <p:txBody>
+          <a:bodyPr/>
+          <a:lstStyle/>
+          <a:p>
+            <a:fld id="{3EBA5BD7-F043-4D1B-AA17-CD412FC534DE}" type="slidenum">
+              <a:rPr lang="it-IT" smtClean="0"/>
+              <a:pPr/>
+              <a:t>19</a:t>
+            </a:fld>
+            <a:endParaRPr lang="it-IT" dirty="0"/>
+          </a:p>
+        </p:txBody>
+      </p:sp>
+    </p:spTree>
+    <p:extLst>
+      <p:ext uri="{BB962C8B-B14F-4D97-AF65-F5344CB8AC3E}">
+        <p14:creationId xmlns:p14="http://schemas.microsoft.com/office/powerpoint/2010/main" val="1054507137"/>
       </p:ext>
     </p:extLst>
   </p:cSld>
@@ -2497,6 +2766,443 @@
     <p:extLst>
       <p:ext uri="{BB962C8B-B14F-4D97-AF65-F5344CB8AC3E}">
         <p14:creationId xmlns:p14="http://schemas.microsoft.com/office/powerpoint/2010/main" val="2287174021"/>
+      </p:ext>
+    </p:extLst>
+  </p:cSld>
+  <p:clrMapOvr>
+    <a:masterClrMapping/>
+  </p:clrMapOvr>
+</p:notes>
+</file>
+
+<file path=ppt/notesSlides/notesSlide20.xml><?xml version="1.0" encoding="utf-8"?>
+<p:notes xmlns:a="http://schemas.openxmlformats.org/drawingml/2006/main" xmlns:r="http://schemas.openxmlformats.org/officeDocument/2006/relationships" xmlns:p="http://schemas.openxmlformats.org/presentationml/2006/main">
+  <p:cSld>
+    <p:spTree>
+      <p:nvGrpSpPr>
+        <p:cNvPr id="1" name=""/>
+        <p:cNvGrpSpPr/>
+        <p:nvPr/>
+      </p:nvGrpSpPr>
+      <p:grpSpPr>
+        <a:xfrm>
+          <a:off x="0" y="0"/>
+          <a:ext cx="0" cy="0"/>
+          <a:chOff x="0" y="0"/>
+          <a:chExt cx="0" cy="0"/>
+        </a:xfrm>
+      </p:grpSpPr>
+      <p:sp>
+        <p:nvSpPr>
+          <p:cNvPr id="2" name="Segnaposto immagine diapositiva 1"/>
+          <p:cNvSpPr>
+            <a:spLocks noGrp="1" noRot="1" noChangeAspect="1"/>
+          </p:cNvSpPr>
+          <p:nvPr>
+            <p:ph type="sldImg"/>
+          </p:nvPr>
+        </p:nvSpPr>
+        <p:spPr/>
+      </p:sp>
+      <p:sp>
+        <p:nvSpPr>
+          <p:cNvPr id="3" name="Segnaposto note 2"/>
+          <p:cNvSpPr>
+            <a:spLocks noGrp="1"/>
+          </p:cNvSpPr>
+          <p:nvPr>
+            <p:ph type="body" idx="1"/>
+          </p:nvPr>
+        </p:nvSpPr>
+        <p:spPr/>
+        <p:txBody>
+          <a:bodyPr/>
+          <a:lstStyle/>
+          <a:p>
+            <a:r>
+              <a:rPr lang="it-IT" dirty="0"/>
+              <a:t>La libreria che abbiamo utilizzato per fare Content è stata Spacy.</a:t>
+            </a:r>
+          </a:p>
+        </p:txBody>
+      </p:sp>
+      <p:sp>
+        <p:nvSpPr>
+          <p:cNvPr id="4" name="Segnaposto numero diapositiva 3"/>
+          <p:cNvSpPr>
+            <a:spLocks noGrp="1"/>
+          </p:cNvSpPr>
+          <p:nvPr>
+            <p:ph type="sldNum" sz="quarter" idx="10"/>
+          </p:nvPr>
+        </p:nvSpPr>
+        <p:spPr/>
+        <p:txBody>
+          <a:bodyPr/>
+          <a:lstStyle/>
+          <a:p>
+            <a:fld id="{3EBA5BD7-F043-4D1B-AA17-CD412FC534DE}" type="slidenum">
+              <a:rPr lang="it-IT" smtClean="0"/>
+              <a:pPr/>
+              <a:t>20</a:t>
+            </a:fld>
+            <a:endParaRPr lang="it-IT" dirty="0"/>
+          </a:p>
+        </p:txBody>
+      </p:sp>
+    </p:spTree>
+    <p:extLst>
+      <p:ext uri="{BB962C8B-B14F-4D97-AF65-F5344CB8AC3E}">
+        <p14:creationId xmlns:p14="http://schemas.microsoft.com/office/powerpoint/2010/main" val="3794186773"/>
+      </p:ext>
+    </p:extLst>
+  </p:cSld>
+  <p:clrMapOvr>
+    <a:masterClrMapping/>
+  </p:clrMapOvr>
+</p:notes>
+</file>
+
+<file path=ppt/notesSlides/notesSlide21.xml><?xml version="1.0" encoding="utf-8"?>
+<p:notes xmlns:a="http://schemas.openxmlformats.org/drawingml/2006/main" xmlns:r="http://schemas.openxmlformats.org/officeDocument/2006/relationships" xmlns:p="http://schemas.openxmlformats.org/presentationml/2006/main">
+  <p:cSld>
+    <p:spTree>
+      <p:nvGrpSpPr>
+        <p:cNvPr id="1" name=""/>
+        <p:cNvGrpSpPr/>
+        <p:nvPr/>
+      </p:nvGrpSpPr>
+      <p:grpSpPr>
+        <a:xfrm>
+          <a:off x="0" y="0"/>
+          <a:ext cx="0" cy="0"/>
+          <a:chOff x="0" y="0"/>
+          <a:chExt cx="0" cy="0"/>
+        </a:xfrm>
+      </p:grpSpPr>
+      <p:sp>
+        <p:nvSpPr>
+          <p:cNvPr id="2" name="Segnaposto immagine diapositiva 1"/>
+          <p:cNvSpPr>
+            <a:spLocks noGrp="1" noRot="1" noChangeAspect="1"/>
+          </p:cNvSpPr>
+          <p:nvPr>
+            <p:ph type="sldImg"/>
+          </p:nvPr>
+        </p:nvSpPr>
+        <p:spPr/>
+      </p:sp>
+      <p:sp>
+        <p:nvSpPr>
+          <p:cNvPr id="3" name="Segnaposto note 2"/>
+          <p:cNvSpPr>
+            <a:spLocks noGrp="1"/>
+          </p:cNvSpPr>
+          <p:nvPr>
+            <p:ph type="body" idx="1"/>
+          </p:nvPr>
+        </p:nvSpPr>
+        <p:spPr/>
+        <p:txBody>
+          <a:bodyPr/>
+          <a:lstStyle/>
+          <a:p>
+            <a:r>
+              <a:rPr lang="it-IT" dirty="0"/>
+              <a:t>La libreria che abbiamo utilizzato per fare Content è stata Spacy.</a:t>
+            </a:r>
+          </a:p>
+        </p:txBody>
+      </p:sp>
+      <p:sp>
+        <p:nvSpPr>
+          <p:cNvPr id="4" name="Segnaposto numero diapositiva 3"/>
+          <p:cNvSpPr>
+            <a:spLocks noGrp="1"/>
+          </p:cNvSpPr>
+          <p:nvPr>
+            <p:ph type="sldNum" sz="quarter" idx="10"/>
+          </p:nvPr>
+        </p:nvSpPr>
+        <p:spPr/>
+        <p:txBody>
+          <a:bodyPr/>
+          <a:lstStyle/>
+          <a:p>
+            <a:fld id="{3EBA5BD7-F043-4D1B-AA17-CD412FC534DE}" type="slidenum">
+              <a:rPr lang="it-IT" smtClean="0"/>
+              <a:pPr/>
+              <a:t>21</a:t>
+            </a:fld>
+            <a:endParaRPr lang="it-IT" dirty="0"/>
+          </a:p>
+        </p:txBody>
+      </p:sp>
+    </p:spTree>
+    <p:extLst>
+      <p:ext uri="{BB962C8B-B14F-4D97-AF65-F5344CB8AC3E}">
+        <p14:creationId xmlns:p14="http://schemas.microsoft.com/office/powerpoint/2010/main" val="1272099144"/>
+      </p:ext>
+    </p:extLst>
+  </p:cSld>
+  <p:clrMapOvr>
+    <a:masterClrMapping/>
+  </p:clrMapOvr>
+</p:notes>
+</file>
+
+<file path=ppt/notesSlides/notesSlide22.xml><?xml version="1.0" encoding="utf-8"?>
+<p:notes xmlns:a="http://schemas.openxmlformats.org/drawingml/2006/main" xmlns:r="http://schemas.openxmlformats.org/officeDocument/2006/relationships" xmlns:p="http://schemas.openxmlformats.org/presentationml/2006/main">
+  <p:cSld>
+    <p:spTree>
+      <p:nvGrpSpPr>
+        <p:cNvPr id="1" name=""/>
+        <p:cNvGrpSpPr/>
+        <p:nvPr/>
+      </p:nvGrpSpPr>
+      <p:grpSpPr>
+        <a:xfrm>
+          <a:off x="0" y="0"/>
+          <a:ext cx="0" cy="0"/>
+          <a:chOff x="0" y="0"/>
+          <a:chExt cx="0" cy="0"/>
+        </a:xfrm>
+      </p:grpSpPr>
+      <p:sp>
+        <p:nvSpPr>
+          <p:cNvPr id="2" name="Segnaposto immagine diapositiva 1"/>
+          <p:cNvSpPr>
+            <a:spLocks noGrp="1" noRot="1" noChangeAspect="1"/>
+          </p:cNvSpPr>
+          <p:nvPr>
+            <p:ph type="sldImg"/>
+          </p:nvPr>
+        </p:nvSpPr>
+        <p:spPr/>
+      </p:sp>
+      <p:sp>
+        <p:nvSpPr>
+          <p:cNvPr id="3" name="Segnaposto note 2"/>
+          <p:cNvSpPr>
+            <a:spLocks noGrp="1"/>
+          </p:cNvSpPr>
+          <p:nvPr>
+            <p:ph type="body" idx="1"/>
+          </p:nvPr>
+        </p:nvSpPr>
+        <p:spPr/>
+        <p:txBody>
+          <a:bodyPr/>
+          <a:lstStyle/>
+          <a:p>
+            <a:r>
+              <a:rPr lang="it-IT" dirty="0"/>
+              <a:t>Nel nostro caso di studio</a:t>
+            </a:r>
+          </a:p>
+        </p:txBody>
+      </p:sp>
+      <p:sp>
+        <p:nvSpPr>
+          <p:cNvPr id="4" name="Segnaposto numero diapositiva 3"/>
+          <p:cNvSpPr>
+            <a:spLocks noGrp="1"/>
+          </p:cNvSpPr>
+          <p:nvPr>
+            <p:ph type="sldNum" sz="quarter" idx="10"/>
+          </p:nvPr>
+        </p:nvSpPr>
+        <p:spPr/>
+        <p:txBody>
+          <a:bodyPr/>
+          <a:lstStyle/>
+          <a:p>
+            <a:fld id="{3EBA5BD7-F043-4D1B-AA17-CD412FC534DE}" type="slidenum">
+              <a:rPr lang="it-IT" smtClean="0"/>
+              <a:pPr/>
+              <a:t>22</a:t>
+            </a:fld>
+            <a:endParaRPr lang="it-IT" dirty="0"/>
+          </a:p>
+        </p:txBody>
+      </p:sp>
+    </p:spTree>
+    <p:extLst>
+      <p:ext uri="{BB962C8B-B14F-4D97-AF65-F5344CB8AC3E}">
+        <p14:creationId xmlns:p14="http://schemas.microsoft.com/office/powerpoint/2010/main" val="319390075"/>
+      </p:ext>
+    </p:extLst>
+  </p:cSld>
+  <p:clrMapOvr>
+    <a:masterClrMapping/>
+  </p:clrMapOvr>
+</p:notes>
+</file>
+
+<file path=ppt/notesSlides/notesSlide23.xml><?xml version="1.0" encoding="utf-8"?>
+<p:notes xmlns:a="http://schemas.openxmlformats.org/drawingml/2006/main" xmlns:r="http://schemas.openxmlformats.org/officeDocument/2006/relationships" xmlns:p="http://schemas.openxmlformats.org/presentationml/2006/main">
+  <p:cSld>
+    <p:spTree>
+      <p:nvGrpSpPr>
+        <p:cNvPr id="1" name=""/>
+        <p:cNvGrpSpPr/>
+        <p:nvPr/>
+      </p:nvGrpSpPr>
+      <p:grpSpPr>
+        <a:xfrm>
+          <a:off x="0" y="0"/>
+          <a:ext cx="0" cy="0"/>
+          <a:chOff x="0" y="0"/>
+          <a:chExt cx="0" cy="0"/>
+        </a:xfrm>
+      </p:grpSpPr>
+      <p:sp>
+        <p:nvSpPr>
+          <p:cNvPr id="2" name="Segnaposto immagine diapositiva 1"/>
+          <p:cNvSpPr>
+            <a:spLocks noGrp="1" noRot="1" noChangeAspect="1"/>
+          </p:cNvSpPr>
+          <p:nvPr>
+            <p:ph type="sldImg"/>
+          </p:nvPr>
+        </p:nvSpPr>
+        <p:spPr/>
+      </p:sp>
+      <p:sp>
+        <p:nvSpPr>
+          <p:cNvPr id="3" name="Segnaposto note 2"/>
+          <p:cNvSpPr>
+            <a:spLocks noGrp="1"/>
+          </p:cNvSpPr>
+          <p:nvPr>
+            <p:ph type="body" idx="1"/>
+          </p:nvPr>
+        </p:nvSpPr>
+        <p:spPr/>
+        <p:txBody>
+          <a:bodyPr/>
+          <a:lstStyle/>
+          <a:p>
+            <a:r>
+              <a:rPr lang="it-IT" dirty="0"/>
+              <a:t>La libreria che abbiamo utilizzato per fare Content è stata Spacy.</a:t>
+            </a:r>
+          </a:p>
+        </p:txBody>
+      </p:sp>
+      <p:sp>
+        <p:nvSpPr>
+          <p:cNvPr id="4" name="Segnaposto numero diapositiva 3"/>
+          <p:cNvSpPr>
+            <a:spLocks noGrp="1"/>
+          </p:cNvSpPr>
+          <p:nvPr>
+            <p:ph type="sldNum" sz="quarter" idx="10"/>
+          </p:nvPr>
+        </p:nvSpPr>
+        <p:spPr/>
+        <p:txBody>
+          <a:bodyPr/>
+          <a:lstStyle/>
+          <a:p>
+            <a:fld id="{3EBA5BD7-F043-4D1B-AA17-CD412FC534DE}" type="slidenum">
+              <a:rPr lang="it-IT" smtClean="0"/>
+              <a:pPr/>
+              <a:t>23</a:t>
+            </a:fld>
+            <a:endParaRPr lang="it-IT" dirty="0"/>
+          </a:p>
+        </p:txBody>
+      </p:sp>
+    </p:spTree>
+    <p:extLst>
+      <p:ext uri="{BB962C8B-B14F-4D97-AF65-F5344CB8AC3E}">
+        <p14:creationId xmlns:p14="http://schemas.microsoft.com/office/powerpoint/2010/main" val="3581221903"/>
+      </p:ext>
+    </p:extLst>
+  </p:cSld>
+  <p:clrMapOvr>
+    <a:masterClrMapping/>
+  </p:clrMapOvr>
+</p:notes>
+</file>
+
+<file path=ppt/notesSlides/notesSlide24.xml><?xml version="1.0" encoding="utf-8"?>
+<p:notes xmlns:a="http://schemas.openxmlformats.org/drawingml/2006/main" xmlns:r="http://schemas.openxmlformats.org/officeDocument/2006/relationships" xmlns:p="http://schemas.openxmlformats.org/presentationml/2006/main">
+  <p:cSld>
+    <p:spTree>
+      <p:nvGrpSpPr>
+        <p:cNvPr id="1" name=""/>
+        <p:cNvGrpSpPr/>
+        <p:nvPr/>
+      </p:nvGrpSpPr>
+      <p:grpSpPr>
+        <a:xfrm>
+          <a:off x="0" y="0"/>
+          <a:ext cx="0" cy="0"/>
+          <a:chOff x="0" y="0"/>
+          <a:chExt cx="0" cy="0"/>
+        </a:xfrm>
+      </p:grpSpPr>
+      <p:sp>
+        <p:nvSpPr>
+          <p:cNvPr id="2" name="Segnaposto immagine diapositiva 1"/>
+          <p:cNvSpPr>
+            <a:spLocks noGrp="1" noRot="1" noChangeAspect="1"/>
+          </p:cNvSpPr>
+          <p:nvPr>
+            <p:ph type="sldImg"/>
+          </p:nvPr>
+        </p:nvSpPr>
+        <p:spPr/>
+      </p:sp>
+      <p:sp>
+        <p:nvSpPr>
+          <p:cNvPr id="3" name="Segnaposto note 2"/>
+          <p:cNvSpPr>
+            <a:spLocks noGrp="1"/>
+          </p:cNvSpPr>
+          <p:nvPr>
+            <p:ph type="body" idx="1"/>
+          </p:nvPr>
+        </p:nvSpPr>
+        <p:spPr/>
+        <p:txBody>
+          <a:bodyPr/>
+          <a:lstStyle/>
+          <a:p>
+            <a:endParaRPr lang="it-IT" dirty="0"/>
+          </a:p>
+        </p:txBody>
+      </p:sp>
+      <p:sp>
+        <p:nvSpPr>
+          <p:cNvPr id="4" name="Segnaposto numero diapositiva 3"/>
+          <p:cNvSpPr>
+            <a:spLocks noGrp="1"/>
+          </p:cNvSpPr>
+          <p:nvPr>
+            <p:ph type="sldNum" sz="quarter" idx="10"/>
+          </p:nvPr>
+        </p:nvSpPr>
+        <p:spPr/>
+        <p:txBody>
+          <a:bodyPr/>
+          <a:lstStyle/>
+          <a:p>
+            <a:fld id="{3EBA5BD7-F043-4D1B-AA17-CD412FC534DE}" type="slidenum">
+              <a:rPr lang="it-IT" smtClean="0"/>
+              <a:pPr/>
+              <a:t>24</a:t>
+            </a:fld>
+            <a:endParaRPr lang="it-IT" dirty="0"/>
+          </a:p>
+        </p:txBody>
+      </p:sp>
+    </p:spTree>
+    <p:extLst>
+      <p:ext uri="{BB962C8B-B14F-4D97-AF65-F5344CB8AC3E}">
+        <p14:creationId xmlns:p14="http://schemas.microsoft.com/office/powerpoint/2010/main" val="4149218938"/>
       </p:ext>
     </p:extLst>
   </p:cSld>
@@ -3921,7 +4627,7 @@
             <a:fld id="{3889EF9B-A500-41B6-8F1C-893813E9A898}" type="datetime1">
               <a:rPr lang="it-IT" smtClean="0"/>
               <a:pPr/>
-              <a:t>24/02/2023</a:t>
+              <a:t>25/02/2023</a:t>
             </a:fld>
             <a:endParaRPr lang="it-IT" dirty="0"/>
           </a:p>
@@ -4127,7 +4833,7 @@
             <a:fld id="{6E724BBD-5BEA-4971-A6C4-42E94AF7CB5F}" type="datetime1">
               <a:rPr lang="it-IT" smtClean="0"/>
               <a:pPr/>
-              <a:t>24/02/2023</a:t>
+              <a:t>25/02/2023</a:t>
             </a:fld>
             <a:endParaRPr lang="it-IT" dirty="0"/>
           </a:p>
@@ -4343,7 +5049,7 @@
             <a:fld id="{EF1B2188-7D8C-43C8-B29F-60D01DE77B72}" type="datetime1">
               <a:rPr lang="it-IT" smtClean="0"/>
               <a:pPr/>
-              <a:t>24/02/2023</a:t>
+              <a:t>25/02/2023</a:t>
             </a:fld>
             <a:endParaRPr lang="it-IT" dirty="0"/>
           </a:p>
@@ -4549,7 +5255,7 @@
             <a:fld id="{581DC961-63CE-49AB-921E-1CE3DDEFC80A}" type="datetime1">
               <a:rPr lang="it-IT" smtClean="0"/>
               <a:pPr/>
-              <a:t>24/02/2023</a:t>
+              <a:t>25/02/2023</a:t>
             </a:fld>
             <a:endParaRPr lang="it-IT" dirty="0"/>
           </a:p>
@@ -4993,7 +5699,7 @@
             <a:fld id="{C6066F5F-3C86-4285-A86F-35EFBBDD7800}" type="datetime1">
               <a:rPr lang="it-IT" smtClean="0"/>
               <a:pPr/>
-              <a:t>24/02/2023</a:t>
+              <a:t>25/02/2023</a:t>
             </a:fld>
             <a:endParaRPr lang="it-IT" dirty="0"/>
           </a:p>
@@ -5305,7 +6011,7 @@
             <a:fld id="{0B9BE34E-14EC-4041-A597-EE22FC16794F}" type="datetime1">
               <a:rPr lang="it-IT" smtClean="0"/>
               <a:pPr/>
-              <a:t>24/02/2023</a:t>
+              <a:t>25/02/2023</a:t>
             </a:fld>
             <a:endParaRPr lang="it-IT" dirty="0"/>
           </a:p>
@@ -5769,7 +6475,7 @@
             <a:fld id="{D6FAD192-1BF7-4994-9CBA-74265F19F4C1}" type="datetime1">
               <a:rPr lang="it-IT" smtClean="0"/>
               <a:pPr/>
-              <a:t>24/02/2023</a:t>
+              <a:t>25/02/2023</a:t>
             </a:fld>
             <a:endParaRPr lang="it-IT" dirty="0"/>
           </a:p>
@@ -5907,7 +6613,7 @@
             <a:fld id="{C476DD40-7EBA-46D0-A855-62759524AC7A}" type="datetime1">
               <a:rPr lang="it-IT" smtClean="0"/>
               <a:pPr/>
-              <a:t>24/02/2023</a:t>
+              <a:t>25/02/2023</a:t>
             </a:fld>
             <a:endParaRPr lang="it-IT" dirty="0"/>
           </a:p>
@@ -6021,7 +6727,7 @@
             <a:fld id="{C62E4D95-88E1-4556-89BE-EC650C1D14A8}" type="datetime1">
               <a:rPr lang="it-IT" smtClean="0"/>
               <a:pPr/>
-              <a:t>24/02/2023</a:t>
+              <a:t>25/02/2023</a:t>
             </a:fld>
             <a:endParaRPr lang="it-IT" dirty="0"/>
           </a:p>
@@ -6328,7 +7034,7 @@
             <a:fld id="{1F9867D3-FC26-40B1-8BB9-B19FF8D6CD45}" type="datetime1">
               <a:rPr lang="it-IT" smtClean="0"/>
               <a:pPr/>
-              <a:t>24/02/2023</a:t>
+              <a:t>25/02/2023</a:t>
             </a:fld>
             <a:endParaRPr lang="it-IT" dirty="0"/>
           </a:p>
@@ -6625,7 +7331,7 @@
             <a:fld id="{5B0EE21F-92EE-4289-AFFB-9252D957F459}" type="datetime1">
               <a:rPr lang="it-IT" smtClean="0"/>
               <a:pPr/>
-              <a:t>24/02/2023</a:t>
+              <a:t>25/02/2023</a:t>
             </a:fld>
             <a:endParaRPr lang="it-IT" dirty="0"/>
           </a:p>
@@ -7249,7 +7955,7 @@
             <a:fld id="{8A756645-DD8C-4009-9A84-A4AD56EB55A9}" type="datetime1">
               <a:rPr lang="it-IT" smtClean="0"/>
               <a:pPr/>
-              <a:t>24/02/2023</a:t>
+              <a:t>25/02/2023</a:t>
             </a:fld>
             <a:endParaRPr lang="it-IT" dirty="0"/>
           </a:p>
@@ -8215,13 +8921,13 @@
   <p:clrMapOvr>
     <a:masterClrMapping/>
   </p:clrMapOvr>
-  <mc:AlternateContent xmlns:mc="http://schemas.openxmlformats.org/markup-compatibility/2006">
-    <mc:Choice xmlns:p14="http://schemas.microsoft.com/office/powerpoint/2010/main" Requires="p14">
+  <mc:AlternateContent xmlns:mc="http://schemas.openxmlformats.org/markup-compatibility/2006" xmlns:p14="http://schemas.microsoft.com/office/powerpoint/2010/main">
+    <mc:Choice Requires="p14">
       <p:transition spd="med" p14:dur="700">
         <p:fade/>
       </p:transition>
     </mc:Choice>
-    <mc:Fallback>
+    <mc:Fallback xmlns="">
       <p:transition spd="med">
         <p:fade/>
       </p:transition>
@@ -8347,13 +9053,13 @@
   <p:clrMapOvr>
     <a:masterClrMapping/>
   </p:clrMapOvr>
-  <mc:AlternateContent xmlns:mc="http://schemas.openxmlformats.org/markup-compatibility/2006">
-    <mc:Choice xmlns:p14="http://schemas.microsoft.com/office/powerpoint/2010/main" Requires="p14">
+  <mc:AlternateContent xmlns:mc="http://schemas.openxmlformats.org/markup-compatibility/2006" xmlns:p14="http://schemas.microsoft.com/office/powerpoint/2010/main">
+    <mc:Choice Requires="p14">
       <p:transition spd="med" p14:dur="700">
         <p:fade/>
       </p:transition>
     </mc:Choice>
-    <mc:Fallback>
+    <mc:Fallback xmlns="">
       <p:transition spd="med">
         <p:fade/>
       </p:transition>
@@ -8545,13 +9251,13 @@
   <p:clrMapOvr>
     <a:masterClrMapping/>
   </p:clrMapOvr>
-  <mc:AlternateContent xmlns:mc="http://schemas.openxmlformats.org/markup-compatibility/2006">
-    <mc:Choice xmlns:p14="http://schemas.microsoft.com/office/powerpoint/2010/main" Requires="p14">
+  <mc:AlternateContent xmlns:mc="http://schemas.openxmlformats.org/markup-compatibility/2006" xmlns:p14="http://schemas.microsoft.com/office/powerpoint/2010/main">
+    <mc:Choice Requires="p14">
       <p:transition spd="med" p14:dur="700">
         <p:fade/>
       </p:transition>
     </mc:Choice>
-    <mc:Fallback>
+    <mc:Fallback xmlns="">
       <p:transition spd="med">
         <p:fade/>
       </p:transition>
@@ -8715,13 +9421,13 @@
   <p:clrMapOvr>
     <a:masterClrMapping/>
   </p:clrMapOvr>
-  <mc:AlternateContent xmlns:mc="http://schemas.openxmlformats.org/markup-compatibility/2006">
-    <mc:Choice xmlns:p14="http://schemas.microsoft.com/office/powerpoint/2010/main" Requires="p14">
+  <mc:AlternateContent xmlns:mc="http://schemas.openxmlformats.org/markup-compatibility/2006" xmlns:p14="http://schemas.microsoft.com/office/powerpoint/2010/main">
+    <mc:Choice Requires="p14">
       <p:transition spd="med" p14:dur="700">
         <p:fade/>
       </p:transition>
     </mc:Choice>
-    <mc:Fallback>
+    <mc:Fallback xmlns="">
       <p:transition spd="med">
         <p:fade/>
       </p:transition>
@@ -8850,13 +9556,13 @@
   <p:clrMapOvr>
     <a:masterClrMapping/>
   </p:clrMapOvr>
-  <mc:AlternateContent xmlns:mc="http://schemas.openxmlformats.org/markup-compatibility/2006">
-    <mc:Choice xmlns:p14="http://schemas.microsoft.com/office/powerpoint/2010/main" Requires="p14">
+  <mc:AlternateContent xmlns:mc="http://schemas.openxmlformats.org/markup-compatibility/2006" xmlns:p14="http://schemas.microsoft.com/office/powerpoint/2010/main">
+    <mc:Choice Requires="p14">
       <p:transition spd="med" p14:dur="700">
         <p:fade/>
       </p:transition>
     </mc:Choice>
-    <mc:Fallback>
+    <mc:Fallback xmlns="">
       <p:transition spd="med">
         <p:fade/>
       </p:transition>
@@ -8949,7 +9655,7 @@
               <a:t>Successivamente questa libreria ci ha permesso di rimuovere le </a:t>
             </a:r>
             <a:r>
-              <a:rPr lang="it-IT" sz="3000" dirty="0">
+              <a:rPr lang="it-IT" sz="3000" b="1" dirty="0">
                 <a:solidFill>
                   <a:srgbClr val="FF0000"/>
                 </a:solidFill>
@@ -8973,7 +9679,15 @@
             </a:pPr>
             <a:r>
               <a:rPr lang="it-IT" sz="3000" dirty="0"/>
-              <a:t>Infine effettua l'analisi delle polarità per calcolare il sentiment dei tweet. Questo  si basa sull'attribuzione di un punteggio (compound) a ciascuna frase del testo, che rappresenta la somma dei punteggi attribuiti alle singole parole della frase. Il punteggio finale sarà contenuto nell’intervallo [-1;1].</a:t>
+              <a:t>Infine effettua l'</a:t>
+            </a:r>
+            <a:r>
+              <a:rPr lang="it-IT" sz="3000" b="1" dirty="0"/>
+              <a:t>analisi delle polarità</a:t>
+            </a:r>
+            <a:r>
+              <a:rPr lang="it-IT" sz="3000" dirty="0"/>
+              <a:t> per calcolare il sentiment dei tweet. Questo  si basa sull'attribuzione di un punteggio (compound) a ciascuna frase del testo, che rappresenta la somma dei punteggi attribuiti alle singole parole della frase. Il punteggio finale sarà contenuto nell’intervallo [-1;1].</a:t>
             </a:r>
             <a:endParaRPr lang="en-US" sz="3000" dirty="0"/>
           </a:p>
@@ -8989,13 +9703,13 @@
   <p:clrMapOvr>
     <a:masterClrMapping/>
   </p:clrMapOvr>
-  <mc:AlternateContent xmlns:mc="http://schemas.openxmlformats.org/markup-compatibility/2006">
-    <mc:Choice xmlns:p14="http://schemas.microsoft.com/office/powerpoint/2010/main" Requires="p14">
+  <mc:AlternateContent xmlns:mc="http://schemas.openxmlformats.org/markup-compatibility/2006" xmlns:p14="http://schemas.microsoft.com/office/powerpoint/2010/main">
+    <mc:Choice Requires="p14">
       <p:transition spd="med" p14:dur="700">
         <p:fade/>
       </p:transition>
     </mc:Choice>
-    <mc:Fallback>
+    <mc:Fallback xmlns="">
       <p:transition spd="med">
         <p:fade/>
       </p:transition>
@@ -9023,7 +9737,7 @@
       </p:grpSpPr>
       <p:sp>
         <p:nvSpPr>
-          <p:cNvPr id="7" name="Titolo 6"/>
+          <p:cNvPr id="13" name="Titolo 12"/>
           <p:cNvSpPr>
             <a:spLocks noGrp="1"/>
           </p:cNvSpPr>
@@ -9031,61 +9745,564 @@
             <p:ph type="title"/>
           </p:nvPr>
         </p:nvSpPr>
+        <p:spPr>
+          <a:xfrm>
+            <a:off x="1218883" y="260648"/>
+            <a:ext cx="10360501" cy="1223963"/>
+          </a:xfrm>
+        </p:spPr>
+        <p:txBody>
+          <a:bodyPr rtlCol="0">
+            <a:normAutofit/>
+          </a:bodyPr>
+          <a:lstStyle/>
+          <a:p>
+            <a:pPr rtl="0"/>
+            <a:r>
+              <a:rPr lang="it-IT" sz="5000" b="1" dirty="0"/>
+              <a:t>Risultati – Sentiment Analysis</a:t>
+            </a:r>
+          </a:p>
+        </p:txBody>
+      </p:sp>
+      <p:sp>
+        <p:nvSpPr>
+          <p:cNvPr id="14" name="Segnaposto contenuto 13"/>
+          <p:cNvSpPr>
+            <a:spLocks noGrp="1"/>
+          </p:cNvSpPr>
+          <p:nvPr>
+            <p:ph idx="1"/>
+          </p:nvPr>
+        </p:nvSpPr>
         <p:spPr/>
         <p:txBody>
-          <a:bodyPr rtlCol="0"/>
+          <a:bodyPr rtlCol="0">
+            <a:normAutofit/>
+          </a:bodyPr>
           <a:lstStyle/>
           <a:p>
-            <a:pPr rtl="0"/>
-            <a:r>
-              <a:rPr lang="it-IT" dirty="0"/>
-              <a:t>Layout titolo e contenuto con grafico</a:t>
-            </a:r>
-          </a:p>
-        </p:txBody>
-      </p:sp>
-      <p:graphicFrame>
-        <p:nvGraphicFramePr>
-          <p:cNvPr id="9" name="Segnaposto contenuto 8" descr="Istogramma che mostra i valori di 3 serie per 4 categorie"/>
-          <p:cNvGraphicFramePr>
-            <a:graphicFrameLocks noGrp="1"/>
-          </p:cNvGraphicFramePr>
-          <p:nvPr>
-            <p:ph idx="1"/>
-            <p:extLst>
-              <p:ext uri="{D42A27DB-BD31-4B8C-83A1-F6EECF244321}">
-                <p14:modId xmlns:p14="http://schemas.microsoft.com/office/powerpoint/2010/main" val="2354287857"/>
-              </p:ext>
-            </p:extLst>
-          </p:nvPr>
-        </p:nvGraphicFramePr>
-        <p:xfrm>
-          <a:off x="1219200" y="1701800"/>
-          <a:ext cx="10360025" cy="4462463"/>
-        </p:xfrm>
-        <a:graphic>
-          <a:graphicData uri="http://schemas.openxmlformats.org/drawingml/2006/chart">
-            <c:chart xmlns:c="http://schemas.openxmlformats.org/drawingml/2006/chart" xmlns:r="http://schemas.openxmlformats.org/officeDocument/2006/relationships" r:id="rId3"/>
-          </a:graphicData>
-        </a:graphic>
-      </p:graphicFrame>
+            <a:pPr marL="145253" indent="0" algn="just">
+              <a:buNone/>
+            </a:pPr>
+            <a:endParaRPr lang="it-IT" sz="100" dirty="0"/>
+          </a:p>
+          <a:p>
+            <a:pPr marL="145253" indent="0" algn="just">
+              <a:buNone/>
+            </a:pPr>
+            <a:endParaRPr lang="it-IT" sz="100" dirty="0"/>
+          </a:p>
+          <a:p>
+            <a:pPr marL="145253" indent="0" algn="just">
+              <a:buNone/>
+            </a:pPr>
+            <a:r>
+              <a:rPr lang="it-IT" sz="3000" dirty="0"/>
+              <a:t>La media del Sentiment Analysis dei tweet è: </a:t>
+            </a:r>
+            <a:r>
+              <a:rPr lang="it-IT" sz="3000" b="1" dirty="0"/>
+              <a:t>0.13</a:t>
+            </a:r>
+          </a:p>
+          <a:p>
+            <a:pPr marL="145253" indent="0" algn="just">
+              <a:buNone/>
+            </a:pPr>
+            <a:endParaRPr lang="it-IT" sz="3000" dirty="0"/>
+          </a:p>
+          <a:p>
+            <a:pPr marL="145253" indent="0" algn="just">
+              <a:buNone/>
+            </a:pPr>
+            <a:r>
+              <a:rPr lang="it-IT" sz="3000" dirty="0"/>
+              <a:t>Dei 6000 tweets analizzati sono presenti:</a:t>
+            </a:r>
+          </a:p>
+          <a:p>
+            <a:pPr marL="602453" indent="-457200" algn="just"/>
+            <a:r>
+              <a:rPr lang="it-IT" sz="3000" dirty="0"/>
+              <a:t>Tweet Positivi: </a:t>
+            </a:r>
+            <a:r>
+              <a:rPr lang="it-IT" sz="3000" b="1" dirty="0">
+                <a:solidFill>
+                  <a:srgbClr val="00B050"/>
+                </a:solidFill>
+              </a:rPr>
+              <a:t>2706</a:t>
+            </a:r>
+          </a:p>
+          <a:p>
+            <a:pPr marL="602453" indent="-457200" algn="just"/>
+            <a:r>
+              <a:rPr lang="it-IT" sz="3000" dirty="0"/>
+              <a:t>Tweet Neutrali: </a:t>
+            </a:r>
+            <a:r>
+              <a:rPr lang="it-IT" sz="3000" b="1" dirty="0">
+                <a:solidFill>
+                  <a:srgbClr val="FFC000"/>
+                </a:solidFill>
+              </a:rPr>
+              <a:t>1897</a:t>
+            </a:r>
+          </a:p>
+          <a:p>
+            <a:pPr marL="602453" indent="-457200" algn="just"/>
+            <a:r>
+              <a:rPr lang="it-IT" sz="3000" dirty="0"/>
+              <a:t>Tweet Negativi: </a:t>
+            </a:r>
+            <a:r>
+              <a:rPr lang="it-IT" sz="3000" b="1" dirty="0">
+                <a:solidFill>
+                  <a:srgbClr val="FF0000"/>
+                </a:solidFill>
+              </a:rPr>
+              <a:t>1397</a:t>
+            </a:r>
+            <a:endParaRPr lang="en-US" sz="3000" b="1" dirty="0">
+              <a:solidFill>
+                <a:srgbClr val="FF0000"/>
+              </a:solidFill>
+            </a:endParaRPr>
+          </a:p>
+        </p:txBody>
+      </p:sp>
     </p:spTree>
     <p:extLst>
       <p:ext uri="{BB962C8B-B14F-4D97-AF65-F5344CB8AC3E}">
-        <p14:creationId xmlns:p14="http://schemas.microsoft.com/office/powerpoint/2010/main" val="1484811712"/>
+        <p14:creationId xmlns:p14="http://schemas.microsoft.com/office/powerpoint/2010/main" val="564273718"/>
       </p:ext>
     </p:extLst>
   </p:cSld>
   <p:clrMapOvr>
     <a:masterClrMapping/>
   </p:clrMapOvr>
-  <mc:AlternateContent xmlns:mc="http://schemas.openxmlformats.org/markup-compatibility/2006" xmlns:p14="http://schemas.microsoft.com/office/powerpoint/2010/main">
-    <mc:Choice Requires="p14">
+  <mc:AlternateContent xmlns:mc="http://schemas.openxmlformats.org/markup-compatibility/2006">
+    <mc:Choice xmlns:p14="http://schemas.microsoft.com/office/powerpoint/2010/main" Requires="p14">
       <p:transition spd="med" p14:dur="700">
         <p:fade/>
       </p:transition>
     </mc:Choice>
-    <mc:Fallback xmlns="">
+    <mc:Fallback>
+      <p:transition spd="med">
+        <p:fade/>
+      </p:transition>
+    </mc:Fallback>
+  </mc:AlternateContent>
+</p:sld>
+</file>
+
+<file path=ppt/slides/slide17.xml><?xml version="1.0" encoding="utf-8"?>
+<p:sld xmlns:a="http://schemas.openxmlformats.org/drawingml/2006/main" xmlns:r="http://schemas.openxmlformats.org/officeDocument/2006/relationships" xmlns:p="http://schemas.openxmlformats.org/presentationml/2006/main">
+  <p:cSld>
+    <p:spTree>
+      <p:nvGrpSpPr>
+        <p:cNvPr id="1" name=""/>
+        <p:cNvGrpSpPr/>
+        <p:nvPr/>
+      </p:nvGrpSpPr>
+      <p:grpSpPr>
+        <a:xfrm>
+          <a:off x="0" y="0"/>
+          <a:ext cx="0" cy="0"/>
+          <a:chOff x="0" y="0"/>
+          <a:chExt cx="0" cy="0"/>
+        </a:xfrm>
+      </p:grpSpPr>
+      <p:sp>
+        <p:nvSpPr>
+          <p:cNvPr id="13" name="Titolo 12"/>
+          <p:cNvSpPr>
+            <a:spLocks noGrp="1"/>
+          </p:cNvSpPr>
+          <p:nvPr>
+            <p:ph type="title"/>
+          </p:nvPr>
+        </p:nvSpPr>
+        <p:spPr>
+          <a:xfrm>
+            <a:off x="1218883" y="260648"/>
+            <a:ext cx="10360501" cy="1223963"/>
+          </a:xfrm>
+        </p:spPr>
+        <p:txBody>
+          <a:bodyPr rtlCol="0">
+            <a:normAutofit/>
+          </a:bodyPr>
+          <a:lstStyle/>
+          <a:p>
+            <a:pPr rtl="0"/>
+            <a:r>
+              <a:rPr lang="it-IT" sz="5000" b="1" dirty="0"/>
+              <a:t>Risultati – Sentiment Analysis</a:t>
+            </a:r>
+          </a:p>
+        </p:txBody>
+      </p:sp>
+      <p:sp>
+        <p:nvSpPr>
+          <p:cNvPr id="14" name="Segnaposto contenuto 13"/>
+          <p:cNvSpPr>
+            <a:spLocks noGrp="1"/>
+          </p:cNvSpPr>
+          <p:nvPr>
+            <p:ph idx="1"/>
+          </p:nvPr>
+        </p:nvSpPr>
+        <p:spPr/>
+        <p:txBody>
+          <a:bodyPr rtlCol="0">
+            <a:normAutofit fontScale="77500" lnSpcReduction="20000"/>
+          </a:bodyPr>
+          <a:lstStyle/>
+          <a:p>
+            <a:pPr marL="145253" indent="0" algn="just">
+              <a:buNone/>
+            </a:pPr>
+            <a:endParaRPr lang="it-IT" sz="100" dirty="0"/>
+          </a:p>
+          <a:p>
+            <a:pPr marL="145253" indent="0" algn="just">
+              <a:buNone/>
+            </a:pPr>
+            <a:endParaRPr lang="it-IT" sz="100" dirty="0"/>
+          </a:p>
+          <a:p>
+            <a:pPr marL="145253" indent="0" algn="just">
+              <a:buNone/>
+            </a:pPr>
+            <a:r>
+              <a:rPr lang="en-US" sz="3000" dirty="0"/>
+              <a:t>Congrats to the amazing scientists who created #coronavirus #vaccines to end the #pandemic.</a:t>
+            </a:r>
+          </a:p>
+          <a:p>
+            <a:pPr marL="145253" indent="0" algn="just">
+              <a:buNone/>
+            </a:pPr>
+            <a:r>
+              <a:rPr lang="en-US" sz="3000" dirty="0"/>
+              <a:t>Sentiment: 0.60</a:t>
+            </a:r>
+          </a:p>
+          <a:p>
+            <a:pPr marL="145253" indent="0" algn="just">
+              <a:buNone/>
+            </a:pPr>
+            <a:endParaRPr lang="en-US" sz="3000" dirty="0"/>
+          </a:p>
+          <a:p>
+            <a:pPr marL="145253" indent="0" algn="just">
+              <a:buNone/>
+            </a:pPr>
+            <a:r>
+              <a:rPr lang="en-US" sz="3000" dirty="0"/>
+              <a:t>Testo: #Biden administration finalizes #deal for #200 #million #vaccine doses from #Pfizer, #Moderna</a:t>
+            </a:r>
+          </a:p>
+          <a:p>
+            <a:pPr marL="145253" indent="0" algn="just">
+              <a:buNone/>
+            </a:pPr>
+            <a:r>
+              <a:rPr lang="en-US" sz="3000" dirty="0"/>
+              <a:t>Sentiment: 0.0</a:t>
+            </a:r>
+          </a:p>
+          <a:p>
+            <a:pPr marL="145253" indent="0" algn="just">
+              <a:buNone/>
+            </a:pPr>
+            <a:endParaRPr lang="en-US" sz="3000" dirty="0"/>
+          </a:p>
+          <a:p>
+            <a:pPr marL="145253" indent="0" algn="just">
+              <a:buNone/>
+            </a:pPr>
+            <a:r>
+              <a:rPr lang="en-US" sz="3000" dirty="0"/>
+              <a:t>Testo: Russian woman after mRNA #SputnikV is very sick and terrified.</a:t>
+            </a:r>
+          </a:p>
+          <a:p>
+            <a:pPr marL="145253" indent="0" algn="just">
+              <a:buNone/>
+            </a:pPr>
+            <a:r>
+              <a:rPr lang="en-US" sz="3000" dirty="0"/>
+              <a:t>Sentiment: -0.46</a:t>
+            </a:r>
+          </a:p>
+        </p:txBody>
+      </p:sp>
+    </p:spTree>
+    <p:extLst>
+      <p:ext uri="{BB962C8B-B14F-4D97-AF65-F5344CB8AC3E}">
+        <p14:creationId xmlns:p14="http://schemas.microsoft.com/office/powerpoint/2010/main" val="2427094659"/>
+      </p:ext>
+    </p:extLst>
+  </p:cSld>
+  <p:clrMapOvr>
+    <a:masterClrMapping/>
+  </p:clrMapOvr>
+  <mc:AlternateContent xmlns:mc="http://schemas.openxmlformats.org/markup-compatibility/2006">
+    <mc:Choice xmlns:p14="http://schemas.microsoft.com/office/powerpoint/2010/main" Requires="p14">
+      <p:transition spd="med" p14:dur="700">
+        <p:fade/>
+      </p:transition>
+    </mc:Choice>
+    <mc:Fallback>
+      <p:transition spd="med">
+        <p:fade/>
+      </p:transition>
+    </mc:Fallback>
+  </mc:AlternateContent>
+</p:sld>
+</file>
+
+<file path=ppt/slides/slide18.xml><?xml version="1.0" encoding="utf-8"?>
+<p:sld xmlns:a="http://schemas.openxmlformats.org/drawingml/2006/main" xmlns:r="http://schemas.openxmlformats.org/officeDocument/2006/relationships" xmlns:p="http://schemas.openxmlformats.org/presentationml/2006/main">
+  <p:cSld>
+    <p:spTree>
+      <p:nvGrpSpPr>
+        <p:cNvPr id="1" name=""/>
+        <p:cNvGrpSpPr/>
+        <p:nvPr/>
+      </p:nvGrpSpPr>
+      <p:grpSpPr>
+        <a:xfrm>
+          <a:off x="0" y="0"/>
+          <a:ext cx="0" cy="0"/>
+          <a:chOff x="0" y="0"/>
+          <a:chExt cx="0" cy="0"/>
+        </a:xfrm>
+      </p:grpSpPr>
+      <p:sp>
+        <p:nvSpPr>
+          <p:cNvPr id="13" name="Titolo 12"/>
+          <p:cNvSpPr>
+            <a:spLocks noGrp="1"/>
+          </p:cNvSpPr>
+          <p:nvPr>
+            <p:ph type="title"/>
+          </p:nvPr>
+        </p:nvSpPr>
+        <p:spPr>
+          <a:xfrm>
+            <a:off x="1218883" y="260648"/>
+            <a:ext cx="10360501" cy="1223963"/>
+          </a:xfrm>
+        </p:spPr>
+        <p:txBody>
+          <a:bodyPr rtlCol="0">
+            <a:normAutofit/>
+          </a:bodyPr>
+          <a:lstStyle/>
+          <a:p>
+            <a:pPr rtl="0"/>
+            <a:r>
+              <a:rPr lang="it-IT" sz="5000" b="1" dirty="0"/>
+              <a:t>Sentiment di frasi scelte dall’utente </a:t>
+            </a:r>
+          </a:p>
+        </p:txBody>
+      </p:sp>
+      <p:sp>
+        <p:nvSpPr>
+          <p:cNvPr id="14" name="Segnaposto contenuto 13"/>
+          <p:cNvSpPr>
+            <a:spLocks noGrp="1"/>
+          </p:cNvSpPr>
+          <p:nvPr>
+            <p:ph idx="1"/>
+          </p:nvPr>
+        </p:nvSpPr>
+        <p:spPr/>
+        <p:txBody>
+          <a:bodyPr rtlCol="0">
+            <a:normAutofit/>
+          </a:bodyPr>
+          <a:lstStyle/>
+          <a:p>
+            <a:pPr marL="145253" indent="0" algn="just">
+              <a:buNone/>
+            </a:pPr>
+            <a:endParaRPr lang="en-US" sz="3000" dirty="0"/>
+          </a:p>
+          <a:p>
+            <a:pPr marL="145253" indent="0" algn="just">
+              <a:buNone/>
+            </a:pPr>
+            <a:r>
+              <a:rPr lang="it-IT" sz="3000" dirty="0"/>
+              <a:t>Il programma realizzato utilizza il modello di </a:t>
+            </a:r>
+            <a:r>
+              <a:rPr lang="it-IT" sz="3000" b="1" dirty="0"/>
+              <a:t>regressione logistica</a:t>
+            </a:r>
+            <a:r>
+              <a:rPr lang="it-IT" sz="3000" dirty="0"/>
+              <a:t> per addestrare un classificatore di sentimenti sui tweet.</a:t>
+            </a:r>
+          </a:p>
+          <a:p>
+            <a:pPr marL="145253" indent="0" algn="just">
+              <a:buNone/>
+            </a:pPr>
+            <a:endParaRPr lang="it-IT" sz="3000" dirty="0"/>
+          </a:p>
+          <a:p>
+            <a:pPr marL="145253" indent="0" algn="just">
+              <a:buNone/>
+            </a:pPr>
+            <a:r>
+              <a:rPr lang="it-IT" sz="3000" dirty="0"/>
+              <a:t>La Regressione Logistica è un algoritmo di Machine Learning che viene utilizzato per risolvere problemi di classificazione. Questo algoritmo assegna ad ogni istanza del dataset un valore per etichettarlo. </a:t>
+            </a:r>
+          </a:p>
+          <a:p>
+            <a:pPr marL="145253" indent="0" algn="just">
+              <a:buNone/>
+            </a:pPr>
+            <a:endParaRPr lang="it-IT" sz="3000" dirty="0"/>
+          </a:p>
+        </p:txBody>
+      </p:sp>
+    </p:spTree>
+    <p:extLst>
+      <p:ext uri="{BB962C8B-B14F-4D97-AF65-F5344CB8AC3E}">
+        <p14:creationId xmlns:p14="http://schemas.microsoft.com/office/powerpoint/2010/main" val="3434551019"/>
+      </p:ext>
+    </p:extLst>
+  </p:cSld>
+  <p:clrMapOvr>
+    <a:masterClrMapping/>
+  </p:clrMapOvr>
+  <mc:AlternateContent xmlns:mc="http://schemas.openxmlformats.org/markup-compatibility/2006">
+    <mc:Choice xmlns:p14="http://schemas.microsoft.com/office/powerpoint/2010/main" Requires="p14">
+      <p:transition spd="med" p14:dur="700">
+        <p:fade/>
+      </p:transition>
+    </mc:Choice>
+    <mc:Fallback>
+      <p:transition spd="med">
+        <p:fade/>
+      </p:transition>
+    </mc:Fallback>
+  </mc:AlternateContent>
+</p:sld>
+</file>
+
+<file path=ppt/slides/slide19.xml><?xml version="1.0" encoding="utf-8"?>
+<p:sld xmlns:a="http://schemas.openxmlformats.org/drawingml/2006/main" xmlns:r="http://schemas.openxmlformats.org/officeDocument/2006/relationships" xmlns:p="http://schemas.openxmlformats.org/presentationml/2006/main">
+  <p:cSld>
+    <p:spTree>
+      <p:nvGrpSpPr>
+        <p:cNvPr id="1" name=""/>
+        <p:cNvGrpSpPr/>
+        <p:nvPr/>
+      </p:nvGrpSpPr>
+      <p:grpSpPr>
+        <a:xfrm>
+          <a:off x="0" y="0"/>
+          <a:ext cx="0" cy="0"/>
+          <a:chOff x="0" y="0"/>
+          <a:chExt cx="0" cy="0"/>
+        </a:xfrm>
+      </p:grpSpPr>
+      <p:sp>
+        <p:nvSpPr>
+          <p:cNvPr id="13" name="Titolo 12"/>
+          <p:cNvSpPr>
+            <a:spLocks noGrp="1"/>
+          </p:cNvSpPr>
+          <p:nvPr>
+            <p:ph type="title"/>
+          </p:nvPr>
+        </p:nvSpPr>
+        <p:spPr>
+          <a:xfrm>
+            <a:off x="1218883" y="260648"/>
+            <a:ext cx="10360501" cy="1223963"/>
+          </a:xfrm>
+        </p:spPr>
+        <p:txBody>
+          <a:bodyPr rtlCol="0">
+            <a:normAutofit/>
+          </a:bodyPr>
+          <a:lstStyle/>
+          <a:p>
+            <a:pPr rtl="0"/>
+            <a:r>
+              <a:rPr lang="it-IT" sz="5000" b="1" dirty="0"/>
+              <a:t>Risultati delle frasi scelte dall’utente </a:t>
+            </a:r>
+          </a:p>
+        </p:txBody>
+      </p:sp>
+      <p:sp>
+        <p:nvSpPr>
+          <p:cNvPr id="14" name="Segnaposto contenuto 13"/>
+          <p:cNvSpPr>
+            <a:spLocks noGrp="1"/>
+          </p:cNvSpPr>
+          <p:nvPr>
+            <p:ph idx="1"/>
+          </p:nvPr>
+        </p:nvSpPr>
+        <p:spPr/>
+        <p:txBody>
+          <a:bodyPr rtlCol="0">
+            <a:normAutofit/>
+          </a:bodyPr>
+          <a:lstStyle/>
+          <a:p>
+            <a:pPr marL="145253" indent="0" algn="just">
+              <a:buNone/>
+            </a:pPr>
+            <a:endParaRPr lang="en-US" sz="3000" dirty="0"/>
+          </a:p>
+          <a:p>
+            <a:pPr marL="145253" indent="0" algn="just">
+              <a:buNone/>
+            </a:pPr>
+            <a:r>
+              <a:rPr lang="it-IT" sz="3000" dirty="0"/>
+              <a:t>To DO: Vedere se togliere </a:t>
+            </a:r>
+          </a:p>
+          <a:p>
+            <a:pPr marL="145253" indent="0" algn="just">
+              <a:buNone/>
+            </a:pPr>
+            <a:endParaRPr lang="it-IT" sz="3000" dirty="0"/>
+          </a:p>
+        </p:txBody>
+      </p:sp>
+    </p:spTree>
+    <p:extLst>
+      <p:ext uri="{BB962C8B-B14F-4D97-AF65-F5344CB8AC3E}">
+        <p14:creationId xmlns:p14="http://schemas.microsoft.com/office/powerpoint/2010/main" val="275754347"/>
+      </p:ext>
+    </p:extLst>
+  </p:cSld>
+  <p:clrMapOvr>
+    <a:masterClrMapping/>
+  </p:clrMapOvr>
+  <mc:AlternateContent xmlns:mc="http://schemas.openxmlformats.org/markup-compatibility/2006">
+    <mc:Choice xmlns:p14="http://schemas.microsoft.com/office/powerpoint/2010/main" Requires="p14">
+      <p:transition spd="med" p14:dur="700">
+        <p:fade/>
+      </p:transition>
+    </mc:Choice>
+    <mc:Fallback>
       <p:transition spd="med">
         <p:fade/>
       </p:transition>
@@ -9188,6 +10405,663 @@
     <p:extLst>
       <p:ext uri="{BB962C8B-B14F-4D97-AF65-F5344CB8AC3E}">
         <p14:creationId xmlns:p14="http://schemas.microsoft.com/office/powerpoint/2010/main" val="3529114326"/>
+      </p:ext>
+    </p:extLst>
+  </p:cSld>
+  <p:clrMapOvr>
+    <a:masterClrMapping/>
+  </p:clrMapOvr>
+  <mc:AlternateContent xmlns:mc="http://schemas.openxmlformats.org/markup-compatibility/2006" xmlns:p14="http://schemas.microsoft.com/office/powerpoint/2010/main">
+    <mc:Choice Requires="p14">
+      <p:transition spd="med" p14:dur="700">
+        <p:fade/>
+      </p:transition>
+    </mc:Choice>
+    <mc:Fallback xmlns="">
+      <p:transition spd="med">
+        <p:fade/>
+      </p:transition>
+    </mc:Fallback>
+  </mc:AlternateContent>
+</p:sld>
+</file>
+
+<file path=ppt/slides/slide20.xml><?xml version="1.0" encoding="utf-8"?>
+<p:sld xmlns:a="http://schemas.openxmlformats.org/drawingml/2006/main" xmlns:r="http://schemas.openxmlformats.org/officeDocument/2006/relationships" xmlns:p="http://schemas.openxmlformats.org/presentationml/2006/main">
+  <p:cSld>
+    <p:spTree>
+      <p:nvGrpSpPr>
+        <p:cNvPr id="1" name=""/>
+        <p:cNvGrpSpPr/>
+        <p:nvPr/>
+      </p:nvGrpSpPr>
+      <p:grpSpPr>
+        <a:xfrm>
+          <a:off x="0" y="0"/>
+          <a:ext cx="0" cy="0"/>
+          <a:chOff x="0" y="0"/>
+          <a:chExt cx="0" cy="0"/>
+        </a:xfrm>
+      </p:grpSpPr>
+      <p:sp>
+        <p:nvSpPr>
+          <p:cNvPr id="13" name="Titolo 12"/>
+          <p:cNvSpPr>
+            <a:spLocks noGrp="1"/>
+          </p:cNvSpPr>
+          <p:nvPr>
+            <p:ph type="title"/>
+          </p:nvPr>
+        </p:nvSpPr>
+        <p:spPr>
+          <a:xfrm>
+            <a:off x="1218883" y="260648"/>
+            <a:ext cx="10360501" cy="1223963"/>
+          </a:xfrm>
+        </p:spPr>
+        <p:txBody>
+          <a:bodyPr rtlCol="0">
+            <a:normAutofit/>
+          </a:bodyPr>
+          <a:lstStyle/>
+          <a:p>
+            <a:pPr rtl="0"/>
+            <a:r>
+              <a:rPr lang="it-IT" sz="5000" b="1" dirty="0"/>
+              <a:t>Natural Language Processing</a:t>
+            </a:r>
+          </a:p>
+        </p:txBody>
+      </p:sp>
+      <p:sp>
+        <p:nvSpPr>
+          <p:cNvPr id="14" name="Segnaposto contenuto 13"/>
+          <p:cNvSpPr>
+            <a:spLocks noGrp="1"/>
+          </p:cNvSpPr>
+          <p:nvPr>
+            <p:ph idx="1"/>
+          </p:nvPr>
+        </p:nvSpPr>
+        <p:spPr/>
+        <p:txBody>
+          <a:bodyPr rtlCol="0">
+            <a:normAutofit/>
+          </a:bodyPr>
+          <a:lstStyle/>
+          <a:p>
+            <a:pPr marL="145253" indent="0" algn="just">
+              <a:buNone/>
+            </a:pPr>
+            <a:endParaRPr lang="en-US" sz="3000" dirty="0"/>
+          </a:p>
+          <a:p>
+            <a:pPr marL="145253" indent="0" algn="just">
+              <a:buNone/>
+            </a:pPr>
+            <a:r>
+              <a:rPr lang="it-IT" sz="3000" dirty="0"/>
+              <a:t>Il Natural Language Processing (NLP) è una tecnologia che permette di processare e analizzare il linguaggio naturale umano. </a:t>
+            </a:r>
+          </a:p>
+          <a:p>
+            <a:pPr marL="145253" indent="0" algn="just">
+              <a:buNone/>
+            </a:pPr>
+            <a:endParaRPr lang="it-IT" sz="3000" dirty="0"/>
+          </a:p>
+          <a:p>
+            <a:pPr marL="145253" indent="0" algn="just">
+              <a:buNone/>
+            </a:pPr>
+            <a:r>
+              <a:rPr lang="it-IT" sz="3000" dirty="0"/>
+              <a:t>Spacy è una libreria Python utilizzata per l'elaborazione del linguaggio naturale, che fornisce delle funzioni utili per eseguire operazioni di NLP.</a:t>
+            </a:r>
+          </a:p>
+        </p:txBody>
+      </p:sp>
+    </p:spTree>
+    <p:extLst>
+      <p:ext uri="{BB962C8B-B14F-4D97-AF65-F5344CB8AC3E}">
+        <p14:creationId xmlns:p14="http://schemas.microsoft.com/office/powerpoint/2010/main" val="2883616358"/>
+      </p:ext>
+    </p:extLst>
+  </p:cSld>
+  <p:clrMapOvr>
+    <a:masterClrMapping/>
+  </p:clrMapOvr>
+  <mc:AlternateContent xmlns:mc="http://schemas.openxmlformats.org/markup-compatibility/2006">
+    <mc:Choice xmlns:p14="http://schemas.microsoft.com/office/powerpoint/2010/main" Requires="p14">
+      <p:transition spd="med" p14:dur="700">
+        <p:fade/>
+      </p:transition>
+    </mc:Choice>
+    <mc:Fallback>
+      <p:transition spd="med">
+        <p:fade/>
+      </p:transition>
+    </mc:Fallback>
+  </mc:AlternateContent>
+</p:sld>
+</file>
+
+<file path=ppt/slides/slide21.xml><?xml version="1.0" encoding="utf-8"?>
+<p:sld xmlns:a="http://schemas.openxmlformats.org/drawingml/2006/main" xmlns:r="http://schemas.openxmlformats.org/officeDocument/2006/relationships" xmlns:p="http://schemas.openxmlformats.org/presentationml/2006/main">
+  <p:cSld>
+    <p:spTree>
+      <p:nvGrpSpPr>
+        <p:cNvPr id="1" name=""/>
+        <p:cNvGrpSpPr/>
+        <p:nvPr/>
+      </p:nvGrpSpPr>
+      <p:grpSpPr>
+        <a:xfrm>
+          <a:off x="0" y="0"/>
+          <a:ext cx="0" cy="0"/>
+          <a:chOff x="0" y="0"/>
+          <a:chExt cx="0" cy="0"/>
+        </a:xfrm>
+      </p:grpSpPr>
+      <p:sp>
+        <p:nvSpPr>
+          <p:cNvPr id="13" name="Titolo 12"/>
+          <p:cNvSpPr>
+            <a:spLocks noGrp="1"/>
+          </p:cNvSpPr>
+          <p:nvPr>
+            <p:ph type="title"/>
+          </p:nvPr>
+        </p:nvSpPr>
+        <p:spPr>
+          <a:xfrm>
+            <a:off x="1218883" y="260648"/>
+            <a:ext cx="10360501" cy="1223963"/>
+          </a:xfrm>
+        </p:spPr>
+        <p:txBody>
+          <a:bodyPr rtlCol="0">
+            <a:normAutofit/>
+          </a:bodyPr>
+          <a:lstStyle/>
+          <a:p>
+            <a:pPr rtl="0"/>
+            <a:r>
+              <a:rPr lang="it-IT" sz="5000" b="1" dirty="0"/>
+              <a:t>Spacy</a:t>
+            </a:r>
+          </a:p>
+        </p:txBody>
+      </p:sp>
+      <p:sp>
+        <p:nvSpPr>
+          <p:cNvPr id="14" name="Segnaposto contenuto 13"/>
+          <p:cNvSpPr>
+            <a:spLocks noGrp="1"/>
+          </p:cNvSpPr>
+          <p:nvPr>
+            <p:ph idx="1"/>
+          </p:nvPr>
+        </p:nvSpPr>
+        <p:spPr/>
+        <p:txBody>
+          <a:bodyPr rtlCol="0">
+            <a:normAutofit/>
+          </a:bodyPr>
+          <a:lstStyle/>
+          <a:p>
+            <a:pPr marL="145253" indent="0" algn="just">
+              <a:buNone/>
+            </a:pPr>
+            <a:endParaRPr lang="en-US" sz="3000" dirty="0"/>
+          </a:p>
+          <a:p>
+            <a:pPr marL="145253" indent="0" algn="just">
+              <a:buNone/>
+            </a:pPr>
+            <a:r>
+              <a:rPr lang="it-IT" sz="3000" dirty="0"/>
+              <a:t>Spacy consente di effettuare: </a:t>
+            </a:r>
+          </a:p>
+          <a:p>
+            <a:pPr marL="145253" indent="0" algn="just">
+              <a:buNone/>
+            </a:pPr>
+            <a:endParaRPr lang="it-IT" sz="3000" dirty="0"/>
+          </a:p>
+          <a:p>
+            <a:pPr marL="602453" indent="-457200" algn="just"/>
+            <a:r>
+              <a:rPr lang="it-IT" sz="3000" dirty="0"/>
+              <a:t>Analisi della sintassi</a:t>
+            </a:r>
+          </a:p>
+          <a:p>
+            <a:pPr marL="602453" indent="-457200" algn="just"/>
+            <a:r>
+              <a:rPr lang="it-IT" sz="3000" dirty="0"/>
+              <a:t>Estrazione di informazioni </a:t>
+            </a:r>
+          </a:p>
+          <a:p>
+            <a:pPr marL="602453" indent="-457200" algn="just"/>
+            <a:r>
+              <a:rPr lang="it-IT" sz="3000" dirty="0"/>
+              <a:t>Classificazione del testo</a:t>
+            </a:r>
+          </a:p>
+        </p:txBody>
+      </p:sp>
+    </p:spTree>
+    <p:extLst>
+      <p:ext uri="{BB962C8B-B14F-4D97-AF65-F5344CB8AC3E}">
+        <p14:creationId xmlns:p14="http://schemas.microsoft.com/office/powerpoint/2010/main" val="4094612344"/>
+      </p:ext>
+    </p:extLst>
+  </p:cSld>
+  <p:clrMapOvr>
+    <a:masterClrMapping/>
+  </p:clrMapOvr>
+  <mc:AlternateContent xmlns:mc="http://schemas.openxmlformats.org/markup-compatibility/2006">
+    <mc:Choice xmlns:p14="http://schemas.microsoft.com/office/powerpoint/2010/main" Requires="p14">
+      <p:transition spd="med" p14:dur="700">
+        <p:fade/>
+      </p:transition>
+    </mc:Choice>
+    <mc:Fallback>
+      <p:transition spd="med">
+        <p:fade/>
+      </p:transition>
+    </mc:Fallback>
+  </mc:AlternateContent>
+</p:sld>
+</file>
+
+<file path=ppt/slides/slide22.xml><?xml version="1.0" encoding="utf-8"?>
+<p:sld xmlns:a="http://schemas.openxmlformats.org/drawingml/2006/main" xmlns:r="http://schemas.openxmlformats.org/officeDocument/2006/relationships" xmlns:p="http://schemas.openxmlformats.org/presentationml/2006/main">
+  <p:cSld>
+    <p:spTree>
+      <p:nvGrpSpPr>
+        <p:cNvPr id="1" name=""/>
+        <p:cNvGrpSpPr/>
+        <p:nvPr/>
+      </p:nvGrpSpPr>
+      <p:grpSpPr>
+        <a:xfrm>
+          <a:off x="0" y="0"/>
+          <a:ext cx="0" cy="0"/>
+          <a:chOff x="0" y="0"/>
+          <a:chExt cx="0" cy="0"/>
+        </a:xfrm>
+      </p:grpSpPr>
+      <p:sp>
+        <p:nvSpPr>
+          <p:cNvPr id="13" name="Titolo 12"/>
+          <p:cNvSpPr>
+            <a:spLocks noGrp="1"/>
+          </p:cNvSpPr>
+          <p:nvPr>
+            <p:ph type="title"/>
+          </p:nvPr>
+        </p:nvSpPr>
+        <p:spPr>
+          <a:xfrm>
+            <a:off x="1218883" y="260648"/>
+            <a:ext cx="10360501" cy="1223963"/>
+          </a:xfrm>
+        </p:spPr>
+        <p:txBody>
+          <a:bodyPr rtlCol="0">
+            <a:normAutofit/>
+          </a:bodyPr>
+          <a:lstStyle/>
+          <a:p>
+            <a:pPr rtl="0"/>
+            <a:r>
+              <a:rPr lang="it-IT" sz="5000" b="1" dirty="0"/>
+              <a:t>Parole maggiormente utilizzate</a:t>
+            </a:r>
+          </a:p>
+        </p:txBody>
+      </p:sp>
+      <p:sp>
+        <p:nvSpPr>
+          <p:cNvPr id="14" name="Segnaposto contenuto 13"/>
+          <p:cNvSpPr>
+            <a:spLocks noGrp="1"/>
+          </p:cNvSpPr>
+          <p:nvPr>
+            <p:ph idx="1"/>
+          </p:nvPr>
+        </p:nvSpPr>
+        <p:spPr/>
+        <p:txBody>
+          <a:bodyPr numCol="2" rtlCol="0">
+            <a:normAutofit/>
+          </a:bodyPr>
+          <a:lstStyle/>
+          <a:p>
+            <a:pPr marL="145253" indent="0" algn="just">
+              <a:buNone/>
+            </a:pPr>
+            <a:endParaRPr lang="en-US" sz="3000" dirty="0"/>
+          </a:p>
+          <a:p>
+            <a:pPr marL="659603" indent="-514350" algn="just">
+              <a:buFont typeface="+mj-lt"/>
+              <a:buAutoNum type="arabicPeriod"/>
+            </a:pPr>
+            <a:r>
+              <a:rPr lang="it-IT" sz="3000" dirty="0"/>
+              <a:t>Vaccine</a:t>
+            </a:r>
+          </a:p>
+          <a:p>
+            <a:pPr marL="659603" indent="-514350" algn="just">
+              <a:buFont typeface="+mj-lt"/>
+              <a:buAutoNum type="arabicPeriod"/>
+            </a:pPr>
+            <a:r>
+              <a:rPr lang="it-IT" sz="3000" dirty="0"/>
+              <a:t>Moderna</a:t>
+            </a:r>
+          </a:p>
+          <a:p>
+            <a:pPr marL="659603" indent="-514350" algn="just">
+              <a:buFont typeface="+mj-lt"/>
+              <a:buAutoNum type="arabicPeriod"/>
+            </a:pPr>
+            <a:r>
+              <a:rPr lang="it-IT" sz="3000" dirty="0"/>
+              <a:t>Covaxin</a:t>
+            </a:r>
+          </a:p>
+          <a:p>
+            <a:pPr marL="659603" indent="-514350" algn="just">
+              <a:buFont typeface="+mj-lt"/>
+              <a:buAutoNum type="arabicPeriod"/>
+            </a:pPr>
+            <a:r>
+              <a:rPr lang="it-IT" sz="3000" dirty="0"/>
+              <a:t>COVID19</a:t>
+            </a:r>
+          </a:p>
+          <a:p>
+            <a:pPr marL="659603" indent="-514350" algn="just">
+              <a:buFont typeface="+mj-lt"/>
+              <a:buAutoNum type="arabicPeriod"/>
+            </a:pPr>
+            <a:r>
+              <a:rPr lang="it-IT" sz="3000" dirty="0"/>
+              <a:t>SputnikV</a:t>
+            </a:r>
+          </a:p>
+          <a:p>
+            <a:pPr marL="659603" indent="-514350" algn="just">
+              <a:buFont typeface="+mj-lt"/>
+              <a:buAutoNum type="arabicPeriod"/>
+            </a:pPr>
+            <a:endParaRPr lang="it-IT" sz="3000" dirty="0"/>
+          </a:p>
+          <a:p>
+            <a:pPr marL="659603" indent="-514350" algn="just">
+              <a:buFont typeface="+mj-lt"/>
+              <a:buAutoNum type="arabicPeriod"/>
+            </a:pPr>
+            <a:endParaRPr lang="it-IT" sz="3000" dirty="0"/>
+          </a:p>
+          <a:p>
+            <a:pPr marL="659603" indent="-514350" algn="just">
+              <a:buFont typeface="+mj-lt"/>
+              <a:buAutoNum type="arabicPeriod"/>
+            </a:pPr>
+            <a:r>
+              <a:rPr lang="it-IT" sz="3000" dirty="0"/>
+              <a:t>Pfizer</a:t>
+            </a:r>
+          </a:p>
+          <a:p>
+            <a:pPr marL="659603" indent="-514350" algn="just">
+              <a:buFont typeface="+mj-lt"/>
+              <a:buAutoNum type="arabicPeriod"/>
+            </a:pPr>
+            <a:r>
+              <a:rPr lang="it-IT" sz="3000" dirty="0"/>
+              <a:t>Vaccines</a:t>
+            </a:r>
+          </a:p>
+          <a:p>
+            <a:pPr marL="659603" indent="-514350" algn="just">
+              <a:buFont typeface="+mj-lt"/>
+              <a:buAutoNum type="arabicPeriod"/>
+            </a:pPr>
+            <a:r>
+              <a:rPr lang="it-IT" sz="3000" dirty="0"/>
+              <a:t>First</a:t>
+            </a:r>
+          </a:p>
+          <a:p>
+            <a:pPr marL="659603" indent="-514350" algn="just">
+              <a:buFont typeface="+mj-lt"/>
+              <a:buAutoNum type="arabicPeriod"/>
+            </a:pPr>
+            <a:r>
+              <a:rPr lang="it-IT" sz="3000" dirty="0"/>
+              <a:t>Dose</a:t>
+            </a:r>
+          </a:p>
+          <a:p>
+            <a:pPr marL="659603" indent="-514350" algn="just">
+              <a:buFont typeface="+mj-lt"/>
+              <a:buAutoNum type="arabicPeriod"/>
+            </a:pPr>
+            <a:r>
+              <a:rPr lang="it-IT" sz="3000" dirty="0"/>
+              <a:t> PfizerBioNTech</a:t>
+            </a:r>
+          </a:p>
+        </p:txBody>
+      </p:sp>
+    </p:spTree>
+    <p:extLst>
+      <p:ext uri="{BB962C8B-B14F-4D97-AF65-F5344CB8AC3E}">
+        <p14:creationId xmlns:p14="http://schemas.microsoft.com/office/powerpoint/2010/main" val="1518665190"/>
+      </p:ext>
+    </p:extLst>
+  </p:cSld>
+  <p:clrMapOvr>
+    <a:masterClrMapping/>
+  </p:clrMapOvr>
+  <mc:AlternateContent xmlns:mc="http://schemas.openxmlformats.org/markup-compatibility/2006">
+    <mc:Choice xmlns:p14="http://schemas.microsoft.com/office/powerpoint/2010/main" Requires="p14">
+      <p:transition spd="med" p14:dur="700">
+        <p:fade/>
+      </p:transition>
+    </mc:Choice>
+    <mc:Fallback>
+      <p:transition spd="med">
+        <p:fade/>
+      </p:transition>
+    </mc:Fallback>
+  </mc:AlternateContent>
+</p:sld>
+</file>
+
+<file path=ppt/slides/slide23.xml><?xml version="1.0" encoding="utf-8"?>
+<p:sld xmlns:a="http://schemas.openxmlformats.org/drawingml/2006/main" xmlns:r="http://schemas.openxmlformats.org/officeDocument/2006/relationships" xmlns:p="http://schemas.openxmlformats.org/presentationml/2006/main">
+  <p:cSld>
+    <p:spTree>
+      <p:nvGrpSpPr>
+        <p:cNvPr id="1" name=""/>
+        <p:cNvGrpSpPr/>
+        <p:nvPr/>
+      </p:nvGrpSpPr>
+      <p:grpSpPr>
+        <a:xfrm>
+          <a:off x="0" y="0"/>
+          <a:ext cx="0" cy="0"/>
+          <a:chOff x="0" y="0"/>
+          <a:chExt cx="0" cy="0"/>
+        </a:xfrm>
+      </p:grpSpPr>
+      <p:sp>
+        <p:nvSpPr>
+          <p:cNvPr id="13" name="Titolo 12"/>
+          <p:cNvSpPr>
+            <a:spLocks noGrp="1"/>
+          </p:cNvSpPr>
+          <p:nvPr>
+            <p:ph type="title"/>
+          </p:nvPr>
+        </p:nvSpPr>
+        <p:spPr>
+          <a:xfrm>
+            <a:off x="1218883" y="260648"/>
+            <a:ext cx="10360501" cy="1223963"/>
+          </a:xfrm>
+        </p:spPr>
+        <p:txBody>
+          <a:bodyPr rtlCol="0">
+            <a:normAutofit/>
+          </a:bodyPr>
+          <a:lstStyle/>
+          <a:p>
+            <a:pPr rtl="0"/>
+            <a:r>
+              <a:rPr lang="it-IT" sz="5000" b="1" dirty="0"/>
+              <a:t>Identificazione dei sostantivi</a:t>
+            </a:r>
+          </a:p>
+        </p:txBody>
+      </p:sp>
+      <p:sp>
+        <p:nvSpPr>
+          <p:cNvPr id="14" name="Segnaposto contenuto 13"/>
+          <p:cNvSpPr>
+            <a:spLocks noGrp="1"/>
+          </p:cNvSpPr>
+          <p:nvPr>
+            <p:ph idx="1"/>
+          </p:nvPr>
+        </p:nvSpPr>
+        <p:spPr/>
+        <p:txBody>
+          <a:bodyPr rtlCol="0">
+            <a:normAutofit/>
+          </a:bodyPr>
+          <a:lstStyle/>
+          <a:p>
+            <a:pPr marL="145253" indent="0" algn="just">
+              <a:buNone/>
+            </a:pPr>
+            <a:endParaRPr lang="en-US" sz="3000" dirty="0"/>
+          </a:p>
+          <a:p>
+            <a:pPr marL="145253" indent="0" algn="just">
+              <a:buNone/>
+            </a:pPr>
+            <a:r>
+              <a:rPr lang="it-IT" sz="3000" dirty="0"/>
+              <a:t>Spacy ci ha permesso di identificare i sostantivi presenti nei tweet a partire da un modello della lingua inglese. </a:t>
+            </a:r>
+          </a:p>
+        </p:txBody>
+      </p:sp>
+    </p:spTree>
+    <p:extLst>
+      <p:ext uri="{BB962C8B-B14F-4D97-AF65-F5344CB8AC3E}">
+        <p14:creationId xmlns:p14="http://schemas.microsoft.com/office/powerpoint/2010/main" val="2911635079"/>
+      </p:ext>
+    </p:extLst>
+  </p:cSld>
+  <p:clrMapOvr>
+    <a:masterClrMapping/>
+  </p:clrMapOvr>
+  <mc:AlternateContent xmlns:mc="http://schemas.openxmlformats.org/markup-compatibility/2006">
+    <mc:Choice xmlns:p14="http://schemas.microsoft.com/office/powerpoint/2010/main" Requires="p14">
+      <p:transition spd="med" p14:dur="700">
+        <p:fade/>
+      </p:transition>
+    </mc:Choice>
+    <mc:Fallback>
+      <p:transition spd="med">
+        <p:fade/>
+      </p:transition>
+    </mc:Fallback>
+  </mc:AlternateContent>
+</p:sld>
+</file>
+
+<file path=ppt/slides/slide24.xml><?xml version="1.0" encoding="utf-8"?>
+<p:sld xmlns:a="http://schemas.openxmlformats.org/drawingml/2006/main" xmlns:r="http://schemas.openxmlformats.org/officeDocument/2006/relationships" xmlns:p="http://schemas.openxmlformats.org/presentationml/2006/main">
+  <p:cSld>
+    <p:spTree>
+      <p:nvGrpSpPr>
+        <p:cNvPr id="1" name=""/>
+        <p:cNvGrpSpPr/>
+        <p:nvPr/>
+      </p:nvGrpSpPr>
+      <p:grpSpPr>
+        <a:xfrm>
+          <a:off x="0" y="0"/>
+          <a:ext cx="0" cy="0"/>
+          <a:chOff x="0" y="0"/>
+          <a:chExt cx="0" cy="0"/>
+        </a:xfrm>
+      </p:grpSpPr>
+      <p:sp>
+        <p:nvSpPr>
+          <p:cNvPr id="7" name="Titolo 6"/>
+          <p:cNvSpPr>
+            <a:spLocks noGrp="1"/>
+          </p:cNvSpPr>
+          <p:nvPr>
+            <p:ph type="title"/>
+          </p:nvPr>
+        </p:nvSpPr>
+        <p:spPr/>
+        <p:txBody>
+          <a:bodyPr rtlCol="0"/>
+          <a:lstStyle/>
+          <a:p>
+            <a:pPr rtl="0"/>
+            <a:r>
+              <a:rPr lang="it-IT" dirty="0"/>
+              <a:t>Layout titolo e contenuto con grafico</a:t>
+            </a:r>
+          </a:p>
+        </p:txBody>
+      </p:sp>
+      <p:graphicFrame>
+        <p:nvGraphicFramePr>
+          <p:cNvPr id="9" name="Segnaposto contenuto 8" descr="Istogramma che mostra i valori di 3 serie per 4 categorie"/>
+          <p:cNvGraphicFramePr>
+            <a:graphicFrameLocks noGrp="1"/>
+          </p:cNvGraphicFramePr>
+          <p:nvPr>
+            <p:ph idx="1"/>
+            <p:extLst>
+              <p:ext uri="{D42A27DB-BD31-4B8C-83A1-F6EECF244321}">
+                <p14:modId xmlns:p14="http://schemas.microsoft.com/office/powerpoint/2010/main" val="2354287857"/>
+              </p:ext>
+            </p:extLst>
+          </p:nvPr>
+        </p:nvGraphicFramePr>
+        <p:xfrm>
+          <a:off x="1219200" y="1701800"/>
+          <a:ext cx="10360025" cy="4462463"/>
+        </p:xfrm>
+        <a:graphic>
+          <a:graphicData uri="http://schemas.openxmlformats.org/drawingml/2006/chart">
+            <c:chart xmlns:c="http://schemas.openxmlformats.org/drawingml/2006/chart" xmlns:r="http://schemas.openxmlformats.org/officeDocument/2006/relationships" r:id="rId3"/>
+          </a:graphicData>
+        </a:graphic>
+      </p:graphicFrame>
+    </p:spTree>
+    <p:extLst>
+      <p:ext uri="{BB962C8B-B14F-4D97-AF65-F5344CB8AC3E}">
+        <p14:creationId xmlns:p14="http://schemas.microsoft.com/office/powerpoint/2010/main" val="1484811712"/>
       </p:ext>
     </p:extLst>
   </p:cSld>
@@ -9469,13 +11343,13 @@
   <p:clrMapOvr>
     <a:masterClrMapping/>
   </p:clrMapOvr>
-  <mc:AlternateContent xmlns:mc="http://schemas.openxmlformats.org/markup-compatibility/2006">
-    <mc:Choice xmlns:p14="http://schemas.microsoft.com/office/powerpoint/2010/main" Requires="p14">
+  <mc:AlternateContent xmlns:mc="http://schemas.openxmlformats.org/markup-compatibility/2006" xmlns:p14="http://schemas.microsoft.com/office/powerpoint/2010/main">
+    <mc:Choice Requires="p14">
       <p:transition spd="med" p14:dur="700">
         <p:fade/>
       </p:transition>
     </mc:Choice>
-    <mc:Fallback>
+    <mc:Fallback xmlns="">
       <p:transition spd="med">
         <p:fade/>
       </p:transition>
@@ -9593,13 +11467,13 @@
   <p:clrMapOvr>
     <a:masterClrMapping/>
   </p:clrMapOvr>
-  <mc:AlternateContent xmlns:mc="http://schemas.openxmlformats.org/markup-compatibility/2006">
-    <mc:Choice xmlns:p14="http://schemas.microsoft.com/office/powerpoint/2010/main" Requires="p14">
+  <mc:AlternateContent xmlns:mc="http://schemas.openxmlformats.org/markup-compatibility/2006" xmlns:p14="http://schemas.microsoft.com/office/powerpoint/2010/main">
+    <mc:Choice Requires="p14">
       <p:transition spd="med" p14:dur="700">
         <p:fade/>
       </p:transition>
     </mc:Choice>
-    <mc:Fallback>
+    <mc:Fallback xmlns="">
       <p:transition spd="med">
         <p:fade/>
       </p:transition>
@@ -9724,13 +11598,13 @@
   <p:clrMapOvr>
     <a:masterClrMapping/>
   </p:clrMapOvr>
-  <mc:AlternateContent xmlns:mc="http://schemas.openxmlformats.org/markup-compatibility/2006">
-    <mc:Choice xmlns:p14="http://schemas.microsoft.com/office/powerpoint/2010/main" Requires="p14">
+  <mc:AlternateContent xmlns:mc="http://schemas.openxmlformats.org/markup-compatibility/2006" xmlns:p14="http://schemas.microsoft.com/office/powerpoint/2010/main">
+    <mc:Choice Requires="p14">
       <p:transition spd="med" p14:dur="700">
         <p:fade/>
       </p:transition>
     </mc:Choice>
-    <mc:Fallback>
+    <mc:Fallback xmlns="">
       <p:transition spd="med">
         <p:fade/>
       </p:transition>
@@ -9859,13 +11733,13 @@
   <p:clrMapOvr>
     <a:masterClrMapping/>
   </p:clrMapOvr>
-  <mc:AlternateContent xmlns:mc="http://schemas.openxmlformats.org/markup-compatibility/2006">
-    <mc:Choice xmlns:p14="http://schemas.microsoft.com/office/powerpoint/2010/main" Requires="p14">
+  <mc:AlternateContent xmlns:mc="http://schemas.openxmlformats.org/markup-compatibility/2006" xmlns:p14="http://schemas.microsoft.com/office/powerpoint/2010/main">
+    <mc:Choice Requires="p14">
       <p:transition spd="med" p14:dur="700">
         <p:fade/>
       </p:transition>
     </mc:Choice>
-    <mc:Fallback>
+    <mc:Fallback xmlns="">
       <p:transition spd="med">
         <p:fade/>
       </p:transition>
@@ -9988,13 +11862,13 @@
   <p:clrMapOvr>
     <a:masterClrMapping/>
   </p:clrMapOvr>
-  <mc:AlternateContent xmlns:mc="http://schemas.openxmlformats.org/markup-compatibility/2006">
-    <mc:Choice xmlns:p14="http://schemas.microsoft.com/office/powerpoint/2010/main" Requires="p14">
+  <mc:AlternateContent xmlns:mc="http://schemas.openxmlformats.org/markup-compatibility/2006" xmlns:p14="http://schemas.microsoft.com/office/powerpoint/2010/main">
+    <mc:Choice Requires="p14">
       <p:transition spd="med" p14:dur="700">
         <p:fade/>
       </p:transition>
     </mc:Choice>
-    <mc:Fallback>
+    <mc:Fallback xmlns="">
       <p:transition spd="med">
         <p:fade/>
       </p:transition>
@@ -10116,13 +11990,13 @@
   <p:clrMapOvr>
     <a:masterClrMapping/>
   </p:clrMapOvr>
-  <mc:AlternateContent xmlns:mc="http://schemas.openxmlformats.org/markup-compatibility/2006">
-    <mc:Choice xmlns:p14="http://schemas.microsoft.com/office/powerpoint/2010/main" Requires="p14">
+  <mc:AlternateContent xmlns:mc="http://schemas.openxmlformats.org/markup-compatibility/2006" xmlns:p14="http://schemas.microsoft.com/office/powerpoint/2010/main">
+    <mc:Choice Requires="p14">
       <p:transition spd="med" p14:dur="700">
         <p:fade/>
       </p:transition>
     </mc:Choice>
-    <mc:Fallback>
+    <mc:Fallback xmlns="">
       <p:transition spd="med">
         <p:fade/>
       </p:transition>
@@ -11082,139 +12956,12 @@
 </file>
 
 <file path=customXml/item1.xml><?xml version="1.0" encoding="utf-8"?>
-<p:properties xmlns:p="http://schemas.microsoft.com/office/2006/metadata/properties" xmlns:xsi="http://www.w3.org/2001/XMLSchema-instance" xmlns:pc="http://schemas.microsoft.com/office/infopath/2007/PartnerControls">
-  <documentManagement>
-    <LocPublishedLinkedAssetsLookup xmlns="4873beb7-5857-4685-be1f-d57550cc96cc" xsi:nil="true"/>
-    <ApprovalStatus xmlns="4873beb7-5857-4685-be1f-d57550cc96cc">InProgress</ApprovalStatus>
-    <MarketSpecific xmlns="4873beb7-5857-4685-be1f-d57550cc96cc">false</MarketSpecific>
-    <LocComments xmlns="4873beb7-5857-4685-be1f-d57550cc96cc" xsi:nil="true"/>
-    <LocLastLocAttemptVersionTypeLookup xmlns="4873beb7-5857-4685-be1f-d57550cc96cc" xsi:nil="true"/>
-    <DirectSourceMarket xmlns="4873beb7-5857-4685-be1f-d57550cc96cc" xsi:nil="true"/>
-    <ThumbnailAssetId xmlns="4873beb7-5857-4685-be1f-d57550cc96cc" xsi:nil="true"/>
-    <PrimaryImageGen xmlns="4873beb7-5857-4685-be1f-d57550cc96cc">false</PrimaryImageGen>
-    <LocNewPublishedVersionLookup xmlns="4873beb7-5857-4685-be1f-d57550cc96cc" xsi:nil="true"/>
-    <LegacyData xmlns="4873beb7-5857-4685-be1f-d57550cc96cc" xsi:nil="true"/>
-    <LocRecommendedHandoff xmlns="4873beb7-5857-4685-be1f-d57550cc96cc" xsi:nil="true"/>
-    <BusinessGroup xmlns="4873beb7-5857-4685-be1f-d57550cc96cc" xsi:nil="true"/>
-    <BlockPublish xmlns="4873beb7-5857-4685-be1f-d57550cc96cc">false</BlockPublish>
-    <TPFriendlyName xmlns="4873beb7-5857-4685-be1f-d57550cc96cc" xsi:nil="true"/>
-    <LocOverallPublishStatusLookup xmlns="4873beb7-5857-4685-be1f-d57550cc96cc" xsi:nil="true"/>
-    <NumericId xmlns="4873beb7-5857-4685-be1f-d57550cc96cc" xsi:nil="true"/>
-    <APEditor xmlns="4873beb7-5857-4685-be1f-d57550cc96cc">
-      <UserInfo>
-        <DisplayName/>
-        <AccountId xsi:nil="true"/>
-        <AccountType/>
-      </UserInfo>
-    </APEditor>
-    <SourceTitle xmlns="4873beb7-5857-4685-be1f-d57550cc96cc" xsi:nil="true"/>
-    <OpenTemplate xmlns="4873beb7-5857-4685-be1f-d57550cc96cc">true</OpenTemplate>
-    <LocOverallLocStatusLookup xmlns="4873beb7-5857-4685-be1f-d57550cc96cc" xsi:nil="true"/>
-    <UALocComments xmlns="4873beb7-5857-4685-be1f-d57550cc96cc" xsi:nil="true"/>
-    <ParentAssetId xmlns="4873beb7-5857-4685-be1f-d57550cc96cc" xsi:nil="true"/>
-    <IntlLangReviewDate xmlns="4873beb7-5857-4685-be1f-d57550cc96cc" xsi:nil="true"/>
-    <FeatureTagsTaxHTField0 xmlns="4873beb7-5857-4685-be1f-d57550cc96cc">
-      <Terms xmlns="http://schemas.microsoft.com/office/infopath/2007/PartnerControls"/>
-    </FeatureTagsTaxHTField0>
-    <PublishStatusLookup xmlns="4873beb7-5857-4685-be1f-d57550cc96cc">
-      <Value>1345093</Value>
-    </PublishStatusLookup>
-    <Providers xmlns="4873beb7-5857-4685-be1f-d57550cc96cc" xsi:nil="true"/>
-    <MachineTranslated xmlns="4873beb7-5857-4685-be1f-d57550cc96cc">false</MachineTranslated>
-    <OriginalSourceMarket xmlns="4873beb7-5857-4685-be1f-d57550cc96cc" xsi:nil="true"/>
-    <APDescription xmlns="4873beb7-5857-4685-be1f-d57550cc96cc">This simple template design works for technology and  businesses, but it's versatile enough to use in other contexts.  It features multiple slide layouts designed for widescreen (16x9 resolution) and includes a sample SmartArt list and chart that are easily editable.</APDescription>
-    <ClipArtFilename xmlns="4873beb7-5857-4685-be1f-d57550cc96cc" xsi:nil="true"/>
-    <ContentItem xmlns="4873beb7-5857-4685-be1f-d57550cc96cc" xsi:nil="true"/>
-    <TPInstallLocation xmlns="4873beb7-5857-4685-be1f-d57550cc96cc" xsi:nil="true"/>
-    <PublishTargets xmlns="4873beb7-5857-4685-be1f-d57550cc96cc">OfficeOnlineVNext</PublishTargets>
-    <TimesCloned xmlns="4873beb7-5857-4685-be1f-d57550cc96cc" xsi:nil="true"/>
-    <AssetStart xmlns="4873beb7-5857-4685-be1f-d57550cc96cc">2011-11-26T00:30:00+00:00</AssetStart>
-    <Provider xmlns="4873beb7-5857-4685-be1f-d57550cc96cc" xsi:nil="true"/>
-    <AcquiredFrom xmlns="4873beb7-5857-4685-be1f-d57550cc96cc">Internal MS</AcquiredFrom>
-    <FriendlyTitle xmlns="4873beb7-5857-4685-be1f-d57550cc96cc" xsi:nil="true"/>
-    <LastHandOff xmlns="4873beb7-5857-4685-be1f-d57550cc96cc" xsi:nil="true"/>
-    <TPClientViewer xmlns="4873beb7-5857-4685-be1f-d57550cc96cc" xsi:nil="true"/>
-    <TemplateStatus xmlns="4873beb7-5857-4685-be1f-d57550cc96cc">Complete</TemplateStatus>
-    <Downloads xmlns="4873beb7-5857-4685-be1f-d57550cc96cc">0</Downloads>
-    <OOCacheId xmlns="4873beb7-5857-4685-be1f-d57550cc96cc" xsi:nil="true"/>
-    <IsDeleted xmlns="4873beb7-5857-4685-be1f-d57550cc96cc">false</IsDeleted>
-    <LocPublishedDependentAssetsLookup xmlns="4873beb7-5857-4685-be1f-d57550cc96cc" xsi:nil="true"/>
-    <TPExecutable xmlns="4873beb7-5857-4685-be1f-d57550cc96cc" xsi:nil="true"/>
-    <EditorialTags xmlns="4873beb7-5857-4685-be1f-d57550cc96cc" xsi:nil="true"/>
-    <SubmitterId xmlns="4873beb7-5857-4685-be1f-d57550cc96cc" xsi:nil="true"/>
-    <ApprovalLog xmlns="4873beb7-5857-4685-be1f-d57550cc96cc" xsi:nil="true"/>
-    <AssetType xmlns="4873beb7-5857-4685-be1f-d57550cc96cc">TP</AssetType>
-    <BugNumber xmlns="4873beb7-5857-4685-be1f-d57550cc96cc" xsi:nil="true"/>
-    <CSXSubmissionDate xmlns="4873beb7-5857-4685-be1f-d57550cc96cc" xsi:nil="true"/>
-    <CSXUpdate xmlns="4873beb7-5857-4685-be1f-d57550cc96cc">false</CSXUpdate>
-    <Milestone xmlns="4873beb7-5857-4685-be1f-d57550cc96cc" xsi:nil="true"/>
-    <RecommendationsModifier xmlns="4873beb7-5857-4685-be1f-d57550cc96cc" xsi:nil="true"/>
-    <OriginAsset xmlns="4873beb7-5857-4685-be1f-d57550cc96cc" xsi:nil="true"/>
-    <TPComponent xmlns="4873beb7-5857-4685-be1f-d57550cc96cc" xsi:nil="true"/>
-    <AssetId xmlns="4873beb7-5857-4685-be1f-d57550cc96cc">TP102787989</AssetId>
-    <IntlLocPriority xmlns="4873beb7-5857-4685-be1f-d57550cc96cc" xsi:nil="true"/>
-    <PolicheckWords xmlns="4873beb7-5857-4685-be1f-d57550cc96cc" xsi:nil="true"/>
-    <TPLaunchHelpLink xmlns="4873beb7-5857-4685-be1f-d57550cc96cc" xsi:nil="true"/>
-    <TPApplication xmlns="4873beb7-5857-4685-be1f-d57550cc96cc" xsi:nil="true"/>
-    <CrawlForDependencies xmlns="4873beb7-5857-4685-be1f-d57550cc96cc">false</CrawlForDependencies>
-    <HandoffToMSDN xmlns="4873beb7-5857-4685-be1f-d57550cc96cc" xsi:nil="true"/>
-    <PlannedPubDate xmlns="4873beb7-5857-4685-be1f-d57550cc96cc" xsi:nil="true"/>
-    <IntlLangReviewer xmlns="4873beb7-5857-4685-be1f-d57550cc96cc" xsi:nil="true"/>
-    <TrustLevel xmlns="4873beb7-5857-4685-be1f-d57550cc96cc">1 Microsoft Managed Content</TrustLevel>
-    <LocLastLocAttemptVersionLookup xmlns="4873beb7-5857-4685-be1f-d57550cc96cc">694266</LocLastLocAttemptVersionLookup>
-    <LocProcessedForHandoffsLookup xmlns="4873beb7-5857-4685-be1f-d57550cc96cc" xsi:nil="true"/>
-    <IsSearchable xmlns="4873beb7-5857-4685-be1f-d57550cc96cc">true</IsSearchable>
-    <TemplateTemplateType xmlns="4873beb7-5857-4685-be1f-d57550cc96cc">PowerPoint Presentation Template</TemplateTemplateType>
-    <CampaignTagsTaxHTField0 xmlns="4873beb7-5857-4685-be1f-d57550cc96cc">
-      <Terms xmlns="http://schemas.microsoft.com/office/infopath/2007/PartnerControls"/>
-    </CampaignTagsTaxHTField0>
-    <TPNamespace xmlns="4873beb7-5857-4685-be1f-d57550cc96cc" xsi:nil="true"/>
-    <LocOverallPreviewStatusLookup xmlns="4873beb7-5857-4685-be1f-d57550cc96cc" xsi:nil="true"/>
-    <TaxCatchAll xmlns="4873beb7-5857-4685-be1f-d57550cc96cc"/>
-    <Markets xmlns="4873beb7-5857-4685-be1f-d57550cc96cc"/>
-    <UAProjectedTotalWords xmlns="4873beb7-5857-4685-be1f-d57550cc96cc" xsi:nil="true"/>
-    <IntlLangReview xmlns="4873beb7-5857-4685-be1f-d57550cc96cc" xsi:nil="true"/>
-    <OutputCachingOn xmlns="4873beb7-5857-4685-be1f-d57550cc96cc">false</OutputCachingOn>
-    <AverageRating xmlns="4873beb7-5857-4685-be1f-d57550cc96cc" xsi:nil="true"/>
-    <APAuthor xmlns="4873beb7-5857-4685-be1f-d57550cc96cc">
-      <UserInfo>
-        <DisplayName>REDMOND\kristaa</DisplayName>
-        <AccountId>136</AccountId>
-        <AccountType/>
-      </UserInfo>
-    </APAuthor>
-    <LocManualTestRequired xmlns="4873beb7-5857-4685-be1f-d57550cc96cc">false</LocManualTestRequired>
-    <TPCommandLine xmlns="4873beb7-5857-4685-be1f-d57550cc96cc" xsi:nil="true"/>
-    <TPAppVersion xmlns="4873beb7-5857-4685-be1f-d57550cc96cc" xsi:nil="true"/>
-    <EditorialStatus xmlns="4873beb7-5857-4685-be1f-d57550cc96cc">Complete</EditorialStatus>
-    <LastModifiedDateTime xmlns="4873beb7-5857-4685-be1f-d57550cc96cc" xsi:nil="true"/>
-    <ScenarioTagsTaxHTField0 xmlns="4873beb7-5857-4685-be1f-d57550cc96cc">
-      <Terms xmlns="http://schemas.microsoft.com/office/infopath/2007/PartnerControls"/>
-    </ScenarioTagsTaxHTField0>
-    <LocProcessedForMarketsLookup xmlns="4873beb7-5857-4685-be1f-d57550cc96cc" xsi:nil="true"/>
-    <TPLaunchHelpLinkType xmlns="4873beb7-5857-4685-be1f-d57550cc96cc">Template</TPLaunchHelpLinkType>
-    <OriginalRelease xmlns="4873beb7-5857-4685-be1f-d57550cc96cc">15</OriginalRelease>
-    <LocalizationTagsTaxHTField0 xmlns="4873beb7-5857-4685-be1f-d57550cc96cc">
-      <Terms xmlns="http://schemas.microsoft.com/office/infopath/2007/PartnerControls"/>
-    </LocalizationTagsTaxHTField0>
-    <UACurrentWords xmlns="4873beb7-5857-4685-be1f-d57550cc96cc" xsi:nil="true"/>
-    <ArtSampleDocs xmlns="4873beb7-5857-4685-be1f-d57550cc96cc" xsi:nil="true"/>
-    <UALocRecommendation xmlns="4873beb7-5857-4685-be1f-d57550cc96cc">Localize</UALocRecommendation>
-    <Manager xmlns="4873beb7-5857-4685-be1f-d57550cc96cc" xsi:nil="true"/>
-    <LocOverallHandbackStatusLookup xmlns="4873beb7-5857-4685-be1f-d57550cc96cc" xsi:nil="true"/>
-    <ShowIn xmlns="4873beb7-5857-4685-be1f-d57550cc96cc">Show everywhere</ShowIn>
-    <UANotes xmlns="4873beb7-5857-4685-be1f-d57550cc96cc" xsi:nil="true"/>
-    <InternalTagsTaxHTField0 xmlns="4873beb7-5857-4685-be1f-d57550cc96cc">
-      <Terms xmlns="http://schemas.microsoft.com/office/infopath/2007/PartnerControls"/>
-    </InternalTagsTaxHTField0>
-    <CSXHash xmlns="4873beb7-5857-4685-be1f-d57550cc96cc" xsi:nil="true"/>
-    <VoteCount xmlns="4873beb7-5857-4685-be1f-d57550cc96cc" xsi:nil="true"/>
-    <AssetExpire xmlns="4873beb7-5857-4685-be1f-d57550cc96cc">2029-05-12T07:00:00+00:00</AssetExpire>
-    <DSATActionTaken xmlns="4873beb7-5857-4685-be1f-d57550cc96cc" xsi:nil="true"/>
-    <CSXSubmissionMarket xmlns="4873beb7-5857-4685-be1f-d57550cc96cc" xsi:nil="true"/>
-    <LocMarketGroupTiers2 xmlns="4873beb7-5857-4685-be1f-d57550cc96cc" xsi:nil="true"/>
-  </documentManagement>
-</p:properties>
+<?mso-contentType ?>
+<FormTemplates xmlns="http://schemas.microsoft.com/sharepoint/v3/contenttype/forms">
+  <Display>DocumentLibraryForm</Display>
+  <Edit>AssetEditForm</Edit>
+  <New>DocumentLibraryForm</New>
+</FormTemplates>
 </file>
 
 <file path=customXml/item2.xml><?xml version="1.0" encoding="utf-8"?>
@@ -12258,26 +14005,145 @@
 </file>
 
 <file path=customXml/item3.xml><?xml version="1.0" encoding="utf-8"?>
-<?mso-contentType ?>
-<FormTemplates xmlns="http://schemas.microsoft.com/sharepoint/v3/contenttype/forms">
-  <Display>DocumentLibraryForm</Display>
-  <Edit>AssetEditForm</Edit>
-  <New>DocumentLibraryForm</New>
-</FormTemplates>
+<p:properties xmlns:p="http://schemas.microsoft.com/office/2006/metadata/properties" xmlns:xsi="http://www.w3.org/2001/XMLSchema-instance" xmlns:pc="http://schemas.microsoft.com/office/infopath/2007/PartnerControls">
+  <documentManagement>
+    <LocPublishedLinkedAssetsLookup xmlns="4873beb7-5857-4685-be1f-d57550cc96cc" xsi:nil="true"/>
+    <ApprovalStatus xmlns="4873beb7-5857-4685-be1f-d57550cc96cc">InProgress</ApprovalStatus>
+    <MarketSpecific xmlns="4873beb7-5857-4685-be1f-d57550cc96cc">false</MarketSpecific>
+    <LocComments xmlns="4873beb7-5857-4685-be1f-d57550cc96cc" xsi:nil="true"/>
+    <LocLastLocAttemptVersionTypeLookup xmlns="4873beb7-5857-4685-be1f-d57550cc96cc" xsi:nil="true"/>
+    <DirectSourceMarket xmlns="4873beb7-5857-4685-be1f-d57550cc96cc" xsi:nil="true"/>
+    <ThumbnailAssetId xmlns="4873beb7-5857-4685-be1f-d57550cc96cc" xsi:nil="true"/>
+    <PrimaryImageGen xmlns="4873beb7-5857-4685-be1f-d57550cc96cc">false</PrimaryImageGen>
+    <LocNewPublishedVersionLookup xmlns="4873beb7-5857-4685-be1f-d57550cc96cc" xsi:nil="true"/>
+    <LegacyData xmlns="4873beb7-5857-4685-be1f-d57550cc96cc" xsi:nil="true"/>
+    <LocRecommendedHandoff xmlns="4873beb7-5857-4685-be1f-d57550cc96cc" xsi:nil="true"/>
+    <BusinessGroup xmlns="4873beb7-5857-4685-be1f-d57550cc96cc" xsi:nil="true"/>
+    <BlockPublish xmlns="4873beb7-5857-4685-be1f-d57550cc96cc">false</BlockPublish>
+    <TPFriendlyName xmlns="4873beb7-5857-4685-be1f-d57550cc96cc" xsi:nil="true"/>
+    <LocOverallPublishStatusLookup xmlns="4873beb7-5857-4685-be1f-d57550cc96cc" xsi:nil="true"/>
+    <NumericId xmlns="4873beb7-5857-4685-be1f-d57550cc96cc" xsi:nil="true"/>
+    <APEditor xmlns="4873beb7-5857-4685-be1f-d57550cc96cc">
+      <UserInfo>
+        <DisplayName/>
+        <AccountId xsi:nil="true"/>
+        <AccountType/>
+      </UserInfo>
+    </APEditor>
+    <SourceTitle xmlns="4873beb7-5857-4685-be1f-d57550cc96cc" xsi:nil="true"/>
+    <OpenTemplate xmlns="4873beb7-5857-4685-be1f-d57550cc96cc">true</OpenTemplate>
+    <LocOverallLocStatusLookup xmlns="4873beb7-5857-4685-be1f-d57550cc96cc" xsi:nil="true"/>
+    <UALocComments xmlns="4873beb7-5857-4685-be1f-d57550cc96cc" xsi:nil="true"/>
+    <ParentAssetId xmlns="4873beb7-5857-4685-be1f-d57550cc96cc" xsi:nil="true"/>
+    <IntlLangReviewDate xmlns="4873beb7-5857-4685-be1f-d57550cc96cc" xsi:nil="true"/>
+    <FeatureTagsTaxHTField0 xmlns="4873beb7-5857-4685-be1f-d57550cc96cc">
+      <Terms xmlns="http://schemas.microsoft.com/office/infopath/2007/PartnerControls"/>
+    </FeatureTagsTaxHTField0>
+    <PublishStatusLookup xmlns="4873beb7-5857-4685-be1f-d57550cc96cc">
+      <Value>1345093</Value>
+    </PublishStatusLookup>
+    <Providers xmlns="4873beb7-5857-4685-be1f-d57550cc96cc" xsi:nil="true"/>
+    <MachineTranslated xmlns="4873beb7-5857-4685-be1f-d57550cc96cc">false</MachineTranslated>
+    <OriginalSourceMarket xmlns="4873beb7-5857-4685-be1f-d57550cc96cc" xsi:nil="true"/>
+    <APDescription xmlns="4873beb7-5857-4685-be1f-d57550cc96cc">This simple template design works for technology and  businesses, but it's versatile enough to use in other contexts.  It features multiple slide layouts designed for widescreen (16x9 resolution) and includes a sample SmartArt list and chart that are easily editable.</APDescription>
+    <ClipArtFilename xmlns="4873beb7-5857-4685-be1f-d57550cc96cc" xsi:nil="true"/>
+    <ContentItem xmlns="4873beb7-5857-4685-be1f-d57550cc96cc" xsi:nil="true"/>
+    <TPInstallLocation xmlns="4873beb7-5857-4685-be1f-d57550cc96cc" xsi:nil="true"/>
+    <PublishTargets xmlns="4873beb7-5857-4685-be1f-d57550cc96cc">OfficeOnlineVNext</PublishTargets>
+    <TimesCloned xmlns="4873beb7-5857-4685-be1f-d57550cc96cc" xsi:nil="true"/>
+    <AssetStart xmlns="4873beb7-5857-4685-be1f-d57550cc96cc">2011-11-26T00:30:00+00:00</AssetStart>
+    <Provider xmlns="4873beb7-5857-4685-be1f-d57550cc96cc" xsi:nil="true"/>
+    <AcquiredFrom xmlns="4873beb7-5857-4685-be1f-d57550cc96cc">Internal MS</AcquiredFrom>
+    <FriendlyTitle xmlns="4873beb7-5857-4685-be1f-d57550cc96cc" xsi:nil="true"/>
+    <LastHandOff xmlns="4873beb7-5857-4685-be1f-d57550cc96cc" xsi:nil="true"/>
+    <TPClientViewer xmlns="4873beb7-5857-4685-be1f-d57550cc96cc" xsi:nil="true"/>
+    <TemplateStatus xmlns="4873beb7-5857-4685-be1f-d57550cc96cc">Complete</TemplateStatus>
+    <Downloads xmlns="4873beb7-5857-4685-be1f-d57550cc96cc">0</Downloads>
+    <OOCacheId xmlns="4873beb7-5857-4685-be1f-d57550cc96cc" xsi:nil="true"/>
+    <IsDeleted xmlns="4873beb7-5857-4685-be1f-d57550cc96cc">false</IsDeleted>
+    <LocPublishedDependentAssetsLookup xmlns="4873beb7-5857-4685-be1f-d57550cc96cc" xsi:nil="true"/>
+    <TPExecutable xmlns="4873beb7-5857-4685-be1f-d57550cc96cc" xsi:nil="true"/>
+    <EditorialTags xmlns="4873beb7-5857-4685-be1f-d57550cc96cc" xsi:nil="true"/>
+    <SubmitterId xmlns="4873beb7-5857-4685-be1f-d57550cc96cc" xsi:nil="true"/>
+    <ApprovalLog xmlns="4873beb7-5857-4685-be1f-d57550cc96cc" xsi:nil="true"/>
+    <AssetType xmlns="4873beb7-5857-4685-be1f-d57550cc96cc">TP</AssetType>
+    <BugNumber xmlns="4873beb7-5857-4685-be1f-d57550cc96cc" xsi:nil="true"/>
+    <CSXSubmissionDate xmlns="4873beb7-5857-4685-be1f-d57550cc96cc" xsi:nil="true"/>
+    <CSXUpdate xmlns="4873beb7-5857-4685-be1f-d57550cc96cc">false</CSXUpdate>
+    <Milestone xmlns="4873beb7-5857-4685-be1f-d57550cc96cc" xsi:nil="true"/>
+    <RecommendationsModifier xmlns="4873beb7-5857-4685-be1f-d57550cc96cc" xsi:nil="true"/>
+    <OriginAsset xmlns="4873beb7-5857-4685-be1f-d57550cc96cc" xsi:nil="true"/>
+    <TPComponent xmlns="4873beb7-5857-4685-be1f-d57550cc96cc" xsi:nil="true"/>
+    <AssetId xmlns="4873beb7-5857-4685-be1f-d57550cc96cc">TP102787989</AssetId>
+    <IntlLocPriority xmlns="4873beb7-5857-4685-be1f-d57550cc96cc" xsi:nil="true"/>
+    <PolicheckWords xmlns="4873beb7-5857-4685-be1f-d57550cc96cc" xsi:nil="true"/>
+    <TPLaunchHelpLink xmlns="4873beb7-5857-4685-be1f-d57550cc96cc" xsi:nil="true"/>
+    <TPApplication xmlns="4873beb7-5857-4685-be1f-d57550cc96cc" xsi:nil="true"/>
+    <CrawlForDependencies xmlns="4873beb7-5857-4685-be1f-d57550cc96cc">false</CrawlForDependencies>
+    <HandoffToMSDN xmlns="4873beb7-5857-4685-be1f-d57550cc96cc" xsi:nil="true"/>
+    <PlannedPubDate xmlns="4873beb7-5857-4685-be1f-d57550cc96cc" xsi:nil="true"/>
+    <IntlLangReviewer xmlns="4873beb7-5857-4685-be1f-d57550cc96cc" xsi:nil="true"/>
+    <TrustLevel xmlns="4873beb7-5857-4685-be1f-d57550cc96cc">1 Microsoft Managed Content</TrustLevel>
+    <LocLastLocAttemptVersionLookup xmlns="4873beb7-5857-4685-be1f-d57550cc96cc">694266</LocLastLocAttemptVersionLookup>
+    <LocProcessedForHandoffsLookup xmlns="4873beb7-5857-4685-be1f-d57550cc96cc" xsi:nil="true"/>
+    <IsSearchable xmlns="4873beb7-5857-4685-be1f-d57550cc96cc">true</IsSearchable>
+    <TemplateTemplateType xmlns="4873beb7-5857-4685-be1f-d57550cc96cc">PowerPoint Presentation Template</TemplateTemplateType>
+    <CampaignTagsTaxHTField0 xmlns="4873beb7-5857-4685-be1f-d57550cc96cc">
+      <Terms xmlns="http://schemas.microsoft.com/office/infopath/2007/PartnerControls"/>
+    </CampaignTagsTaxHTField0>
+    <TPNamespace xmlns="4873beb7-5857-4685-be1f-d57550cc96cc" xsi:nil="true"/>
+    <LocOverallPreviewStatusLookup xmlns="4873beb7-5857-4685-be1f-d57550cc96cc" xsi:nil="true"/>
+    <TaxCatchAll xmlns="4873beb7-5857-4685-be1f-d57550cc96cc"/>
+    <Markets xmlns="4873beb7-5857-4685-be1f-d57550cc96cc"/>
+    <UAProjectedTotalWords xmlns="4873beb7-5857-4685-be1f-d57550cc96cc" xsi:nil="true"/>
+    <IntlLangReview xmlns="4873beb7-5857-4685-be1f-d57550cc96cc" xsi:nil="true"/>
+    <OutputCachingOn xmlns="4873beb7-5857-4685-be1f-d57550cc96cc">false</OutputCachingOn>
+    <AverageRating xmlns="4873beb7-5857-4685-be1f-d57550cc96cc" xsi:nil="true"/>
+    <APAuthor xmlns="4873beb7-5857-4685-be1f-d57550cc96cc">
+      <UserInfo>
+        <DisplayName>REDMOND\kristaa</DisplayName>
+        <AccountId>136</AccountId>
+        <AccountType/>
+      </UserInfo>
+    </APAuthor>
+    <LocManualTestRequired xmlns="4873beb7-5857-4685-be1f-d57550cc96cc">false</LocManualTestRequired>
+    <TPCommandLine xmlns="4873beb7-5857-4685-be1f-d57550cc96cc" xsi:nil="true"/>
+    <TPAppVersion xmlns="4873beb7-5857-4685-be1f-d57550cc96cc" xsi:nil="true"/>
+    <EditorialStatus xmlns="4873beb7-5857-4685-be1f-d57550cc96cc">Complete</EditorialStatus>
+    <LastModifiedDateTime xmlns="4873beb7-5857-4685-be1f-d57550cc96cc" xsi:nil="true"/>
+    <ScenarioTagsTaxHTField0 xmlns="4873beb7-5857-4685-be1f-d57550cc96cc">
+      <Terms xmlns="http://schemas.microsoft.com/office/infopath/2007/PartnerControls"/>
+    </ScenarioTagsTaxHTField0>
+    <LocProcessedForMarketsLookup xmlns="4873beb7-5857-4685-be1f-d57550cc96cc" xsi:nil="true"/>
+    <TPLaunchHelpLinkType xmlns="4873beb7-5857-4685-be1f-d57550cc96cc">Template</TPLaunchHelpLinkType>
+    <OriginalRelease xmlns="4873beb7-5857-4685-be1f-d57550cc96cc">15</OriginalRelease>
+    <LocalizationTagsTaxHTField0 xmlns="4873beb7-5857-4685-be1f-d57550cc96cc">
+      <Terms xmlns="http://schemas.microsoft.com/office/infopath/2007/PartnerControls"/>
+    </LocalizationTagsTaxHTField0>
+    <UACurrentWords xmlns="4873beb7-5857-4685-be1f-d57550cc96cc" xsi:nil="true"/>
+    <ArtSampleDocs xmlns="4873beb7-5857-4685-be1f-d57550cc96cc" xsi:nil="true"/>
+    <UALocRecommendation xmlns="4873beb7-5857-4685-be1f-d57550cc96cc">Localize</UALocRecommendation>
+    <Manager xmlns="4873beb7-5857-4685-be1f-d57550cc96cc" xsi:nil="true"/>
+    <LocOverallHandbackStatusLookup xmlns="4873beb7-5857-4685-be1f-d57550cc96cc" xsi:nil="true"/>
+    <ShowIn xmlns="4873beb7-5857-4685-be1f-d57550cc96cc">Show everywhere</ShowIn>
+    <UANotes xmlns="4873beb7-5857-4685-be1f-d57550cc96cc" xsi:nil="true"/>
+    <InternalTagsTaxHTField0 xmlns="4873beb7-5857-4685-be1f-d57550cc96cc">
+      <Terms xmlns="http://schemas.microsoft.com/office/infopath/2007/PartnerControls"/>
+    </InternalTagsTaxHTField0>
+    <CSXHash xmlns="4873beb7-5857-4685-be1f-d57550cc96cc" xsi:nil="true"/>
+    <VoteCount xmlns="4873beb7-5857-4685-be1f-d57550cc96cc" xsi:nil="true"/>
+    <AssetExpire xmlns="4873beb7-5857-4685-be1f-d57550cc96cc">2029-05-12T07:00:00+00:00</AssetExpire>
+    <DSATActionTaken xmlns="4873beb7-5857-4685-be1f-d57550cc96cc" xsi:nil="true"/>
+    <CSXSubmissionMarket xmlns="4873beb7-5857-4685-be1f-d57550cc96cc" xsi:nil="true"/>
+    <LocMarketGroupTiers2 xmlns="4873beb7-5857-4685-be1f-d57550cc96cc" xsi:nil="true"/>
+  </documentManagement>
+</p:properties>
 </file>
 
 <file path=customXml/itemProps1.xml><?xml version="1.0" encoding="utf-8"?>
-<ds:datastoreItem xmlns:ds="http://schemas.openxmlformats.org/officeDocument/2006/customXml" ds:itemID="{60C67BEE-D13F-4BD2-98A5-34D8A0977F68}">
+<ds:datastoreItem xmlns:ds="http://schemas.openxmlformats.org/officeDocument/2006/customXml" ds:itemID="{3836F65B-1B07-41EE-A0E8-BC6EF3855225}">
   <ds:schemaRefs>
-    <ds:schemaRef ds:uri="4873beb7-5857-4685-be1f-d57550cc96cc"/>
-    <ds:schemaRef ds:uri="http://schemas.openxmlformats.org/package/2006/metadata/core-properties"/>
-    <ds:schemaRef ds:uri="http://purl.org/dc/terms/"/>
-    <ds:schemaRef ds:uri="http://schemas.microsoft.com/office/2006/documentManagement/types"/>
-    <ds:schemaRef ds:uri="http://purl.org/dc/elements/1.1/"/>
-    <ds:schemaRef ds:uri="http://schemas.microsoft.com/office/2006/metadata/properties"/>
-    <ds:schemaRef ds:uri="http://schemas.microsoft.com/office/infopath/2007/PartnerControls"/>
-    <ds:schemaRef ds:uri="http://www.w3.org/XML/1998/namespace"/>
-    <ds:schemaRef ds:uri="http://purl.org/dc/dcmitype/"/>
+    <ds:schemaRef ds:uri="http://schemas.microsoft.com/sharepoint/v3/contenttype/forms"/>
   </ds:schemaRefs>
 </ds:datastoreItem>
 </file>
@@ -12301,9 +14167,17 @@
 </file>
 
 <file path=customXml/itemProps3.xml><?xml version="1.0" encoding="utf-8"?>
-<ds:datastoreItem xmlns:ds="http://schemas.openxmlformats.org/officeDocument/2006/customXml" ds:itemID="{3836F65B-1B07-41EE-A0E8-BC6EF3855225}">
+<ds:datastoreItem xmlns:ds="http://schemas.openxmlformats.org/officeDocument/2006/customXml" ds:itemID="{60C67BEE-D13F-4BD2-98A5-34D8A0977F68}">
   <ds:schemaRefs>
-    <ds:schemaRef ds:uri="http://schemas.microsoft.com/sharepoint/v3/contenttype/forms"/>
+    <ds:schemaRef ds:uri="4873beb7-5857-4685-be1f-d57550cc96cc"/>
+    <ds:schemaRef ds:uri="http://schemas.openxmlformats.org/package/2006/metadata/core-properties"/>
+    <ds:schemaRef ds:uri="http://purl.org/dc/terms/"/>
+    <ds:schemaRef ds:uri="http://schemas.microsoft.com/office/2006/documentManagement/types"/>
+    <ds:schemaRef ds:uri="http://purl.org/dc/elements/1.1/"/>
+    <ds:schemaRef ds:uri="http://schemas.microsoft.com/office/2006/metadata/properties"/>
+    <ds:schemaRef ds:uri="http://schemas.microsoft.com/office/infopath/2007/PartnerControls"/>
+    <ds:schemaRef ds:uri="http://www.w3.org/XML/1998/namespace"/>
+    <ds:schemaRef ds:uri="http://purl.org/dc/dcmitype/"/>
   </ds:schemaRefs>
 </ds:datastoreItem>
 </file>
</xml_diff>

<commit_message>
Rimozione della funzionalità di calcolo del Sentiment di una frase passata in input e aggiunta delle conclusioni alla file Presentazione Progetto.pptx
</commit_message>
<xml_diff>
--- a/Presentazione/Presentazione Progetto.pptx
+++ b/Presentazione/Presentazione Progetto.pptx
@@ -5,10 +5,10 @@
     <p:sldMasterId id="2147483660" r:id="rId4"/>
   </p:sldMasterIdLst>
   <p:notesMasterIdLst>
-    <p:notesMasterId r:id="rId29"/>
+    <p:notesMasterId r:id="rId33"/>
   </p:notesMasterIdLst>
   <p:handoutMasterIdLst>
-    <p:handoutMasterId r:id="rId30"/>
+    <p:handoutMasterId r:id="rId34"/>
   </p:handoutMasterIdLst>
   <p:sldIdLst>
     <p:sldId id="272" r:id="rId5"/>
@@ -24,17 +24,21 @@
     <p:sldId id="282" r:id="rId15"/>
     <p:sldId id="281" r:id="rId16"/>
     <p:sldId id="283" r:id="rId17"/>
-    <p:sldId id="284" r:id="rId18"/>
-    <p:sldId id="285" r:id="rId19"/>
-    <p:sldId id="286" r:id="rId20"/>
-    <p:sldId id="287" r:id="rId21"/>
-    <p:sldId id="288" r:id="rId22"/>
-    <p:sldId id="289" r:id="rId23"/>
-    <p:sldId id="291" r:id="rId24"/>
-    <p:sldId id="292" r:id="rId25"/>
-    <p:sldId id="293" r:id="rId26"/>
-    <p:sldId id="294" r:id="rId27"/>
-    <p:sldId id="267" r:id="rId28"/>
+    <p:sldId id="296" r:id="rId18"/>
+    <p:sldId id="284" r:id="rId19"/>
+    <p:sldId id="285" r:id="rId20"/>
+    <p:sldId id="286" r:id="rId21"/>
+    <p:sldId id="287" r:id="rId22"/>
+    <p:sldId id="288" r:id="rId23"/>
+    <p:sldId id="297" r:id="rId24"/>
+    <p:sldId id="291" r:id="rId25"/>
+    <p:sldId id="292" r:id="rId26"/>
+    <p:sldId id="293" r:id="rId27"/>
+    <p:sldId id="294" r:id="rId28"/>
+    <p:sldId id="295" r:id="rId29"/>
+    <p:sldId id="298" r:id="rId30"/>
+    <p:sldId id="299" r:id="rId31"/>
+    <p:sldId id="300" r:id="rId32"/>
   </p:sldIdLst>
   <p:sldSz cx="12188825" cy="6858000"/>
   <p:notesSz cx="6858000" cy="9144000"/>
@@ -182,7 +186,17 @@
   <c:chart>
     <c:autoTitleDeleted val="0"/>
     <c:plotArea>
-      <c:layout/>
+      <c:layout>
+        <c:manualLayout>
+          <c:layoutTarget val="inner"/>
+          <c:xMode val="edge"/>
+          <c:yMode val="edge"/>
+          <c:x val="0"/>
+          <c:y val="6.0847330215586404E-3"/>
+          <c:w val="0.99537931292930082"/>
+          <c:h val="0.99391526697844135"/>
+        </c:manualLayout>
+      </c:layout>
       <c:barChart>
         <c:barDir val="col"/>
         <c:grouping val="clustered"/>
@@ -205,57 +219,97 @@
             <a:noFill/>
             <a:ln w="25400" cap="flat" cmpd="sng" algn="ctr">
               <a:solidFill>
-                <a:schemeClr val="accent1"/>
+                <a:srgbClr val="00B050"/>
               </a:solidFill>
               <a:miter lim="800000"/>
             </a:ln>
             <a:effectLst/>
           </c:spPr>
           <c:invertIfNegative val="0"/>
+          <c:dLbls>
+            <c:spPr>
+              <a:noFill/>
+              <a:ln>
+                <a:noFill/>
+              </a:ln>
+              <a:effectLst/>
+            </c:spPr>
+            <c:txPr>
+              <a:bodyPr rot="0" spcFirstLastPara="1" vertOverflow="ellipsis" vert="horz" wrap="square" lIns="38100" tIns="19050" rIns="38100" bIns="19050" anchor="ctr" anchorCtr="1">
+                <a:spAutoFit/>
+              </a:bodyPr>
+              <a:lstStyle/>
+              <a:p>
+                <a:pPr>
+                  <a:defRPr sz="1197" b="0" i="0" u="none" strike="noStrike" kern="1200" baseline="0">
+                    <a:solidFill>
+                      <a:schemeClr val="tx1">
+                        <a:lumMod val="65000"/>
+                        <a:lumOff val="35000"/>
+                      </a:schemeClr>
+                    </a:solidFill>
+                    <a:latin typeface="+mn-lt"/>
+                    <a:ea typeface="+mn-ea"/>
+                    <a:cs typeface="+mn-cs"/>
+                  </a:defRPr>
+                </a:pPr>
+                <a:endParaRPr lang="it-IT"/>
+              </a:p>
+            </c:txPr>
+            <c:dLblPos val="ctr"/>
+            <c:showLegendKey val="0"/>
+            <c:showVal val="1"/>
+            <c:showCatName val="0"/>
+            <c:showSerName val="0"/>
+            <c:showPercent val="0"/>
+            <c:showBubbleSize val="0"/>
+            <c:showLeaderLines val="0"/>
+            <c:extLst>
+              <c:ext xmlns:c15="http://schemas.microsoft.com/office/drawing/2012/chart" uri="{CE6537A1-D6FC-4f65-9D91-7224C49458BB}">
+                <c15:showLeaderLines val="1"/>
+                <c15:leaderLines>
+                  <c:spPr>
+                    <a:ln w="9525" cap="flat" cmpd="sng" algn="ctr">
+                      <a:solidFill>
+                        <a:schemeClr val="tx1">
+                          <a:lumMod val="35000"/>
+                          <a:lumOff val="65000"/>
+                        </a:schemeClr>
+                      </a:solidFill>
+                      <a:round/>
+                    </a:ln>
+                    <a:effectLst/>
+                  </c:spPr>
+                </c15:leaderLines>
+              </c:ext>
+            </c:extLst>
+          </c:dLbls>
           <c:cat>
             <c:strRef>
-              <c:f>Sheet1!$A$2:$A$5</c:f>
+              <c:f>Sheet1!$A$2</c:f>
               <c:strCache>
-                <c:ptCount val="4"/>
+                <c:ptCount val="1"/>
                 <c:pt idx="0">
                   <c:v>Categoria 1</c:v>
-                </c:pt>
-                <c:pt idx="1">
-                  <c:v>Categoria 2</c:v>
-                </c:pt>
-                <c:pt idx="2">
-                  <c:v>Categoria 3</c:v>
-                </c:pt>
-                <c:pt idx="3">
-                  <c:v>Categoria 4</c:v>
                 </c:pt>
               </c:strCache>
             </c:strRef>
           </c:cat>
           <c:val>
             <c:numRef>
-              <c:f>Sheet1!$B$2:$B$5</c:f>
+              <c:f>Sheet1!$B$2</c:f>
               <c:numCache>
                 <c:formatCode>General</c:formatCode>
-                <c:ptCount val="4"/>
+                <c:ptCount val="1"/>
                 <c:pt idx="0">
-                  <c:v>4.3</c:v>
-                </c:pt>
-                <c:pt idx="1">
-                  <c:v>2.5</c:v>
-                </c:pt>
-                <c:pt idx="2">
-                  <c:v>3.5</c:v>
-                </c:pt>
-                <c:pt idx="3">
-                  <c:v>4.5</c:v>
+                  <c:v>2706</c:v>
                 </c:pt>
               </c:numCache>
             </c:numRef>
           </c:val>
           <c:extLst>
             <c:ext xmlns:c16="http://schemas.microsoft.com/office/drawing/2014/chart" uri="{C3380CC4-5D6E-409C-BE32-E72D297353CC}">
-              <c16:uniqueId val="{00000000-5E92-4051-99BC-2623F45BF7E0}"/>
+              <c16:uniqueId val="{00000000-37CE-41BB-8D1F-E0CEFC6C150F}"/>
             </c:ext>
           </c:extLst>
         </c:ser>
@@ -284,50 +338,90 @@
             <a:effectLst/>
           </c:spPr>
           <c:invertIfNegative val="0"/>
+          <c:dLbls>
+            <c:spPr>
+              <a:noFill/>
+              <a:ln>
+                <a:noFill/>
+              </a:ln>
+              <a:effectLst/>
+            </c:spPr>
+            <c:txPr>
+              <a:bodyPr rot="0" spcFirstLastPara="1" vertOverflow="ellipsis" vert="horz" wrap="square" lIns="38100" tIns="19050" rIns="38100" bIns="19050" anchor="ctr" anchorCtr="1">
+                <a:spAutoFit/>
+              </a:bodyPr>
+              <a:lstStyle/>
+              <a:p>
+                <a:pPr>
+                  <a:defRPr sz="1197" b="0" i="0" u="none" strike="noStrike" kern="1200" baseline="0">
+                    <a:solidFill>
+                      <a:schemeClr val="tx1">
+                        <a:lumMod val="65000"/>
+                        <a:lumOff val="35000"/>
+                      </a:schemeClr>
+                    </a:solidFill>
+                    <a:latin typeface="+mn-lt"/>
+                    <a:ea typeface="+mn-ea"/>
+                    <a:cs typeface="+mn-cs"/>
+                  </a:defRPr>
+                </a:pPr>
+                <a:endParaRPr lang="it-IT"/>
+              </a:p>
+            </c:txPr>
+            <c:dLblPos val="ctr"/>
+            <c:showLegendKey val="0"/>
+            <c:showVal val="1"/>
+            <c:showCatName val="0"/>
+            <c:showSerName val="0"/>
+            <c:showPercent val="0"/>
+            <c:showBubbleSize val="0"/>
+            <c:showLeaderLines val="0"/>
+            <c:extLst>
+              <c:ext xmlns:c15="http://schemas.microsoft.com/office/drawing/2012/chart" uri="{CE6537A1-D6FC-4f65-9D91-7224C49458BB}">
+                <c15:showLeaderLines val="1"/>
+                <c15:leaderLines>
+                  <c:spPr>
+                    <a:ln w="9525" cap="flat" cmpd="sng" algn="ctr">
+                      <a:solidFill>
+                        <a:schemeClr val="tx1">
+                          <a:lumMod val="35000"/>
+                          <a:lumOff val="65000"/>
+                        </a:schemeClr>
+                      </a:solidFill>
+                      <a:round/>
+                    </a:ln>
+                    <a:effectLst/>
+                  </c:spPr>
+                </c15:leaderLines>
+              </c:ext>
+            </c:extLst>
+          </c:dLbls>
           <c:cat>
             <c:strRef>
-              <c:f>Sheet1!$A$2:$A$5</c:f>
+              <c:f>Sheet1!$A$2</c:f>
               <c:strCache>
-                <c:ptCount val="4"/>
+                <c:ptCount val="1"/>
                 <c:pt idx="0">
                   <c:v>Categoria 1</c:v>
-                </c:pt>
-                <c:pt idx="1">
-                  <c:v>Categoria 2</c:v>
-                </c:pt>
-                <c:pt idx="2">
-                  <c:v>Categoria 3</c:v>
-                </c:pt>
-                <c:pt idx="3">
-                  <c:v>Categoria 4</c:v>
                 </c:pt>
               </c:strCache>
             </c:strRef>
           </c:cat>
           <c:val>
             <c:numRef>
-              <c:f>Sheet1!$C$2:$C$5</c:f>
+              <c:f>Sheet1!$C$2</c:f>
               <c:numCache>
                 <c:formatCode>General</c:formatCode>
-                <c:ptCount val="4"/>
+                <c:ptCount val="1"/>
                 <c:pt idx="0">
-                  <c:v>2.4</c:v>
-                </c:pt>
-                <c:pt idx="1">
-                  <c:v>4.4000000000000004</c:v>
-                </c:pt>
-                <c:pt idx="2">
-                  <c:v>1.8</c:v>
-                </c:pt>
-                <c:pt idx="3">
-                  <c:v>2.8</c:v>
+                  <c:v>1897</c:v>
                 </c:pt>
               </c:numCache>
             </c:numRef>
           </c:val>
           <c:extLst>
             <c:ext xmlns:c16="http://schemas.microsoft.com/office/drawing/2014/chart" uri="{C3380CC4-5D6E-409C-BE32-E72D297353CC}">
-              <c16:uniqueId val="{00000001-5E92-4051-99BC-2623F45BF7E0}"/>
+              <c16:uniqueId val="{00000001-37CE-41BB-8D1F-E0CEFC6C150F}"/>
             </c:ext>
           </c:extLst>
         </c:ser>
@@ -349,63 +443,104 @@
             <a:noFill/>
             <a:ln w="25400" cap="flat" cmpd="sng" algn="ctr">
               <a:solidFill>
-                <a:schemeClr val="accent3"/>
+                <a:srgbClr val="FF0000"/>
               </a:solidFill>
               <a:miter lim="800000"/>
             </a:ln>
             <a:effectLst/>
           </c:spPr>
           <c:invertIfNegative val="0"/>
+          <c:dLbls>
+            <c:spPr>
+              <a:noFill/>
+              <a:ln>
+                <a:noFill/>
+              </a:ln>
+              <a:effectLst/>
+            </c:spPr>
+            <c:txPr>
+              <a:bodyPr rot="0" spcFirstLastPara="1" vertOverflow="ellipsis" vert="horz" wrap="square" lIns="38100" tIns="19050" rIns="38100" bIns="19050" anchor="ctr" anchorCtr="1">
+                <a:spAutoFit/>
+              </a:bodyPr>
+              <a:lstStyle/>
+              <a:p>
+                <a:pPr>
+                  <a:defRPr sz="1197" b="0" i="0" u="none" strike="noStrike" kern="1200" baseline="0">
+                    <a:solidFill>
+                      <a:schemeClr val="tx1">
+                        <a:lumMod val="65000"/>
+                        <a:lumOff val="35000"/>
+                      </a:schemeClr>
+                    </a:solidFill>
+                    <a:latin typeface="+mn-lt"/>
+                    <a:ea typeface="+mn-ea"/>
+                    <a:cs typeface="+mn-cs"/>
+                  </a:defRPr>
+                </a:pPr>
+                <a:endParaRPr lang="it-IT"/>
+              </a:p>
+            </c:txPr>
+            <c:dLblPos val="ctr"/>
+            <c:showLegendKey val="0"/>
+            <c:showVal val="1"/>
+            <c:showCatName val="0"/>
+            <c:showSerName val="0"/>
+            <c:showPercent val="0"/>
+            <c:showBubbleSize val="0"/>
+            <c:showLeaderLines val="0"/>
+            <c:extLst>
+              <c:ext xmlns:c15="http://schemas.microsoft.com/office/drawing/2012/chart" uri="{CE6537A1-D6FC-4f65-9D91-7224C49458BB}">
+                <c15:showLeaderLines val="1"/>
+                <c15:leaderLines>
+                  <c:spPr>
+                    <a:ln w="9525" cap="flat" cmpd="sng" algn="ctr">
+                      <a:solidFill>
+                        <a:schemeClr val="tx1">
+                          <a:lumMod val="35000"/>
+                          <a:lumOff val="65000"/>
+                        </a:schemeClr>
+                      </a:solidFill>
+                      <a:round/>
+                    </a:ln>
+                    <a:effectLst/>
+                  </c:spPr>
+                </c15:leaderLines>
+              </c:ext>
+            </c:extLst>
+          </c:dLbls>
           <c:cat>
             <c:strRef>
-              <c:f>Sheet1!$A$2:$A$5</c:f>
+              <c:f>Sheet1!$A$2</c:f>
               <c:strCache>
-                <c:ptCount val="4"/>
+                <c:ptCount val="1"/>
                 <c:pt idx="0">
                   <c:v>Categoria 1</c:v>
-                </c:pt>
-                <c:pt idx="1">
-                  <c:v>Categoria 2</c:v>
-                </c:pt>
-                <c:pt idx="2">
-                  <c:v>Categoria 3</c:v>
-                </c:pt>
-                <c:pt idx="3">
-                  <c:v>Categoria 4</c:v>
                 </c:pt>
               </c:strCache>
             </c:strRef>
           </c:cat>
           <c:val>
             <c:numRef>
-              <c:f>Sheet1!$D$2:$D$5</c:f>
+              <c:f>Sheet1!$D$2</c:f>
               <c:numCache>
                 <c:formatCode>General</c:formatCode>
-                <c:ptCount val="4"/>
+                <c:ptCount val="1"/>
                 <c:pt idx="0">
-                  <c:v>2</c:v>
-                </c:pt>
-                <c:pt idx="1">
-                  <c:v>2</c:v>
-                </c:pt>
-                <c:pt idx="2">
-                  <c:v>3</c:v>
-                </c:pt>
-                <c:pt idx="3">
-                  <c:v>5</c:v>
+                  <c:v>1397</c:v>
                 </c:pt>
               </c:numCache>
             </c:numRef>
           </c:val>
           <c:extLst>
             <c:ext xmlns:c16="http://schemas.microsoft.com/office/drawing/2014/chart" uri="{C3380CC4-5D6E-409C-BE32-E72D297353CC}">
-              <c16:uniqueId val="{00000002-5E92-4051-99BC-2623F45BF7E0}"/>
+              <c16:uniqueId val="{00000002-37CE-41BB-8D1F-E0CEFC6C150F}"/>
             </c:ext>
           </c:extLst>
         </c:ser>
         <c:dLbls>
+          <c:dLblPos val="ctr"/>
           <c:showLegendKey val="0"/>
-          <c:showVal val="0"/>
+          <c:showVal val="1"/>
           <c:showCatName val="0"/>
           <c:showSerName val="0"/>
           <c:showPercent val="0"/>
@@ -421,39 +556,12 @@
         <c:scaling>
           <c:orientation val="minMax"/>
         </c:scaling>
-        <c:delete val="0"/>
+        <c:delete val="1"/>
         <c:axPos val="b"/>
         <c:numFmt formatCode="General" sourceLinked="0"/>
         <c:majorTickMark val="none"/>
         <c:minorTickMark val="none"/>
         <c:tickLblPos val="nextTo"/>
-        <c:spPr>
-          <a:noFill/>
-          <a:ln>
-            <a:noFill/>
-          </a:ln>
-          <a:effectLst/>
-        </c:spPr>
-        <c:txPr>
-          <a:bodyPr rot="-60000000" spcFirstLastPara="1" vertOverflow="ellipsis" vert="horz" wrap="square" anchor="ctr" anchorCtr="1"/>
-          <a:lstStyle/>
-          <a:p>
-            <a:pPr>
-              <a:defRPr sz="1197" b="0" i="0" u="none" strike="noStrike" kern="1200" baseline="0">
-                <a:solidFill>
-                  <a:schemeClr val="tx1">
-                    <a:lumMod val="50000"/>
-                    <a:lumOff val="50000"/>
-                  </a:schemeClr>
-                </a:solidFill>
-                <a:latin typeface="+mn-lt"/>
-                <a:ea typeface="+mn-ea"/>
-                <a:cs typeface="+mn-cs"/>
-              </a:defRPr>
-            </a:pPr>
-            <a:endParaRPr lang="it-IT"/>
-          </a:p>
-        </c:txPr>
         <c:crossAx val="632166128"/>
         <c:crosses val="autoZero"/>
         <c:auto val="1"/>
@@ -466,39 +574,12 @@
         <c:scaling>
           <c:orientation val="minMax"/>
         </c:scaling>
-        <c:delete val="0"/>
+        <c:delete val="1"/>
         <c:axPos val="l"/>
         <c:numFmt formatCode="General" sourceLinked="1"/>
         <c:majorTickMark val="none"/>
         <c:minorTickMark val="none"/>
         <c:tickLblPos val="nextTo"/>
-        <c:spPr>
-          <a:noFill/>
-          <a:ln>
-            <a:noFill/>
-          </a:ln>
-          <a:effectLst/>
-        </c:spPr>
-        <c:txPr>
-          <a:bodyPr rot="-60000000" spcFirstLastPara="1" vertOverflow="ellipsis" vert="horz" wrap="square" anchor="ctr" anchorCtr="1"/>
-          <a:lstStyle/>
-          <a:p>
-            <a:pPr>
-              <a:defRPr sz="1197" b="0" i="0" u="none" strike="noStrike" kern="1200" baseline="0">
-                <a:solidFill>
-                  <a:schemeClr val="tx1">
-                    <a:lumMod val="50000"/>
-                    <a:lumOff val="50000"/>
-                  </a:schemeClr>
-                </a:solidFill>
-                <a:latin typeface="+mn-lt"/>
-                <a:ea typeface="+mn-ea"/>
-                <a:cs typeface="+mn-cs"/>
-              </a:defRPr>
-            </a:pPr>
-            <a:endParaRPr lang="it-IT"/>
-          </a:p>
-        </c:txPr>
         <c:crossAx val="632163384"/>
         <c:crosses val="autoZero"/>
         <c:crossBetween val="between"/>
@@ -511,37 +592,6 @@
         <a:effectLst/>
       </c:spPr>
     </c:plotArea>
-    <c:legend>
-      <c:legendPos val="t"/>
-      <c:overlay val="0"/>
-      <c:spPr>
-        <a:noFill/>
-        <a:ln>
-          <a:noFill/>
-        </a:ln>
-        <a:effectLst/>
-      </c:spPr>
-      <c:txPr>
-        <a:bodyPr rot="0" spcFirstLastPara="1" vertOverflow="ellipsis" vert="horz" wrap="square" anchor="ctr" anchorCtr="1"/>
-        <a:lstStyle/>
-        <a:p>
-          <a:pPr>
-            <a:defRPr sz="1197" b="0" i="0" u="none" strike="noStrike" kern="1200" baseline="0">
-              <a:solidFill>
-                <a:schemeClr val="tx1">
-                  <a:lumMod val="50000"/>
-                  <a:lumOff val="50000"/>
-                </a:schemeClr>
-              </a:solidFill>
-              <a:latin typeface="+mn-lt"/>
-              <a:ea typeface="+mn-ea"/>
-              <a:cs typeface="+mn-cs"/>
-            </a:defRPr>
-          </a:pPr>
-          <a:endParaRPr lang="it-IT"/>
-        </a:p>
-      </c:txPr>
-    </c:legend>
     <c:plotVisOnly val="1"/>
     <c:dispBlanksAs val="gap"/>
     <c:showDLblsOverMax val="0"/>
@@ -1178,7 +1228,7 @@
             <a:pPr algn="r" rtl="0"/>
             <a:fld id="{221A1788-7372-4FAC-9AF0-00B54B8D9CBA}" type="datetime1">
               <a:rPr lang="it-IT" smtClean="0"/>
-              <a:t>25/02/2023</a:t>
+              <a:t>26/02/2023</a:t>
             </a:fld>
             <a:endParaRPr lang="it-IT" dirty="0"/>
           </a:p>
@@ -1348,7 +1398,7 @@
             <a:fld id="{D943A304-85CD-4257-B418-D8F889FE0DBC}" type="datetime1">
               <a:rPr lang="it-IT" smtClean="0"/>
               <a:pPr/>
-              <a:t>25/02/2023</a:t>
+              <a:t>26/02/2023</a:t>
             </a:fld>
             <a:endParaRPr lang="it-IT" dirty="0"/>
           </a:p>
@@ -2211,10 +2261,7 @@
           <a:bodyPr/>
           <a:lstStyle/>
           <a:p>
-            <a:r>
-              <a:rPr lang="it-IT" dirty="0"/>
-              <a:t>Per quanto riguarda il Sentiment Analysis, la prima cosa che abbiamo fatto è stata quella d calcolare il Sentiment di ogni tweet</a:t>
-            </a:r>
+            <a:endParaRPr lang="it-IT" dirty="0"/>
           </a:p>
         </p:txBody>
       </p:sp>
@@ -2245,7 +2292,7 @@
     </p:spTree>
     <p:extLst>
       <p:ext uri="{BB962C8B-B14F-4D97-AF65-F5344CB8AC3E}">
-        <p14:creationId xmlns:p14="http://schemas.microsoft.com/office/powerpoint/2010/main" val="728977095"/>
+        <p14:creationId xmlns:p14="http://schemas.microsoft.com/office/powerpoint/2010/main" val="3263193388"/>
       </p:ext>
     </p:extLst>
   </p:cSld>
@@ -2300,10 +2347,9 @@
           <a:lstStyle/>
           <a:p>
             <a:r>
-              <a:rPr lang="it-IT" sz="1600" dirty="0"/>
-              <a:t>Il punteggio finale indica se la frase ha un orientamento emotivo positivo (compound score &gt; 0), negativo (compound score &lt; 0) o neutro (compound score = 0).</a:t>
-            </a:r>
-            <a:endParaRPr lang="it-IT" dirty="0"/>
+              <a:rPr lang="it-IT" dirty="0"/>
+              <a:t>Per quanto riguarda il Sentiment Analysis, la prima cosa che abbiamo fatto è stata quella d calcolare il Sentiment di ogni tweet</a:t>
+            </a:r>
           </a:p>
         </p:txBody>
       </p:sp>
@@ -2334,7 +2380,7 @@
     </p:spTree>
     <p:extLst>
       <p:ext uri="{BB962C8B-B14F-4D97-AF65-F5344CB8AC3E}">
-        <p14:creationId xmlns:p14="http://schemas.microsoft.com/office/powerpoint/2010/main" val="2638469449"/>
+        <p14:creationId xmlns:p14="http://schemas.microsoft.com/office/powerpoint/2010/main" val="728977095"/>
       </p:ext>
     </p:extLst>
   </p:cSld>
@@ -2388,6 +2434,10 @@
           <a:bodyPr/>
           <a:lstStyle/>
           <a:p>
+            <a:r>
+              <a:rPr lang="it-IT" sz="1600" dirty="0"/>
+              <a:t>Il punteggio finale indica se la frase ha un orientamento emotivo positivo (compound score &gt; 0), negativo (compound score &lt; 0) o neutro (compound score = 0).</a:t>
+            </a:r>
             <a:endParaRPr lang="it-IT" dirty="0"/>
           </a:p>
         </p:txBody>
@@ -2419,7 +2469,7 @@
     </p:spTree>
     <p:extLst>
       <p:ext uri="{BB962C8B-B14F-4D97-AF65-F5344CB8AC3E}">
-        <p14:creationId xmlns:p14="http://schemas.microsoft.com/office/powerpoint/2010/main" val="1894627143"/>
+        <p14:creationId xmlns:p14="http://schemas.microsoft.com/office/powerpoint/2010/main" val="2638469449"/>
       </p:ext>
     </p:extLst>
   </p:cSld>
@@ -2504,7 +2554,7 @@
     </p:spTree>
     <p:extLst>
       <p:ext uri="{BB962C8B-B14F-4D97-AF65-F5344CB8AC3E}">
-        <p14:creationId xmlns:p14="http://schemas.microsoft.com/office/powerpoint/2010/main" val="3331015620"/>
+        <p14:creationId xmlns:p14="http://schemas.microsoft.com/office/powerpoint/2010/main" val="1894627143"/>
       </p:ext>
     </p:extLst>
   </p:cSld>
@@ -2558,10 +2608,7 @@
           <a:bodyPr/>
           <a:lstStyle/>
           <a:p>
-            <a:r>
-              <a:rPr lang="it-IT" dirty="0"/>
-              <a:t>Nel nostro caso positivo, negativo o neutro</a:t>
-            </a:r>
+            <a:endParaRPr lang="it-IT" dirty="0"/>
           </a:p>
         </p:txBody>
       </p:sp>
@@ -2592,7 +2639,7 @@
     </p:spTree>
     <p:extLst>
       <p:ext uri="{BB962C8B-B14F-4D97-AF65-F5344CB8AC3E}">
-        <p14:creationId xmlns:p14="http://schemas.microsoft.com/office/powerpoint/2010/main" val="1626038331"/>
+        <p14:creationId xmlns:p14="http://schemas.microsoft.com/office/powerpoint/2010/main" val="3331015620"/>
       </p:ext>
     </p:extLst>
   </p:cSld>
@@ -2680,7 +2727,7 @@
     </p:spTree>
     <p:extLst>
       <p:ext uri="{BB962C8B-B14F-4D97-AF65-F5344CB8AC3E}">
-        <p14:creationId xmlns:p14="http://schemas.microsoft.com/office/powerpoint/2010/main" val="1054507137"/>
+        <p14:creationId xmlns:p14="http://schemas.microsoft.com/office/powerpoint/2010/main" val="1626038331"/>
       </p:ext>
     </p:extLst>
   </p:cSld>
@@ -2819,10 +2866,7 @@
           <a:bodyPr/>
           <a:lstStyle/>
           <a:p>
-            <a:r>
-              <a:rPr lang="it-IT" dirty="0"/>
-              <a:t>La libreria che abbiamo utilizzato per fare Content è stata Spacy.</a:t>
-            </a:r>
+            <a:endParaRPr lang="it-IT" dirty="0"/>
           </a:p>
         </p:txBody>
       </p:sp>
@@ -2853,7 +2897,7 @@
     </p:spTree>
     <p:extLst>
       <p:ext uri="{BB962C8B-B14F-4D97-AF65-F5344CB8AC3E}">
-        <p14:creationId xmlns:p14="http://schemas.microsoft.com/office/powerpoint/2010/main" val="3794186773"/>
+        <p14:creationId xmlns:p14="http://schemas.microsoft.com/office/powerpoint/2010/main" val="3620667321"/>
       </p:ext>
     </p:extLst>
   </p:cSld>
@@ -2941,7 +2985,7 @@
     </p:spTree>
     <p:extLst>
       <p:ext uri="{BB962C8B-B14F-4D97-AF65-F5344CB8AC3E}">
-        <p14:creationId xmlns:p14="http://schemas.microsoft.com/office/powerpoint/2010/main" val="1272099144"/>
+        <p14:creationId xmlns:p14="http://schemas.microsoft.com/office/powerpoint/2010/main" val="3794186773"/>
       </p:ext>
     </p:extLst>
   </p:cSld>
@@ -2997,7 +3041,7 @@
           <a:p>
             <a:r>
               <a:rPr lang="it-IT" dirty="0"/>
-              <a:t>Nel nostro caso di studio</a:t>
+              <a:t>La libreria che abbiamo utilizzato per fare Content è stata Spacy.</a:t>
             </a:r>
           </a:p>
         </p:txBody>
@@ -3029,7 +3073,7 @@
     </p:spTree>
     <p:extLst>
       <p:ext uri="{BB962C8B-B14F-4D97-AF65-F5344CB8AC3E}">
-        <p14:creationId xmlns:p14="http://schemas.microsoft.com/office/powerpoint/2010/main" val="319390075"/>
+        <p14:creationId xmlns:p14="http://schemas.microsoft.com/office/powerpoint/2010/main" val="1272099144"/>
       </p:ext>
     </p:extLst>
   </p:cSld>
@@ -3085,7 +3129,16 @@
           <a:p>
             <a:r>
               <a:rPr lang="it-IT" dirty="0"/>
-              <a:t>La libreria che abbiamo utilizzato per fare Content è stata Spacy.</a:t>
+              <a:t>Nel nostro caso di studio</a:t>
+            </a:r>
+          </a:p>
+          <a:p>
+            <a:endParaRPr lang="it-IT" dirty="0"/>
+          </a:p>
+          <a:p>
+            <a:r>
+              <a:rPr lang="it-IT" dirty="0"/>
+              <a:t>Noi lo sappiamo a priori ma, analizzando un dataset qualsisi possiamo facilmente capire qual è l’argomento trattato</a:t>
             </a:r>
           </a:p>
         </p:txBody>
@@ -3117,7 +3170,7 @@
     </p:spTree>
     <p:extLst>
       <p:ext uri="{BB962C8B-B14F-4D97-AF65-F5344CB8AC3E}">
-        <p14:creationId xmlns:p14="http://schemas.microsoft.com/office/powerpoint/2010/main" val="3581221903"/>
+        <p14:creationId xmlns:p14="http://schemas.microsoft.com/office/powerpoint/2010/main" val="319390075"/>
       </p:ext>
     </p:extLst>
   </p:cSld>
@@ -3171,7 +3224,10 @@
           <a:bodyPr/>
           <a:lstStyle/>
           <a:p>
-            <a:endParaRPr lang="it-IT" dirty="0"/>
+            <a:r>
+              <a:rPr lang="it-IT" dirty="0"/>
+              <a:t>La libreria che abbiamo utilizzato per fare Content è stata Spacy.</a:t>
+            </a:r>
           </a:p>
         </p:txBody>
       </p:sp>
@@ -3202,7 +3258,356 @@
     </p:spTree>
     <p:extLst>
       <p:ext uri="{BB962C8B-B14F-4D97-AF65-F5344CB8AC3E}">
-        <p14:creationId xmlns:p14="http://schemas.microsoft.com/office/powerpoint/2010/main" val="4149218938"/>
+        <p14:creationId xmlns:p14="http://schemas.microsoft.com/office/powerpoint/2010/main" val="3581221903"/>
+      </p:ext>
+    </p:extLst>
+  </p:cSld>
+  <p:clrMapOvr>
+    <a:masterClrMapping/>
+  </p:clrMapOvr>
+</p:notes>
+</file>
+
+<file path=ppt/notesSlides/notesSlide25.xml><?xml version="1.0" encoding="utf-8"?>
+<p:notes xmlns:a="http://schemas.openxmlformats.org/drawingml/2006/main" xmlns:r="http://schemas.openxmlformats.org/officeDocument/2006/relationships" xmlns:p="http://schemas.openxmlformats.org/presentationml/2006/main">
+  <p:cSld>
+    <p:spTree>
+      <p:nvGrpSpPr>
+        <p:cNvPr id="1" name=""/>
+        <p:cNvGrpSpPr/>
+        <p:nvPr/>
+      </p:nvGrpSpPr>
+      <p:grpSpPr>
+        <a:xfrm>
+          <a:off x="0" y="0"/>
+          <a:ext cx="0" cy="0"/>
+          <a:chOff x="0" y="0"/>
+          <a:chExt cx="0" cy="0"/>
+        </a:xfrm>
+      </p:grpSpPr>
+      <p:sp>
+        <p:nvSpPr>
+          <p:cNvPr id="2" name="Segnaposto immagine diapositiva 1"/>
+          <p:cNvSpPr>
+            <a:spLocks noGrp="1" noRot="1" noChangeAspect="1"/>
+          </p:cNvSpPr>
+          <p:nvPr>
+            <p:ph type="sldImg"/>
+          </p:nvPr>
+        </p:nvSpPr>
+        <p:spPr/>
+      </p:sp>
+      <p:sp>
+        <p:nvSpPr>
+          <p:cNvPr id="3" name="Segnaposto note 2"/>
+          <p:cNvSpPr>
+            <a:spLocks noGrp="1"/>
+          </p:cNvSpPr>
+          <p:nvPr>
+            <p:ph type="body" idx="1"/>
+          </p:nvPr>
+        </p:nvSpPr>
+        <p:spPr/>
+        <p:txBody>
+          <a:bodyPr/>
+          <a:lstStyle/>
+          <a:p>
+            <a:r>
+              <a:rPr lang="it-IT" dirty="0"/>
+              <a:t>La libreria che abbiamo utilizzato per fare Content è stata Spacy.</a:t>
+            </a:r>
+          </a:p>
+        </p:txBody>
+      </p:sp>
+      <p:sp>
+        <p:nvSpPr>
+          <p:cNvPr id="4" name="Segnaposto numero diapositiva 3"/>
+          <p:cNvSpPr>
+            <a:spLocks noGrp="1"/>
+          </p:cNvSpPr>
+          <p:nvPr>
+            <p:ph type="sldNum" sz="quarter" idx="10"/>
+          </p:nvPr>
+        </p:nvSpPr>
+        <p:spPr/>
+        <p:txBody>
+          <a:bodyPr/>
+          <a:lstStyle/>
+          <a:p>
+            <a:fld id="{3EBA5BD7-F043-4D1B-AA17-CD412FC534DE}" type="slidenum">
+              <a:rPr lang="it-IT" smtClean="0"/>
+              <a:pPr/>
+              <a:t>25</a:t>
+            </a:fld>
+            <a:endParaRPr lang="it-IT" dirty="0"/>
+          </a:p>
+        </p:txBody>
+      </p:sp>
+    </p:spTree>
+    <p:extLst>
+      <p:ext uri="{BB962C8B-B14F-4D97-AF65-F5344CB8AC3E}">
+        <p14:creationId xmlns:p14="http://schemas.microsoft.com/office/powerpoint/2010/main" val="4141571329"/>
+      </p:ext>
+    </p:extLst>
+  </p:cSld>
+  <p:clrMapOvr>
+    <a:masterClrMapping/>
+  </p:clrMapOvr>
+</p:notes>
+</file>
+
+<file path=ppt/notesSlides/notesSlide26.xml><?xml version="1.0" encoding="utf-8"?>
+<p:notes xmlns:a="http://schemas.openxmlformats.org/drawingml/2006/main" xmlns:r="http://schemas.openxmlformats.org/officeDocument/2006/relationships" xmlns:p="http://schemas.openxmlformats.org/presentationml/2006/main">
+  <p:cSld>
+    <p:spTree>
+      <p:nvGrpSpPr>
+        <p:cNvPr id="1" name=""/>
+        <p:cNvGrpSpPr/>
+        <p:nvPr/>
+      </p:nvGrpSpPr>
+      <p:grpSpPr>
+        <a:xfrm>
+          <a:off x="0" y="0"/>
+          <a:ext cx="0" cy="0"/>
+          <a:chOff x="0" y="0"/>
+          <a:chExt cx="0" cy="0"/>
+        </a:xfrm>
+      </p:grpSpPr>
+      <p:sp>
+        <p:nvSpPr>
+          <p:cNvPr id="2" name="Segnaposto immagine diapositiva 1"/>
+          <p:cNvSpPr>
+            <a:spLocks noGrp="1" noRot="1" noChangeAspect="1"/>
+          </p:cNvSpPr>
+          <p:nvPr>
+            <p:ph type="sldImg"/>
+          </p:nvPr>
+        </p:nvSpPr>
+        <p:spPr/>
+      </p:sp>
+      <p:sp>
+        <p:nvSpPr>
+          <p:cNvPr id="3" name="Segnaposto note 2"/>
+          <p:cNvSpPr>
+            <a:spLocks noGrp="1"/>
+          </p:cNvSpPr>
+          <p:nvPr>
+            <p:ph type="body" idx="1"/>
+          </p:nvPr>
+        </p:nvSpPr>
+        <p:spPr/>
+        <p:txBody>
+          <a:bodyPr/>
+          <a:lstStyle/>
+          <a:p>
+            <a:r>
+              <a:rPr lang="it-IT" dirty="0"/>
+              <a:t>La libreria che abbiamo utilizzato per fare Content è stata Spacy.</a:t>
+            </a:r>
+          </a:p>
+        </p:txBody>
+      </p:sp>
+      <p:sp>
+        <p:nvSpPr>
+          <p:cNvPr id="4" name="Segnaposto numero diapositiva 3"/>
+          <p:cNvSpPr>
+            <a:spLocks noGrp="1"/>
+          </p:cNvSpPr>
+          <p:nvPr>
+            <p:ph type="sldNum" sz="quarter" idx="10"/>
+          </p:nvPr>
+        </p:nvSpPr>
+        <p:spPr/>
+        <p:txBody>
+          <a:bodyPr/>
+          <a:lstStyle/>
+          <a:p>
+            <a:fld id="{3EBA5BD7-F043-4D1B-AA17-CD412FC534DE}" type="slidenum">
+              <a:rPr lang="it-IT" smtClean="0"/>
+              <a:pPr/>
+              <a:t>26</a:t>
+            </a:fld>
+            <a:endParaRPr lang="it-IT" dirty="0"/>
+          </a:p>
+        </p:txBody>
+      </p:sp>
+    </p:spTree>
+    <p:extLst>
+      <p:ext uri="{BB962C8B-B14F-4D97-AF65-F5344CB8AC3E}">
+        <p14:creationId xmlns:p14="http://schemas.microsoft.com/office/powerpoint/2010/main" val="2929649750"/>
+      </p:ext>
+    </p:extLst>
+  </p:cSld>
+  <p:clrMapOvr>
+    <a:masterClrMapping/>
+  </p:clrMapOvr>
+</p:notes>
+</file>
+
+<file path=ppt/notesSlides/notesSlide27.xml><?xml version="1.0" encoding="utf-8"?>
+<p:notes xmlns:a="http://schemas.openxmlformats.org/drawingml/2006/main" xmlns:r="http://schemas.openxmlformats.org/officeDocument/2006/relationships" xmlns:p="http://schemas.openxmlformats.org/presentationml/2006/main">
+  <p:cSld>
+    <p:spTree>
+      <p:nvGrpSpPr>
+        <p:cNvPr id="1" name=""/>
+        <p:cNvGrpSpPr/>
+        <p:nvPr/>
+      </p:nvGrpSpPr>
+      <p:grpSpPr>
+        <a:xfrm>
+          <a:off x="0" y="0"/>
+          <a:ext cx="0" cy="0"/>
+          <a:chOff x="0" y="0"/>
+          <a:chExt cx="0" cy="0"/>
+        </a:xfrm>
+      </p:grpSpPr>
+      <p:sp>
+        <p:nvSpPr>
+          <p:cNvPr id="2" name="Segnaposto immagine diapositiva 1"/>
+          <p:cNvSpPr>
+            <a:spLocks noGrp="1" noRot="1" noChangeAspect="1"/>
+          </p:cNvSpPr>
+          <p:nvPr>
+            <p:ph type="sldImg"/>
+          </p:nvPr>
+        </p:nvSpPr>
+        <p:spPr/>
+      </p:sp>
+      <p:sp>
+        <p:nvSpPr>
+          <p:cNvPr id="3" name="Segnaposto note 2"/>
+          <p:cNvSpPr>
+            <a:spLocks noGrp="1"/>
+          </p:cNvSpPr>
+          <p:nvPr>
+            <p:ph type="body" idx="1"/>
+          </p:nvPr>
+        </p:nvSpPr>
+        <p:spPr/>
+        <p:txBody>
+          <a:bodyPr/>
+          <a:lstStyle/>
+          <a:p>
+            <a:r>
+              <a:rPr lang="it-IT" dirty="0"/>
+              <a:t>La libreria che abbiamo utilizzato per fare Content è stata Spacy.</a:t>
+            </a:r>
+          </a:p>
+        </p:txBody>
+      </p:sp>
+      <p:sp>
+        <p:nvSpPr>
+          <p:cNvPr id="4" name="Segnaposto numero diapositiva 3"/>
+          <p:cNvSpPr>
+            <a:spLocks noGrp="1"/>
+          </p:cNvSpPr>
+          <p:nvPr>
+            <p:ph type="sldNum" sz="quarter" idx="10"/>
+          </p:nvPr>
+        </p:nvSpPr>
+        <p:spPr/>
+        <p:txBody>
+          <a:bodyPr/>
+          <a:lstStyle/>
+          <a:p>
+            <a:fld id="{3EBA5BD7-F043-4D1B-AA17-CD412FC534DE}" type="slidenum">
+              <a:rPr lang="it-IT" smtClean="0"/>
+              <a:pPr/>
+              <a:t>27</a:t>
+            </a:fld>
+            <a:endParaRPr lang="it-IT" dirty="0"/>
+          </a:p>
+        </p:txBody>
+      </p:sp>
+    </p:spTree>
+    <p:extLst>
+      <p:ext uri="{BB962C8B-B14F-4D97-AF65-F5344CB8AC3E}">
+        <p14:creationId xmlns:p14="http://schemas.microsoft.com/office/powerpoint/2010/main" val="2906118524"/>
+      </p:ext>
+    </p:extLst>
+  </p:cSld>
+  <p:clrMapOvr>
+    <a:masterClrMapping/>
+  </p:clrMapOvr>
+</p:notes>
+</file>
+
+<file path=ppt/notesSlides/notesSlide28.xml><?xml version="1.0" encoding="utf-8"?>
+<p:notes xmlns:a="http://schemas.openxmlformats.org/drawingml/2006/main" xmlns:r="http://schemas.openxmlformats.org/officeDocument/2006/relationships" xmlns:p="http://schemas.openxmlformats.org/presentationml/2006/main">
+  <p:cSld>
+    <p:spTree>
+      <p:nvGrpSpPr>
+        <p:cNvPr id="1" name=""/>
+        <p:cNvGrpSpPr/>
+        <p:nvPr/>
+      </p:nvGrpSpPr>
+      <p:grpSpPr>
+        <a:xfrm>
+          <a:off x="0" y="0"/>
+          <a:ext cx="0" cy="0"/>
+          <a:chOff x="0" y="0"/>
+          <a:chExt cx="0" cy="0"/>
+        </a:xfrm>
+      </p:grpSpPr>
+      <p:sp>
+        <p:nvSpPr>
+          <p:cNvPr id="2" name="Segnaposto immagine diapositiva 1"/>
+          <p:cNvSpPr>
+            <a:spLocks noGrp="1" noRot="1" noChangeAspect="1"/>
+          </p:cNvSpPr>
+          <p:nvPr>
+            <p:ph type="sldImg"/>
+          </p:nvPr>
+        </p:nvSpPr>
+        <p:spPr/>
+      </p:sp>
+      <p:sp>
+        <p:nvSpPr>
+          <p:cNvPr id="3" name="Segnaposto note 2"/>
+          <p:cNvSpPr>
+            <a:spLocks noGrp="1"/>
+          </p:cNvSpPr>
+          <p:nvPr>
+            <p:ph type="body" idx="1"/>
+          </p:nvPr>
+        </p:nvSpPr>
+        <p:spPr/>
+        <p:txBody>
+          <a:bodyPr/>
+          <a:lstStyle/>
+          <a:p>
+            <a:endParaRPr lang="it-IT" dirty="0"/>
+          </a:p>
+        </p:txBody>
+      </p:sp>
+      <p:sp>
+        <p:nvSpPr>
+          <p:cNvPr id="4" name="Segnaposto numero diapositiva 3"/>
+          <p:cNvSpPr>
+            <a:spLocks noGrp="1"/>
+          </p:cNvSpPr>
+          <p:nvPr>
+            <p:ph type="sldNum" sz="quarter" idx="10"/>
+          </p:nvPr>
+        </p:nvSpPr>
+        <p:spPr/>
+        <p:txBody>
+          <a:bodyPr/>
+          <a:lstStyle/>
+          <a:p>
+            <a:fld id="{3EBA5BD7-F043-4D1B-AA17-CD412FC534DE}" type="slidenum">
+              <a:rPr lang="it-IT" smtClean="0"/>
+              <a:pPr/>
+              <a:t>28</a:t>
+            </a:fld>
+            <a:endParaRPr lang="it-IT" dirty="0"/>
+          </a:p>
+        </p:txBody>
+      </p:sp>
+    </p:spTree>
+    <p:extLst>
+      <p:ext uri="{BB962C8B-B14F-4D97-AF65-F5344CB8AC3E}">
+        <p14:creationId xmlns:p14="http://schemas.microsoft.com/office/powerpoint/2010/main" val="2755364451"/>
       </p:ext>
     </p:extLst>
   </p:cSld>
@@ -4627,7 +5032,7 @@
             <a:fld id="{3889EF9B-A500-41B6-8F1C-893813E9A898}" type="datetime1">
               <a:rPr lang="it-IT" smtClean="0"/>
               <a:pPr/>
-              <a:t>25/02/2023</a:t>
+              <a:t>26/02/2023</a:t>
             </a:fld>
             <a:endParaRPr lang="it-IT" dirty="0"/>
           </a:p>
@@ -4833,7 +5238,7 @@
             <a:fld id="{6E724BBD-5BEA-4971-A6C4-42E94AF7CB5F}" type="datetime1">
               <a:rPr lang="it-IT" smtClean="0"/>
               <a:pPr/>
-              <a:t>25/02/2023</a:t>
+              <a:t>26/02/2023</a:t>
             </a:fld>
             <a:endParaRPr lang="it-IT" dirty="0"/>
           </a:p>
@@ -5049,7 +5454,7 @@
             <a:fld id="{EF1B2188-7D8C-43C8-B29F-60D01DE77B72}" type="datetime1">
               <a:rPr lang="it-IT" smtClean="0"/>
               <a:pPr/>
-              <a:t>25/02/2023</a:t>
+              <a:t>26/02/2023</a:t>
             </a:fld>
             <a:endParaRPr lang="it-IT" dirty="0"/>
           </a:p>
@@ -5255,7 +5660,7 @@
             <a:fld id="{581DC961-63CE-49AB-921E-1CE3DDEFC80A}" type="datetime1">
               <a:rPr lang="it-IT" smtClean="0"/>
               <a:pPr/>
-              <a:t>25/02/2023</a:t>
+              <a:t>26/02/2023</a:t>
             </a:fld>
             <a:endParaRPr lang="it-IT" dirty="0"/>
           </a:p>
@@ -5699,7 +6104,7 @@
             <a:fld id="{C6066F5F-3C86-4285-A86F-35EFBBDD7800}" type="datetime1">
               <a:rPr lang="it-IT" smtClean="0"/>
               <a:pPr/>
-              <a:t>25/02/2023</a:t>
+              <a:t>26/02/2023</a:t>
             </a:fld>
             <a:endParaRPr lang="it-IT" dirty="0"/>
           </a:p>
@@ -6011,7 +6416,7 @@
             <a:fld id="{0B9BE34E-14EC-4041-A597-EE22FC16794F}" type="datetime1">
               <a:rPr lang="it-IT" smtClean="0"/>
               <a:pPr/>
-              <a:t>25/02/2023</a:t>
+              <a:t>26/02/2023</a:t>
             </a:fld>
             <a:endParaRPr lang="it-IT" dirty="0"/>
           </a:p>
@@ -6475,7 +6880,7 @@
             <a:fld id="{D6FAD192-1BF7-4994-9CBA-74265F19F4C1}" type="datetime1">
               <a:rPr lang="it-IT" smtClean="0"/>
               <a:pPr/>
-              <a:t>25/02/2023</a:t>
+              <a:t>26/02/2023</a:t>
             </a:fld>
             <a:endParaRPr lang="it-IT" dirty="0"/>
           </a:p>
@@ -6613,7 +7018,7 @@
             <a:fld id="{C476DD40-7EBA-46D0-A855-62759524AC7A}" type="datetime1">
               <a:rPr lang="it-IT" smtClean="0"/>
               <a:pPr/>
-              <a:t>25/02/2023</a:t>
+              <a:t>26/02/2023</a:t>
             </a:fld>
             <a:endParaRPr lang="it-IT" dirty="0"/>
           </a:p>
@@ -6727,7 +7132,7 @@
             <a:fld id="{C62E4D95-88E1-4556-89BE-EC650C1D14A8}" type="datetime1">
               <a:rPr lang="it-IT" smtClean="0"/>
               <a:pPr/>
-              <a:t>25/02/2023</a:t>
+              <a:t>26/02/2023</a:t>
             </a:fld>
             <a:endParaRPr lang="it-IT" dirty="0"/>
           </a:p>
@@ -7034,7 +7439,7 @@
             <a:fld id="{1F9867D3-FC26-40B1-8BB9-B19FF8D6CD45}" type="datetime1">
               <a:rPr lang="it-IT" smtClean="0"/>
               <a:pPr/>
-              <a:t>25/02/2023</a:t>
+              <a:t>26/02/2023</a:t>
             </a:fld>
             <a:endParaRPr lang="it-IT" dirty="0"/>
           </a:p>
@@ -7331,7 +7736,7 @@
             <a:fld id="{5B0EE21F-92EE-4289-AFFB-9252D957F459}" type="datetime1">
               <a:rPr lang="it-IT" smtClean="0"/>
               <a:pPr/>
-              <a:t>25/02/2023</a:t>
+              <a:t>26/02/2023</a:t>
             </a:fld>
             <a:endParaRPr lang="it-IT" dirty="0"/>
           </a:p>
@@ -7955,7 +8360,7 @@
             <a:fld id="{8A756645-DD8C-4009-9A84-A4AD56EB55A9}" type="datetime1">
               <a:rPr lang="it-IT" smtClean="0"/>
               <a:pPr/>
-              <a:t>25/02/2023</a:t>
+              <a:t>26/02/2023</a:t>
             </a:fld>
             <a:endParaRPr lang="it-IT" dirty="0"/>
           </a:p>
@@ -8467,7 +8872,7 @@
             <a:pPr rtl="0"/>
             <a:r>
               <a:rPr lang="it-IT" dirty="0"/>
-              <a:t>Sentiment e content analysis dei tweet riguardati i vaccini</a:t>
+              <a:t>Sentiment e content analysis dei tweet riguardati i vaccini per il covid-19</a:t>
             </a:r>
           </a:p>
         </p:txBody>
@@ -9465,8 +9870,8 @@
         </p:nvSpPr>
         <p:spPr>
           <a:xfrm>
-            <a:off x="1218883" y="260648"/>
-            <a:ext cx="10360501" cy="1223963"/>
+            <a:off x="1125860" y="476672"/>
+            <a:ext cx="10360501" cy="4104456"/>
           </a:xfrm>
         </p:spPr>
         <p:txBody>
@@ -9475,81 +9880,61 @@
           </a:bodyPr>
           <a:lstStyle/>
           <a:p>
-            <a:pPr rtl="0"/>
-            <a:r>
+            <a:pPr algn="ctr" rtl="0"/>
+            <a:r>
+              <a:rPr lang="it-IT" sz="8800" b="1" dirty="0"/>
+              <a:t>Sentiment Analysis</a:t>
+            </a:r>
+            <a:br>
               <a:rPr lang="it-IT" sz="5000" b="1" dirty="0"/>
-              <a:t>Calcolo Sentiment per ogni Tweet </a:t>
-            </a:r>
-          </a:p>
-        </p:txBody>
-      </p:sp>
-      <p:sp>
-        <p:nvSpPr>
-          <p:cNvPr id="14" name="Segnaposto contenuto 13"/>
-          <p:cNvSpPr>
-            <a:spLocks noGrp="1"/>
-          </p:cNvSpPr>
-          <p:nvPr>
-            <p:ph idx="1"/>
-          </p:nvPr>
-        </p:nvSpPr>
-        <p:spPr/>
-        <p:txBody>
-          <a:bodyPr rtlCol="0">
-            <a:normAutofit/>
-          </a:bodyPr>
-          <a:lstStyle/>
-          <a:p>
-            <a:pPr marL="145253" indent="0" algn="just">
-              <a:buNone/>
-            </a:pPr>
-            <a:endParaRPr lang="it-IT" sz="100" dirty="0"/>
-          </a:p>
-          <a:p>
-            <a:pPr marL="145253" indent="0" algn="just">
-              <a:buNone/>
-            </a:pPr>
-            <a:endParaRPr lang="it-IT" sz="100" dirty="0"/>
-          </a:p>
-          <a:p>
-            <a:pPr marL="145253" indent="0" algn="just">
-              <a:buNone/>
-            </a:pPr>
-            <a:r>
-              <a:rPr lang="it-IT" sz="3000" dirty="0"/>
-              <a:t>Per calcolare il sentiment dei singoli tweet abbiamo utilizzato la libreria </a:t>
-            </a:r>
-            <a:r>
-              <a:rPr lang="it-IT" sz="3000" b="1" dirty="0"/>
-              <a:t>NLTK</a:t>
-            </a:r>
-            <a:r>
-              <a:rPr lang="it-IT" sz="3000" dirty="0"/>
-              <a:t> (Natural Language Toolkit).</a:t>
-            </a:r>
-          </a:p>
-          <a:p>
-            <a:pPr marL="145253" indent="0" algn="just">
-              <a:buNone/>
-            </a:pPr>
-            <a:endParaRPr lang="it-IT" sz="3000" dirty="0"/>
-          </a:p>
-          <a:p>
-            <a:pPr marL="145253" indent="0" algn="just">
-              <a:buNone/>
-            </a:pPr>
-            <a:r>
-              <a:rPr lang="it-IT" sz="3000" dirty="0"/>
-              <a:t>Questa ci ha permesso di rimuovere gli hashtag, i link e i simboli dal testo del tweet, tokenizzare le parole del testo del tweet, ossia suddividere il testo in frasi e parole. </a:t>
-            </a:r>
-            <a:endParaRPr lang="en-US" sz="3000" dirty="0"/>
-          </a:p>
-        </p:txBody>
-      </p:sp>
+            </a:br>
+            <a:br>
+              <a:rPr lang="it-IT" sz="5000" b="1" dirty="0"/>
+            </a:br>
+            <a:endParaRPr lang="it-IT" sz="5000" b="1" dirty="0"/>
+          </a:p>
+        </p:txBody>
+      </p:sp>
+      <p:pic>
+        <p:nvPicPr>
+          <p:cNvPr id="5" name="Immagine 4">
+            <a:extLst>
+              <a:ext uri="{FF2B5EF4-FFF2-40B4-BE49-F238E27FC236}">
+                <a16:creationId xmlns:a16="http://schemas.microsoft.com/office/drawing/2014/main" id="{6038338C-4F2C-9364-B45F-8D6FC5AEE473}"/>
+              </a:ext>
+            </a:extLst>
+          </p:cNvPr>
+          <p:cNvPicPr>
+            <a:picLocks noChangeAspect="1"/>
+          </p:cNvPicPr>
+          <p:nvPr/>
+        </p:nvPicPr>
+        <p:blipFill>
+          <a:blip r:embed="rId3">
+            <a:extLst>
+              <a:ext uri="{28A0092B-C50C-407E-A947-70E740481C1C}">
+                <a14:useLocalDpi xmlns:a14="http://schemas.microsoft.com/office/drawing/2010/main" val="0"/>
+              </a:ext>
+            </a:extLst>
+          </a:blip>
+          <a:stretch>
+            <a:fillRect/>
+          </a:stretch>
+        </p:blipFill>
+        <p:spPr>
+          <a:xfrm>
+            <a:off x="3659061" y="2956749"/>
+            <a:ext cx="4870702" cy="3248758"/>
+          </a:xfrm>
+          <a:prstGeom prst="rect">
+            <a:avLst/>
+          </a:prstGeom>
+        </p:spPr>
+      </p:pic>
     </p:spTree>
     <p:extLst>
       <p:ext uri="{BB962C8B-B14F-4D97-AF65-F5344CB8AC3E}">
-        <p14:creationId xmlns:p14="http://schemas.microsoft.com/office/powerpoint/2010/main" val="2169509852"/>
+        <p14:creationId xmlns:p14="http://schemas.microsoft.com/office/powerpoint/2010/main" val="3714154796"/>
       </p:ext>
     </p:extLst>
   </p:cSld>
@@ -9631,7 +10016,7 @@
         <p:spPr/>
         <p:txBody>
           <a:bodyPr rtlCol="0">
-            <a:normAutofit lnSpcReduction="10000"/>
+            <a:normAutofit/>
           </a:bodyPr>
           <a:lstStyle/>
           <a:p>
@@ -9652,19 +10037,15 @@
             </a:pPr>
             <a:r>
               <a:rPr lang="it-IT" sz="3000" dirty="0"/>
-              <a:t>Successivamente questa libreria ci ha permesso di rimuovere le </a:t>
-            </a:r>
-            <a:r>
-              <a:rPr lang="it-IT" sz="3000" b="1" dirty="0">
-                <a:solidFill>
-                  <a:srgbClr val="FF0000"/>
-                </a:solidFill>
-              </a:rPr>
-              <a:t>stop-word</a:t>
+              <a:t>Per calcolare il sentiment dei singoli tweet abbiamo utilizzato la libreria </a:t>
+            </a:r>
+            <a:r>
+              <a:rPr lang="it-IT" sz="3000" b="1" dirty="0"/>
+              <a:t>NLTK</a:t>
             </a:r>
             <a:r>
               <a:rPr lang="it-IT" sz="3000" dirty="0"/>
-              <a:t> dal testo del tweet, in quanto non forniscono informazioni rilevanti sul sentiment della frase. </a:t>
+              <a:t> (Natural Language Toolkit).</a:t>
             </a:r>
           </a:p>
           <a:p>
@@ -9679,15 +10060,7 @@
             </a:pPr>
             <a:r>
               <a:rPr lang="it-IT" sz="3000" dirty="0"/>
-              <a:t>Infine effettua l'</a:t>
-            </a:r>
-            <a:r>
-              <a:rPr lang="it-IT" sz="3000" b="1" dirty="0"/>
-              <a:t>analisi delle polarità</a:t>
-            </a:r>
-            <a:r>
-              <a:rPr lang="it-IT" sz="3000" dirty="0"/>
-              <a:t> per calcolare il sentiment dei tweet. Questo  si basa sull'attribuzione di un punteggio (compound) a ciascuna frase del testo, che rappresenta la somma dei punteggi attribuiti alle singole parole della frase. Il punteggio finale sarà contenuto nell’intervallo [-1;1].</a:t>
+              <a:t>Questa ci ha permesso di rimuovere gli hashtag, i link e i simboli dal testo del tweet, tokenizzare le parole del testo del tweet, ossia suddividere il testo in frasi e parole. </a:t>
             </a:r>
             <a:endParaRPr lang="en-US" sz="3000" dirty="0"/>
           </a:p>
@@ -9696,7 +10069,7 @@
     </p:spTree>
     <p:extLst>
       <p:ext uri="{BB962C8B-B14F-4D97-AF65-F5344CB8AC3E}">
-        <p14:creationId xmlns:p14="http://schemas.microsoft.com/office/powerpoint/2010/main" val="1280197172"/>
+        <p14:creationId xmlns:p14="http://schemas.microsoft.com/office/powerpoint/2010/main" val="2169509852"/>
       </p:ext>
     </p:extLst>
   </p:cSld>
@@ -9760,7 +10133,7 @@
             <a:pPr rtl="0"/>
             <a:r>
               <a:rPr lang="it-IT" sz="5000" b="1" dirty="0"/>
-              <a:t>Risultati – Sentiment Analysis</a:t>
+              <a:t>Calcolo Sentiment per ogni Tweet </a:t>
             </a:r>
           </a:p>
         </p:txBody>
@@ -9778,7 +10151,7 @@
         <p:spPr/>
         <p:txBody>
           <a:bodyPr rtlCol="0">
-            <a:normAutofit/>
+            <a:normAutofit lnSpcReduction="10000"/>
           </a:bodyPr>
           <a:lstStyle/>
           <a:p>
@@ -9799,63 +10172,7 @@
             </a:pPr>
             <a:r>
               <a:rPr lang="it-IT" sz="3000" dirty="0"/>
-              <a:t>La media del Sentiment Analysis dei tweet è: </a:t>
-            </a:r>
-            <a:r>
-              <a:rPr lang="it-IT" sz="3000" b="1" dirty="0"/>
-              <a:t>0.13</a:t>
-            </a:r>
-          </a:p>
-          <a:p>
-            <a:pPr marL="145253" indent="0" algn="just">
-              <a:buNone/>
-            </a:pPr>
-            <a:endParaRPr lang="it-IT" sz="3000" dirty="0"/>
-          </a:p>
-          <a:p>
-            <a:pPr marL="145253" indent="0" algn="just">
-              <a:buNone/>
-            </a:pPr>
-            <a:r>
-              <a:rPr lang="it-IT" sz="3000" dirty="0"/>
-              <a:t>Dei 6000 tweets analizzati sono presenti:</a:t>
-            </a:r>
-          </a:p>
-          <a:p>
-            <a:pPr marL="602453" indent="-457200" algn="just"/>
-            <a:r>
-              <a:rPr lang="it-IT" sz="3000" dirty="0"/>
-              <a:t>Tweet Positivi: </a:t>
-            </a:r>
-            <a:r>
-              <a:rPr lang="it-IT" sz="3000" b="1" dirty="0">
-                <a:solidFill>
-                  <a:srgbClr val="00B050"/>
-                </a:solidFill>
-              </a:rPr>
-              <a:t>2706</a:t>
-            </a:r>
-          </a:p>
-          <a:p>
-            <a:pPr marL="602453" indent="-457200" algn="just"/>
-            <a:r>
-              <a:rPr lang="it-IT" sz="3000" dirty="0"/>
-              <a:t>Tweet Neutrali: </a:t>
-            </a:r>
-            <a:r>
-              <a:rPr lang="it-IT" sz="3000" b="1" dirty="0">
-                <a:solidFill>
-                  <a:srgbClr val="FFC000"/>
-                </a:solidFill>
-              </a:rPr>
-              <a:t>1897</a:t>
-            </a:r>
-          </a:p>
-          <a:p>
-            <a:pPr marL="602453" indent="-457200" algn="just"/>
-            <a:r>
-              <a:rPr lang="it-IT" sz="3000" dirty="0"/>
-              <a:t>Tweet Negativi: </a:t>
+              <a:t>Successivamente questa libreria ci ha permesso di rimuovere le </a:t>
             </a:r>
             <a:r>
               <a:rPr lang="it-IT" sz="3000" b="1" dirty="0">
@@ -9863,33 +10180,56 @@
                   <a:srgbClr val="FF0000"/>
                 </a:solidFill>
               </a:rPr>
-              <a:t>1397</a:t>
-            </a:r>
-            <a:endParaRPr lang="en-US" sz="3000" b="1" dirty="0">
-              <a:solidFill>
-                <a:srgbClr val="FF0000"/>
-              </a:solidFill>
-            </a:endParaRPr>
+              <a:t>stop-word</a:t>
+            </a:r>
+            <a:r>
+              <a:rPr lang="it-IT" sz="3000" dirty="0"/>
+              <a:t> dal testo del tweet, in quanto non forniscono informazioni rilevanti sul sentiment della frase. </a:t>
+            </a:r>
+          </a:p>
+          <a:p>
+            <a:pPr marL="145253" indent="0" algn="just">
+              <a:buNone/>
+            </a:pPr>
+            <a:endParaRPr lang="it-IT" sz="3000" dirty="0"/>
+          </a:p>
+          <a:p>
+            <a:pPr marL="145253" indent="0" algn="just">
+              <a:buNone/>
+            </a:pPr>
+            <a:r>
+              <a:rPr lang="it-IT" sz="3000" dirty="0"/>
+              <a:t>Infine effettua l'</a:t>
+            </a:r>
+            <a:r>
+              <a:rPr lang="it-IT" sz="3000" b="1" dirty="0"/>
+              <a:t>analisi delle polarità</a:t>
+            </a:r>
+            <a:r>
+              <a:rPr lang="it-IT" sz="3000" dirty="0"/>
+              <a:t> per calcolare il sentiment dei tweet. Questo  si basa sull'attribuzione di un punteggio (compound) a ciascuna frase del testo, che rappresenta la somma dei punteggi attribuiti alle singole parole della frase. Il punteggio finale sarà contenuto nell’intervallo [-1;1].</a:t>
+            </a:r>
+            <a:endParaRPr lang="en-US" sz="3000" dirty="0"/>
           </a:p>
         </p:txBody>
       </p:sp>
     </p:spTree>
     <p:extLst>
       <p:ext uri="{BB962C8B-B14F-4D97-AF65-F5344CB8AC3E}">
-        <p14:creationId xmlns:p14="http://schemas.microsoft.com/office/powerpoint/2010/main" val="564273718"/>
+        <p14:creationId xmlns:p14="http://schemas.microsoft.com/office/powerpoint/2010/main" val="1280197172"/>
       </p:ext>
     </p:extLst>
   </p:cSld>
   <p:clrMapOvr>
     <a:masterClrMapping/>
   </p:clrMapOvr>
-  <mc:AlternateContent xmlns:mc="http://schemas.openxmlformats.org/markup-compatibility/2006">
-    <mc:Choice xmlns:p14="http://schemas.microsoft.com/office/powerpoint/2010/main" Requires="p14">
+  <mc:AlternateContent xmlns:mc="http://schemas.openxmlformats.org/markup-compatibility/2006" xmlns:p14="http://schemas.microsoft.com/office/powerpoint/2010/main">
+    <mc:Choice Requires="p14">
       <p:transition spd="med" p14:dur="700">
         <p:fade/>
       </p:transition>
     </mc:Choice>
-    <mc:Fallback>
+    <mc:Fallback xmlns="">
       <p:transition spd="med">
         <p:fade/>
       </p:transition>
@@ -9955,10 +10295,15 @@
             <p:ph idx="1"/>
           </p:nvPr>
         </p:nvSpPr>
-        <p:spPr/>
+        <p:spPr>
+          <a:xfrm>
+            <a:off x="1218882" y="1706443"/>
+            <a:ext cx="10360501" cy="4462272"/>
+          </a:xfrm>
+        </p:spPr>
         <p:txBody>
           <a:bodyPr rtlCol="0">
-            <a:normAutofit fontScale="77500" lnSpcReduction="20000"/>
+            <a:normAutofit/>
           </a:bodyPr>
           <a:lstStyle/>
           <a:p>
@@ -9978,86 +10323,128 @@
               <a:buNone/>
             </a:pPr>
             <a:r>
-              <a:rPr lang="en-US" sz="3000" dirty="0"/>
-              <a:t>Congrats to the amazing scientists who created #coronavirus #vaccines to end the #pandemic.</a:t>
+              <a:rPr lang="it-IT" sz="3000" dirty="0"/>
+              <a:t>La media del Sentiment Analysis dei tweet è: </a:t>
+            </a:r>
+            <a:r>
+              <a:rPr lang="it-IT" sz="3000" b="1" dirty="0"/>
+              <a:t>0.13</a:t>
             </a:r>
           </a:p>
           <a:p>
             <a:pPr marL="145253" indent="0" algn="just">
               <a:buNone/>
             </a:pPr>
-            <a:r>
-              <a:rPr lang="en-US" sz="3000" dirty="0"/>
-              <a:t>Sentiment: 0.60</a:t>
-            </a:r>
+            <a:endParaRPr lang="it-IT" sz="3000" dirty="0"/>
           </a:p>
           <a:p>
             <a:pPr marL="145253" indent="0" algn="just">
               <a:buNone/>
             </a:pPr>
-            <a:endParaRPr lang="en-US" sz="3000" dirty="0"/>
-          </a:p>
-          <a:p>
-            <a:pPr marL="145253" indent="0" algn="just">
-              <a:buNone/>
-            </a:pPr>
-            <a:r>
-              <a:rPr lang="en-US" sz="3000" dirty="0"/>
-              <a:t>Testo: #Biden administration finalizes #deal for #200 #million #vaccine doses from #Pfizer, #Moderna</a:t>
-            </a:r>
-          </a:p>
-          <a:p>
-            <a:pPr marL="145253" indent="0" algn="just">
-              <a:buNone/>
-            </a:pPr>
-            <a:r>
-              <a:rPr lang="en-US" sz="3000" dirty="0"/>
-              <a:t>Sentiment: 0.0</a:t>
-            </a:r>
-          </a:p>
-          <a:p>
-            <a:pPr marL="145253" indent="0" algn="just">
-              <a:buNone/>
-            </a:pPr>
-            <a:endParaRPr lang="en-US" sz="3000" dirty="0"/>
-          </a:p>
-          <a:p>
-            <a:pPr marL="145253" indent="0" algn="just">
-              <a:buNone/>
-            </a:pPr>
-            <a:r>
-              <a:rPr lang="en-US" sz="3000" dirty="0"/>
-              <a:t>Testo: Russian woman after mRNA #SputnikV is very sick and terrified.</a:t>
-            </a:r>
-          </a:p>
-          <a:p>
-            <a:pPr marL="145253" indent="0" algn="just">
-              <a:buNone/>
-            </a:pPr>
-            <a:r>
-              <a:rPr lang="en-US" sz="3000" dirty="0"/>
-              <a:t>Sentiment: -0.46</a:t>
-            </a:r>
-          </a:p>
-        </p:txBody>
-      </p:sp>
+            <a:r>
+              <a:rPr lang="it-IT" sz="3000" dirty="0"/>
+              <a:t>Dei 6000 tweets analizzati sono presenti:</a:t>
+            </a:r>
+          </a:p>
+          <a:p>
+            <a:pPr marL="602453" indent="-457200" algn="just"/>
+            <a:r>
+              <a:rPr lang="it-IT" sz="3000" dirty="0"/>
+              <a:t>Tweet Positivi: </a:t>
+            </a:r>
+            <a:r>
+              <a:rPr lang="it-IT" sz="3000" b="1" dirty="0">
+                <a:solidFill>
+                  <a:srgbClr val="00B050"/>
+                </a:solidFill>
+              </a:rPr>
+              <a:t>2706</a:t>
+            </a:r>
+          </a:p>
+          <a:p>
+            <a:pPr marL="602453" indent="-457200" algn="just"/>
+            <a:r>
+              <a:rPr lang="it-IT" sz="3000" dirty="0"/>
+              <a:t>Tweet Neutrali: </a:t>
+            </a:r>
+            <a:r>
+              <a:rPr lang="it-IT" sz="3000" b="1" dirty="0">
+                <a:solidFill>
+                  <a:srgbClr val="FFC000"/>
+                </a:solidFill>
+              </a:rPr>
+              <a:t>1897</a:t>
+            </a:r>
+          </a:p>
+          <a:p>
+            <a:pPr marL="602453" indent="-457200" algn="just"/>
+            <a:r>
+              <a:rPr lang="it-IT" sz="3000" dirty="0"/>
+              <a:t>Tweet Negativi: </a:t>
+            </a:r>
+            <a:r>
+              <a:rPr lang="it-IT" sz="3000" b="1" dirty="0">
+                <a:solidFill>
+                  <a:srgbClr val="FF0000"/>
+                </a:solidFill>
+              </a:rPr>
+              <a:t>1397</a:t>
+            </a:r>
+            <a:endParaRPr lang="en-US" sz="3000" b="1" dirty="0">
+              <a:solidFill>
+                <a:srgbClr val="FF0000"/>
+              </a:solidFill>
+            </a:endParaRPr>
+          </a:p>
+        </p:txBody>
+      </p:sp>
+      <p:graphicFrame>
+        <p:nvGraphicFramePr>
+          <p:cNvPr id="2" name="Segnaposto contenuto 8" descr="Istogramma che mostra i valori di 3 serie per 4 categorie">
+            <a:extLst>
+              <a:ext uri="{FF2B5EF4-FFF2-40B4-BE49-F238E27FC236}">
+                <a16:creationId xmlns:a16="http://schemas.microsoft.com/office/drawing/2014/main" id="{00902C2B-DC0F-9766-D856-EBF1ACF2403C}"/>
+              </a:ext>
+            </a:extLst>
+          </p:cNvPr>
+          <p:cNvGraphicFramePr>
+            <a:graphicFrameLocks/>
+          </p:cNvGraphicFramePr>
+          <p:nvPr>
+            <p:extLst>
+              <p:ext uri="{D42A27DB-BD31-4B8C-83A1-F6EECF244321}">
+                <p14:modId xmlns:p14="http://schemas.microsoft.com/office/powerpoint/2010/main" val="3002628414"/>
+              </p:ext>
+            </p:extLst>
+          </p:nvPr>
+        </p:nvGraphicFramePr>
+        <p:xfrm>
+          <a:off x="8974732" y="4005064"/>
+          <a:ext cx="2892525" cy="2151915"/>
+        </p:xfrm>
+        <a:graphic>
+          <a:graphicData uri="http://schemas.openxmlformats.org/drawingml/2006/chart">
+            <c:chart xmlns:c="http://schemas.openxmlformats.org/drawingml/2006/chart" xmlns:r="http://schemas.openxmlformats.org/officeDocument/2006/relationships" r:id="rId3"/>
+          </a:graphicData>
+        </a:graphic>
+      </p:graphicFrame>
     </p:spTree>
     <p:extLst>
       <p:ext uri="{BB962C8B-B14F-4D97-AF65-F5344CB8AC3E}">
-        <p14:creationId xmlns:p14="http://schemas.microsoft.com/office/powerpoint/2010/main" val="2427094659"/>
+        <p14:creationId xmlns:p14="http://schemas.microsoft.com/office/powerpoint/2010/main" val="564273718"/>
       </p:ext>
     </p:extLst>
   </p:cSld>
   <p:clrMapOvr>
     <a:masterClrMapping/>
   </p:clrMapOvr>
-  <mc:AlternateContent xmlns:mc="http://schemas.openxmlformats.org/markup-compatibility/2006">
-    <mc:Choice xmlns:p14="http://schemas.microsoft.com/office/powerpoint/2010/main" Requires="p14">
+  <mc:AlternateContent xmlns:mc="http://schemas.openxmlformats.org/markup-compatibility/2006" xmlns:p14="http://schemas.microsoft.com/office/powerpoint/2010/main">
+    <mc:Choice Requires="p14">
       <p:transition spd="med" p14:dur="700">
         <p:fade/>
       </p:transition>
     </mc:Choice>
-    <mc:Fallback>
+    <mc:Fallback xmlns="">
       <p:transition spd="med">
         <p:fade/>
       </p:transition>
@@ -10108,7 +10495,7 @@
             <a:pPr rtl="0"/>
             <a:r>
               <a:rPr lang="it-IT" sz="5000" b="1" dirty="0"/>
-              <a:t>Sentiment di frasi scelte dall’utente </a:t>
+              <a:t>Risultati – Sentiment Analysis</a:t>
             </a:r>
           </a:p>
         </p:txBody>
@@ -10126,13 +10513,43 @@
         <p:spPr/>
         <p:txBody>
           <a:bodyPr rtlCol="0">
-            <a:normAutofit/>
+            <a:normAutofit fontScale="77500" lnSpcReduction="20000"/>
           </a:bodyPr>
           <a:lstStyle/>
           <a:p>
             <a:pPr marL="145253" indent="0" algn="just">
               <a:buNone/>
             </a:pPr>
+            <a:endParaRPr lang="it-IT" sz="100" dirty="0"/>
+          </a:p>
+          <a:p>
+            <a:pPr marL="145253" indent="0" algn="just">
+              <a:buNone/>
+            </a:pPr>
+            <a:endParaRPr lang="it-IT" sz="100" dirty="0"/>
+          </a:p>
+          <a:p>
+            <a:pPr marL="145253" indent="0" algn="just">
+              <a:buNone/>
+            </a:pPr>
+            <a:r>
+              <a:rPr lang="en-US" sz="3000" dirty="0"/>
+              <a:t>Congrats to the amazing scientists who created #coronavirus #vaccines to end the #pandemic.</a:t>
+            </a:r>
+          </a:p>
+          <a:p>
+            <a:pPr marL="145253" indent="0" algn="just">
+              <a:buNone/>
+            </a:pPr>
+            <a:r>
+              <a:rPr lang="en-US" sz="3000" dirty="0"/>
+              <a:t>Sentiment: 0.60</a:t>
+            </a:r>
+          </a:p>
+          <a:p>
+            <a:pPr marL="145253" indent="0" algn="just">
+              <a:buNone/>
+            </a:pPr>
             <a:endParaRPr lang="en-US" sz="3000" dirty="0"/>
           </a:p>
           <a:p>
@@ -10140,58 +10557,62 @@
               <a:buNone/>
             </a:pPr>
             <a:r>
-              <a:rPr lang="it-IT" sz="3000" dirty="0"/>
-              <a:t>Il programma realizzato utilizza il modello di </a:t>
-            </a:r>
-            <a:r>
-              <a:rPr lang="it-IT" sz="3000" b="1" dirty="0"/>
-              <a:t>regressione logistica</a:t>
-            </a:r>
-            <a:r>
-              <a:rPr lang="it-IT" sz="3000" dirty="0"/>
-              <a:t> per addestrare un classificatore di sentimenti sui tweet.</a:t>
+              <a:rPr lang="en-US" sz="3000" dirty="0"/>
+              <a:t>Testo: #Biden administration finalizes #deal for #200 #million #vaccine doses from #Pfizer, #Moderna</a:t>
             </a:r>
           </a:p>
           <a:p>
             <a:pPr marL="145253" indent="0" algn="just">
               <a:buNone/>
             </a:pPr>
-            <a:endParaRPr lang="it-IT" sz="3000" dirty="0"/>
+            <a:r>
+              <a:rPr lang="en-US" sz="3000" dirty="0"/>
+              <a:t>Sentiment: 0.0</a:t>
+            </a:r>
           </a:p>
           <a:p>
             <a:pPr marL="145253" indent="0" algn="just">
               <a:buNone/>
             </a:pPr>
-            <a:r>
-              <a:rPr lang="it-IT" sz="3000" dirty="0"/>
-              <a:t>La Regressione Logistica è un algoritmo di Machine Learning che viene utilizzato per risolvere problemi di classificazione. Questo algoritmo assegna ad ogni istanza del dataset un valore per etichettarlo. </a:t>
-            </a:r>
+            <a:endParaRPr lang="en-US" sz="3000" dirty="0"/>
           </a:p>
           <a:p>
             <a:pPr marL="145253" indent="0" algn="just">
               <a:buNone/>
             </a:pPr>
-            <a:endParaRPr lang="it-IT" sz="3000" dirty="0"/>
+            <a:r>
+              <a:rPr lang="en-US" sz="3000" dirty="0"/>
+              <a:t>Testo: Russian woman after mRNA #SputnikV is very sick and terrified.</a:t>
+            </a:r>
+          </a:p>
+          <a:p>
+            <a:pPr marL="145253" indent="0" algn="just">
+              <a:buNone/>
+            </a:pPr>
+            <a:r>
+              <a:rPr lang="en-US" sz="3000" dirty="0"/>
+              <a:t>Sentiment: -0.46</a:t>
+            </a:r>
           </a:p>
         </p:txBody>
       </p:sp>
     </p:spTree>
     <p:extLst>
       <p:ext uri="{BB962C8B-B14F-4D97-AF65-F5344CB8AC3E}">
-        <p14:creationId xmlns:p14="http://schemas.microsoft.com/office/powerpoint/2010/main" val="3434551019"/>
+        <p14:creationId xmlns:p14="http://schemas.microsoft.com/office/powerpoint/2010/main" val="2427094659"/>
       </p:ext>
     </p:extLst>
   </p:cSld>
   <p:clrMapOvr>
     <a:masterClrMapping/>
   </p:clrMapOvr>
-  <mc:AlternateContent xmlns:mc="http://schemas.openxmlformats.org/markup-compatibility/2006">
-    <mc:Choice xmlns:p14="http://schemas.microsoft.com/office/powerpoint/2010/main" Requires="p14">
+  <mc:AlternateContent xmlns:mc="http://schemas.openxmlformats.org/markup-compatibility/2006" xmlns:p14="http://schemas.microsoft.com/office/powerpoint/2010/main">
+    <mc:Choice Requires="p14">
       <p:transition spd="med" p14:dur="700">
         <p:fade/>
       </p:transition>
     </mc:Choice>
-    <mc:Fallback>
+    <mc:Fallback xmlns="">
       <p:transition spd="med">
         <p:fade/>
       </p:transition>
@@ -10201,7 +10622,7 @@
 </file>
 
 <file path=ppt/slides/slide19.xml><?xml version="1.0" encoding="utf-8"?>
-<p:sld xmlns:a="http://schemas.openxmlformats.org/drawingml/2006/main" xmlns:r="http://schemas.openxmlformats.org/officeDocument/2006/relationships" xmlns:p="http://schemas.openxmlformats.org/presentationml/2006/main">
+<p:sld xmlns:a="http://schemas.openxmlformats.org/drawingml/2006/main" xmlns:r="http://schemas.openxmlformats.org/officeDocument/2006/relationships" xmlns:p="http://schemas.openxmlformats.org/presentationml/2006/main" show="0">
   <p:cSld>
     <p:spTree>
       <p:nvGrpSpPr>
@@ -10242,7 +10663,7 @@
             <a:pPr rtl="0"/>
             <a:r>
               <a:rPr lang="it-IT" sz="5000" b="1" dirty="0"/>
-              <a:t>Risultati delle frasi scelte dall’utente </a:t>
+              <a:t>Sentiment di frasi scelte dall’utente </a:t>
             </a:r>
           </a:p>
         </p:txBody>
@@ -10275,7 +10696,30 @@
             </a:pPr>
             <a:r>
               <a:rPr lang="it-IT" sz="3000" dirty="0"/>
-              <a:t>To DO: Vedere se togliere </a:t>
+              <a:t>Il programma realizzato utilizza il modello di </a:t>
+            </a:r>
+            <a:r>
+              <a:rPr lang="it-IT" sz="3000" b="1" dirty="0"/>
+              <a:t>regressione logistica</a:t>
+            </a:r>
+            <a:r>
+              <a:rPr lang="it-IT" sz="3000" dirty="0"/>
+              <a:t> per addestrare un classificatore di sentimenti sui tweet.</a:t>
+            </a:r>
+          </a:p>
+          <a:p>
+            <a:pPr marL="145253" indent="0" algn="just">
+              <a:buNone/>
+            </a:pPr>
+            <a:endParaRPr lang="it-IT" sz="3000" dirty="0"/>
+          </a:p>
+          <a:p>
+            <a:pPr marL="145253" indent="0" algn="just">
+              <a:buNone/>
+            </a:pPr>
+            <a:r>
+              <a:rPr lang="it-IT" sz="3000" dirty="0"/>
+              <a:t>La Regressione Logistica è un algoritmo di Machine Learning che viene utilizzato per risolvere problemi di classificazione. Questo algoritmo assegna ad ogni istanza del dataset un valore per etichettarlo. </a:t>
             </a:r>
           </a:p>
           <a:p>
@@ -10289,7 +10733,7 @@
     </p:spTree>
     <p:extLst>
       <p:ext uri="{BB962C8B-B14F-4D97-AF65-F5344CB8AC3E}">
-        <p14:creationId xmlns:p14="http://schemas.microsoft.com/office/powerpoint/2010/main" val="275754347"/>
+        <p14:creationId xmlns:p14="http://schemas.microsoft.com/office/powerpoint/2010/main" val="3434551019"/>
       </p:ext>
     </p:extLst>
   </p:cSld>
@@ -10455,8 +10899,8 @@
         </p:nvSpPr>
         <p:spPr>
           <a:xfrm>
-            <a:off x="1218883" y="260648"/>
-            <a:ext cx="10360501" cy="1223963"/>
+            <a:off x="1197868" y="332656"/>
+            <a:ext cx="10360501" cy="4104456"/>
           </a:xfrm>
         </p:spPr>
         <p:txBody>
@@ -10465,79 +10909,74 @@
           </a:bodyPr>
           <a:lstStyle/>
           <a:p>
-            <a:pPr rtl="0"/>
-            <a:r>
+            <a:pPr algn="ctr" rtl="0"/>
+            <a:r>
+              <a:rPr lang="it-IT" sz="8800" b="1" dirty="0"/>
+              <a:t>Content Analysis</a:t>
+            </a:r>
+            <a:br>
               <a:rPr lang="it-IT" sz="5000" b="1" dirty="0"/>
-              <a:t>Natural Language Processing</a:t>
-            </a:r>
-          </a:p>
-        </p:txBody>
-      </p:sp>
-      <p:sp>
-        <p:nvSpPr>
-          <p:cNvPr id="14" name="Segnaposto contenuto 13"/>
-          <p:cNvSpPr>
-            <a:spLocks noGrp="1"/>
-          </p:cNvSpPr>
-          <p:nvPr>
-            <p:ph idx="1"/>
-          </p:nvPr>
-        </p:nvSpPr>
-        <p:spPr/>
-        <p:txBody>
-          <a:bodyPr rtlCol="0">
-            <a:normAutofit/>
-          </a:bodyPr>
-          <a:lstStyle/>
-          <a:p>
-            <a:pPr marL="145253" indent="0" algn="just">
-              <a:buNone/>
-            </a:pPr>
-            <a:endParaRPr lang="en-US" sz="3000" dirty="0"/>
-          </a:p>
-          <a:p>
-            <a:pPr marL="145253" indent="0" algn="just">
-              <a:buNone/>
-            </a:pPr>
-            <a:r>
-              <a:rPr lang="it-IT" sz="3000" dirty="0"/>
-              <a:t>Il Natural Language Processing (NLP) è una tecnologia che permette di processare e analizzare il linguaggio naturale umano. </a:t>
-            </a:r>
-          </a:p>
-          <a:p>
-            <a:pPr marL="145253" indent="0" algn="just">
-              <a:buNone/>
-            </a:pPr>
-            <a:endParaRPr lang="it-IT" sz="3000" dirty="0"/>
-          </a:p>
-          <a:p>
-            <a:pPr marL="145253" indent="0" algn="just">
-              <a:buNone/>
-            </a:pPr>
-            <a:r>
-              <a:rPr lang="it-IT" sz="3000" dirty="0"/>
-              <a:t>Spacy è una libreria Python utilizzata per l'elaborazione del linguaggio naturale, che fornisce delle funzioni utili per eseguire operazioni di NLP.</a:t>
-            </a:r>
-          </a:p>
-        </p:txBody>
-      </p:sp>
+            </a:br>
+            <a:br>
+              <a:rPr lang="it-IT" sz="5000" b="1" dirty="0"/>
+            </a:br>
+            <a:endParaRPr lang="it-IT" sz="5000" b="1" dirty="0"/>
+          </a:p>
+        </p:txBody>
+      </p:sp>
+      <p:pic>
+        <p:nvPicPr>
+          <p:cNvPr id="3" name="Immagine 2">
+            <a:extLst>
+              <a:ext uri="{FF2B5EF4-FFF2-40B4-BE49-F238E27FC236}">
+                <a16:creationId xmlns:a16="http://schemas.microsoft.com/office/drawing/2014/main" id="{3DC9603D-6FB6-3B82-9531-04B471F08271}"/>
+              </a:ext>
+            </a:extLst>
+          </p:cNvPr>
+          <p:cNvPicPr>
+            <a:picLocks noChangeAspect="1"/>
+          </p:cNvPicPr>
+          <p:nvPr/>
+        </p:nvPicPr>
+        <p:blipFill>
+          <a:blip r:embed="rId3">
+            <a:extLst>
+              <a:ext uri="{28A0092B-C50C-407E-A947-70E740481C1C}">
+                <a14:useLocalDpi xmlns:a14="http://schemas.microsoft.com/office/drawing/2010/main" val="0"/>
+              </a:ext>
+            </a:extLst>
+          </a:blip>
+          <a:stretch>
+            <a:fillRect/>
+          </a:stretch>
+        </p:blipFill>
+        <p:spPr>
+          <a:xfrm>
+            <a:off x="4789750" y="3449247"/>
+            <a:ext cx="2609324" cy="1759044"/>
+          </a:xfrm>
+          <a:prstGeom prst="rect">
+            <a:avLst/>
+          </a:prstGeom>
+        </p:spPr>
+      </p:pic>
     </p:spTree>
     <p:extLst>
       <p:ext uri="{BB962C8B-B14F-4D97-AF65-F5344CB8AC3E}">
-        <p14:creationId xmlns:p14="http://schemas.microsoft.com/office/powerpoint/2010/main" val="2883616358"/>
+        <p14:creationId xmlns:p14="http://schemas.microsoft.com/office/powerpoint/2010/main" val="1401168407"/>
       </p:ext>
     </p:extLst>
   </p:cSld>
   <p:clrMapOvr>
     <a:masterClrMapping/>
   </p:clrMapOvr>
-  <mc:AlternateContent xmlns:mc="http://schemas.openxmlformats.org/markup-compatibility/2006">
-    <mc:Choice xmlns:p14="http://schemas.microsoft.com/office/powerpoint/2010/main" Requires="p14">
+  <mc:AlternateContent xmlns:mc="http://schemas.openxmlformats.org/markup-compatibility/2006" xmlns:p14="http://schemas.microsoft.com/office/powerpoint/2010/main">
+    <mc:Choice Requires="p14">
       <p:transition spd="med" p14:dur="700">
         <p:fade/>
       </p:transition>
     </mc:Choice>
-    <mc:Fallback>
+    <mc:Fallback xmlns="">
       <p:transition spd="med">
         <p:fade/>
       </p:transition>
@@ -10588,7 +11027,7 @@
             <a:pPr rtl="0"/>
             <a:r>
               <a:rPr lang="it-IT" sz="5000" b="1" dirty="0"/>
-              <a:t>Spacy</a:t>
+              <a:t>Natural Language Processing</a:t>
             </a:r>
           </a:p>
         </p:txBody>
@@ -10621,7 +11060,7 @@
             </a:pPr>
             <a:r>
               <a:rPr lang="it-IT" sz="3000" dirty="0"/>
-              <a:t>Spacy consente di effettuare: </a:t>
+              <a:t>Il Natural Language Processing (NLP) è una tecnologia che permette di processare e analizzare il linguaggio naturale umano. </a:t>
             </a:r>
           </a:p>
           <a:p>
@@ -10631,24 +11070,12 @@
             <a:endParaRPr lang="it-IT" sz="3000" dirty="0"/>
           </a:p>
           <a:p>
-            <a:pPr marL="602453" indent="-457200" algn="just"/>
+            <a:pPr marL="145253" indent="0" algn="just">
+              <a:buNone/>
+            </a:pPr>
             <a:r>
               <a:rPr lang="it-IT" sz="3000" dirty="0"/>
-              <a:t>Analisi della sintassi</a:t>
-            </a:r>
-          </a:p>
-          <a:p>
-            <a:pPr marL="602453" indent="-457200" algn="just"/>
-            <a:r>
-              <a:rPr lang="it-IT" sz="3000" dirty="0"/>
-              <a:t>Estrazione di informazioni </a:t>
-            </a:r>
-          </a:p>
-          <a:p>
-            <a:pPr marL="602453" indent="-457200" algn="just"/>
-            <a:r>
-              <a:rPr lang="it-IT" sz="3000" dirty="0"/>
-              <a:t>Classificazione del testo</a:t>
+              <a:t>Spacy è una libreria Python utilizzata per l'elaborazione del linguaggio naturale, che fornisce delle funzioni utili per eseguire operazioni di NLP.</a:t>
             </a:r>
           </a:p>
         </p:txBody>
@@ -10656,20 +11083,20 @@
     </p:spTree>
     <p:extLst>
       <p:ext uri="{BB962C8B-B14F-4D97-AF65-F5344CB8AC3E}">
-        <p14:creationId xmlns:p14="http://schemas.microsoft.com/office/powerpoint/2010/main" val="4094612344"/>
+        <p14:creationId xmlns:p14="http://schemas.microsoft.com/office/powerpoint/2010/main" val="2883616358"/>
       </p:ext>
     </p:extLst>
   </p:cSld>
   <p:clrMapOvr>
     <a:masterClrMapping/>
   </p:clrMapOvr>
-  <mc:AlternateContent xmlns:mc="http://schemas.openxmlformats.org/markup-compatibility/2006">
-    <mc:Choice xmlns:p14="http://schemas.microsoft.com/office/powerpoint/2010/main" Requires="p14">
+  <mc:AlternateContent xmlns:mc="http://schemas.openxmlformats.org/markup-compatibility/2006" xmlns:p14="http://schemas.microsoft.com/office/powerpoint/2010/main">
+    <mc:Choice Requires="p14">
       <p:transition spd="med" p14:dur="700">
         <p:fade/>
       </p:transition>
     </mc:Choice>
-    <mc:Fallback>
+    <mc:Fallback xmlns="">
       <p:transition spd="med">
         <p:fade/>
       </p:transition>
@@ -10720,7 +11147,7 @@
             <a:pPr rtl="0"/>
             <a:r>
               <a:rPr lang="it-IT" sz="5000" b="1" dirty="0"/>
-              <a:t>Parole maggiormente utilizzate</a:t>
+              <a:t>Spacy</a:t>
             </a:r>
           </a:p>
         </p:txBody>
@@ -10737,7 +11164,7 @@
         </p:nvSpPr>
         <p:spPr/>
         <p:txBody>
-          <a:bodyPr numCol="2" rtlCol="0">
+          <a:bodyPr rtlCol="0">
             <a:normAutofit/>
           </a:bodyPr>
           <a:lstStyle/>
@@ -10748,117 +11175,39 @@
             <a:endParaRPr lang="en-US" sz="3000" dirty="0"/>
           </a:p>
           <a:p>
-            <a:pPr marL="659603" indent="-514350" algn="just">
-              <a:buFont typeface="+mj-lt"/>
-              <a:buAutoNum type="arabicPeriod"/>
+            <a:pPr marL="145253" indent="0" algn="just">
+              <a:buNone/>
             </a:pPr>
             <a:r>
               <a:rPr lang="it-IT" sz="3000" dirty="0"/>
-              <a:t>Vaccine</a:t>
-            </a:r>
-          </a:p>
-          <a:p>
-            <a:pPr marL="659603" indent="-514350" algn="just">
-              <a:buFont typeface="+mj-lt"/>
-              <a:buAutoNum type="arabicPeriod"/>
-            </a:pPr>
-            <a:r>
-              <a:rPr lang="it-IT" sz="3000" dirty="0"/>
-              <a:t>Moderna</a:t>
-            </a:r>
-          </a:p>
-          <a:p>
-            <a:pPr marL="659603" indent="-514350" algn="just">
-              <a:buFont typeface="+mj-lt"/>
-              <a:buAutoNum type="arabicPeriod"/>
-            </a:pPr>
-            <a:r>
-              <a:rPr lang="it-IT" sz="3000" dirty="0"/>
-              <a:t>Covaxin</a:t>
-            </a:r>
-          </a:p>
-          <a:p>
-            <a:pPr marL="659603" indent="-514350" algn="just">
-              <a:buFont typeface="+mj-lt"/>
-              <a:buAutoNum type="arabicPeriod"/>
-            </a:pPr>
-            <a:r>
-              <a:rPr lang="it-IT" sz="3000" dirty="0"/>
-              <a:t>COVID19</a:t>
-            </a:r>
-          </a:p>
-          <a:p>
-            <a:pPr marL="659603" indent="-514350" algn="just">
-              <a:buFont typeface="+mj-lt"/>
-              <a:buAutoNum type="arabicPeriod"/>
-            </a:pPr>
-            <a:r>
-              <a:rPr lang="it-IT" sz="3000" dirty="0"/>
-              <a:t>SputnikV</a:t>
-            </a:r>
-          </a:p>
-          <a:p>
-            <a:pPr marL="659603" indent="-514350" algn="just">
-              <a:buFont typeface="+mj-lt"/>
-              <a:buAutoNum type="arabicPeriod"/>
+              <a:t>Spacy consente di effettuare: </a:t>
+            </a:r>
+          </a:p>
+          <a:p>
+            <a:pPr marL="145253" indent="0" algn="just">
+              <a:buNone/>
             </a:pPr>
             <a:endParaRPr lang="it-IT" sz="3000" dirty="0"/>
           </a:p>
           <a:p>
-            <a:pPr marL="659603" indent="-514350" algn="just">
-              <a:buFont typeface="+mj-lt"/>
-              <a:buAutoNum type="arabicPeriod"/>
-            </a:pPr>
-            <a:endParaRPr lang="it-IT" sz="3000" dirty="0"/>
-          </a:p>
-          <a:p>
-            <a:pPr marL="659603" indent="-514350" algn="just">
-              <a:buFont typeface="+mj-lt"/>
-              <a:buAutoNum type="arabicPeriod"/>
-            </a:pPr>
+            <a:pPr marL="602453" indent="-457200" algn="just"/>
             <a:r>
               <a:rPr lang="it-IT" sz="3000" dirty="0"/>
-              <a:t>Pfizer</a:t>
-            </a:r>
-          </a:p>
-          <a:p>
-            <a:pPr marL="659603" indent="-514350" algn="just">
-              <a:buFont typeface="+mj-lt"/>
-              <a:buAutoNum type="arabicPeriod"/>
-            </a:pPr>
+              <a:t>Analisi della sintassi</a:t>
+            </a:r>
+          </a:p>
+          <a:p>
+            <a:pPr marL="602453" indent="-457200" algn="just"/>
             <a:r>
               <a:rPr lang="it-IT" sz="3000" dirty="0"/>
-              <a:t>Vaccines</a:t>
-            </a:r>
-          </a:p>
-          <a:p>
-            <a:pPr marL="659603" indent="-514350" algn="just">
-              <a:buFont typeface="+mj-lt"/>
-              <a:buAutoNum type="arabicPeriod"/>
-            </a:pPr>
+              <a:t>Estrazione di informazioni </a:t>
+            </a:r>
+          </a:p>
+          <a:p>
+            <a:pPr marL="602453" indent="-457200" algn="just"/>
             <a:r>
               <a:rPr lang="it-IT" sz="3000" dirty="0"/>
-              <a:t>First</a:t>
-            </a:r>
-          </a:p>
-          <a:p>
-            <a:pPr marL="659603" indent="-514350" algn="just">
-              <a:buFont typeface="+mj-lt"/>
-              <a:buAutoNum type="arabicPeriod"/>
-            </a:pPr>
-            <a:r>
-              <a:rPr lang="it-IT" sz="3000" dirty="0"/>
-              <a:t>Dose</a:t>
-            </a:r>
-          </a:p>
-          <a:p>
-            <a:pPr marL="659603" indent="-514350" algn="just">
-              <a:buFont typeface="+mj-lt"/>
-              <a:buAutoNum type="arabicPeriod"/>
-            </a:pPr>
-            <a:r>
-              <a:rPr lang="it-IT" sz="3000" dirty="0"/>
-              <a:t> PfizerBioNTech</a:t>
+              <a:t>Classificazione del testo</a:t>
             </a:r>
           </a:p>
         </p:txBody>
@@ -10866,20 +11215,20 @@
     </p:spTree>
     <p:extLst>
       <p:ext uri="{BB962C8B-B14F-4D97-AF65-F5344CB8AC3E}">
-        <p14:creationId xmlns:p14="http://schemas.microsoft.com/office/powerpoint/2010/main" val="1518665190"/>
+        <p14:creationId xmlns:p14="http://schemas.microsoft.com/office/powerpoint/2010/main" val="4094612344"/>
       </p:ext>
     </p:extLst>
   </p:cSld>
   <p:clrMapOvr>
     <a:masterClrMapping/>
   </p:clrMapOvr>
-  <mc:AlternateContent xmlns:mc="http://schemas.openxmlformats.org/markup-compatibility/2006">
-    <mc:Choice xmlns:p14="http://schemas.microsoft.com/office/powerpoint/2010/main" Requires="p14">
+  <mc:AlternateContent xmlns:mc="http://schemas.openxmlformats.org/markup-compatibility/2006" xmlns:p14="http://schemas.microsoft.com/office/powerpoint/2010/main">
+    <mc:Choice Requires="p14">
       <p:transition spd="med" p14:dur="700">
         <p:fade/>
       </p:transition>
     </mc:Choice>
-    <mc:Fallback>
+    <mc:Fallback xmlns="">
       <p:transition spd="med">
         <p:fade/>
       </p:transition>
@@ -10930,7 +11279,7 @@
             <a:pPr rtl="0"/>
             <a:r>
               <a:rPr lang="it-IT" sz="5000" b="1" dirty="0"/>
-              <a:t>Identificazione dei sostantivi</a:t>
+              <a:t>Parole maggiormente utilizzate</a:t>
             </a:r>
           </a:p>
         </p:txBody>
@@ -10947,7 +11296,7 @@
         </p:nvSpPr>
         <p:spPr/>
         <p:txBody>
-          <a:bodyPr rtlCol="0">
+          <a:bodyPr numCol="2" rtlCol="0">
             <a:normAutofit/>
           </a:bodyPr>
           <a:lstStyle/>
@@ -10958,12 +11307,117 @@
             <a:endParaRPr lang="en-US" sz="3000" dirty="0"/>
           </a:p>
           <a:p>
-            <a:pPr marL="145253" indent="0" algn="just">
-              <a:buNone/>
+            <a:pPr marL="659603" indent="-514350" algn="just">
+              <a:buFont typeface="+mj-lt"/>
+              <a:buAutoNum type="arabicPeriod"/>
             </a:pPr>
             <a:r>
               <a:rPr lang="it-IT" sz="3000" dirty="0"/>
-              <a:t>Spacy ci ha permesso di identificare i sostantivi presenti nei tweet a partire da un modello della lingua inglese. </a:t>
+              <a:t>Vaccine</a:t>
+            </a:r>
+          </a:p>
+          <a:p>
+            <a:pPr marL="659603" indent="-514350" algn="just">
+              <a:buFont typeface="+mj-lt"/>
+              <a:buAutoNum type="arabicPeriod"/>
+            </a:pPr>
+            <a:r>
+              <a:rPr lang="it-IT" sz="3000" dirty="0"/>
+              <a:t>Moderna</a:t>
+            </a:r>
+          </a:p>
+          <a:p>
+            <a:pPr marL="659603" indent="-514350" algn="just">
+              <a:buFont typeface="+mj-lt"/>
+              <a:buAutoNum type="arabicPeriod"/>
+            </a:pPr>
+            <a:r>
+              <a:rPr lang="it-IT" sz="3000" dirty="0"/>
+              <a:t>Covaxin</a:t>
+            </a:r>
+          </a:p>
+          <a:p>
+            <a:pPr marL="659603" indent="-514350" algn="just">
+              <a:buFont typeface="+mj-lt"/>
+              <a:buAutoNum type="arabicPeriod"/>
+            </a:pPr>
+            <a:r>
+              <a:rPr lang="it-IT" sz="3000" dirty="0"/>
+              <a:t>COVID19</a:t>
+            </a:r>
+          </a:p>
+          <a:p>
+            <a:pPr marL="659603" indent="-514350" algn="just">
+              <a:buFont typeface="+mj-lt"/>
+              <a:buAutoNum type="arabicPeriod"/>
+            </a:pPr>
+            <a:r>
+              <a:rPr lang="it-IT" sz="3000" dirty="0"/>
+              <a:t>SputnikV</a:t>
+            </a:r>
+          </a:p>
+          <a:p>
+            <a:pPr marL="659603" indent="-514350" algn="just">
+              <a:buFont typeface="+mj-lt"/>
+              <a:buAutoNum type="arabicPeriod"/>
+            </a:pPr>
+            <a:endParaRPr lang="it-IT" sz="3000" dirty="0"/>
+          </a:p>
+          <a:p>
+            <a:pPr marL="659603" indent="-514350" algn="just">
+              <a:buFont typeface="+mj-lt"/>
+              <a:buAutoNum type="arabicPeriod"/>
+            </a:pPr>
+            <a:endParaRPr lang="it-IT" sz="3000" dirty="0"/>
+          </a:p>
+          <a:p>
+            <a:pPr marL="659603" indent="-514350" algn="just">
+              <a:buFont typeface="+mj-lt"/>
+              <a:buAutoNum type="arabicPeriod"/>
+            </a:pPr>
+            <a:r>
+              <a:rPr lang="it-IT" sz="3000" dirty="0"/>
+              <a:t>Pfizer</a:t>
+            </a:r>
+          </a:p>
+          <a:p>
+            <a:pPr marL="659603" indent="-514350" algn="just">
+              <a:buFont typeface="+mj-lt"/>
+              <a:buAutoNum type="arabicPeriod"/>
+            </a:pPr>
+            <a:r>
+              <a:rPr lang="it-IT" sz="3000" dirty="0"/>
+              <a:t>Vaccines</a:t>
+            </a:r>
+          </a:p>
+          <a:p>
+            <a:pPr marL="659603" indent="-514350" algn="just">
+              <a:buFont typeface="+mj-lt"/>
+              <a:buAutoNum type="arabicPeriod"/>
+            </a:pPr>
+            <a:r>
+              <a:rPr lang="it-IT" sz="3000" dirty="0"/>
+              <a:t>First</a:t>
+            </a:r>
+          </a:p>
+          <a:p>
+            <a:pPr marL="659603" indent="-514350" algn="just">
+              <a:buFont typeface="+mj-lt"/>
+              <a:buAutoNum type="arabicPeriod"/>
+            </a:pPr>
+            <a:r>
+              <a:rPr lang="it-IT" sz="3000" dirty="0"/>
+              <a:t>Dose</a:t>
+            </a:r>
+          </a:p>
+          <a:p>
+            <a:pPr marL="659603" indent="-514350" algn="just">
+              <a:buFont typeface="+mj-lt"/>
+              <a:buAutoNum type="arabicPeriod"/>
+            </a:pPr>
+            <a:r>
+              <a:rPr lang="it-IT" sz="3000" dirty="0"/>
+              <a:t> PfizerBioNTech</a:t>
             </a:r>
           </a:p>
         </p:txBody>
@@ -10971,20 +11425,20 @@
     </p:spTree>
     <p:extLst>
       <p:ext uri="{BB962C8B-B14F-4D97-AF65-F5344CB8AC3E}">
-        <p14:creationId xmlns:p14="http://schemas.microsoft.com/office/powerpoint/2010/main" val="2911635079"/>
+        <p14:creationId xmlns:p14="http://schemas.microsoft.com/office/powerpoint/2010/main" val="1518665190"/>
       </p:ext>
     </p:extLst>
   </p:cSld>
   <p:clrMapOvr>
     <a:masterClrMapping/>
   </p:clrMapOvr>
-  <mc:AlternateContent xmlns:mc="http://schemas.openxmlformats.org/markup-compatibility/2006">
-    <mc:Choice xmlns:p14="http://schemas.microsoft.com/office/powerpoint/2010/main" Requires="p14">
+  <mc:AlternateContent xmlns:mc="http://schemas.openxmlformats.org/markup-compatibility/2006" xmlns:p14="http://schemas.microsoft.com/office/powerpoint/2010/main">
+    <mc:Choice Requires="p14">
       <p:transition spd="med" p14:dur="700">
         <p:fade/>
       </p:transition>
     </mc:Choice>
-    <mc:Fallback>
+    <mc:Fallback xmlns="">
       <p:transition spd="med">
         <p:fade/>
       </p:transition>
@@ -11012,7 +11466,7 @@
       </p:grpSpPr>
       <p:sp>
         <p:nvSpPr>
-          <p:cNvPr id="7" name="Titolo 6"/>
+          <p:cNvPr id="13" name="Titolo 12"/>
           <p:cNvSpPr>
             <a:spLocks noGrp="1"/>
           </p:cNvSpPr>
@@ -11020,48 +11474,661 @@
             <p:ph type="title"/>
           </p:nvPr>
         </p:nvSpPr>
-        <p:spPr/>
-        <p:txBody>
-          <a:bodyPr rtlCol="0"/>
+        <p:spPr>
+          <a:xfrm>
+            <a:off x="1218883" y="260648"/>
+            <a:ext cx="10360501" cy="1223963"/>
+          </a:xfrm>
+        </p:spPr>
+        <p:txBody>
+          <a:bodyPr rtlCol="0">
+            <a:normAutofit/>
+          </a:bodyPr>
           <a:lstStyle/>
           <a:p>
             <a:pPr rtl="0"/>
             <a:r>
-              <a:rPr lang="it-IT" dirty="0"/>
-              <a:t>Layout titolo e contenuto con grafico</a:t>
-            </a:r>
-          </a:p>
-        </p:txBody>
-      </p:sp>
-      <p:graphicFrame>
-        <p:nvGraphicFramePr>
-          <p:cNvPr id="9" name="Segnaposto contenuto 8" descr="Istogramma che mostra i valori di 3 serie per 4 categorie"/>
-          <p:cNvGraphicFramePr>
-            <a:graphicFrameLocks noGrp="1"/>
-          </p:cNvGraphicFramePr>
+              <a:rPr lang="it-IT" sz="5000" b="1" dirty="0"/>
+              <a:t>Identificazione delle frasi e sostantivi</a:t>
+            </a:r>
+          </a:p>
+        </p:txBody>
+      </p:sp>
+      <p:sp>
+        <p:nvSpPr>
+          <p:cNvPr id="14" name="Segnaposto contenuto 13"/>
+          <p:cNvSpPr>
+            <a:spLocks noGrp="1"/>
+          </p:cNvSpPr>
           <p:nvPr>
             <p:ph idx="1"/>
-            <p:extLst>
-              <p:ext uri="{D42A27DB-BD31-4B8C-83A1-F6EECF244321}">
-                <p14:modId xmlns:p14="http://schemas.microsoft.com/office/powerpoint/2010/main" val="2354287857"/>
-              </p:ext>
-            </p:extLst>
-          </p:nvPr>
-        </p:nvGraphicFramePr>
-        <p:xfrm>
-          <a:off x="1219200" y="1701800"/>
-          <a:ext cx="10360025" cy="4462463"/>
-        </p:xfrm>
-        <a:graphic>
-          <a:graphicData uri="http://schemas.openxmlformats.org/drawingml/2006/chart">
-            <c:chart xmlns:c="http://schemas.openxmlformats.org/drawingml/2006/chart" xmlns:r="http://schemas.openxmlformats.org/officeDocument/2006/relationships" r:id="rId3"/>
-          </a:graphicData>
-        </a:graphic>
-      </p:graphicFrame>
+          </p:nvPr>
+        </p:nvSpPr>
+        <p:spPr/>
+        <p:txBody>
+          <a:bodyPr rtlCol="0">
+            <a:normAutofit/>
+          </a:bodyPr>
+          <a:lstStyle/>
+          <a:p>
+            <a:pPr marL="145253" indent="0" algn="just">
+              <a:buNone/>
+            </a:pPr>
+            <a:endParaRPr lang="en-US" sz="3000" dirty="0"/>
+          </a:p>
+          <a:p>
+            <a:pPr marL="145253" indent="0" algn="just">
+              <a:buNone/>
+            </a:pPr>
+            <a:r>
+              <a:rPr lang="it-IT" sz="3000" dirty="0"/>
+              <a:t>Spacy ci ha permesso di identificare le frasi e i sostantivi presenti nei tweet a partire da un </a:t>
+            </a:r>
+            <a:r>
+              <a:rPr lang="it-IT" sz="3000" b="1" dirty="0"/>
+              <a:t>modello della lingua inglese</a:t>
+            </a:r>
+            <a:r>
+              <a:rPr lang="it-IT" sz="3000" dirty="0"/>
+              <a:t>.</a:t>
+            </a:r>
+          </a:p>
+          <a:p>
+            <a:pPr marL="145253" indent="0" algn="just">
+              <a:buNone/>
+            </a:pPr>
+            <a:endParaRPr lang="it-IT" sz="3000" dirty="0"/>
+          </a:p>
+          <a:p>
+            <a:pPr marL="145253" indent="0" algn="just">
+              <a:buNone/>
+            </a:pPr>
+            <a:r>
+              <a:rPr lang="it-IT" sz="3000" dirty="0"/>
+              <a:t>Per evitare di avere contare più volte un sostantivo presente in più frasi, li abbiamo salvati in una variabile di tipo </a:t>
+            </a:r>
+            <a:r>
+              <a:rPr lang="it-IT" sz="3000" b="1" dirty="0"/>
+              <a:t>set</a:t>
+            </a:r>
+            <a:r>
+              <a:rPr lang="it-IT" sz="3000" dirty="0"/>
+              <a:t>.</a:t>
+            </a:r>
+          </a:p>
+        </p:txBody>
+      </p:sp>
     </p:spTree>
     <p:extLst>
       <p:ext uri="{BB962C8B-B14F-4D97-AF65-F5344CB8AC3E}">
-        <p14:creationId xmlns:p14="http://schemas.microsoft.com/office/powerpoint/2010/main" val="1484811712"/>
+        <p14:creationId xmlns:p14="http://schemas.microsoft.com/office/powerpoint/2010/main" val="2911635079"/>
+      </p:ext>
+    </p:extLst>
+  </p:cSld>
+  <p:clrMapOvr>
+    <a:masterClrMapping/>
+  </p:clrMapOvr>
+  <mc:AlternateContent xmlns:mc="http://schemas.openxmlformats.org/markup-compatibility/2006" xmlns:p14="http://schemas.microsoft.com/office/powerpoint/2010/main">
+    <mc:Choice Requires="p14">
+      <p:transition spd="med" p14:dur="700">
+        <p:fade/>
+      </p:transition>
+    </mc:Choice>
+    <mc:Fallback xmlns="">
+      <p:transition spd="med">
+        <p:fade/>
+      </p:transition>
+    </mc:Fallback>
+  </mc:AlternateContent>
+</p:sld>
+</file>
+
+<file path=ppt/slides/slide25.xml><?xml version="1.0" encoding="utf-8"?>
+<p:sld xmlns:a="http://schemas.openxmlformats.org/drawingml/2006/main" xmlns:r="http://schemas.openxmlformats.org/officeDocument/2006/relationships" xmlns:p="http://schemas.openxmlformats.org/presentationml/2006/main">
+  <p:cSld>
+    <p:spTree>
+      <p:nvGrpSpPr>
+        <p:cNvPr id="1" name=""/>
+        <p:cNvGrpSpPr/>
+        <p:nvPr/>
+      </p:nvGrpSpPr>
+      <p:grpSpPr>
+        <a:xfrm>
+          <a:off x="0" y="0"/>
+          <a:ext cx="0" cy="0"/>
+          <a:chOff x="0" y="0"/>
+          <a:chExt cx="0" cy="0"/>
+        </a:xfrm>
+      </p:grpSpPr>
+      <p:sp>
+        <p:nvSpPr>
+          <p:cNvPr id="13" name="Titolo 12"/>
+          <p:cNvSpPr>
+            <a:spLocks noGrp="1"/>
+          </p:cNvSpPr>
+          <p:nvPr>
+            <p:ph type="title"/>
+          </p:nvPr>
+        </p:nvSpPr>
+        <p:spPr>
+          <a:xfrm>
+            <a:off x="1218883" y="260648"/>
+            <a:ext cx="10360501" cy="1223963"/>
+          </a:xfrm>
+        </p:spPr>
+        <p:txBody>
+          <a:bodyPr rtlCol="0">
+            <a:normAutofit/>
+          </a:bodyPr>
+          <a:lstStyle/>
+          <a:p>
+            <a:pPr rtl="0"/>
+            <a:r>
+              <a:rPr lang="it-IT" sz="5000" b="1" dirty="0"/>
+              <a:t>Risultati dell’identificazione</a:t>
+            </a:r>
+          </a:p>
+        </p:txBody>
+      </p:sp>
+      <p:sp>
+        <p:nvSpPr>
+          <p:cNvPr id="14" name="Segnaposto contenuto 13"/>
+          <p:cNvSpPr>
+            <a:spLocks noGrp="1"/>
+          </p:cNvSpPr>
+          <p:nvPr>
+            <p:ph idx="1"/>
+          </p:nvPr>
+        </p:nvSpPr>
+        <p:spPr/>
+        <p:txBody>
+          <a:bodyPr rtlCol="0">
+            <a:normAutofit/>
+          </a:bodyPr>
+          <a:lstStyle/>
+          <a:p>
+            <a:pPr marL="145253" indent="0" algn="just">
+              <a:buNone/>
+            </a:pPr>
+            <a:endParaRPr lang="en-US" sz="4000" dirty="0"/>
+          </a:p>
+          <a:p>
+            <a:pPr marL="602453" indent="-457200" algn="just"/>
+            <a:r>
+              <a:rPr lang="it-IT" sz="4000" dirty="0"/>
+              <a:t>Frasi: </a:t>
+            </a:r>
+            <a:r>
+              <a:rPr lang="it-IT" sz="4000" b="1" dirty="0"/>
+              <a:t>14618</a:t>
+            </a:r>
+          </a:p>
+          <a:p>
+            <a:pPr marL="602453" indent="-457200" algn="just"/>
+            <a:r>
+              <a:rPr lang="it-IT" sz="4000" dirty="0"/>
+              <a:t>Sostantivi</a:t>
+            </a:r>
+            <a:r>
+              <a:rPr lang="it-IT" sz="4000" b="1" dirty="0"/>
+              <a:t>: 9111 </a:t>
+            </a:r>
+          </a:p>
+          <a:p>
+            <a:pPr marL="602453" indent="-457200" algn="just"/>
+            <a:endParaRPr lang="it-IT" sz="3000" dirty="0"/>
+          </a:p>
+          <a:p>
+            <a:pPr marL="145253" indent="0" algn="just">
+              <a:buNone/>
+            </a:pPr>
+            <a:r>
+              <a:rPr lang="it-IT" sz="3000" dirty="0"/>
+              <a:t>Tutti i risultati sono stati salvati all’interno di un file di testo.</a:t>
+            </a:r>
+          </a:p>
+          <a:p>
+            <a:pPr marL="602453" indent="-457200" algn="just"/>
+            <a:endParaRPr lang="it-IT" sz="3000" dirty="0"/>
+          </a:p>
+          <a:p>
+            <a:pPr marL="602453" indent="-457200" algn="just"/>
+            <a:endParaRPr lang="it-IT" sz="3000" dirty="0"/>
+          </a:p>
+        </p:txBody>
+      </p:sp>
+    </p:spTree>
+    <p:extLst>
+      <p:ext uri="{BB962C8B-B14F-4D97-AF65-F5344CB8AC3E}">
+        <p14:creationId xmlns:p14="http://schemas.microsoft.com/office/powerpoint/2010/main" val="3537741645"/>
+      </p:ext>
+    </p:extLst>
+  </p:cSld>
+  <p:clrMapOvr>
+    <a:masterClrMapping/>
+  </p:clrMapOvr>
+  <mc:AlternateContent xmlns:mc="http://schemas.openxmlformats.org/markup-compatibility/2006" xmlns:p14="http://schemas.microsoft.com/office/powerpoint/2010/main">
+    <mc:Choice Requires="p14">
+      <p:transition spd="med" p14:dur="700">
+        <p:fade/>
+      </p:transition>
+    </mc:Choice>
+    <mc:Fallback xmlns="">
+      <p:transition spd="med">
+        <p:fade/>
+      </p:transition>
+    </mc:Fallback>
+  </mc:AlternateContent>
+</p:sld>
+</file>
+
+<file path=ppt/slides/slide26.xml><?xml version="1.0" encoding="utf-8"?>
+<p:sld xmlns:a="http://schemas.openxmlformats.org/drawingml/2006/main" xmlns:r="http://schemas.openxmlformats.org/officeDocument/2006/relationships" xmlns:p="http://schemas.openxmlformats.org/presentationml/2006/main">
+  <p:cSld>
+    <p:spTree>
+      <p:nvGrpSpPr>
+        <p:cNvPr id="1" name=""/>
+        <p:cNvGrpSpPr/>
+        <p:nvPr/>
+      </p:nvGrpSpPr>
+      <p:grpSpPr>
+        <a:xfrm>
+          <a:off x="0" y="0"/>
+          <a:ext cx="0" cy="0"/>
+          <a:chOff x="0" y="0"/>
+          <a:chExt cx="0" cy="0"/>
+        </a:xfrm>
+      </p:grpSpPr>
+      <p:sp>
+        <p:nvSpPr>
+          <p:cNvPr id="13" name="Titolo 12"/>
+          <p:cNvSpPr>
+            <a:spLocks noGrp="1"/>
+          </p:cNvSpPr>
+          <p:nvPr>
+            <p:ph type="title"/>
+          </p:nvPr>
+        </p:nvSpPr>
+        <p:spPr>
+          <a:xfrm>
+            <a:off x="1218883" y="260648"/>
+            <a:ext cx="10360501" cy="1223963"/>
+          </a:xfrm>
+        </p:spPr>
+        <p:txBody>
+          <a:bodyPr rtlCol="0">
+            <a:normAutofit/>
+          </a:bodyPr>
+          <a:lstStyle/>
+          <a:p>
+            <a:pPr rtl="0"/>
+            <a:r>
+              <a:rPr lang="it-IT" sz="5000" b="1" dirty="0"/>
+              <a:t>Conclusioni</a:t>
+            </a:r>
+          </a:p>
+        </p:txBody>
+      </p:sp>
+      <p:sp>
+        <p:nvSpPr>
+          <p:cNvPr id="14" name="Segnaposto contenuto 13"/>
+          <p:cNvSpPr>
+            <a:spLocks noGrp="1"/>
+          </p:cNvSpPr>
+          <p:nvPr>
+            <p:ph idx="1"/>
+          </p:nvPr>
+        </p:nvSpPr>
+        <p:spPr/>
+        <p:txBody>
+          <a:bodyPr rtlCol="0">
+            <a:normAutofit lnSpcReduction="10000"/>
+          </a:bodyPr>
+          <a:lstStyle/>
+          <a:p>
+            <a:pPr marL="145253" indent="0" algn="just">
+              <a:buNone/>
+            </a:pPr>
+            <a:endParaRPr lang="en-US" sz="4000" dirty="0"/>
+          </a:p>
+          <a:p>
+            <a:pPr marL="145253" indent="0" algn="just">
+              <a:buNone/>
+            </a:pPr>
+            <a:r>
+              <a:rPr lang="it-IT" sz="3000" dirty="0"/>
+              <a:t>Dai risultati ottenuti da questo caso di studio possiamo affermare che </a:t>
+            </a:r>
+            <a:r>
+              <a:rPr lang="it-IT" sz="3000" b="1" dirty="0"/>
+              <a:t>Content</a:t>
+            </a:r>
+            <a:r>
+              <a:rPr lang="it-IT" sz="3000" dirty="0"/>
+              <a:t> e </a:t>
+            </a:r>
+            <a:r>
+              <a:rPr lang="it-IT" sz="3000" b="1" dirty="0"/>
+              <a:t>Sentiment Analysis </a:t>
+            </a:r>
+            <a:r>
+              <a:rPr lang="it-IT" sz="3000" dirty="0"/>
+              <a:t>ci forniscono moltissime informazioni sul dataset analizzato.</a:t>
+            </a:r>
+          </a:p>
+          <a:p>
+            <a:pPr marL="145253" indent="0" algn="just">
+              <a:buNone/>
+            </a:pPr>
+            <a:endParaRPr lang="it-IT" sz="3000" dirty="0"/>
+          </a:p>
+          <a:p>
+            <a:pPr marL="145253" indent="0" algn="just">
+              <a:buNone/>
+            </a:pPr>
+            <a:r>
+              <a:rPr lang="it-IT" sz="3000" dirty="0"/>
+              <a:t>In particolare sotto due diversi aspetti:</a:t>
+            </a:r>
+          </a:p>
+          <a:p>
+            <a:pPr marL="602453" indent="-457200" algn="just"/>
+            <a:r>
+              <a:rPr lang="it-IT" sz="3000" b="1" dirty="0"/>
+              <a:t>Oggettivo</a:t>
+            </a:r>
+            <a:r>
+              <a:rPr lang="it-IT" sz="3000" dirty="0"/>
+              <a:t> (Content Analysis)</a:t>
+            </a:r>
+          </a:p>
+          <a:p>
+            <a:pPr marL="602453" indent="-457200" algn="just"/>
+            <a:r>
+              <a:rPr lang="it-IT" sz="3000" b="1" dirty="0"/>
+              <a:t>Soggettivo</a:t>
+            </a:r>
+            <a:r>
+              <a:rPr lang="it-IT" sz="3000" dirty="0"/>
+              <a:t> (Sentiment Analysis).</a:t>
+            </a:r>
+          </a:p>
+        </p:txBody>
+      </p:sp>
+    </p:spTree>
+    <p:extLst>
+      <p:ext uri="{BB962C8B-B14F-4D97-AF65-F5344CB8AC3E}">
+        <p14:creationId xmlns:p14="http://schemas.microsoft.com/office/powerpoint/2010/main" val="4227603974"/>
+      </p:ext>
+    </p:extLst>
+  </p:cSld>
+  <p:clrMapOvr>
+    <a:masterClrMapping/>
+  </p:clrMapOvr>
+  <mc:AlternateContent xmlns:mc="http://schemas.openxmlformats.org/markup-compatibility/2006" xmlns:p14="http://schemas.microsoft.com/office/powerpoint/2010/main">
+    <mc:Choice Requires="p14">
+      <p:transition spd="med" p14:dur="700">
+        <p:fade/>
+      </p:transition>
+    </mc:Choice>
+    <mc:Fallback xmlns="">
+      <p:transition spd="med">
+        <p:fade/>
+      </p:transition>
+    </mc:Fallback>
+  </mc:AlternateContent>
+</p:sld>
+</file>
+
+<file path=ppt/slides/slide27.xml><?xml version="1.0" encoding="utf-8"?>
+<p:sld xmlns:a="http://schemas.openxmlformats.org/drawingml/2006/main" xmlns:r="http://schemas.openxmlformats.org/officeDocument/2006/relationships" xmlns:p="http://schemas.openxmlformats.org/presentationml/2006/main">
+  <p:cSld>
+    <p:spTree>
+      <p:nvGrpSpPr>
+        <p:cNvPr id="1" name=""/>
+        <p:cNvGrpSpPr/>
+        <p:nvPr/>
+      </p:nvGrpSpPr>
+      <p:grpSpPr>
+        <a:xfrm>
+          <a:off x="0" y="0"/>
+          <a:ext cx="0" cy="0"/>
+          <a:chOff x="0" y="0"/>
+          <a:chExt cx="0" cy="0"/>
+        </a:xfrm>
+      </p:grpSpPr>
+      <p:sp>
+        <p:nvSpPr>
+          <p:cNvPr id="13" name="Titolo 12"/>
+          <p:cNvSpPr>
+            <a:spLocks noGrp="1"/>
+          </p:cNvSpPr>
+          <p:nvPr>
+            <p:ph type="title"/>
+          </p:nvPr>
+        </p:nvSpPr>
+        <p:spPr>
+          <a:xfrm>
+            <a:off x="1218883" y="260648"/>
+            <a:ext cx="10360501" cy="1223963"/>
+          </a:xfrm>
+        </p:spPr>
+        <p:txBody>
+          <a:bodyPr rtlCol="0">
+            <a:normAutofit/>
+          </a:bodyPr>
+          <a:lstStyle/>
+          <a:p>
+            <a:pPr rtl="0"/>
+            <a:r>
+              <a:rPr lang="it-IT" sz="5000" b="1" dirty="0"/>
+              <a:t>Conclusioni</a:t>
+            </a:r>
+          </a:p>
+        </p:txBody>
+      </p:sp>
+      <p:sp>
+        <p:nvSpPr>
+          <p:cNvPr id="14" name="Segnaposto contenuto 13"/>
+          <p:cNvSpPr>
+            <a:spLocks noGrp="1"/>
+          </p:cNvSpPr>
+          <p:nvPr>
+            <p:ph idx="1"/>
+          </p:nvPr>
+        </p:nvSpPr>
+        <p:spPr/>
+        <p:txBody>
+          <a:bodyPr rtlCol="0">
+            <a:normAutofit/>
+          </a:bodyPr>
+          <a:lstStyle/>
+          <a:p>
+            <a:pPr marL="145253" indent="0" algn="just">
+              <a:buNone/>
+            </a:pPr>
+            <a:endParaRPr lang="en-US" sz="4000" dirty="0"/>
+          </a:p>
+          <a:p>
+            <a:pPr marL="145253" indent="0" algn="just">
+              <a:buNone/>
+            </a:pPr>
+            <a:r>
+              <a:rPr lang="it-IT" sz="3000" b="1" dirty="0"/>
+              <a:t>Sentiment Analysis:</a:t>
+            </a:r>
+            <a:r>
+              <a:rPr lang="it-IT" sz="3000" dirty="0"/>
+              <a:t> Ci ha permesso di capire quali sono le opinioni ed il sentimento delle persone riguardo i vaccini per il Covid-19.</a:t>
+            </a:r>
+          </a:p>
+          <a:p>
+            <a:pPr marL="145253" indent="0" algn="just">
+              <a:buNone/>
+            </a:pPr>
+            <a:endParaRPr lang="it-IT" sz="3000" dirty="0"/>
+          </a:p>
+          <a:p>
+            <a:pPr marL="145253" indent="0" algn="just">
+              <a:buNone/>
+            </a:pPr>
+            <a:r>
+              <a:rPr lang="it-IT" sz="3000" b="1" dirty="0"/>
+              <a:t>Content Analysis:</a:t>
+            </a:r>
+            <a:r>
+              <a:rPr lang="it-IT" sz="3000" dirty="0"/>
+              <a:t> Permette di capire l’argomento principale del dataset analizzato senza conoscerlo a priori.</a:t>
+            </a:r>
+          </a:p>
+          <a:p>
+            <a:pPr marL="602453" indent="-457200" algn="just"/>
+            <a:endParaRPr lang="it-IT" sz="3000" dirty="0"/>
+          </a:p>
+        </p:txBody>
+      </p:sp>
+    </p:spTree>
+    <p:extLst>
+      <p:ext uri="{BB962C8B-B14F-4D97-AF65-F5344CB8AC3E}">
+        <p14:creationId xmlns:p14="http://schemas.microsoft.com/office/powerpoint/2010/main" val="923815433"/>
+      </p:ext>
+    </p:extLst>
+  </p:cSld>
+  <p:clrMapOvr>
+    <a:masterClrMapping/>
+  </p:clrMapOvr>
+  <mc:AlternateContent xmlns:mc="http://schemas.openxmlformats.org/markup-compatibility/2006">
+    <mc:Choice xmlns:p14="http://schemas.microsoft.com/office/powerpoint/2010/main" Requires="p14">
+      <p:transition spd="med" p14:dur="700">
+        <p:fade/>
+      </p:transition>
+    </mc:Choice>
+    <mc:Fallback>
+      <p:transition spd="med">
+        <p:fade/>
+      </p:transition>
+    </mc:Fallback>
+  </mc:AlternateContent>
+</p:sld>
+</file>
+
+<file path=ppt/slides/slide28.xml><?xml version="1.0" encoding="utf-8"?>
+<p:sld xmlns:a="http://schemas.openxmlformats.org/drawingml/2006/main" xmlns:r="http://schemas.openxmlformats.org/officeDocument/2006/relationships" xmlns:p="http://schemas.openxmlformats.org/presentationml/2006/main">
+  <p:cSld>
+    <p:spTree>
+      <p:nvGrpSpPr>
+        <p:cNvPr id="1" name=""/>
+        <p:cNvGrpSpPr/>
+        <p:nvPr/>
+      </p:nvGrpSpPr>
+      <p:grpSpPr>
+        <a:xfrm>
+          <a:off x="0" y="0"/>
+          <a:ext cx="0" cy="0"/>
+          <a:chOff x="0" y="0"/>
+          <a:chExt cx="0" cy="0"/>
+        </a:xfrm>
+      </p:grpSpPr>
+      <p:sp>
+        <p:nvSpPr>
+          <p:cNvPr id="2" name="Titolo 1"/>
+          <p:cNvSpPr>
+            <a:spLocks noGrp="1"/>
+          </p:cNvSpPr>
+          <p:nvPr>
+            <p:ph type="ctrTitle"/>
+          </p:nvPr>
+        </p:nvSpPr>
+        <p:spPr>
+          <a:xfrm>
+            <a:off x="1726748" y="2204864"/>
+            <a:ext cx="8735325" cy="1064147"/>
+          </a:xfrm>
+        </p:spPr>
+        <p:txBody>
+          <a:bodyPr rtlCol="0">
+            <a:normAutofit/>
+          </a:bodyPr>
+          <a:lstStyle/>
+          <a:p>
+            <a:pPr algn="ctr" rtl="0"/>
+            <a:r>
+              <a:rPr lang="it-IT" sz="6600" dirty="0"/>
+              <a:t>Grazie per l’attenzione!</a:t>
+            </a:r>
+          </a:p>
+        </p:txBody>
+      </p:sp>
+      <p:sp>
+        <p:nvSpPr>
+          <p:cNvPr id="5" name="Sottotitolo 4"/>
+          <p:cNvSpPr>
+            <a:spLocks noGrp="1"/>
+          </p:cNvSpPr>
+          <p:nvPr>
+            <p:ph type="subTitle" idx="1"/>
+          </p:nvPr>
+        </p:nvSpPr>
+        <p:spPr>
+          <a:xfrm>
+            <a:off x="1726748" y="3356992"/>
+            <a:ext cx="8735325" cy="1008112"/>
+          </a:xfrm>
+        </p:spPr>
+        <p:txBody>
+          <a:bodyPr rtlCol="0">
+            <a:normAutofit fontScale="77500" lnSpcReduction="20000"/>
+          </a:bodyPr>
+          <a:lstStyle/>
+          <a:p>
+            <a:pPr algn="ctr" rtl="0"/>
+            <a:r>
+              <a:rPr lang="it-IT" sz="4000" dirty="0"/>
+              <a:t>Sentiment e content analysis dei tweet riguardati i vaccini per il covid-19</a:t>
+            </a:r>
+          </a:p>
+        </p:txBody>
+      </p:sp>
+      <p:pic>
+        <p:nvPicPr>
+          <p:cNvPr id="3" name="Immagine 2" descr="Immagine che contiene testo, clipart&#10;&#10;Descrizione generata automaticamente">
+            <a:extLst>
+              <a:ext uri="{FF2B5EF4-FFF2-40B4-BE49-F238E27FC236}">
+                <a16:creationId xmlns:a16="http://schemas.microsoft.com/office/drawing/2014/main" id="{6A39C3A7-A3CB-1B93-8C9B-F6CC201107D9}"/>
+              </a:ext>
+            </a:extLst>
+          </p:cNvPr>
+          <p:cNvPicPr>
+            <a:picLocks noChangeAspect="1"/>
+          </p:cNvPicPr>
+          <p:nvPr/>
+        </p:nvPicPr>
+        <p:blipFill>
+          <a:blip r:embed="rId3" cstate="print">
+            <a:extLst>
+              <a:ext uri="{28A0092B-C50C-407E-A947-70E740481C1C}">
+                <a14:useLocalDpi xmlns:a14="http://schemas.microsoft.com/office/drawing/2010/main" val="0"/>
+              </a:ext>
+            </a:extLst>
+          </a:blip>
+          <a:stretch>
+            <a:fillRect/>
+          </a:stretch>
+        </p:blipFill>
+        <p:spPr>
+          <a:xfrm>
+            <a:off x="11062964" y="116632"/>
+            <a:ext cx="980728" cy="980728"/>
+          </a:xfrm>
+          <a:prstGeom prst="rect">
+            <a:avLst/>
+          </a:prstGeom>
+        </p:spPr>
+      </p:pic>
+    </p:spTree>
+    <p:extLst>
+      <p:ext uri="{BB962C8B-B14F-4D97-AF65-F5344CB8AC3E}">
+        <p14:creationId xmlns:p14="http://schemas.microsoft.com/office/powerpoint/2010/main" val="3654026268"/>
       </p:ext>
     </p:extLst>
   </p:cSld>

</xml_diff>

<commit_message>
Implementazione ed organizzazzione delle nuove funzuonalità richieste
</commit_message>
<xml_diff>
--- a/Presentazione/Presentazione Progetto.pptx
+++ b/Presentazione/Presentazione Progetto.pptx
@@ -5,10 +5,10 @@
     <p:sldMasterId id="2147483660" r:id="rId4"/>
   </p:sldMasterIdLst>
   <p:notesMasterIdLst>
-    <p:notesMasterId r:id="rId33"/>
+    <p:notesMasterId r:id="rId32"/>
   </p:notesMasterIdLst>
   <p:handoutMasterIdLst>
-    <p:handoutMasterId r:id="rId34"/>
+    <p:handoutMasterId r:id="rId33"/>
   </p:handoutMasterIdLst>
   <p:sldIdLst>
     <p:sldId id="272" r:id="rId5"/>
@@ -29,16 +29,15 @@
     <p:sldId id="285" r:id="rId20"/>
     <p:sldId id="286" r:id="rId21"/>
     <p:sldId id="287" r:id="rId22"/>
-    <p:sldId id="288" r:id="rId23"/>
-    <p:sldId id="297" r:id="rId24"/>
-    <p:sldId id="291" r:id="rId25"/>
-    <p:sldId id="292" r:id="rId26"/>
-    <p:sldId id="293" r:id="rId27"/>
-    <p:sldId id="294" r:id="rId28"/>
-    <p:sldId id="295" r:id="rId29"/>
-    <p:sldId id="298" r:id="rId30"/>
-    <p:sldId id="299" r:id="rId31"/>
-    <p:sldId id="300" r:id="rId32"/>
+    <p:sldId id="297" r:id="rId23"/>
+    <p:sldId id="291" r:id="rId24"/>
+    <p:sldId id="292" r:id="rId25"/>
+    <p:sldId id="293" r:id="rId26"/>
+    <p:sldId id="294" r:id="rId27"/>
+    <p:sldId id="295" r:id="rId28"/>
+    <p:sldId id="298" r:id="rId29"/>
+    <p:sldId id="299" r:id="rId30"/>
+    <p:sldId id="300" r:id="rId31"/>
   </p:sldIdLst>
   <p:sldSz cx="12188825" cy="6858000"/>
   <p:notesSz cx="6858000" cy="9144000"/>
@@ -168,6 +167,35 @@
     </p:ext>
   </p:extLst>
 </p:presentation>
+</file>
+
+<file path=ppt/changesInfos/changesInfo1.xml><?xml version="1.0" encoding="utf-8"?>
+<pc:chgInfo xmlns:a="http://schemas.openxmlformats.org/drawingml/2006/main" xmlns:r="http://schemas.openxmlformats.org/officeDocument/2006/relationships" xmlns:ac="http://schemas.microsoft.com/office/drawing/2013/main/command" xmlns:pc="http://schemas.microsoft.com/office/powerpoint/2013/main/command">
+  <pc:docChgLst>
+    <pc:chgData name="Daniele Campopiano" userId="134d6b9f1efdce74" providerId="LiveId" clId="{9290B50E-0F91-46B0-8D0F-1A12A4D09882}"/>
+    <pc:docChg chg="modSld">
+      <pc:chgData name="Daniele Campopiano" userId="134d6b9f1efdce74" providerId="LiveId" clId="{9290B50E-0F91-46B0-8D0F-1A12A4D09882}" dt="2023-03-29T10:17:55.508" v="0" actId="20577"/>
+      <pc:docMkLst>
+        <pc:docMk/>
+      </pc:docMkLst>
+      <pc:sldChg chg="modSp mod">
+        <pc:chgData name="Daniele Campopiano" userId="134d6b9f1efdce74" providerId="LiveId" clId="{9290B50E-0F91-46B0-8D0F-1A12A4D09882}" dt="2023-03-29T10:17:55.508" v="0" actId="20577"/>
+        <pc:sldMkLst>
+          <pc:docMk/>
+          <pc:sldMk cId="3589808300" sldId="281"/>
+        </pc:sldMkLst>
+        <pc:spChg chg="mod">
+          <ac:chgData name="Daniele Campopiano" userId="134d6b9f1efdce74" providerId="LiveId" clId="{9290B50E-0F91-46B0-8D0F-1A12A4D09882}" dt="2023-03-29T10:17:55.508" v="0" actId="20577"/>
+          <ac:spMkLst>
+            <pc:docMk/>
+            <pc:sldMk cId="3589808300" sldId="281"/>
+            <ac:spMk id="14" creationId="{00000000-0000-0000-0000-000000000000}"/>
+          </ac:spMkLst>
+        </pc:spChg>
+      </pc:sldChg>
+    </pc:docChg>
+  </pc:docChgLst>
+</pc:chgInfo>
 </file>
 
 <file path=ppt/charts/chart1.xml><?xml version="1.0" encoding="utf-8"?>
@@ -1228,7 +1256,7 @@
             <a:pPr algn="r" rtl="0"/>
             <a:fld id="{221A1788-7372-4FAC-9AF0-00B54B8D9CBA}" type="datetime1">
               <a:rPr lang="it-IT" smtClean="0"/>
-              <a:t>25/03/2023</a:t>
+              <a:t>03/04/2023</a:t>
             </a:fld>
             <a:endParaRPr lang="it-IT" dirty="0"/>
           </a:p>
@@ -1398,7 +1426,7 @@
             <a:fld id="{D943A304-85CD-4257-B418-D8F889FE0DBC}" type="datetime1">
               <a:rPr lang="it-IT" smtClean="0"/>
               <a:pPr/>
-              <a:t>25/03/2023</a:t>
+              <a:t>03/04/2023</a:t>
             </a:fld>
             <a:endParaRPr lang="it-IT" dirty="0"/>
           </a:p>
@@ -2693,10 +2721,7 @@
           <a:bodyPr/>
           <a:lstStyle/>
           <a:p>
-            <a:r>
-              <a:rPr lang="it-IT" dirty="0"/>
-              <a:t>Nel nostro caso positivo, negativo o neutro</a:t>
-            </a:r>
+            <a:endParaRPr lang="it-IT" dirty="0"/>
           </a:p>
         </p:txBody>
       </p:sp>
@@ -2727,7 +2752,7 @@
     </p:spTree>
     <p:extLst>
       <p:ext uri="{BB962C8B-B14F-4D97-AF65-F5344CB8AC3E}">
-        <p14:creationId xmlns:p14="http://schemas.microsoft.com/office/powerpoint/2010/main" val="1626038331"/>
+        <p14:creationId xmlns:p14="http://schemas.microsoft.com/office/powerpoint/2010/main" val="3620667321"/>
       </p:ext>
     </p:extLst>
   </p:cSld>
@@ -2866,7 +2891,10 @@
           <a:bodyPr/>
           <a:lstStyle/>
           <a:p>
-            <a:endParaRPr lang="it-IT" dirty="0"/>
+            <a:r>
+              <a:rPr lang="it-IT" dirty="0"/>
+              <a:t>La libreria che abbiamo utilizzato per fare Content è stata Spacy.</a:t>
+            </a:r>
           </a:p>
         </p:txBody>
       </p:sp>
@@ -2897,7 +2925,7 @@
     </p:spTree>
     <p:extLst>
       <p:ext uri="{BB962C8B-B14F-4D97-AF65-F5344CB8AC3E}">
-        <p14:creationId xmlns:p14="http://schemas.microsoft.com/office/powerpoint/2010/main" val="3620667321"/>
+        <p14:creationId xmlns:p14="http://schemas.microsoft.com/office/powerpoint/2010/main" val="3794186773"/>
       </p:ext>
     </p:extLst>
   </p:cSld>
@@ -2985,7 +3013,7 @@
     </p:spTree>
     <p:extLst>
       <p:ext uri="{BB962C8B-B14F-4D97-AF65-F5344CB8AC3E}">
-        <p14:creationId xmlns:p14="http://schemas.microsoft.com/office/powerpoint/2010/main" val="3794186773"/>
+        <p14:creationId xmlns:p14="http://schemas.microsoft.com/office/powerpoint/2010/main" val="1272099144"/>
       </p:ext>
     </p:extLst>
   </p:cSld>
@@ -3041,7 +3069,16 @@
           <a:p>
             <a:r>
               <a:rPr lang="it-IT" dirty="0"/>
-              <a:t>La libreria che abbiamo utilizzato per fare Content è stata Spacy.</a:t>
+              <a:t>Nel nostro caso di studio</a:t>
+            </a:r>
+          </a:p>
+          <a:p>
+            <a:endParaRPr lang="it-IT" dirty="0"/>
+          </a:p>
+          <a:p>
+            <a:r>
+              <a:rPr lang="it-IT" dirty="0"/>
+              <a:t>Noi lo sappiamo a priori ma, analizzando un dataset qualsisi possiamo facilmente capire qual è l’argomento trattato</a:t>
             </a:r>
           </a:p>
         </p:txBody>
@@ -3073,7 +3110,7 @@
     </p:spTree>
     <p:extLst>
       <p:ext uri="{BB962C8B-B14F-4D97-AF65-F5344CB8AC3E}">
-        <p14:creationId xmlns:p14="http://schemas.microsoft.com/office/powerpoint/2010/main" val="1272099144"/>
+        <p14:creationId xmlns:p14="http://schemas.microsoft.com/office/powerpoint/2010/main" val="319390075"/>
       </p:ext>
     </p:extLst>
   </p:cSld>
@@ -3129,16 +3166,7 @@
           <a:p>
             <a:r>
               <a:rPr lang="it-IT" dirty="0"/>
-              <a:t>Nel nostro caso di studio</a:t>
-            </a:r>
-          </a:p>
-          <a:p>
-            <a:endParaRPr lang="it-IT" dirty="0"/>
-          </a:p>
-          <a:p>
-            <a:r>
-              <a:rPr lang="it-IT" dirty="0"/>
-              <a:t>Noi lo sappiamo a priori ma, analizzando un dataset qualsisi possiamo facilmente capire qual è l’argomento trattato</a:t>
+              <a:t>La libreria che abbiamo utilizzato per fare Content è stata Spacy.</a:t>
             </a:r>
           </a:p>
         </p:txBody>
@@ -3170,7 +3198,7 @@
     </p:spTree>
     <p:extLst>
       <p:ext uri="{BB962C8B-B14F-4D97-AF65-F5344CB8AC3E}">
-        <p14:creationId xmlns:p14="http://schemas.microsoft.com/office/powerpoint/2010/main" val="319390075"/>
+        <p14:creationId xmlns:p14="http://schemas.microsoft.com/office/powerpoint/2010/main" val="3581221903"/>
       </p:ext>
     </p:extLst>
   </p:cSld>
@@ -3258,7 +3286,7 @@
     </p:spTree>
     <p:extLst>
       <p:ext uri="{BB962C8B-B14F-4D97-AF65-F5344CB8AC3E}">
-        <p14:creationId xmlns:p14="http://schemas.microsoft.com/office/powerpoint/2010/main" val="3581221903"/>
+        <p14:creationId xmlns:p14="http://schemas.microsoft.com/office/powerpoint/2010/main" val="4141571329"/>
       </p:ext>
     </p:extLst>
   </p:cSld>
@@ -3346,7 +3374,7 @@
     </p:spTree>
     <p:extLst>
       <p:ext uri="{BB962C8B-B14F-4D97-AF65-F5344CB8AC3E}">
-        <p14:creationId xmlns:p14="http://schemas.microsoft.com/office/powerpoint/2010/main" val="4141571329"/>
+        <p14:creationId xmlns:p14="http://schemas.microsoft.com/office/powerpoint/2010/main" val="2929649750"/>
       </p:ext>
     </p:extLst>
   </p:cSld>
@@ -3434,7 +3462,7 @@
     </p:spTree>
     <p:extLst>
       <p:ext uri="{BB962C8B-B14F-4D97-AF65-F5344CB8AC3E}">
-        <p14:creationId xmlns:p14="http://schemas.microsoft.com/office/powerpoint/2010/main" val="2929649750"/>
+        <p14:creationId xmlns:p14="http://schemas.microsoft.com/office/powerpoint/2010/main" val="2906118524"/>
       </p:ext>
     </p:extLst>
   </p:cSld>
@@ -3488,10 +3516,7 @@
           <a:bodyPr/>
           <a:lstStyle/>
           <a:p>
-            <a:r>
-              <a:rPr lang="it-IT" dirty="0"/>
-              <a:t>La libreria che abbiamo utilizzato per fare Content è stata Spacy.</a:t>
-            </a:r>
+            <a:endParaRPr lang="it-IT" dirty="0"/>
           </a:p>
         </p:txBody>
       </p:sp>
@@ -3514,91 +3539,6 @@
               <a:rPr lang="it-IT" smtClean="0"/>
               <a:pPr/>
               <a:t>27</a:t>
-            </a:fld>
-            <a:endParaRPr lang="it-IT" dirty="0"/>
-          </a:p>
-        </p:txBody>
-      </p:sp>
-    </p:spTree>
-    <p:extLst>
-      <p:ext uri="{BB962C8B-B14F-4D97-AF65-F5344CB8AC3E}">
-        <p14:creationId xmlns:p14="http://schemas.microsoft.com/office/powerpoint/2010/main" val="2906118524"/>
-      </p:ext>
-    </p:extLst>
-  </p:cSld>
-  <p:clrMapOvr>
-    <a:masterClrMapping/>
-  </p:clrMapOvr>
-</p:notes>
-</file>
-
-<file path=ppt/notesSlides/notesSlide28.xml><?xml version="1.0" encoding="utf-8"?>
-<p:notes xmlns:a="http://schemas.openxmlformats.org/drawingml/2006/main" xmlns:r="http://schemas.openxmlformats.org/officeDocument/2006/relationships" xmlns:p="http://schemas.openxmlformats.org/presentationml/2006/main">
-  <p:cSld>
-    <p:spTree>
-      <p:nvGrpSpPr>
-        <p:cNvPr id="1" name=""/>
-        <p:cNvGrpSpPr/>
-        <p:nvPr/>
-      </p:nvGrpSpPr>
-      <p:grpSpPr>
-        <a:xfrm>
-          <a:off x="0" y="0"/>
-          <a:ext cx="0" cy="0"/>
-          <a:chOff x="0" y="0"/>
-          <a:chExt cx="0" cy="0"/>
-        </a:xfrm>
-      </p:grpSpPr>
-      <p:sp>
-        <p:nvSpPr>
-          <p:cNvPr id="2" name="Segnaposto immagine diapositiva 1"/>
-          <p:cNvSpPr>
-            <a:spLocks noGrp="1" noRot="1" noChangeAspect="1"/>
-          </p:cNvSpPr>
-          <p:nvPr>
-            <p:ph type="sldImg"/>
-          </p:nvPr>
-        </p:nvSpPr>
-        <p:spPr/>
-      </p:sp>
-      <p:sp>
-        <p:nvSpPr>
-          <p:cNvPr id="3" name="Segnaposto note 2"/>
-          <p:cNvSpPr>
-            <a:spLocks noGrp="1"/>
-          </p:cNvSpPr>
-          <p:nvPr>
-            <p:ph type="body" idx="1"/>
-          </p:nvPr>
-        </p:nvSpPr>
-        <p:spPr/>
-        <p:txBody>
-          <a:bodyPr/>
-          <a:lstStyle/>
-          <a:p>
-            <a:endParaRPr lang="it-IT" dirty="0"/>
-          </a:p>
-        </p:txBody>
-      </p:sp>
-      <p:sp>
-        <p:nvSpPr>
-          <p:cNvPr id="4" name="Segnaposto numero diapositiva 3"/>
-          <p:cNvSpPr>
-            <a:spLocks noGrp="1"/>
-          </p:cNvSpPr>
-          <p:nvPr>
-            <p:ph type="sldNum" sz="quarter" idx="10"/>
-          </p:nvPr>
-        </p:nvSpPr>
-        <p:spPr/>
-        <p:txBody>
-          <a:bodyPr/>
-          <a:lstStyle/>
-          <a:p>
-            <a:fld id="{3EBA5BD7-F043-4D1B-AA17-CD412FC534DE}" type="slidenum">
-              <a:rPr lang="it-IT" smtClean="0"/>
-              <a:pPr/>
-              <a:t>28</a:t>
             </a:fld>
             <a:endParaRPr lang="it-IT" dirty="0"/>
           </a:p>
@@ -5032,7 +4972,7 @@
             <a:fld id="{3889EF9B-A500-41B6-8F1C-893813E9A898}" type="datetime1">
               <a:rPr lang="it-IT" smtClean="0"/>
               <a:pPr/>
-              <a:t>25/03/2023</a:t>
+              <a:t>03/04/2023</a:t>
             </a:fld>
             <a:endParaRPr lang="it-IT" dirty="0"/>
           </a:p>
@@ -5238,7 +5178,7 @@
             <a:fld id="{6E724BBD-5BEA-4971-A6C4-42E94AF7CB5F}" type="datetime1">
               <a:rPr lang="it-IT" smtClean="0"/>
               <a:pPr/>
-              <a:t>25/03/2023</a:t>
+              <a:t>03/04/2023</a:t>
             </a:fld>
             <a:endParaRPr lang="it-IT" dirty="0"/>
           </a:p>
@@ -5454,7 +5394,7 @@
             <a:fld id="{EF1B2188-7D8C-43C8-B29F-60D01DE77B72}" type="datetime1">
               <a:rPr lang="it-IT" smtClean="0"/>
               <a:pPr/>
-              <a:t>25/03/2023</a:t>
+              <a:t>03/04/2023</a:t>
             </a:fld>
             <a:endParaRPr lang="it-IT" dirty="0"/>
           </a:p>
@@ -5660,7 +5600,7 @@
             <a:fld id="{581DC961-63CE-49AB-921E-1CE3DDEFC80A}" type="datetime1">
               <a:rPr lang="it-IT" smtClean="0"/>
               <a:pPr/>
-              <a:t>25/03/2023</a:t>
+              <a:t>03/04/2023</a:t>
             </a:fld>
             <a:endParaRPr lang="it-IT" dirty="0"/>
           </a:p>
@@ -6104,7 +6044,7 @@
             <a:fld id="{C6066F5F-3C86-4285-A86F-35EFBBDD7800}" type="datetime1">
               <a:rPr lang="it-IT" smtClean="0"/>
               <a:pPr/>
-              <a:t>25/03/2023</a:t>
+              <a:t>03/04/2023</a:t>
             </a:fld>
             <a:endParaRPr lang="it-IT" dirty="0"/>
           </a:p>
@@ -6416,7 +6356,7 @@
             <a:fld id="{0B9BE34E-14EC-4041-A597-EE22FC16794F}" type="datetime1">
               <a:rPr lang="it-IT" smtClean="0"/>
               <a:pPr/>
-              <a:t>25/03/2023</a:t>
+              <a:t>03/04/2023</a:t>
             </a:fld>
             <a:endParaRPr lang="it-IT" dirty="0"/>
           </a:p>
@@ -6880,7 +6820,7 @@
             <a:fld id="{D6FAD192-1BF7-4994-9CBA-74265F19F4C1}" type="datetime1">
               <a:rPr lang="it-IT" smtClean="0"/>
               <a:pPr/>
-              <a:t>25/03/2023</a:t>
+              <a:t>03/04/2023</a:t>
             </a:fld>
             <a:endParaRPr lang="it-IT" dirty="0"/>
           </a:p>
@@ -7018,7 +6958,7 @@
             <a:fld id="{C476DD40-7EBA-46D0-A855-62759524AC7A}" type="datetime1">
               <a:rPr lang="it-IT" smtClean="0"/>
               <a:pPr/>
-              <a:t>25/03/2023</a:t>
+              <a:t>03/04/2023</a:t>
             </a:fld>
             <a:endParaRPr lang="it-IT" dirty="0"/>
           </a:p>
@@ -7132,7 +7072,7 @@
             <a:fld id="{C62E4D95-88E1-4556-89BE-EC650C1D14A8}" type="datetime1">
               <a:rPr lang="it-IT" smtClean="0"/>
               <a:pPr/>
-              <a:t>25/03/2023</a:t>
+              <a:t>03/04/2023</a:t>
             </a:fld>
             <a:endParaRPr lang="it-IT" dirty="0"/>
           </a:p>
@@ -7439,7 +7379,7 @@
             <a:fld id="{1F9867D3-FC26-40B1-8BB9-B19FF8D6CD45}" type="datetime1">
               <a:rPr lang="it-IT" smtClean="0"/>
               <a:pPr/>
-              <a:t>25/03/2023</a:t>
+              <a:t>03/04/2023</a:t>
             </a:fld>
             <a:endParaRPr lang="it-IT" dirty="0"/>
           </a:p>
@@ -7736,7 +7676,7 @@
             <a:fld id="{5B0EE21F-92EE-4289-AFFB-9252D957F459}" type="datetime1">
               <a:rPr lang="it-IT" smtClean="0"/>
               <a:pPr/>
-              <a:t>25/03/2023</a:t>
+              <a:t>03/04/2023</a:t>
             </a:fld>
             <a:endParaRPr lang="it-IT" dirty="0"/>
           </a:p>
@@ -8360,7 +8300,7 @@
             <a:fld id="{8A756645-DD8C-4009-9A84-A4AD56EB55A9}" type="datetime1">
               <a:rPr lang="it-IT" smtClean="0"/>
               <a:pPr/>
-              <a:t>25/03/2023</a:t>
+              <a:t>03/04/2023</a:t>
             </a:fld>
             <a:endParaRPr lang="it-IT" dirty="0"/>
           </a:p>
@@ -9448,7 +9388,7 @@
             </a:r>
             <a:r>
               <a:rPr lang="it-IT" sz="3000" dirty="0"/>
-              <a:t>: Numero interno compreso tra 1 e 3</a:t>
+              <a:t>: Numero intero compreso tra 1 e 3</a:t>
             </a:r>
           </a:p>
           <a:p>
@@ -10622,255 +10562,6 @@
 </file>
 
 <file path=ppt/slides/slide19.xml><?xml version="1.0" encoding="utf-8"?>
-<p:sld xmlns:a="http://schemas.openxmlformats.org/drawingml/2006/main" xmlns:r="http://schemas.openxmlformats.org/officeDocument/2006/relationships" xmlns:p="http://schemas.openxmlformats.org/presentationml/2006/main" show="0">
-  <p:cSld>
-    <p:spTree>
-      <p:nvGrpSpPr>
-        <p:cNvPr id="1" name=""/>
-        <p:cNvGrpSpPr/>
-        <p:nvPr/>
-      </p:nvGrpSpPr>
-      <p:grpSpPr>
-        <a:xfrm>
-          <a:off x="0" y="0"/>
-          <a:ext cx="0" cy="0"/>
-          <a:chOff x="0" y="0"/>
-          <a:chExt cx="0" cy="0"/>
-        </a:xfrm>
-      </p:grpSpPr>
-      <p:sp>
-        <p:nvSpPr>
-          <p:cNvPr id="13" name="Titolo 12"/>
-          <p:cNvSpPr>
-            <a:spLocks noGrp="1"/>
-          </p:cNvSpPr>
-          <p:nvPr>
-            <p:ph type="title"/>
-          </p:nvPr>
-        </p:nvSpPr>
-        <p:spPr>
-          <a:xfrm>
-            <a:off x="1218883" y="260648"/>
-            <a:ext cx="10360501" cy="1223963"/>
-          </a:xfrm>
-        </p:spPr>
-        <p:txBody>
-          <a:bodyPr rtlCol="0">
-            <a:normAutofit/>
-          </a:bodyPr>
-          <a:lstStyle/>
-          <a:p>
-            <a:pPr rtl="0"/>
-            <a:r>
-              <a:rPr lang="it-IT" sz="5000" b="1" dirty="0"/>
-              <a:t>Sentiment di frasi scelte dall’utente </a:t>
-            </a:r>
-          </a:p>
-        </p:txBody>
-      </p:sp>
-      <p:sp>
-        <p:nvSpPr>
-          <p:cNvPr id="14" name="Segnaposto contenuto 13"/>
-          <p:cNvSpPr>
-            <a:spLocks noGrp="1"/>
-          </p:cNvSpPr>
-          <p:nvPr>
-            <p:ph idx="1"/>
-          </p:nvPr>
-        </p:nvSpPr>
-        <p:spPr/>
-        <p:txBody>
-          <a:bodyPr rtlCol="0">
-            <a:normAutofit/>
-          </a:bodyPr>
-          <a:lstStyle/>
-          <a:p>
-            <a:pPr marL="145253" indent="0" algn="just">
-              <a:buNone/>
-            </a:pPr>
-            <a:endParaRPr lang="en-US" sz="3000" dirty="0"/>
-          </a:p>
-          <a:p>
-            <a:pPr marL="145253" indent="0" algn="just">
-              <a:buNone/>
-            </a:pPr>
-            <a:r>
-              <a:rPr lang="it-IT" sz="3000" dirty="0"/>
-              <a:t>Il programma realizzato utilizza il modello di </a:t>
-            </a:r>
-            <a:r>
-              <a:rPr lang="it-IT" sz="3000" b="1" dirty="0"/>
-              <a:t>regressione logistica</a:t>
-            </a:r>
-            <a:r>
-              <a:rPr lang="it-IT" sz="3000" dirty="0"/>
-              <a:t> per addestrare un classificatore di sentimenti sui tweet.</a:t>
-            </a:r>
-          </a:p>
-          <a:p>
-            <a:pPr marL="145253" indent="0" algn="just">
-              <a:buNone/>
-            </a:pPr>
-            <a:endParaRPr lang="it-IT" sz="3000" dirty="0"/>
-          </a:p>
-          <a:p>
-            <a:pPr marL="145253" indent="0" algn="just">
-              <a:buNone/>
-            </a:pPr>
-            <a:r>
-              <a:rPr lang="it-IT" sz="3000" dirty="0"/>
-              <a:t>La Regressione Logistica è un algoritmo di Machine Learning che viene utilizzato per risolvere problemi di classificazione. Questo algoritmo assegna ad ogni istanza del dataset un valore per etichettarlo. </a:t>
-            </a:r>
-          </a:p>
-          <a:p>
-            <a:pPr marL="145253" indent="0" algn="just">
-              <a:buNone/>
-            </a:pPr>
-            <a:endParaRPr lang="it-IT" sz="3000" dirty="0"/>
-          </a:p>
-        </p:txBody>
-      </p:sp>
-    </p:spTree>
-    <p:extLst>
-      <p:ext uri="{BB962C8B-B14F-4D97-AF65-F5344CB8AC3E}">
-        <p14:creationId xmlns:p14="http://schemas.microsoft.com/office/powerpoint/2010/main" val="3434551019"/>
-      </p:ext>
-    </p:extLst>
-  </p:cSld>
-  <p:clrMapOvr>
-    <a:masterClrMapping/>
-  </p:clrMapOvr>
-  <mc:AlternateContent xmlns:mc="http://schemas.openxmlformats.org/markup-compatibility/2006" xmlns:p14="http://schemas.microsoft.com/office/powerpoint/2010/main">
-    <mc:Choice Requires="p14">
-      <p:transition spd="med" p14:dur="700">
-        <p:fade/>
-      </p:transition>
-    </mc:Choice>
-    <mc:Fallback xmlns="">
-      <p:transition spd="med">
-        <p:fade/>
-      </p:transition>
-    </mc:Fallback>
-  </mc:AlternateContent>
-</p:sld>
-</file>
-
-<file path=ppt/slides/slide2.xml><?xml version="1.0" encoding="utf-8"?>
-<p:sld xmlns:a="http://schemas.openxmlformats.org/drawingml/2006/main" xmlns:r="http://schemas.openxmlformats.org/officeDocument/2006/relationships" xmlns:p="http://schemas.openxmlformats.org/presentationml/2006/main">
-  <p:cSld>
-    <p:spTree>
-      <p:nvGrpSpPr>
-        <p:cNvPr id="1" name=""/>
-        <p:cNvGrpSpPr/>
-        <p:nvPr/>
-      </p:nvGrpSpPr>
-      <p:grpSpPr>
-        <a:xfrm>
-          <a:off x="0" y="0"/>
-          <a:ext cx="0" cy="0"/>
-          <a:chOff x="0" y="0"/>
-          <a:chExt cx="0" cy="0"/>
-        </a:xfrm>
-      </p:grpSpPr>
-      <p:sp>
-        <p:nvSpPr>
-          <p:cNvPr id="13" name="Titolo 12"/>
-          <p:cNvSpPr>
-            <a:spLocks noGrp="1"/>
-          </p:cNvSpPr>
-          <p:nvPr>
-            <p:ph type="title"/>
-          </p:nvPr>
-        </p:nvSpPr>
-        <p:spPr/>
-        <p:txBody>
-          <a:bodyPr rtlCol="0">
-            <a:normAutofit/>
-          </a:bodyPr>
-          <a:lstStyle/>
-          <a:p>
-            <a:pPr rtl="0"/>
-            <a:r>
-              <a:rPr lang="it-IT" sz="5000" b="1" dirty="0"/>
-              <a:t>Semantic Intelligence</a:t>
-            </a:r>
-          </a:p>
-        </p:txBody>
-      </p:sp>
-      <p:sp>
-        <p:nvSpPr>
-          <p:cNvPr id="14" name="Segnaposto contenuto 13"/>
-          <p:cNvSpPr>
-            <a:spLocks noGrp="1"/>
-          </p:cNvSpPr>
-          <p:nvPr>
-            <p:ph idx="1"/>
-          </p:nvPr>
-        </p:nvSpPr>
-        <p:spPr/>
-        <p:txBody>
-          <a:bodyPr rtlCol="0">
-            <a:normAutofit/>
-          </a:bodyPr>
-          <a:lstStyle/>
-          <a:p>
-            <a:pPr marL="0" indent="0" algn="just" rtl="0">
-              <a:buNone/>
-            </a:pPr>
-            <a:endParaRPr lang="it-IT" sz="3000" dirty="0"/>
-          </a:p>
-          <a:p>
-            <a:pPr marL="0" indent="0" algn="just" rtl="0">
-              <a:buNone/>
-            </a:pPr>
-            <a:r>
-              <a:rPr lang="it-IT" sz="3000" dirty="0"/>
-              <a:t>Campo dell'intelligenza artificiale che si concentra sulla comprensione del significato del linguaggio naturale utilizzando una serie di tecniche e metodologie.</a:t>
-            </a:r>
-          </a:p>
-          <a:p>
-            <a:pPr marL="0" indent="0" algn="just" rtl="0">
-              <a:buNone/>
-            </a:pPr>
-            <a:endParaRPr lang="it-IT" sz="3000" dirty="0"/>
-          </a:p>
-          <a:p>
-            <a:pPr marL="0" indent="0" algn="just" rtl="0">
-              <a:buNone/>
-            </a:pPr>
-            <a:r>
-              <a:rPr lang="it-IT" sz="3000" dirty="0"/>
-              <a:t>Ciò include la capacità di analizzare il contenuto semantico di un testo, comprenderne il contesto e fornire risposte intelligenti e significative.</a:t>
-            </a:r>
-          </a:p>
-        </p:txBody>
-      </p:sp>
-    </p:spTree>
-    <p:extLst>
-      <p:ext uri="{BB962C8B-B14F-4D97-AF65-F5344CB8AC3E}">
-        <p14:creationId xmlns:p14="http://schemas.microsoft.com/office/powerpoint/2010/main" val="3529114326"/>
-      </p:ext>
-    </p:extLst>
-  </p:cSld>
-  <p:clrMapOvr>
-    <a:masterClrMapping/>
-  </p:clrMapOvr>
-  <mc:AlternateContent xmlns:mc="http://schemas.openxmlformats.org/markup-compatibility/2006" xmlns:p14="http://schemas.microsoft.com/office/powerpoint/2010/main">
-    <mc:Choice Requires="p14">
-      <p:transition spd="med" p14:dur="700">
-        <p:fade/>
-      </p:transition>
-    </mc:Choice>
-    <mc:Fallback xmlns="">
-      <p:transition spd="med">
-        <p:fade/>
-      </p:transition>
-    </mc:Fallback>
-  </mc:AlternateContent>
-</p:sld>
-</file>
-
-<file path=ppt/slides/slide20.xml><?xml version="1.0" encoding="utf-8"?>
 <p:sld xmlns:a="http://schemas.openxmlformats.org/drawingml/2006/main" xmlns:r="http://schemas.openxmlformats.org/officeDocument/2006/relationships" xmlns:p="http://schemas.openxmlformats.org/presentationml/2006/main">
   <p:cSld>
     <p:spTree>
@@ -10985,6 +10676,241 @@
 </p:sld>
 </file>
 
+<file path=ppt/slides/slide2.xml><?xml version="1.0" encoding="utf-8"?>
+<p:sld xmlns:a="http://schemas.openxmlformats.org/drawingml/2006/main" xmlns:r="http://schemas.openxmlformats.org/officeDocument/2006/relationships" xmlns:p="http://schemas.openxmlformats.org/presentationml/2006/main">
+  <p:cSld>
+    <p:spTree>
+      <p:nvGrpSpPr>
+        <p:cNvPr id="1" name=""/>
+        <p:cNvGrpSpPr/>
+        <p:nvPr/>
+      </p:nvGrpSpPr>
+      <p:grpSpPr>
+        <a:xfrm>
+          <a:off x="0" y="0"/>
+          <a:ext cx="0" cy="0"/>
+          <a:chOff x="0" y="0"/>
+          <a:chExt cx="0" cy="0"/>
+        </a:xfrm>
+      </p:grpSpPr>
+      <p:sp>
+        <p:nvSpPr>
+          <p:cNvPr id="13" name="Titolo 12"/>
+          <p:cNvSpPr>
+            <a:spLocks noGrp="1"/>
+          </p:cNvSpPr>
+          <p:nvPr>
+            <p:ph type="title"/>
+          </p:nvPr>
+        </p:nvSpPr>
+        <p:spPr/>
+        <p:txBody>
+          <a:bodyPr rtlCol="0">
+            <a:normAutofit/>
+          </a:bodyPr>
+          <a:lstStyle/>
+          <a:p>
+            <a:pPr rtl="0"/>
+            <a:r>
+              <a:rPr lang="it-IT" sz="5000" b="1" dirty="0"/>
+              <a:t>Semantic Intelligence</a:t>
+            </a:r>
+          </a:p>
+        </p:txBody>
+      </p:sp>
+      <p:sp>
+        <p:nvSpPr>
+          <p:cNvPr id="14" name="Segnaposto contenuto 13"/>
+          <p:cNvSpPr>
+            <a:spLocks noGrp="1"/>
+          </p:cNvSpPr>
+          <p:nvPr>
+            <p:ph idx="1"/>
+          </p:nvPr>
+        </p:nvSpPr>
+        <p:spPr/>
+        <p:txBody>
+          <a:bodyPr rtlCol="0">
+            <a:normAutofit/>
+          </a:bodyPr>
+          <a:lstStyle/>
+          <a:p>
+            <a:pPr marL="0" indent="0" algn="just" rtl="0">
+              <a:buNone/>
+            </a:pPr>
+            <a:endParaRPr lang="it-IT" sz="3000" dirty="0"/>
+          </a:p>
+          <a:p>
+            <a:pPr marL="0" indent="0" algn="just" rtl="0">
+              <a:buNone/>
+            </a:pPr>
+            <a:r>
+              <a:rPr lang="it-IT" sz="3000" dirty="0"/>
+              <a:t>Campo dell'intelligenza artificiale che si concentra sulla comprensione del significato del linguaggio naturale utilizzando una serie di tecniche e metodologie.</a:t>
+            </a:r>
+          </a:p>
+          <a:p>
+            <a:pPr marL="0" indent="0" algn="just" rtl="0">
+              <a:buNone/>
+            </a:pPr>
+            <a:endParaRPr lang="it-IT" sz="3000" dirty="0"/>
+          </a:p>
+          <a:p>
+            <a:pPr marL="0" indent="0" algn="just" rtl="0">
+              <a:buNone/>
+            </a:pPr>
+            <a:r>
+              <a:rPr lang="it-IT" sz="3000" dirty="0"/>
+              <a:t>Ciò include la capacità di analizzare il contenuto semantico di un testo, comprenderne il contesto e fornire risposte intelligenti e significative.</a:t>
+            </a:r>
+          </a:p>
+        </p:txBody>
+      </p:sp>
+    </p:spTree>
+    <p:extLst>
+      <p:ext uri="{BB962C8B-B14F-4D97-AF65-F5344CB8AC3E}">
+        <p14:creationId xmlns:p14="http://schemas.microsoft.com/office/powerpoint/2010/main" val="3529114326"/>
+      </p:ext>
+    </p:extLst>
+  </p:cSld>
+  <p:clrMapOvr>
+    <a:masterClrMapping/>
+  </p:clrMapOvr>
+  <mc:AlternateContent xmlns:mc="http://schemas.openxmlformats.org/markup-compatibility/2006" xmlns:p14="http://schemas.microsoft.com/office/powerpoint/2010/main">
+    <mc:Choice Requires="p14">
+      <p:transition spd="med" p14:dur="700">
+        <p:fade/>
+      </p:transition>
+    </mc:Choice>
+    <mc:Fallback xmlns="">
+      <p:transition spd="med">
+        <p:fade/>
+      </p:transition>
+    </mc:Fallback>
+  </mc:AlternateContent>
+</p:sld>
+</file>
+
+<file path=ppt/slides/slide20.xml><?xml version="1.0" encoding="utf-8"?>
+<p:sld xmlns:a="http://schemas.openxmlformats.org/drawingml/2006/main" xmlns:r="http://schemas.openxmlformats.org/officeDocument/2006/relationships" xmlns:p="http://schemas.openxmlformats.org/presentationml/2006/main">
+  <p:cSld>
+    <p:spTree>
+      <p:nvGrpSpPr>
+        <p:cNvPr id="1" name=""/>
+        <p:cNvGrpSpPr/>
+        <p:nvPr/>
+      </p:nvGrpSpPr>
+      <p:grpSpPr>
+        <a:xfrm>
+          <a:off x="0" y="0"/>
+          <a:ext cx="0" cy="0"/>
+          <a:chOff x="0" y="0"/>
+          <a:chExt cx="0" cy="0"/>
+        </a:xfrm>
+      </p:grpSpPr>
+      <p:sp>
+        <p:nvSpPr>
+          <p:cNvPr id="13" name="Titolo 12"/>
+          <p:cNvSpPr>
+            <a:spLocks noGrp="1"/>
+          </p:cNvSpPr>
+          <p:nvPr>
+            <p:ph type="title"/>
+          </p:nvPr>
+        </p:nvSpPr>
+        <p:spPr>
+          <a:xfrm>
+            <a:off x="1218883" y="260648"/>
+            <a:ext cx="10360501" cy="1223963"/>
+          </a:xfrm>
+        </p:spPr>
+        <p:txBody>
+          <a:bodyPr rtlCol="0">
+            <a:normAutofit/>
+          </a:bodyPr>
+          <a:lstStyle/>
+          <a:p>
+            <a:pPr rtl="0"/>
+            <a:r>
+              <a:rPr lang="it-IT" sz="5000" b="1" dirty="0"/>
+              <a:t>Natural Language Processing</a:t>
+            </a:r>
+          </a:p>
+        </p:txBody>
+      </p:sp>
+      <p:sp>
+        <p:nvSpPr>
+          <p:cNvPr id="14" name="Segnaposto contenuto 13"/>
+          <p:cNvSpPr>
+            <a:spLocks noGrp="1"/>
+          </p:cNvSpPr>
+          <p:nvPr>
+            <p:ph idx="1"/>
+          </p:nvPr>
+        </p:nvSpPr>
+        <p:spPr/>
+        <p:txBody>
+          <a:bodyPr rtlCol="0">
+            <a:normAutofit/>
+          </a:bodyPr>
+          <a:lstStyle/>
+          <a:p>
+            <a:pPr marL="145253" indent="0" algn="just">
+              <a:buNone/>
+            </a:pPr>
+            <a:endParaRPr lang="en-US" sz="3000" dirty="0"/>
+          </a:p>
+          <a:p>
+            <a:pPr marL="145253" indent="0" algn="just">
+              <a:buNone/>
+            </a:pPr>
+            <a:r>
+              <a:rPr lang="it-IT" sz="3000" dirty="0"/>
+              <a:t>Il Natural Language Processing (NLP) è una tecnologia che permette di processare e analizzare il linguaggio naturale umano. </a:t>
+            </a:r>
+          </a:p>
+          <a:p>
+            <a:pPr marL="145253" indent="0" algn="just">
+              <a:buNone/>
+            </a:pPr>
+            <a:endParaRPr lang="it-IT" sz="3000" dirty="0"/>
+          </a:p>
+          <a:p>
+            <a:pPr marL="145253" indent="0" algn="just">
+              <a:buNone/>
+            </a:pPr>
+            <a:r>
+              <a:rPr lang="it-IT" sz="3000" dirty="0"/>
+              <a:t>Spacy è una libreria Python utilizzata per l'elaborazione del linguaggio naturale, che fornisce delle funzioni utili per eseguire operazioni di NLP.</a:t>
+            </a:r>
+          </a:p>
+        </p:txBody>
+      </p:sp>
+    </p:spTree>
+    <p:extLst>
+      <p:ext uri="{BB962C8B-B14F-4D97-AF65-F5344CB8AC3E}">
+        <p14:creationId xmlns:p14="http://schemas.microsoft.com/office/powerpoint/2010/main" val="2883616358"/>
+      </p:ext>
+    </p:extLst>
+  </p:cSld>
+  <p:clrMapOvr>
+    <a:masterClrMapping/>
+  </p:clrMapOvr>
+  <mc:AlternateContent xmlns:mc="http://schemas.openxmlformats.org/markup-compatibility/2006" xmlns:p14="http://schemas.microsoft.com/office/powerpoint/2010/main">
+    <mc:Choice Requires="p14">
+      <p:transition spd="med" p14:dur="700">
+        <p:fade/>
+      </p:transition>
+    </mc:Choice>
+    <mc:Fallback xmlns="">
+      <p:transition spd="med">
+        <p:fade/>
+      </p:transition>
+    </mc:Fallback>
+  </mc:AlternateContent>
+</p:sld>
+</file>
+
 <file path=ppt/slides/slide21.xml><?xml version="1.0" encoding="utf-8"?>
 <p:sld xmlns:a="http://schemas.openxmlformats.org/drawingml/2006/main" xmlns:r="http://schemas.openxmlformats.org/officeDocument/2006/relationships" xmlns:p="http://schemas.openxmlformats.org/presentationml/2006/main">
   <p:cSld>
@@ -11027,7 +10953,7 @@
             <a:pPr rtl="0"/>
             <a:r>
               <a:rPr lang="it-IT" sz="5000" b="1" dirty="0"/>
-              <a:t>Natural Language Processing</a:t>
+              <a:t>Spacy</a:t>
             </a:r>
           </a:p>
         </p:txBody>
@@ -11060,7 +10986,7 @@
             </a:pPr>
             <a:r>
               <a:rPr lang="it-IT" sz="3000" dirty="0"/>
-              <a:t>Il Natural Language Processing (NLP) è una tecnologia che permette di processare e analizzare il linguaggio naturale umano. </a:t>
+              <a:t>Spacy consente di effettuare: </a:t>
             </a:r>
           </a:p>
           <a:p>
@@ -11070,12 +10996,24 @@
             <a:endParaRPr lang="it-IT" sz="3000" dirty="0"/>
           </a:p>
           <a:p>
-            <a:pPr marL="145253" indent="0" algn="just">
-              <a:buNone/>
-            </a:pPr>
+            <a:pPr marL="602453" indent="-457200" algn="just"/>
             <a:r>
               <a:rPr lang="it-IT" sz="3000" dirty="0"/>
-              <a:t>Spacy è una libreria Python utilizzata per l'elaborazione del linguaggio naturale, che fornisce delle funzioni utili per eseguire operazioni di NLP.</a:t>
+              <a:t>Analisi della sintassi</a:t>
+            </a:r>
+          </a:p>
+          <a:p>
+            <a:pPr marL="602453" indent="-457200" algn="just"/>
+            <a:r>
+              <a:rPr lang="it-IT" sz="3000" dirty="0"/>
+              <a:t>Estrazione di informazioni </a:t>
+            </a:r>
+          </a:p>
+          <a:p>
+            <a:pPr marL="602453" indent="-457200" algn="just"/>
+            <a:r>
+              <a:rPr lang="it-IT" sz="3000" dirty="0"/>
+              <a:t>Classificazione del testo</a:t>
             </a:r>
           </a:p>
         </p:txBody>
@@ -11083,7 +11021,7 @@
     </p:spTree>
     <p:extLst>
       <p:ext uri="{BB962C8B-B14F-4D97-AF65-F5344CB8AC3E}">
-        <p14:creationId xmlns:p14="http://schemas.microsoft.com/office/powerpoint/2010/main" val="2883616358"/>
+        <p14:creationId xmlns:p14="http://schemas.microsoft.com/office/powerpoint/2010/main" val="4094612344"/>
       </p:ext>
     </p:extLst>
   </p:cSld>
@@ -11147,7 +11085,7 @@
             <a:pPr rtl="0"/>
             <a:r>
               <a:rPr lang="it-IT" sz="5000" b="1" dirty="0"/>
-              <a:t>Spacy</a:t>
+              <a:t>Parole maggiormente utilizzate</a:t>
             </a:r>
           </a:p>
         </p:txBody>
@@ -11164,7 +11102,7 @@
         </p:nvSpPr>
         <p:spPr/>
         <p:txBody>
-          <a:bodyPr rtlCol="0">
+          <a:bodyPr numCol="2" rtlCol="0">
             <a:normAutofit/>
           </a:bodyPr>
           <a:lstStyle/>
@@ -11175,39 +11113,117 @@
             <a:endParaRPr lang="en-US" sz="3000" dirty="0"/>
           </a:p>
           <a:p>
-            <a:pPr marL="145253" indent="0" algn="just">
-              <a:buNone/>
+            <a:pPr marL="659603" indent="-514350" algn="just">
+              <a:buFont typeface="+mj-lt"/>
+              <a:buAutoNum type="arabicPeriod"/>
             </a:pPr>
             <a:r>
               <a:rPr lang="it-IT" sz="3000" dirty="0"/>
-              <a:t>Spacy consente di effettuare: </a:t>
-            </a:r>
-          </a:p>
-          <a:p>
-            <a:pPr marL="145253" indent="0" algn="just">
-              <a:buNone/>
+              <a:t>Vaccine</a:t>
+            </a:r>
+          </a:p>
+          <a:p>
+            <a:pPr marL="659603" indent="-514350" algn="just">
+              <a:buFont typeface="+mj-lt"/>
+              <a:buAutoNum type="arabicPeriod"/>
+            </a:pPr>
+            <a:r>
+              <a:rPr lang="it-IT" sz="3000" dirty="0"/>
+              <a:t>Moderna</a:t>
+            </a:r>
+          </a:p>
+          <a:p>
+            <a:pPr marL="659603" indent="-514350" algn="just">
+              <a:buFont typeface="+mj-lt"/>
+              <a:buAutoNum type="arabicPeriod"/>
+            </a:pPr>
+            <a:r>
+              <a:rPr lang="it-IT" sz="3000" dirty="0"/>
+              <a:t>Covaxin</a:t>
+            </a:r>
+          </a:p>
+          <a:p>
+            <a:pPr marL="659603" indent="-514350" algn="just">
+              <a:buFont typeface="+mj-lt"/>
+              <a:buAutoNum type="arabicPeriod"/>
+            </a:pPr>
+            <a:r>
+              <a:rPr lang="it-IT" sz="3000" dirty="0"/>
+              <a:t>COVID19</a:t>
+            </a:r>
+          </a:p>
+          <a:p>
+            <a:pPr marL="659603" indent="-514350" algn="just">
+              <a:buFont typeface="+mj-lt"/>
+              <a:buAutoNum type="arabicPeriod"/>
+            </a:pPr>
+            <a:r>
+              <a:rPr lang="it-IT" sz="3000" dirty="0"/>
+              <a:t>SputnikV</a:t>
+            </a:r>
+          </a:p>
+          <a:p>
+            <a:pPr marL="659603" indent="-514350" algn="just">
+              <a:buFont typeface="+mj-lt"/>
+              <a:buAutoNum type="arabicPeriod"/>
             </a:pPr>
             <a:endParaRPr lang="it-IT" sz="3000" dirty="0"/>
           </a:p>
           <a:p>
-            <a:pPr marL="602453" indent="-457200" algn="just"/>
+            <a:pPr marL="659603" indent="-514350" algn="just">
+              <a:buFont typeface="+mj-lt"/>
+              <a:buAutoNum type="arabicPeriod"/>
+            </a:pPr>
+            <a:endParaRPr lang="it-IT" sz="3000" dirty="0"/>
+          </a:p>
+          <a:p>
+            <a:pPr marL="659603" indent="-514350" algn="just">
+              <a:buFont typeface="+mj-lt"/>
+              <a:buAutoNum type="arabicPeriod"/>
+            </a:pPr>
             <a:r>
               <a:rPr lang="it-IT" sz="3000" dirty="0"/>
-              <a:t>Analisi della sintassi</a:t>
-            </a:r>
-          </a:p>
-          <a:p>
-            <a:pPr marL="602453" indent="-457200" algn="just"/>
+              <a:t>Pfizer</a:t>
+            </a:r>
+          </a:p>
+          <a:p>
+            <a:pPr marL="659603" indent="-514350" algn="just">
+              <a:buFont typeface="+mj-lt"/>
+              <a:buAutoNum type="arabicPeriod"/>
+            </a:pPr>
             <a:r>
               <a:rPr lang="it-IT" sz="3000" dirty="0"/>
-              <a:t>Estrazione di informazioni </a:t>
-            </a:r>
-          </a:p>
-          <a:p>
-            <a:pPr marL="602453" indent="-457200" algn="just"/>
+              <a:t>Vaccines</a:t>
+            </a:r>
+          </a:p>
+          <a:p>
+            <a:pPr marL="659603" indent="-514350" algn="just">
+              <a:buFont typeface="+mj-lt"/>
+              <a:buAutoNum type="arabicPeriod"/>
+            </a:pPr>
             <a:r>
               <a:rPr lang="it-IT" sz="3000" dirty="0"/>
-              <a:t>Classificazione del testo</a:t>
+              <a:t>First</a:t>
+            </a:r>
+          </a:p>
+          <a:p>
+            <a:pPr marL="659603" indent="-514350" algn="just">
+              <a:buFont typeface="+mj-lt"/>
+              <a:buAutoNum type="arabicPeriod"/>
+            </a:pPr>
+            <a:r>
+              <a:rPr lang="it-IT" sz="3000" dirty="0"/>
+              <a:t>Dose</a:t>
+            </a:r>
+          </a:p>
+          <a:p>
+            <a:pPr marL="659603" indent="-514350" algn="just">
+              <a:buFont typeface="+mj-lt"/>
+              <a:buAutoNum type="arabicPeriod"/>
+            </a:pPr>
+            <a:r>
+              <a:rPr lang="it-IT" sz="3000" dirty="0"/>
+              <a:t> PfizerBioNTech</a:t>
             </a:r>
           </a:p>
         </p:txBody>
@@ -11215,7 +11231,7 @@
     </p:spTree>
     <p:extLst>
       <p:ext uri="{BB962C8B-B14F-4D97-AF65-F5344CB8AC3E}">
-        <p14:creationId xmlns:p14="http://schemas.microsoft.com/office/powerpoint/2010/main" val="4094612344"/>
+        <p14:creationId xmlns:p14="http://schemas.microsoft.com/office/powerpoint/2010/main" val="1518665190"/>
       </p:ext>
     </p:extLst>
   </p:cSld>
@@ -11279,7 +11295,7 @@
             <a:pPr rtl="0"/>
             <a:r>
               <a:rPr lang="it-IT" sz="5000" b="1" dirty="0"/>
-              <a:t>Parole maggiormente utilizzate</a:t>
+              <a:t>Identificazione delle frasi e sostantivi</a:t>
             </a:r>
           </a:p>
         </p:txBody>
@@ -11296,7 +11312,7 @@
         </p:nvSpPr>
         <p:spPr/>
         <p:txBody>
-          <a:bodyPr numCol="2" rtlCol="0">
+          <a:bodyPr rtlCol="0">
             <a:normAutofit/>
           </a:bodyPr>
           <a:lstStyle/>
@@ -11307,117 +11323,51 @@
             <a:endParaRPr lang="en-US" sz="3000" dirty="0"/>
           </a:p>
           <a:p>
-            <a:pPr marL="659603" indent="-514350" algn="just">
-              <a:buFont typeface="+mj-lt"/>
-              <a:buAutoNum type="arabicPeriod"/>
+            <a:pPr marL="145253" indent="0" algn="just">
+              <a:buNone/>
             </a:pPr>
             <a:r>
               <a:rPr lang="it-IT" sz="3000" dirty="0"/>
-              <a:t>Vaccine</a:t>
-            </a:r>
-          </a:p>
-          <a:p>
-            <a:pPr marL="659603" indent="-514350" algn="just">
-              <a:buFont typeface="+mj-lt"/>
-              <a:buAutoNum type="arabicPeriod"/>
-            </a:pPr>
+              <a:t>Spacy ci ha permesso di identificare le frasi e i sostantivi presenti nei tweet a partire da un </a:t>
+            </a:r>
+            <a:r>
+              <a:rPr lang="it-IT" sz="3000" b="1" dirty="0"/>
+              <a:t>modello della lingua inglese</a:t>
+            </a:r>
             <a:r>
               <a:rPr lang="it-IT" sz="3000" dirty="0"/>
-              <a:t>Moderna</a:t>
-            </a:r>
-          </a:p>
-          <a:p>
-            <a:pPr marL="659603" indent="-514350" algn="just">
-              <a:buFont typeface="+mj-lt"/>
-              <a:buAutoNum type="arabicPeriod"/>
-            </a:pPr>
-            <a:r>
-              <a:rPr lang="it-IT" sz="3000" dirty="0"/>
-              <a:t>Covaxin</a:t>
-            </a:r>
-          </a:p>
-          <a:p>
-            <a:pPr marL="659603" indent="-514350" algn="just">
-              <a:buFont typeface="+mj-lt"/>
-              <a:buAutoNum type="arabicPeriod"/>
-            </a:pPr>
-            <a:r>
-              <a:rPr lang="it-IT" sz="3000" dirty="0"/>
-              <a:t>COVID19</a:t>
-            </a:r>
-          </a:p>
-          <a:p>
-            <a:pPr marL="659603" indent="-514350" algn="just">
-              <a:buFont typeface="+mj-lt"/>
-              <a:buAutoNum type="arabicPeriod"/>
-            </a:pPr>
-            <a:r>
-              <a:rPr lang="it-IT" sz="3000" dirty="0"/>
-              <a:t>SputnikV</a:t>
-            </a:r>
-          </a:p>
-          <a:p>
-            <a:pPr marL="659603" indent="-514350" algn="just">
-              <a:buFont typeface="+mj-lt"/>
-              <a:buAutoNum type="arabicPeriod"/>
+              <a:t>.</a:t>
+            </a:r>
+          </a:p>
+          <a:p>
+            <a:pPr marL="145253" indent="0" algn="just">
+              <a:buNone/>
             </a:pPr>
             <a:endParaRPr lang="it-IT" sz="3000" dirty="0"/>
           </a:p>
           <a:p>
-            <a:pPr marL="659603" indent="-514350" algn="just">
-              <a:buFont typeface="+mj-lt"/>
-              <a:buAutoNum type="arabicPeriod"/>
+            <a:pPr marL="145253" indent="0" algn="just">
+              <a:buNone/>
             </a:pPr>
-            <a:endParaRPr lang="it-IT" sz="3000" dirty="0"/>
-          </a:p>
-          <a:p>
-            <a:pPr marL="659603" indent="-514350" algn="just">
-              <a:buFont typeface="+mj-lt"/>
-              <a:buAutoNum type="arabicPeriod"/>
-            </a:pPr>
             <a:r>
               <a:rPr lang="it-IT" sz="3000" dirty="0"/>
-              <a:t>Pfizer</a:t>
-            </a:r>
-          </a:p>
-          <a:p>
-            <a:pPr marL="659603" indent="-514350" algn="just">
-              <a:buFont typeface="+mj-lt"/>
-              <a:buAutoNum type="arabicPeriod"/>
-            </a:pPr>
+              <a:t>Per evitare </a:t>
+            </a:r>
+            <a:r>
+              <a:rPr lang="it-IT" sz="3000"/>
+              <a:t>di contare </a:t>
+            </a:r>
             <a:r>
               <a:rPr lang="it-IT" sz="3000" dirty="0"/>
-              <a:t>Vaccines</a:t>
-            </a:r>
-          </a:p>
-          <a:p>
-            <a:pPr marL="659603" indent="-514350" algn="just">
-              <a:buFont typeface="+mj-lt"/>
-              <a:buAutoNum type="arabicPeriod"/>
-            </a:pPr>
+              <a:t>più volte un sostantivo presente in più frasi, li abbiamo salvati in una variabile di tipo </a:t>
+            </a:r>
+            <a:r>
+              <a:rPr lang="it-IT" sz="3000" b="1" dirty="0"/>
+              <a:t>set</a:t>
+            </a:r>
             <a:r>
               <a:rPr lang="it-IT" sz="3000" dirty="0"/>
-              <a:t>First</a:t>
-            </a:r>
-          </a:p>
-          <a:p>
-            <a:pPr marL="659603" indent="-514350" algn="just">
-              <a:buFont typeface="+mj-lt"/>
-              <a:buAutoNum type="arabicPeriod"/>
-            </a:pPr>
-            <a:r>
-              <a:rPr lang="it-IT" sz="3000" dirty="0"/>
-              <a:t>Dose</a:t>
-            </a:r>
-          </a:p>
-          <a:p>
-            <a:pPr marL="659603" indent="-514350" algn="just">
-              <a:buFont typeface="+mj-lt"/>
-              <a:buAutoNum type="arabicPeriod"/>
-            </a:pPr>
-            <a:r>
-              <a:rPr lang="it-IT" sz="3000" dirty="0"/>
-              <a:t> PfizerBioNTech</a:t>
+              <a:t>.</a:t>
             </a:r>
           </a:p>
         </p:txBody>
@@ -11425,7 +11375,7 @@
     </p:spTree>
     <p:extLst>
       <p:ext uri="{BB962C8B-B14F-4D97-AF65-F5344CB8AC3E}">
-        <p14:creationId xmlns:p14="http://schemas.microsoft.com/office/powerpoint/2010/main" val="1518665190"/>
+        <p14:creationId xmlns:p14="http://schemas.microsoft.com/office/powerpoint/2010/main" val="2911635079"/>
       </p:ext>
     </p:extLst>
   </p:cSld>
@@ -11489,7 +11439,7 @@
             <a:pPr rtl="0"/>
             <a:r>
               <a:rPr lang="it-IT" sz="5000" b="1" dirty="0"/>
-              <a:t>Identificazione delle frasi e sostantivi</a:t>
+              <a:t>Risultati dell’identificazione</a:t>
             </a:r>
           </a:p>
         </p:txBody>
@@ -11514,7 +11464,33 @@
             <a:pPr marL="145253" indent="0" algn="just">
               <a:buNone/>
             </a:pPr>
-            <a:endParaRPr lang="en-US" sz="3000" dirty="0"/>
+            <a:endParaRPr lang="en-US" sz="4000" dirty="0"/>
+          </a:p>
+          <a:p>
+            <a:pPr marL="602453" indent="-457200" algn="just"/>
+            <a:r>
+              <a:rPr lang="it-IT" sz="4000" dirty="0"/>
+              <a:t>Frasi: </a:t>
+            </a:r>
+            <a:r>
+              <a:rPr lang="it-IT" sz="4000" b="1" dirty="0"/>
+              <a:t>14618</a:t>
+            </a:r>
+          </a:p>
+          <a:p>
+            <a:pPr marL="602453" indent="-457200" algn="just"/>
+            <a:r>
+              <a:rPr lang="it-IT" sz="4000" dirty="0"/>
+              <a:t>Sostantivi</a:t>
+            </a:r>
+            <a:r>
+              <a:rPr lang="it-IT" sz="4000" b="1" dirty="0"/>
+              <a:t>: 9111 </a:t>
+            </a:r>
+          </a:p>
+          <a:p>
+            <a:pPr marL="602453" indent="-457200" algn="just"/>
+            <a:endParaRPr lang="it-IT" sz="3000" dirty="0"/>
           </a:p>
           <a:p>
             <a:pPr marL="145253" indent="0" algn="just">
@@ -11522,54 +11498,23 @@
             </a:pPr>
             <a:r>
               <a:rPr lang="it-IT" sz="3000" dirty="0"/>
-              <a:t>Spacy ci ha permesso di identificare le frasi e i sostantivi presenti nei tweet a partire da un </a:t>
-            </a:r>
-            <a:r>
-              <a:rPr lang="it-IT" sz="3000" b="1" dirty="0"/>
-              <a:t>modello della lingua inglese</a:t>
-            </a:r>
-            <a:r>
-              <a:rPr lang="it-IT" sz="3000" dirty="0"/>
-              <a:t>.</a:t>
-            </a:r>
-          </a:p>
-          <a:p>
-            <a:pPr marL="145253" indent="0" algn="just">
-              <a:buNone/>
-            </a:pPr>
+              <a:t>Tutti i risultati sono stati salvati all’interno di un file di testo.</a:t>
+            </a:r>
+          </a:p>
+          <a:p>
+            <a:pPr marL="602453" indent="-457200" algn="just"/>
             <a:endParaRPr lang="it-IT" sz="3000" dirty="0"/>
           </a:p>
           <a:p>
-            <a:pPr marL="145253" indent="0" algn="just">
-              <a:buNone/>
-            </a:pPr>
-            <a:r>
-              <a:rPr lang="it-IT" sz="3000" dirty="0"/>
-              <a:t>Per evitare </a:t>
-            </a:r>
-            <a:r>
-              <a:rPr lang="it-IT" sz="3000"/>
-              <a:t>di contare </a:t>
-            </a:r>
-            <a:r>
-              <a:rPr lang="it-IT" sz="3000" dirty="0"/>
-              <a:t>più volte un sostantivo presente in più frasi, li abbiamo salvati in una variabile di tipo </a:t>
-            </a:r>
-            <a:r>
-              <a:rPr lang="it-IT" sz="3000" b="1" dirty="0"/>
-              <a:t>set</a:t>
-            </a:r>
-            <a:r>
-              <a:rPr lang="it-IT" sz="3000" dirty="0"/>
-              <a:t>.</a:t>
-            </a:r>
+            <a:pPr marL="602453" indent="-457200" algn="just"/>
+            <a:endParaRPr lang="it-IT" sz="3000" dirty="0"/>
           </a:p>
         </p:txBody>
       </p:sp>
     </p:spTree>
     <p:extLst>
       <p:ext uri="{BB962C8B-B14F-4D97-AF65-F5344CB8AC3E}">
-        <p14:creationId xmlns:p14="http://schemas.microsoft.com/office/powerpoint/2010/main" val="2911635079"/>
+        <p14:creationId xmlns:p14="http://schemas.microsoft.com/office/powerpoint/2010/main" val="3537741645"/>
       </p:ext>
     </p:extLst>
   </p:cSld>
@@ -11633,7 +11578,7 @@
             <a:pPr rtl="0"/>
             <a:r>
               <a:rPr lang="it-IT" sz="5000" b="1" dirty="0"/>
-              <a:t>Risultati dell’identificazione</a:t>
+              <a:t>Conclusioni</a:t>
             </a:r>
           </a:p>
         </p:txBody>
@@ -11651,7 +11596,7 @@
         <p:spPr/>
         <p:txBody>
           <a:bodyPr rtlCol="0">
-            <a:normAutofit/>
+            <a:normAutofit lnSpcReduction="10000"/>
           </a:bodyPr>
           <a:lstStyle/>
           <a:p>
@@ -11661,54 +11606,73 @@
             <a:endParaRPr lang="en-US" sz="4000" dirty="0"/>
           </a:p>
           <a:p>
+            <a:pPr marL="145253" indent="0" algn="just">
+              <a:buNone/>
+            </a:pPr>
+            <a:r>
+              <a:rPr lang="it-IT" sz="3000" dirty="0"/>
+              <a:t>Dai risultati ottenuti da questo caso di studio possiamo affermare che </a:t>
+            </a:r>
+            <a:r>
+              <a:rPr lang="it-IT" sz="3000" b="1" dirty="0"/>
+              <a:t>Content</a:t>
+            </a:r>
+            <a:r>
+              <a:rPr lang="it-IT" sz="3000" dirty="0"/>
+              <a:t> e </a:t>
+            </a:r>
+            <a:r>
+              <a:rPr lang="it-IT" sz="3000" b="1" dirty="0"/>
+              <a:t>Sentiment Analysis </a:t>
+            </a:r>
+            <a:r>
+              <a:rPr lang="it-IT" sz="3000" dirty="0"/>
+              <a:t>ci forniscono moltissime informazioni sul dataset analizzato.</a:t>
+            </a:r>
+          </a:p>
+          <a:p>
+            <a:pPr marL="145253" indent="0" algn="just">
+              <a:buNone/>
+            </a:pPr>
+            <a:endParaRPr lang="it-IT" sz="3000" dirty="0"/>
+          </a:p>
+          <a:p>
+            <a:pPr marL="145253" indent="0" algn="just">
+              <a:buNone/>
+            </a:pPr>
+            <a:r>
+              <a:rPr lang="it-IT" sz="3000" dirty="0"/>
+              <a:t>In particolare sotto due diversi aspetti:</a:t>
+            </a:r>
+          </a:p>
+          <a:p>
             <a:pPr marL="602453" indent="-457200" algn="just"/>
             <a:r>
-              <a:rPr lang="it-IT" sz="4000" dirty="0"/>
-              <a:t>Frasi: </a:t>
-            </a:r>
-            <a:r>
-              <a:rPr lang="it-IT" sz="4000" b="1" dirty="0"/>
-              <a:t>14618</a:t>
+              <a:rPr lang="it-IT" sz="3000" b="1" dirty="0"/>
+              <a:t>Oggettivo</a:t>
+            </a:r>
+            <a:r>
+              <a:rPr lang="it-IT" sz="3000" dirty="0"/>
+              <a:t> (Content Analysis)</a:t>
             </a:r>
           </a:p>
           <a:p>
             <a:pPr marL="602453" indent="-457200" algn="just"/>
             <a:r>
-              <a:rPr lang="it-IT" sz="4000" dirty="0"/>
-              <a:t>Sostantivi</a:t>
-            </a:r>
-            <a:r>
-              <a:rPr lang="it-IT" sz="4000" b="1" dirty="0"/>
-              <a:t>: 9111 </a:t>
-            </a:r>
-          </a:p>
-          <a:p>
-            <a:pPr marL="602453" indent="-457200" algn="just"/>
-            <a:endParaRPr lang="it-IT" sz="3000" dirty="0"/>
-          </a:p>
-          <a:p>
-            <a:pPr marL="145253" indent="0" algn="just">
-              <a:buNone/>
-            </a:pPr>
+              <a:rPr lang="it-IT" sz="3000" b="1" dirty="0"/>
+              <a:t>Soggettivo</a:t>
+            </a:r>
             <a:r>
               <a:rPr lang="it-IT" sz="3000" dirty="0"/>
-              <a:t>Tutti i risultati sono stati salvati all’interno di un file di testo.</a:t>
-            </a:r>
-          </a:p>
-          <a:p>
-            <a:pPr marL="602453" indent="-457200" algn="just"/>
-            <a:endParaRPr lang="it-IT" sz="3000" dirty="0"/>
-          </a:p>
-          <a:p>
-            <a:pPr marL="602453" indent="-457200" algn="just"/>
-            <a:endParaRPr lang="it-IT" sz="3000" dirty="0"/>
+              <a:t> (Sentiment Analysis).</a:t>
+            </a:r>
           </a:p>
         </p:txBody>
       </p:sp>
     </p:spTree>
     <p:extLst>
       <p:ext uri="{BB962C8B-B14F-4D97-AF65-F5344CB8AC3E}">
-        <p14:creationId xmlns:p14="http://schemas.microsoft.com/office/powerpoint/2010/main" val="3537741645"/>
+        <p14:creationId xmlns:p14="http://schemas.microsoft.com/office/powerpoint/2010/main" val="4227603974"/>
       </p:ext>
     </p:extLst>
   </p:cSld>
@@ -11790,164 +11754,6 @@
         <p:spPr/>
         <p:txBody>
           <a:bodyPr rtlCol="0">
-            <a:normAutofit lnSpcReduction="10000"/>
-          </a:bodyPr>
-          <a:lstStyle/>
-          <a:p>
-            <a:pPr marL="145253" indent="0" algn="just">
-              <a:buNone/>
-            </a:pPr>
-            <a:endParaRPr lang="en-US" sz="4000" dirty="0"/>
-          </a:p>
-          <a:p>
-            <a:pPr marL="145253" indent="0" algn="just">
-              <a:buNone/>
-            </a:pPr>
-            <a:r>
-              <a:rPr lang="it-IT" sz="3000" dirty="0"/>
-              <a:t>Dai risultati ottenuti da questo caso di studio possiamo affermare che </a:t>
-            </a:r>
-            <a:r>
-              <a:rPr lang="it-IT" sz="3000" b="1" dirty="0"/>
-              <a:t>Content</a:t>
-            </a:r>
-            <a:r>
-              <a:rPr lang="it-IT" sz="3000" dirty="0"/>
-              <a:t> e </a:t>
-            </a:r>
-            <a:r>
-              <a:rPr lang="it-IT" sz="3000" b="1" dirty="0"/>
-              <a:t>Sentiment Analysis </a:t>
-            </a:r>
-            <a:r>
-              <a:rPr lang="it-IT" sz="3000" dirty="0"/>
-              <a:t>ci forniscono moltissime informazioni sul dataset analizzato.</a:t>
-            </a:r>
-          </a:p>
-          <a:p>
-            <a:pPr marL="145253" indent="0" algn="just">
-              <a:buNone/>
-            </a:pPr>
-            <a:endParaRPr lang="it-IT" sz="3000" dirty="0"/>
-          </a:p>
-          <a:p>
-            <a:pPr marL="145253" indent="0" algn="just">
-              <a:buNone/>
-            </a:pPr>
-            <a:r>
-              <a:rPr lang="it-IT" sz="3000" dirty="0"/>
-              <a:t>In particolare sotto due diversi aspetti:</a:t>
-            </a:r>
-          </a:p>
-          <a:p>
-            <a:pPr marL="602453" indent="-457200" algn="just"/>
-            <a:r>
-              <a:rPr lang="it-IT" sz="3000" b="1" dirty="0"/>
-              <a:t>Oggettivo</a:t>
-            </a:r>
-            <a:r>
-              <a:rPr lang="it-IT" sz="3000" dirty="0"/>
-              <a:t> (Content Analysis)</a:t>
-            </a:r>
-          </a:p>
-          <a:p>
-            <a:pPr marL="602453" indent="-457200" algn="just"/>
-            <a:r>
-              <a:rPr lang="it-IT" sz="3000" b="1" dirty="0"/>
-              <a:t>Soggettivo</a:t>
-            </a:r>
-            <a:r>
-              <a:rPr lang="it-IT" sz="3000" dirty="0"/>
-              <a:t> (Sentiment Analysis).</a:t>
-            </a:r>
-          </a:p>
-        </p:txBody>
-      </p:sp>
-    </p:spTree>
-    <p:extLst>
-      <p:ext uri="{BB962C8B-B14F-4D97-AF65-F5344CB8AC3E}">
-        <p14:creationId xmlns:p14="http://schemas.microsoft.com/office/powerpoint/2010/main" val="4227603974"/>
-      </p:ext>
-    </p:extLst>
-  </p:cSld>
-  <p:clrMapOvr>
-    <a:masterClrMapping/>
-  </p:clrMapOvr>
-  <mc:AlternateContent xmlns:mc="http://schemas.openxmlformats.org/markup-compatibility/2006" xmlns:p14="http://schemas.microsoft.com/office/powerpoint/2010/main">
-    <mc:Choice Requires="p14">
-      <p:transition spd="med" p14:dur="700">
-        <p:fade/>
-      </p:transition>
-    </mc:Choice>
-    <mc:Fallback xmlns="">
-      <p:transition spd="med">
-        <p:fade/>
-      </p:transition>
-    </mc:Fallback>
-  </mc:AlternateContent>
-</p:sld>
-</file>
-
-<file path=ppt/slides/slide27.xml><?xml version="1.0" encoding="utf-8"?>
-<p:sld xmlns:a="http://schemas.openxmlformats.org/drawingml/2006/main" xmlns:r="http://schemas.openxmlformats.org/officeDocument/2006/relationships" xmlns:p="http://schemas.openxmlformats.org/presentationml/2006/main">
-  <p:cSld>
-    <p:spTree>
-      <p:nvGrpSpPr>
-        <p:cNvPr id="1" name=""/>
-        <p:cNvGrpSpPr/>
-        <p:nvPr/>
-      </p:nvGrpSpPr>
-      <p:grpSpPr>
-        <a:xfrm>
-          <a:off x="0" y="0"/>
-          <a:ext cx="0" cy="0"/>
-          <a:chOff x="0" y="0"/>
-          <a:chExt cx="0" cy="0"/>
-        </a:xfrm>
-      </p:grpSpPr>
-      <p:sp>
-        <p:nvSpPr>
-          <p:cNvPr id="13" name="Titolo 12"/>
-          <p:cNvSpPr>
-            <a:spLocks noGrp="1"/>
-          </p:cNvSpPr>
-          <p:nvPr>
-            <p:ph type="title"/>
-          </p:nvPr>
-        </p:nvSpPr>
-        <p:spPr>
-          <a:xfrm>
-            <a:off x="1218883" y="260648"/>
-            <a:ext cx="10360501" cy="1223963"/>
-          </a:xfrm>
-        </p:spPr>
-        <p:txBody>
-          <a:bodyPr rtlCol="0">
-            <a:normAutofit/>
-          </a:bodyPr>
-          <a:lstStyle/>
-          <a:p>
-            <a:pPr rtl="0"/>
-            <a:r>
-              <a:rPr lang="it-IT" sz="5000" b="1" dirty="0"/>
-              <a:t>Conclusioni</a:t>
-            </a:r>
-          </a:p>
-        </p:txBody>
-      </p:sp>
-      <p:sp>
-        <p:nvSpPr>
-          <p:cNvPr id="14" name="Segnaposto contenuto 13"/>
-          <p:cNvSpPr>
-            <a:spLocks noGrp="1"/>
-          </p:cNvSpPr>
-          <p:nvPr>
-            <p:ph idx="1"/>
-          </p:nvPr>
-        </p:nvSpPr>
-        <p:spPr/>
-        <p:txBody>
-          <a:bodyPr rtlCol="0">
             <a:normAutofit/>
           </a:bodyPr>
           <a:lstStyle/>
@@ -12020,7 +11826,7 @@
 </p:sld>
 </file>
 
-<file path=ppt/slides/slide28.xml><?xml version="1.0" encoding="utf-8"?>
+<file path=ppt/slides/slide27.xml><?xml version="1.0" encoding="utf-8"?>
 <p:sld xmlns:a="http://schemas.openxmlformats.org/drawingml/2006/main" xmlns:r="http://schemas.openxmlformats.org/officeDocument/2006/relationships" xmlns:p="http://schemas.openxmlformats.org/presentationml/2006/main">
   <p:cSld>
     <p:spTree>
@@ -14031,15 +13837,6 @@
 </file>
 
 <file path=customXml/item1.xml><?xml version="1.0" encoding="utf-8"?>
-<?mso-contentType ?>
-<FormTemplates xmlns="http://schemas.microsoft.com/sharepoint/v3/contenttype/forms">
-  <Display>DocumentLibraryForm</Display>
-  <Edit>AssetEditForm</Edit>
-  <New>DocumentLibraryForm</New>
-</FormTemplates>
-</file>
-
-<file path=customXml/item2.xml><?xml version="1.0" encoding="utf-8"?>
 <p:properties xmlns:p="http://schemas.microsoft.com/office/2006/metadata/properties" xmlns:xsi="http://www.w3.org/2001/XMLSchema-instance" xmlns:pc="http://schemas.microsoft.com/office/infopath/2007/PartnerControls">
   <documentManagement>
     <LocPublishedLinkedAssetsLookup xmlns="4873beb7-5857-4685-be1f-d57550cc96cc" xsi:nil="true"/>
@@ -14175,7 +13972,7 @@
 </p:properties>
 </file>
 
-<file path=customXml/item3.xml><?xml version="1.0" encoding="utf-8"?>
+<file path=customXml/item2.xml><?xml version="1.0" encoding="utf-8"?>
 <ct:contentTypeSchema xmlns:ct="http://schemas.microsoft.com/office/2006/metadata/contentType" xmlns:ma="http://schemas.microsoft.com/office/2006/metadata/properties/metaAttributes" ct:_="" ma:_="" ma:contentTypeName="TemplateFile" ma:contentTypeID="0x0101006EDDDB5EE6D98C44930B742096920B300400F5B6D36B3EF94B4E9A635CDF2A18F5B8" ma:contentTypeVersion="72" ma:contentTypeDescription="Create a new document." ma:contentTypeScope="" ma:versionID="a23e56308344d904b51738559c3d67c9">
   <xsd:schema xmlns:xsd="http://www.w3.org/2001/XMLSchema" xmlns:xs="http://www.w3.org/2001/XMLSchema" xmlns:p="http://schemas.microsoft.com/office/2006/metadata/properties" xmlns:ns2="4873beb7-5857-4685-be1f-d57550cc96cc" targetNamespace="http://schemas.microsoft.com/office/2006/metadata/properties" ma:root="true" ma:fieldsID="cd0908cc4600e77bf5da051303e00c8d" ns2:_="">
     <xsd:import namespace="4873beb7-5857-4685-be1f-d57550cc96cc"/>
@@ -15215,15 +15012,16 @@
 </ct:contentTypeSchema>
 </file>
 
-<file path=customXml/itemProps1.xml><?xml version="1.0" encoding="utf-8"?>
-<ds:datastoreItem xmlns:ds="http://schemas.openxmlformats.org/officeDocument/2006/customXml" ds:itemID="{3836F65B-1B07-41EE-A0E8-BC6EF3855225}">
-  <ds:schemaRefs>
-    <ds:schemaRef ds:uri="http://schemas.microsoft.com/sharepoint/v3/contenttype/forms"/>
-  </ds:schemaRefs>
-</ds:datastoreItem>
+<file path=customXml/item3.xml><?xml version="1.0" encoding="utf-8"?>
+<?mso-contentType ?>
+<FormTemplates xmlns="http://schemas.microsoft.com/sharepoint/v3/contenttype/forms">
+  <Display>DocumentLibraryForm</Display>
+  <Edit>AssetEditForm</Edit>
+  <New>DocumentLibraryForm</New>
+</FormTemplates>
 </file>
 
-<file path=customXml/itemProps2.xml><?xml version="1.0" encoding="utf-8"?>
+<file path=customXml/itemProps1.xml><?xml version="1.0" encoding="utf-8"?>
 <ds:datastoreItem xmlns:ds="http://schemas.openxmlformats.org/officeDocument/2006/customXml" ds:itemID="{60C67BEE-D13F-4BD2-98A5-34D8A0977F68}">
   <ds:schemaRefs>
     <ds:schemaRef ds:uri="4873beb7-5857-4685-be1f-d57550cc96cc"/>
@@ -15239,7 +15037,7 @@
 </ds:datastoreItem>
 </file>
 
-<file path=customXml/itemProps3.xml><?xml version="1.0" encoding="utf-8"?>
+<file path=customXml/itemProps2.xml><?xml version="1.0" encoding="utf-8"?>
 <ds:datastoreItem xmlns:ds="http://schemas.openxmlformats.org/officeDocument/2006/customXml" ds:itemID="{A09BF4D4-EF60-4196-BFC3-9462D607978C}">
   <ds:schemaRefs>
     <ds:schemaRef ds:uri="http://schemas.microsoft.com/office/2006/metadata/contentType"/>
@@ -15255,4 +15053,12 @@
     <ds:schemaRef ds:uri="http://schemas.microsoft.com/internal/obd"/>
   </ds:schemaRefs>
 </ds:datastoreItem>
+</file>
+
+<file path=customXml/itemProps3.xml><?xml version="1.0" encoding="utf-8"?>
+<ds:datastoreItem xmlns:ds="http://schemas.openxmlformats.org/officeDocument/2006/customXml" ds:itemID="{3836F65B-1B07-41EE-A0E8-BC6EF3855225}">
+  <ds:schemaRefs>
+    <ds:schemaRef ds:uri="http://schemas.microsoft.com/sharepoint/v3/contenttype/forms"/>
+  </ds:schemaRefs>
+</ds:datastoreItem>
 </file>
</xml_diff>

<commit_message>
Rimozione classi di test ed aggiornamento della presentazione
</commit_message>
<xml_diff>
--- a/Presentazione/Presentazione Progetto.pptx
+++ b/Presentazione/Presentazione Progetto.pptx
@@ -5,10 +5,10 @@
     <p:sldMasterId id="2147483660" r:id="rId4"/>
   </p:sldMasterIdLst>
   <p:notesMasterIdLst>
-    <p:notesMasterId r:id="rId32"/>
+    <p:notesMasterId r:id="rId37"/>
   </p:notesMasterIdLst>
   <p:handoutMasterIdLst>
-    <p:handoutMasterId r:id="rId33"/>
+    <p:handoutMasterId r:id="rId38"/>
   </p:handoutMasterIdLst>
   <p:sldIdLst>
     <p:sldId id="272" r:id="rId5"/>
@@ -35,9 +35,14 @@
     <p:sldId id="293" r:id="rId26"/>
     <p:sldId id="294" r:id="rId27"/>
     <p:sldId id="295" r:id="rId28"/>
-    <p:sldId id="298" r:id="rId29"/>
-    <p:sldId id="299" r:id="rId30"/>
-    <p:sldId id="300" r:id="rId31"/>
+    <p:sldId id="301" r:id="rId29"/>
+    <p:sldId id="298" r:id="rId30"/>
+    <p:sldId id="303" r:id="rId31"/>
+    <p:sldId id="304" r:id="rId32"/>
+    <p:sldId id="305" r:id="rId33"/>
+    <p:sldId id="302" r:id="rId34"/>
+    <p:sldId id="299" r:id="rId35"/>
+    <p:sldId id="300" r:id="rId36"/>
   </p:sldIdLst>
   <p:sldSz cx="12188825" cy="6858000"/>
   <p:notesSz cx="6858000" cy="9144000"/>
@@ -647,7 +652,723 @@
 </c:chartSpace>
 </file>
 
+<file path=ppt/charts/chart2.xml><?xml version="1.0" encoding="utf-8"?>
+<c:chartSpace xmlns:c="http://schemas.openxmlformats.org/drawingml/2006/chart" xmlns:a="http://schemas.openxmlformats.org/drawingml/2006/main" xmlns:r="http://schemas.openxmlformats.org/officeDocument/2006/relationships" xmlns:c16r2="http://schemas.microsoft.com/office/drawing/2015/06/chart">
+  <c:date1904 val="0"/>
+  <c:lang val="it-IT"/>
+  <c:roundedCorners val="0"/>
+  <mc:AlternateContent xmlns:mc="http://schemas.openxmlformats.org/markup-compatibility/2006">
+    <mc:Choice xmlns:c14="http://schemas.microsoft.com/office/drawing/2007/8/2/chart" Requires="c14">
+      <c14:style val="102"/>
+    </mc:Choice>
+    <mc:Fallback>
+      <c:style val="2"/>
+    </mc:Fallback>
+  </mc:AlternateContent>
+  <c:chart>
+    <c:autoTitleDeleted val="1"/>
+    <c:plotArea>
+      <c:layout>
+        <c:manualLayout>
+          <c:layoutTarget val="inner"/>
+          <c:xMode val="edge"/>
+          <c:yMode val="edge"/>
+          <c:x val="6.9853457122620644E-2"/>
+          <c:y val="6.0854883496727569E-3"/>
+          <c:w val="0.94996842693645378"/>
+          <c:h val="0.93003714560193362"/>
+        </c:manualLayout>
+      </c:layout>
+      <c:barChart>
+        <c:barDir val="col"/>
+        <c:grouping val="clustered"/>
+        <c:varyColors val="0"/>
+        <c:ser>
+          <c:idx val="0"/>
+          <c:order val="0"/>
+          <c:tx>
+            <c:strRef>
+              <c:f>Foglio1!$B$1</c:f>
+              <c:strCache>
+                <c:ptCount val="1"/>
+                <c:pt idx="0">
+                  <c:v>Tweet Positivi</c:v>
+                </c:pt>
+              </c:strCache>
+            </c:strRef>
+          </c:tx>
+          <c:spPr>
+            <a:noFill/>
+            <a:ln w="25400" cap="flat" cmpd="sng" algn="ctr">
+              <a:solidFill>
+                <a:schemeClr val="accent1"/>
+              </a:solidFill>
+              <a:miter lim="800000"/>
+            </a:ln>
+            <a:effectLst/>
+          </c:spPr>
+          <c:invertIfNegative val="0"/>
+          <c:dLbls>
+            <c:dLbl>
+              <c:idx val="2"/>
+              <c:layout>
+                <c:manualLayout>
+                  <c:x val="-8.6588714854157669E-3"/>
+                  <c:y val="5.388955272519892E-3"/>
+                </c:manualLayout>
+              </c:layout>
+              <c:showLegendKey val="0"/>
+              <c:showVal val="1"/>
+              <c:showCatName val="0"/>
+              <c:showSerName val="0"/>
+              <c:showPercent val="0"/>
+              <c:showBubbleSize val="0"/>
+              <c:extLst>
+                <c:ext xmlns:c15="http://schemas.microsoft.com/office/drawing/2012/chart" uri="{CE6537A1-D6FC-4f65-9D91-7224C49458BB}"/>
+                <c:ext xmlns:c16="http://schemas.microsoft.com/office/drawing/2014/chart" uri="{C3380CC4-5D6E-409C-BE32-E72D297353CC}">
+                  <c16:uniqueId val="{00000004-5296-46E6-8BEB-B5E4C6096564}"/>
+                </c:ext>
+              </c:extLst>
+            </c:dLbl>
+            <c:dLbl>
+              <c:idx val="3"/>
+              <c:layout>
+                <c:manualLayout>
+                  <c:x val="-7.215726237846473E-3"/>
+                  <c:y val="-2.694477636259946E-3"/>
+                </c:manualLayout>
+              </c:layout>
+              <c:showLegendKey val="0"/>
+              <c:showVal val="1"/>
+              <c:showCatName val="0"/>
+              <c:showSerName val="0"/>
+              <c:showPercent val="0"/>
+              <c:showBubbleSize val="0"/>
+              <c:extLst>
+                <c:ext xmlns:c15="http://schemas.microsoft.com/office/drawing/2012/chart" uri="{CE6537A1-D6FC-4f65-9D91-7224C49458BB}"/>
+                <c:ext xmlns:c16="http://schemas.microsoft.com/office/drawing/2014/chart" uri="{C3380CC4-5D6E-409C-BE32-E72D297353CC}">
+                  <c16:uniqueId val="{00000005-5296-46E6-8BEB-B5E4C6096564}"/>
+                </c:ext>
+              </c:extLst>
+            </c:dLbl>
+            <c:spPr>
+              <a:noFill/>
+              <a:ln>
+                <a:noFill/>
+              </a:ln>
+              <a:effectLst/>
+            </c:spPr>
+            <c:txPr>
+              <a:bodyPr rot="0" spcFirstLastPara="1" vertOverflow="ellipsis" vert="horz" wrap="square" lIns="38100" tIns="19050" rIns="38100" bIns="19050" anchor="ctr" anchorCtr="1">
+                <a:spAutoFit/>
+              </a:bodyPr>
+              <a:lstStyle/>
+              <a:p>
+                <a:pPr>
+                  <a:defRPr sz="1100" b="0" i="0" u="none" strike="noStrike" kern="1200" baseline="0">
+                    <a:solidFill>
+                      <a:schemeClr val="tx1">
+                        <a:lumMod val="65000"/>
+                        <a:lumOff val="35000"/>
+                      </a:schemeClr>
+                    </a:solidFill>
+                    <a:latin typeface="+mn-lt"/>
+                    <a:ea typeface="+mn-ea"/>
+                    <a:cs typeface="+mn-cs"/>
+                  </a:defRPr>
+                </a:pPr>
+                <a:endParaRPr lang="it-IT"/>
+              </a:p>
+            </c:txPr>
+            <c:showLegendKey val="0"/>
+            <c:showVal val="1"/>
+            <c:showCatName val="0"/>
+            <c:showSerName val="0"/>
+            <c:showPercent val="0"/>
+            <c:showBubbleSize val="0"/>
+            <c:showLeaderLines val="0"/>
+            <c:extLst>
+              <c:ext xmlns:c15="http://schemas.microsoft.com/office/drawing/2012/chart" uri="{CE6537A1-D6FC-4f65-9D91-7224C49458BB}">
+                <c15:showLeaderLines val="1"/>
+                <c15:leaderLines>
+                  <c:spPr>
+                    <a:ln w="9525" cap="flat" cmpd="sng" algn="ctr">
+                      <a:solidFill>
+                        <a:schemeClr val="tx1">
+                          <a:lumMod val="35000"/>
+                          <a:lumOff val="65000"/>
+                        </a:schemeClr>
+                      </a:solidFill>
+                      <a:round/>
+                    </a:ln>
+                    <a:effectLst/>
+                  </c:spPr>
+                </c15:leaderLines>
+              </c:ext>
+            </c:extLst>
+          </c:dLbls>
+          <c:cat>
+            <c:strRef>
+              <c:f>Foglio1!$A$2:$A$6</c:f>
+              <c:strCache>
+                <c:ptCount val="5"/>
+                <c:pt idx="0">
+                  <c:v>NOVAVAX</c:v>
+                </c:pt>
+                <c:pt idx="1">
+                  <c:v>J &amp; J</c:v>
+                </c:pt>
+                <c:pt idx="2">
+                  <c:v>MODERNA</c:v>
+                </c:pt>
+                <c:pt idx="3">
+                  <c:v>PFIZER</c:v>
+                </c:pt>
+                <c:pt idx="4">
+                  <c:v>SPUTNIK</c:v>
+                </c:pt>
+              </c:strCache>
+            </c:strRef>
+          </c:cat>
+          <c:val>
+            <c:numRef>
+              <c:f>Foglio1!$B$2:$B$6</c:f>
+              <c:numCache>
+                <c:formatCode>0.00%</c:formatCode>
+                <c:ptCount val="5"/>
+                <c:pt idx="0">
+                  <c:v>0.69699999999999995</c:v>
+                </c:pt>
+                <c:pt idx="1">
+                  <c:v>0.47399999999999998</c:v>
+                </c:pt>
+                <c:pt idx="2">
+                  <c:v>0.40699999999999997</c:v>
+                </c:pt>
+                <c:pt idx="3">
+                  <c:v>0.41099999999999998</c:v>
+                </c:pt>
+                <c:pt idx="4">
+                  <c:v>0.35599999999999998</c:v>
+                </c:pt>
+              </c:numCache>
+            </c:numRef>
+          </c:val>
+          <c:extLst>
+            <c:ext xmlns:c16="http://schemas.microsoft.com/office/drawing/2014/chart" uri="{C3380CC4-5D6E-409C-BE32-E72D297353CC}">
+              <c16:uniqueId val="{00000000-5296-46E6-8BEB-B5E4C6096564}"/>
+            </c:ext>
+          </c:extLst>
+        </c:ser>
+        <c:ser>
+          <c:idx val="1"/>
+          <c:order val="1"/>
+          <c:tx>
+            <c:strRef>
+              <c:f>Foglio1!$C$1</c:f>
+              <c:strCache>
+                <c:ptCount val="1"/>
+                <c:pt idx="0">
+                  <c:v>Tweet Neutrali</c:v>
+                </c:pt>
+              </c:strCache>
+            </c:strRef>
+          </c:tx>
+          <c:spPr>
+            <a:noFill/>
+            <a:ln w="25400" cap="flat" cmpd="sng" algn="ctr">
+              <a:solidFill>
+                <a:schemeClr val="accent2"/>
+              </a:solidFill>
+              <a:miter lim="800000"/>
+            </a:ln>
+            <a:effectLst/>
+          </c:spPr>
+          <c:invertIfNegative val="0"/>
+          <c:dLbls>
+            <c:dLbl>
+              <c:idx val="2"/>
+              <c:layout>
+                <c:manualLayout>
+                  <c:x val="2.8862904951385891E-3"/>
+                  <c:y val="0"/>
+                </c:manualLayout>
+              </c:layout>
+              <c:showLegendKey val="0"/>
+              <c:showVal val="1"/>
+              <c:showCatName val="0"/>
+              <c:showSerName val="0"/>
+              <c:showPercent val="0"/>
+              <c:showBubbleSize val="0"/>
+              <c:extLst>
+                <c:ext xmlns:c15="http://schemas.microsoft.com/office/drawing/2012/chart" uri="{CE6537A1-D6FC-4f65-9D91-7224C49458BB}"/>
+                <c:ext xmlns:c16="http://schemas.microsoft.com/office/drawing/2014/chart" uri="{C3380CC4-5D6E-409C-BE32-E72D297353CC}">
+                  <c16:uniqueId val="{00000003-5296-46E6-8BEB-B5E4C6096564}"/>
+                </c:ext>
+              </c:extLst>
+            </c:dLbl>
+            <c:dLbl>
+              <c:idx val="3"/>
+              <c:layout>
+                <c:manualLayout>
+                  <c:x val="2.8862904951384833E-3"/>
+                  <c:y val="8.0834329087798393E-3"/>
+                </c:manualLayout>
+              </c:layout>
+              <c:showLegendKey val="0"/>
+              <c:showVal val="1"/>
+              <c:showCatName val="0"/>
+              <c:showSerName val="0"/>
+              <c:showPercent val="0"/>
+              <c:showBubbleSize val="0"/>
+              <c:extLst>
+                <c:ext xmlns:c15="http://schemas.microsoft.com/office/drawing/2012/chart" uri="{CE6537A1-D6FC-4f65-9D91-7224C49458BB}"/>
+                <c:ext xmlns:c16="http://schemas.microsoft.com/office/drawing/2014/chart" uri="{C3380CC4-5D6E-409C-BE32-E72D297353CC}">
+                  <c16:uniqueId val="{00000006-5296-46E6-8BEB-B5E4C6096564}"/>
+                </c:ext>
+              </c:extLst>
+            </c:dLbl>
+            <c:spPr>
+              <a:noFill/>
+              <a:ln>
+                <a:noFill/>
+              </a:ln>
+              <a:effectLst/>
+            </c:spPr>
+            <c:txPr>
+              <a:bodyPr rot="0" spcFirstLastPara="1" vertOverflow="ellipsis" vert="horz" wrap="square" lIns="38100" tIns="19050" rIns="38100" bIns="19050" anchor="ctr" anchorCtr="1">
+                <a:spAutoFit/>
+              </a:bodyPr>
+              <a:lstStyle/>
+              <a:p>
+                <a:pPr>
+                  <a:defRPr sz="1197" b="0" i="0" u="none" strike="noStrike" kern="1200" baseline="0">
+                    <a:solidFill>
+                      <a:schemeClr val="tx1">
+                        <a:lumMod val="65000"/>
+                        <a:lumOff val="35000"/>
+                      </a:schemeClr>
+                    </a:solidFill>
+                    <a:latin typeface="+mn-lt"/>
+                    <a:ea typeface="+mn-ea"/>
+                    <a:cs typeface="+mn-cs"/>
+                  </a:defRPr>
+                </a:pPr>
+                <a:endParaRPr lang="it-IT"/>
+              </a:p>
+            </c:txPr>
+            <c:showLegendKey val="0"/>
+            <c:showVal val="1"/>
+            <c:showCatName val="0"/>
+            <c:showSerName val="0"/>
+            <c:showPercent val="0"/>
+            <c:showBubbleSize val="0"/>
+            <c:showLeaderLines val="0"/>
+            <c:extLst>
+              <c:ext xmlns:c15="http://schemas.microsoft.com/office/drawing/2012/chart" uri="{CE6537A1-D6FC-4f65-9D91-7224C49458BB}">
+                <c15:showLeaderLines val="1"/>
+                <c15:leaderLines>
+                  <c:spPr>
+                    <a:ln w="9525" cap="flat" cmpd="sng" algn="ctr">
+                      <a:solidFill>
+                        <a:schemeClr val="tx1">
+                          <a:lumMod val="35000"/>
+                          <a:lumOff val="65000"/>
+                        </a:schemeClr>
+                      </a:solidFill>
+                      <a:round/>
+                    </a:ln>
+                    <a:effectLst/>
+                  </c:spPr>
+                </c15:leaderLines>
+              </c:ext>
+            </c:extLst>
+          </c:dLbls>
+          <c:cat>
+            <c:strRef>
+              <c:f>Foglio1!$A$2:$A$6</c:f>
+              <c:strCache>
+                <c:ptCount val="5"/>
+                <c:pt idx="0">
+                  <c:v>NOVAVAX</c:v>
+                </c:pt>
+                <c:pt idx="1">
+                  <c:v>J &amp; J</c:v>
+                </c:pt>
+                <c:pt idx="2">
+                  <c:v>MODERNA</c:v>
+                </c:pt>
+                <c:pt idx="3">
+                  <c:v>PFIZER</c:v>
+                </c:pt>
+                <c:pt idx="4">
+                  <c:v>SPUTNIK</c:v>
+                </c:pt>
+              </c:strCache>
+            </c:strRef>
+          </c:cat>
+          <c:val>
+            <c:numRef>
+              <c:f>Foglio1!$C$2:$C$6</c:f>
+              <c:numCache>
+                <c:formatCode>0.00%</c:formatCode>
+                <c:ptCount val="5"/>
+                <c:pt idx="0">
+                  <c:v>0.21199999999999999</c:v>
+                </c:pt>
+                <c:pt idx="1">
+                  <c:v>0.33500000000000002</c:v>
+                </c:pt>
+                <c:pt idx="2">
+                  <c:v>0.41199999999999998</c:v>
+                </c:pt>
+                <c:pt idx="3">
+                  <c:v>0.39100000000000001</c:v>
+                </c:pt>
+                <c:pt idx="4">
+                  <c:v>0.38500000000000001</c:v>
+                </c:pt>
+              </c:numCache>
+            </c:numRef>
+          </c:val>
+          <c:extLst>
+            <c:ext xmlns:c16="http://schemas.microsoft.com/office/drawing/2014/chart" uri="{C3380CC4-5D6E-409C-BE32-E72D297353CC}">
+              <c16:uniqueId val="{00000001-5296-46E6-8BEB-B5E4C6096564}"/>
+            </c:ext>
+          </c:extLst>
+        </c:ser>
+        <c:ser>
+          <c:idx val="2"/>
+          <c:order val="2"/>
+          <c:tx>
+            <c:strRef>
+              <c:f>Foglio1!$D$1</c:f>
+              <c:strCache>
+                <c:ptCount val="1"/>
+                <c:pt idx="0">
+                  <c:v>Tweet Negativi</c:v>
+                </c:pt>
+              </c:strCache>
+            </c:strRef>
+          </c:tx>
+          <c:spPr>
+            <a:noFill/>
+            <a:ln w="25400" cap="flat" cmpd="sng" algn="ctr">
+              <a:solidFill>
+                <a:srgbClr val="FF0000"/>
+              </a:solidFill>
+              <a:miter lim="800000"/>
+            </a:ln>
+            <a:effectLst/>
+          </c:spPr>
+          <c:invertIfNegative val="0"/>
+          <c:dLbls>
+            <c:spPr>
+              <a:noFill/>
+              <a:ln>
+                <a:noFill/>
+              </a:ln>
+              <a:effectLst/>
+            </c:spPr>
+            <c:txPr>
+              <a:bodyPr rot="0" spcFirstLastPara="1" vertOverflow="ellipsis" vert="horz" wrap="square" lIns="38100" tIns="19050" rIns="38100" bIns="19050" anchor="ctr" anchorCtr="1">
+                <a:spAutoFit/>
+              </a:bodyPr>
+              <a:lstStyle/>
+              <a:p>
+                <a:pPr>
+                  <a:defRPr sz="1197" b="0" i="0" u="none" strike="noStrike" kern="1200" baseline="0">
+                    <a:solidFill>
+                      <a:schemeClr val="tx1">
+                        <a:lumMod val="65000"/>
+                        <a:lumOff val="35000"/>
+                      </a:schemeClr>
+                    </a:solidFill>
+                    <a:latin typeface="+mn-lt"/>
+                    <a:ea typeface="+mn-ea"/>
+                    <a:cs typeface="+mn-cs"/>
+                  </a:defRPr>
+                </a:pPr>
+                <a:endParaRPr lang="it-IT"/>
+              </a:p>
+            </c:txPr>
+            <c:showLegendKey val="0"/>
+            <c:showVal val="1"/>
+            <c:showCatName val="0"/>
+            <c:showSerName val="0"/>
+            <c:showPercent val="0"/>
+            <c:showBubbleSize val="0"/>
+            <c:showLeaderLines val="0"/>
+            <c:extLst>
+              <c:ext xmlns:c15="http://schemas.microsoft.com/office/drawing/2012/chart" uri="{CE6537A1-D6FC-4f65-9D91-7224C49458BB}">
+                <c15:showLeaderLines val="1"/>
+                <c15:leaderLines>
+                  <c:spPr>
+                    <a:ln w="9525" cap="flat" cmpd="sng" algn="ctr">
+                      <a:solidFill>
+                        <a:schemeClr val="tx1">
+                          <a:lumMod val="35000"/>
+                          <a:lumOff val="65000"/>
+                        </a:schemeClr>
+                      </a:solidFill>
+                      <a:round/>
+                    </a:ln>
+                    <a:effectLst/>
+                  </c:spPr>
+                </c15:leaderLines>
+              </c:ext>
+            </c:extLst>
+          </c:dLbls>
+          <c:cat>
+            <c:strRef>
+              <c:f>Foglio1!$A$2:$A$6</c:f>
+              <c:strCache>
+                <c:ptCount val="5"/>
+                <c:pt idx="0">
+                  <c:v>NOVAVAX</c:v>
+                </c:pt>
+                <c:pt idx="1">
+                  <c:v>J &amp; J</c:v>
+                </c:pt>
+                <c:pt idx="2">
+                  <c:v>MODERNA</c:v>
+                </c:pt>
+                <c:pt idx="3">
+                  <c:v>PFIZER</c:v>
+                </c:pt>
+                <c:pt idx="4">
+                  <c:v>SPUTNIK</c:v>
+                </c:pt>
+              </c:strCache>
+            </c:strRef>
+          </c:cat>
+          <c:val>
+            <c:numRef>
+              <c:f>Foglio1!$D$2:$D$6</c:f>
+              <c:numCache>
+                <c:formatCode>0.00%</c:formatCode>
+                <c:ptCount val="5"/>
+                <c:pt idx="0">
+                  <c:v>9.0999999999999998E-2</c:v>
+                </c:pt>
+                <c:pt idx="1">
+                  <c:v>0.191</c:v>
+                </c:pt>
+                <c:pt idx="2">
+                  <c:v>0.18099999999999999</c:v>
+                </c:pt>
+                <c:pt idx="3">
+                  <c:v>0.19800000000000001</c:v>
+                </c:pt>
+                <c:pt idx="4">
+                  <c:v>0.25900000000000001</c:v>
+                </c:pt>
+              </c:numCache>
+            </c:numRef>
+          </c:val>
+          <c:extLst>
+            <c:ext xmlns:c16="http://schemas.microsoft.com/office/drawing/2014/chart" uri="{C3380CC4-5D6E-409C-BE32-E72D297353CC}">
+              <c16:uniqueId val="{00000002-5296-46E6-8BEB-B5E4C6096564}"/>
+            </c:ext>
+          </c:extLst>
+        </c:ser>
+        <c:dLbls>
+          <c:showLegendKey val="0"/>
+          <c:showVal val="1"/>
+          <c:showCatName val="0"/>
+          <c:showSerName val="0"/>
+          <c:showPercent val="0"/>
+          <c:showBubbleSize val="0"/>
+        </c:dLbls>
+        <c:gapWidth val="164"/>
+        <c:overlap val="-35"/>
+        <c:axId val="816968336"/>
+        <c:axId val="816992336"/>
+      </c:barChart>
+      <c:catAx>
+        <c:axId val="816968336"/>
+        <c:scaling>
+          <c:orientation val="minMax"/>
+        </c:scaling>
+        <c:delete val="0"/>
+        <c:axPos val="b"/>
+        <c:numFmt formatCode="General" sourceLinked="1"/>
+        <c:majorTickMark val="out"/>
+        <c:minorTickMark val="none"/>
+        <c:tickLblPos val="nextTo"/>
+        <c:spPr>
+          <a:noFill/>
+          <a:ln>
+            <a:noFill/>
+          </a:ln>
+          <a:effectLst/>
+        </c:spPr>
+        <c:txPr>
+          <a:bodyPr rot="-60000000" spcFirstLastPara="1" vertOverflow="ellipsis" vert="horz" wrap="square" anchor="ctr" anchorCtr="1"/>
+          <a:lstStyle/>
+          <a:p>
+            <a:pPr>
+              <a:defRPr sz="1197" b="0" i="0" u="none" strike="noStrike" kern="1200" baseline="0">
+                <a:solidFill>
+                  <a:schemeClr val="tx1">
+                    <a:lumMod val="50000"/>
+                    <a:lumOff val="50000"/>
+                  </a:schemeClr>
+                </a:solidFill>
+                <a:latin typeface="+mn-lt"/>
+                <a:ea typeface="+mn-ea"/>
+                <a:cs typeface="+mn-cs"/>
+              </a:defRPr>
+            </a:pPr>
+            <a:endParaRPr lang="it-IT"/>
+          </a:p>
+        </c:txPr>
+        <c:crossAx val="816992336"/>
+        <c:crosses val="autoZero"/>
+        <c:auto val="1"/>
+        <c:lblAlgn val="ctr"/>
+        <c:lblOffset val="100"/>
+        <c:noMultiLvlLbl val="0"/>
+      </c:catAx>
+      <c:valAx>
+        <c:axId val="816992336"/>
+        <c:scaling>
+          <c:orientation val="minMax"/>
+        </c:scaling>
+        <c:delete val="1"/>
+        <c:axPos val="l"/>
+        <c:numFmt formatCode="0.00%" sourceLinked="1"/>
+        <c:majorTickMark val="out"/>
+        <c:minorTickMark val="none"/>
+        <c:tickLblPos val="nextTo"/>
+        <c:crossAx val="816968336"/>
+        <c:crosses val="autoZero"/>
+        <c:crossBetween val="between"/>
+      </c:valAx>
+      <c:spPr>
+        <a:noFill/>
+        <a:ln>
+          <a:noFill/>
+        </a:ln>
+        <a:effectLst/>
+      </c:spPr>
+    </c:plotArea>
+    <c:legend>
+      <c:legendPos val="t"/>
+      <c:layout>
+        <c:manualLayout>
+          <c:xMode val="edge"/>
+          <c:yMode val="edge"/>
+          <c:x val="0.25381084092982642"/>
+          <c:y val="2.1555821090079568E-2"/>
+          <c:w val="0.49237820450686304"/>
+          <c:h val="0.14405738261412704"/>
+        </c:manualLayout>
+      </c:layout>
+      <c:overlay val="0"/>
+      <c:spPr>
+        <a:noFill/>
+        <a:ln>
+          <a:noFill/>
+        </a:ln>
+        <a:effectLst/>
+      </c:spPr>
+      <c:txPr>
+        <a:bodyPr rot="0" spcFirstLastPara="1" vertOverflow="ellipsis" vert="horz" wrap="square" anchor="ctr" anchorCtr="1"/>
+        <a:lstStyle/>
+        <a:p>
+          <a:pPr>
+            <a:defRPr sz="1197" b="0" i="0" u="none" strike="noStrike" kern="1200" baseline="0">
+              <a:solidFill>
+                <a:schemeClr val="tx1">
+                  <a:lumMod val="50000"/>
+                  <a:lumOff val="50000"/>
+                </a:schemeClr>
+              </a:solidFill>
+              <a:latin typeface="+mn-lt"/>
+              <a:ea typeface="+mn-ea"/>
+              <a:cs typeface="+mn-cs"/>
+            </a:defRPr>
+          </a:pPr>
+          <a:endParaRPr lang="it-IT"/>
+        </a:p>
+      </c:txPr>
+    </c:legend>
+    <c:plotVisOnly val="1"/>
+    <c:dispBlanksAs val="gap"/>
+    <c:extLst>
+      <c:ext xmlns:c16r3="http://schemas.microsoft.com/office/drawing/2017/03/chart" uri="{56B9EC1D-385E-4148-901F-78D8002777C0}">
+        <c16r3:dataDisplayOptions16>
+          <c16r3:dispNaAsBlank val="1"/>
+        </c16r3:dataDisplayOptions16>
+      </c:ext>
+    </c:extLst>
+    <c:showDLblsOverMax val="0"/>
+  </c:chart>
+  <c:spPr>
+    <a:noFill/>
+    <a:ln>
+      <a:noFill/>
+    </a:ln>
+    <a:effectLst/>
+  </c:spPr>
+  <c:txPr>
+    <a:bodyPr/>
+    <a:lstStyle/>
+    <a:p>
+      <a:pPr>
+        <a:defRPr/>
+      </a:pPr>
+      <a:endParaRPr lang="it-IT"/>
+    </a:p>
+  </c:txPr>
+  <c:externalData r:id="rId3">
+    <c:autoUpdate val="0"/>
+  </c:externalData>
+</c:chartSpace>
+</file>
+
 <file path=ppt/charts/colors1.xml><?xml version="1.0" encoding="utf-8"?>
+<cs:colorStyle xmlns:cs="http://schemas.microsoft.com/office/drawing/2012/chartStyle" xmlns:a="http://schemas.openxmlformats.org/drawingml/2006/main" meth="cycle" id="10">
+  <a:schemeClr val="accent1"/>
+  <a:schemeClr val="accent2"/>
+  <a:schemeClr val="accent3"/>
+  <a:schemeClr val="accent4"/>
+  <a:schemeClr val="accent5"/>
+  <a:schemeClr val="accent6"/>
+  <cs:variation/>
+  <cs:variation>
+    <a:lumMod val="60000"/>
+  </cs:variation>
+  <cs:variation>
+    <a:lumMod val="80000"/>
+    <a:lumOff val="20000"/>
+  </cs:variation>
+  <cs:variation>
+    <a:lumMod val="80000"/>
+  </cs:variation>
+  <cs:variation>
+    <a:lumMod val="60000"/>
+    <a:lumOff val="40000"/>
+  </cs:variation>
+  <cs:variation>
+    <a:lumMod val="50000"/>
+  </cs:variation>
+  <cs:variation>
+    <a:lumMod val="70000"/>
+    <a:lumOff val="30000"/>
+  </cs:variation>
+  <cs:variation>
+    <a:lumMod val="70000"/>
+  </cs:variation>
+  <cs:variation>
+    <a:lumMod val="50000"/>
+    <a:lumOff val="50000"/>
+  </cs:variation>
+</cs:colorStyle>
+</file>
+
+<file path=ppt/charts/colors2.xml><?xml version="1.0" encoding="utf-8"?>
 <cs:colorStyle xmlns:cs="http://schemas.microsoft.com/office/drawing/2012/chartStyle" xmlns:a="http://schemas.openxmlformats.org/drawingml/2006/main" meth="cycle" id="10">
   <a:schemeClr val="accent1"/>
   <a:schemeClr val="accent2"/>
@@ -1172,6 +1893,494 @@
 </cs:chartStyle>
 </file>
 
+<file path=ppt/charts/style2.xml><?xml version="1.0" encoding="utf-8"?>
+<cs:chartStyle xmlns:cs="http://schemas.microsoft.com/office/drawing/2012/chartStyle" xmlns:a="http://schemas.openxmlformats.org/drawingml/2006/main" id="211">
+  <cs:axisTitle>
+    <cs:lnRef idx="0"/>
+    <cs:fillRef idx="0"/>
+    <cs:effectRef idx="0"/>
+    <cs:fontRef idx="minor">
+      <a:schemeClr val="tx1">
+        <a:lumMod val="50000"/>
+        <a:lumOff val="50000"/>
+      </a:schemeClr>
+    </cs:fontRef>
+    <cs:defRPr sz="1197" kern="1200"/>
+  </cs:axisTitle>
+  <cs:categoryAxis>
+    <cs:lnRef idx="0"/>
+    <cs:fillRef idx="0"/>
+    <cs:effectRef idx="0"/>
+    <cs:fontRef idx="minor">
+      <a:schemeClr val="tx1">
+        <a:lumMod val="50000"/>
+        <a:lumOff val="50000"/>
+      </a:schemeClr>
+    </cs:fontRef>
+    <cs:defRPr sz="1197" kern="1200"/>
+  </cs:categoryAxis>
+  <cs:chartArea mods="allowNoFillOverride allowNoLineOverride">
+    <cs:lnRef idx="0"/>
+    <cs:fillRef idx="0"/>
+    <cs:effectRef idx="0"/>
+    <cs:fontRef idx="minor">
+      <a:schemeClr val="dk1"/>
+    </cs:fontRef>
+    <cs:spPr>
+      <a:solidFill>
+        <a:schemeClr val="bg1"/>
+      </a:solidFill>
+      <a:ln w="9525" cap="flat" cmpd="sng" algn="ctr">
+        <a:solidFill>
+          <a:schemeClr val="tx1">
+            <a:lumMod val="15000"/>
+            <a:lumOff val="85000"/>
+          </a:schemeClr>
+        </a:solidFill>
+        <a:round/>
+      </a:ln>
+    </cs:spPr>
+    <cs:defRPr sz="1197" kern="1200"/>
+  </cs:chartArea>
+  <cs:dataLabel>
+    <cs:lnRef idx="0"/>
+    <cs:fillRef idx="0"/>
+    <cs:effectRef idx="0"/>
+    <cs:fontRef idx="minor">
+      <a:schemeClr val="tx1">
+        <a:lumMod val="65000"/>
+        <a:lumOff val="35000"/>
+      </a:schemeClr>
+    </cs:fontRef>
+    <cs:defRPr sz="1197" kern="1200"/>
+  </cs:dataLabel>
+  <cs:dataLabelCallout>
+    <cs:lnRef idx="0"/>
+    <cs:fillRef idx="0"/>
+    <cs:effectRef idx="0"/>
+    <cs:fontRef idx="minor">
+      <a:schemeClr val="bg1"/>
+    </cs:fontRef>
+    <cs:spPr>
+      <a:solidFill>
+        <a:schemeClr val="tx1">
+          <a:lumMod val="35000"/>
+          <a:lumOff val="65000"/>
+        </a:schemeClr>
+      </a:solidFill>
+    </cs:spPr>
+    <cs:defRPr sz="1197"/>
+    <cs:bodyPr rot="0" spcFirstLastPara="1" vertOverflow="clip" horzOverflow="clip" vert="horz" wrap="square" lIns="36576" tIns="18288" rIns="36576" bIns="18288" anchor="ctr" anchorCtr="1">
+      <a:spAutoFit/>
+    </cs:bodyPr>
+  </cs:dataLabelCallout>
+  <cs:dataPoint>
+    <cs:lnRef idx="0">
+      <cs:styleClr val="auto"/>
+    </cs:lnRef>
+    <cs:fillRef idx="0"/>
+    <cs:effectRef idx="0"/>
+    <cs:fontRef idx="minor">
+      <a:schemeClr val="dk1"/>
+    </cs:fontRef>
+    <cs:spPr>
+      <a:noFill/>
+      <a:ln w="25400" cap="flat" cmpd="sng" algn="ctr">
+        <a:solidFill>
+          <a:schemeClr val="phClr"/>
+        </a:solidFill>
+        <a:miter lim="800000"/>
+      </a:ln>
+    </cs:spPr>
+  </cs:dataPoint>
+  <cs:dataPoint3D>
+    <cs:lnRef idx="0">
+      <cs:styleClr val="auto"/>
+    </cs:lnRef>
+    <cs:fillRef idx="0">
+      <cs:styleClr val="auto"/>
+    </cs:fillRef>
+    <cs:effectRef idx="0"/>
+    <cs:fontRef idx="minor">
+      <a:schemeClr val="dk1"/>
+    </cs:fontRef>
+    <cs:spPr>
+      <a:ln w="19050" cap="flat" cmpd="sng" algn="ctr">
+        <a:solidFill>
+          <a:schemeClr val="phClr"/>
+        </a:solidFill>
+        <a:miter lim="800000"/>
+      </a:ln>
+    </cs:spPr>
+  </cs:dataPoint3D>
+  <cs:dataPointLine>
+    <cs:lnRef idx="0">
+      <cs:styleClr val="auto"/>
+    </cs:lnRef>
+    <cs:fillRef idx="0"/>
+    <cs:effectRef idx="0"/>
+    <cs:fontRef idx="minor">
+      <a:schemeClr val="dk1"/>
+    </cs:fontRef>
+    <cs:spPr>
+      <a:ln w="28575" cap="rnd">
+        <a:solidFill>
+          <a:schemeClr val="phClr"/>
+        </a:solidFill>
+        <a:round/>
+      </a:ln>
+    </cs:spPr>
+  </cs:dataPointLine>
+  <cs:dataPointMarker>
+    <cs:lnRef idx="0">
+      <cs:styleClr val="auto"/>
+    </cs:lnRef>
+    <cs:fillRef idx="0">
+      <cs:styleClr val="auto"/>
+    </cs:fillRef>
+    <cs:effectRef idx="0"/>
+    <cs:fontRef idx="minor">
+      <a:schemeClr val="dk1"/>
+    </cs:fontRef>
+    <cs:spPr>
+      <a:ln w="19050" cap="rnd">
+        <a:solidFill>
+          <a:schemeClr val="phClr"/>
+        </a:solidFill>
+        <a:round/>
+      </a:ln>
+    </cs:spPr>
+  </cs:dataPointMarker>
+  <cs:dataPointMarkerLayout symbol="circle" size="6"/>
+  <cs:dataPointWireframe>
+    <cs:lnRef idx="0">
+      <cs:styleClr val="auto"/>
+    </cs:lnRef>
+    <cs:fillRef idx="1"/>
+    <cs:effectRef idx="0"/>
+    <cs:fontRef idx="minor">
+      <a:schemeClr val="tx1"/>
+    </cs:fontRef>
+    <cs:spPr>
+      <a:ln w="9525">
+        <a:solidFill>
+          <a:schemeClr val="phClr"/>
+        </a:solidFill>
+      </a:ln>
+    </cs:spPr>
+  </cs:dataPointWireframe>
+  <cs:dataTable>
+    <cs:lnRef idx="0"/>
+    <cs:fillRef idx="0"/>
+    <cs:effectRef idx="0"/>
+    <cs:fontRef idx="minor">
+      <a:schemeClr val="tx1">
+        <a:lumMod val="50000"/>
+        <a:lumOff val="50000"/>
+      </a:schemeClr>
+    </cs:fontRef>
+    <cs:spPr>
+      <a:ln w="9525">
+        <a:solidFill>
+          <a:schemeClr val="tx1">
+            <a:lumMod val="15000"/>
+            <a:lumOff val="85000"/>
+          </a:schemeClr>
+        </a:solidFill>
+      </a:ln>
+    </cs:spPr>
+    <cs:defRPr sz="1197" kern="1200"/>
+  </cs:dataTable>
+  <cs:downBar>
+    <cs:lnRef idx="0"/>
+    <cs:fillRef idx="0"/>
+    <cs:effectRef idx="0"/>
+    <cs:fontRef idx="minor">
+      <a:schemeClr val="dk1"/>
+    </cs:fontRef>
+    <cs:spPr>
+      <a:solidFill>
+        <a:schemeClr val="dk1">
+          <a:lumMod val="75000"/>
+          <a:lumOff val="25000"/>
+        </a:schemeClr>
+      </a:solidFill>
+      <a:ln w="9525" cap="flat" cmpd="sng" algn="ctr">
+        <a:solidFill>
+          <a:schemeClr val="tx1">
+            <a:lumMod val="50000"/>
+            <a:lumOff val="50000"/>
+          </a:schemeClr>
+        </a:solidFill>
+        <a:round/>
+      </a:ln>
+    </cs:spPr>
+  </cs:downBar>
+  <cs:dropLine>
+    <cs:lnRef idx="0"/>
+    <cs:fillRef idx="0"/>
+    <cs:effectRef idx="0"/>
+    <cs:fontRef idx="minor">
+      <a:schemeClr val="dk1"/>
+    </cs:fontRef>
+    <cs:spPr>
+      <a:ln w="9525" cap="flat" cmpd="sng" algn="ctr">
+        <a:solidFill>
+          <a:schemeClr val="tx1">
+            <a:lumMod val="35000"/>
+            <a:lumOff val="65000"/>
+          </a:schemeClr>
+        </a:solidFill>
+        <a:round/>
+      </a:ln>
+    </cs:spPr>
+  </cs:dropLine>
+  <cs:errorBar>
+    <cs:lnRef idx="0"/>
+    <cs:fillRef idx="0"/>
+    <cs:effectRef idx="0"/>
+    <cs:fontRef idx="minor">
+      <a:schemeClr val="dk1"/>
+    </cs:fontRef>
+    <cs:spPr>
+      <a:ln w="9525" cap="flat" cmpd="sng" algn="ctr">
+        <a:solidFill>
+          <a:schemeClr val="tx1">
+            <a:lumMod val="50000"/>
+            <a:lumOff val="50000"/>
+          </a:schemeClr>
+        </a:solidFill>
+        <a:round/>
+      </a:ln>
+    </cs:spPr>
+  </cs:errorBar>
+  <cs:floor>
+    <cs:lnRef idx="0"/>
+    <cs:fillRef idx="0"/>
+    <cs:effectRef idx="0"/>
+    <cs:fontRef idx="minor">
+      <a:schemeClr val="dk1"/>
+    </cs:fontRef>
+  </cs:floor>
+  <cs:gridlineMajor>
+    <cs:lnRef idx="0"/>
+    <cs:fillRef idx="0"/>
+    <cs:effectRef idx="0"/>
+    <cs:fontRef idx="minor">
+      <a:schemeClr val="dk1"/>
+    </cs:fontRef>
+    <cs:spPr>
+      <a:ln w="9525">
+        <a:solidFill>
+          <a:schemeClr val="tx1">
+            <a:lumMod val="15000"/>
+            <a:lumOff val="85000"/>
+          </a:schemeClr>
+        </a:solidFill>
+      </a:ln>
+    </cs:spPr>
+  </cs:gridlineMajor>
+  <cs:gridlineMinor>
+    <cs:lnRef idx="0"/>
+    <cs:fillRef idx="0"/>
+    <cs:effectRef idx="0"/>
+    <cs:fontRef idx="minor">
+      <a:schemeClr val="dk1"/>
+    </cs:fontRef>
+    <cs:spPr>
+      <a:ln w="9525">
+        <a:solidFill>
+          <a:schemeClr val="tx1">
+            <a:lumMod val="5000"/>
+            <a:lumOff val="95000"/>
+          </a:schemeClr>
+        </a:solidFill>
+      </a:ln>
+    </cs:spPr>
+  </cs:gridlineMinor>
+  <cs:hiLoLine>
+    <cs:lnRef idx="0"/>
+    <cs:fillRef idx="0"/>
+    <cs:effectRef idx="0"/>
+    <cs:fontRef idx="minor">
+      <a:schemeClr val="dk1"/>
+    </cs:fontRef>
+    <cs:spPr>
+      <a:ln w="9525" cap="flat" cmpd="sng" algn="ctr">
+        <a:solidFill>
+          <a:schemeClr val="tx1">
+            <a:lumMod val="35000"/>
+            <a:lumOff val="65000"/>
+          </a:schemeClr>
+        </a:solidFill>
+        <a:round/>
+      </a:ln>
+    </cs:spPr>
+  </cs:hiLoLine>
+  <cs:leaderLine>
+    <cs:lnRef idx="0"/>
+    <cs:fillRef idx="0"/>
+    <cs:effectRef idx="0"/>
+    <cs:fontRef idx="minor">
+      <a:schemeClr val="dk1"/>
+    </cs:fontRef>
+    <cs:spPr>
+      <a:ln w="9525" cap="flat" cmpd="sng" algn="ctr">
+        <a:solidFill>
+          <a:schemeClr val="tx1">
+            <a:lumMod val="35000"/>
+            <a:lumOff val="65000"/>
+          </a:schemeClr>
+        </a:solidFill>
+        <a:round/>
+      </a:ln>
+    </cs:spPr>
+  </cs:leaderLine>
+  <cs:legend>
+    <cs:lnRef idx="0"/>
+    <cs:fillRef idx="0"/>
+    <cs:effectRef idx="0"/>
+    <cs:fontRef idx="minor">
+      <a:schemeClr val="tx1">
+        <a:lumMod val="50000"/>
+        <a:lumOff val="50000"/>
+      </a:schemeClr>
+    </cs:fontRef>
+    <cs:defRPr sz="1197" kern="1200"/>
+  </cs:legend>
+  <cs:plotArea mods="allowNoFillOverride allowNoLineOverride">
+    <cs:lnRef idx="0"/>
+    <cs:fillRef idx="0"/>
+    <cs:effectRef idx="0"/>
+    <cs:fontRef idx="minor">
+      <a:schemeClr val="dk1"/>
+    </cs:fontRef>
+  </cs:plotArea>
+  <cs:plotArea3D mods="allowNoFillOverride allowNoLineOverride">
+    <cs:lnRef idx="0"/>
+    <cs:fillRef idx="0"/>
+    <cs:effectRef idx="0"/>
+    <cs:fontRef idx="minor">
+      <a:schemeClr val="dk1"/>
+    </cs:fontRef>
+  </cs:plotArea3D>
+  <cs:seriesAxis>
+    <cs:lnRef idx="0"/>
+    <cs:fillRef idx="0"/>
+    <cs:effectRef idx="0"/>
+    <cs:fontRef idx="minor">
+      <a:schemeClr val="tx1">
+        <a:lumMod val="50000"/>
+        <a:lumOff val="50000"/>
+      </a:schemeClr>
+    </cs:fontRef>
+    <cs:defRPr sz="1197" kern="1200"/>
+  </cs:seriesAxis>
+  <cs:seriesLine>
+    <cs:lnRef idx="0"/>
+    <cs:fillRef idx="0"/>
+    <cs:effectRef idx="0"/>
+    <cs:fontRef idx="minor">
+      <a:schemeClr val="dk1"/>
+    </cs:fontRef>
+    <cs:spPr>
+      <a:ln w="9525" cap="flat" cmpd="sng" algn="ctr">
+        <a:solidFill>
+          <a:schemeClr val="tx1">
+            <a:lumMod val="35000"/>
+            <a:lumOff val="65000"/>
+          </a:schemeClr>
+        </a:solidFill>
+        <a:round/>
+      </a:ln>
+    </cs:spPr>
+  </cs:seriesLine>
+  <cs:title>
+    <cs:lnRef idx="0"/>
+    <cs:fillRef idx="0"/>
+    <cs:effectRef idx="0"/>
+    <cs:fontRef idx="minor">
+      <a:schemeClr val="tx1">
+        <a:lumMod val="65000"/>
+        <a:lumOff val="35000"/>
+      </a:schemeClr>
+    </cs:fontRef>
+    <cs:defRPr sz="2200" b="0" kern="1200" cap="none" spc="50" baseline="0"/>
+  </cs:title>
+  <cs:trendline>
+    <cs:lnRef idx="0">
+      <cs:styleClr val="auto"/>
+    </cs:lnRef>
+    <cs:fillRef idx="0"/>
+    <cs:effectRef idx="0"/>
+    <cs:fontRef idx="minor">
+      <a:schemeClr val="dk1"/>
+    </cs:fontRef>
+    <cs:spPr>
+      <a:ln w="19050" cap="rnd">
+        <a:solidFill>
+          <a:schemeClr val="phClr"/>
+        </a:solidFill>
+      </a:ln>
+    </cs:spPr>
+  </cs:trendline>
+  <cs:trendlineLabel>
+    <cs:lnRef idx="0"/>
+    <cs:fillRef idx="0"/>
+    <cs:effectRef idx="0"/>
+    <cs:fontRef idx="minor">
+      <a:schemeClr val="tx1">
+        <a:lumMod val="50000"/>
+        <a:lumOff val="50000"/>
+      </a:schemeClr>
+    </cs:fontRef>
+    <cs:defRPr sz="1197" kern="1200"/>
+  </cs:trendlineLabel>
+  <cs:upBar>
+    <cs:lnRef idx="0"/>
+    <cs:fillRef idx="0"/>
+    <cs:effectRef idx="0"/>
+    <cs:fontRef idx="minor">
+      <a:schemeClr val="dk1"/>
+    </cs:fontRef>
+    <cs:spPr>
+      <a:solidFill>
+        <a:schemeClr val="lt1"/>
+      </a:solidFill>
+      <a:ln w="9525" cap="flat" cmpd="sng" algn="ctr">
+        <a:solidFill>
+          <a:schemeClr val="tx1">
+            <a:lumMod val="50000"/>
+            <a:lumOff val="50000"/>
+          </a:schemeClr>
+        </a:solidFill>
+        <a:round/>
+      </a:ln>
+    </cs:spPr>
+  </cs:upBar>
+  <cs:valueAxis>
+    <cs:lnRef idx="0"/>
+    <cs:fillRef idx="0"/>
+    <cs:effectRef idx="0"/>
+    <cs:fontRef idx="minor">
+      <a:schemeClr val="tx1">
+        <a:lumMod val="50000"/>
+        <a:lumOff val="50000"/>
+      </a:schemeClr>
+    </cs:fontRef>
+    <cs:defRPr sz="1197" kern="1200"/>
+  </cs:valueAxis>
+  <cs:wall>
+    <cs:lnRef idx="0"/>
+    <cs:fillRef idx="0"/>
+    <cs:effectRef idx="0"/>
+    <cs:fontRef idx="minor">
+      <a:schemeClr val="dk1"/>
+    </cs:fontRef>
+  </cs:wall>
+</cs:chartStyle>
+</file>
+
 <file path=ppt/handoutMasters/handoutMaster1.xml><?xml version="1.0" encoding="utf-8"?>
 <p:handoutMaster xmlns:a="http://schemas.openxmlformats.org/drawingml/2006/main" xmlns:r="http://schemas.openxmlformats.org/officeDocument/2006/relationships" xmlns:p="http://schemas.openxmlformats.org/presentationml/2006/main">
   <p:cSld>
@@ -1256,7 +2465,7 @@
             <a:pPr algn="r" rtl="0"/>
             <a:fld id="{221A1788-7372-4FAC-9AF0-00B54B8D9CBA}" type="datetime1">
               <a:rPr lang="it-IT" smtClean="0"/>
-              <a:t>03/04/2023</a:t>
+              <a:t>08/04/2023</a:t>
             </a:fld>
             <a:endParaRPr lang="it-IT" dirty="0"/>
           </a:p>
@@ -1426,7 +2635,7 @@
             <a:fld id="{D943A304-85CD-4257-B418-D8F889FE0DBC}" type="datetime1">
               <a:rPr lang="it-IT" smtClean="0"/>
               <a:pPr/>
-              <a:t>03/04/2023</a:t>
+              <a:t>08/04/2023</a:t>
             </a:fld>
             <a:endParaRPr lang="it-IT" dirty="0"/>
           </a:p>
@@ -3340,10 +4549,7 @@
           <a:bodyPr/>
           <a:lstStyle/>
           <a:p>
-            <a:r>
-              <a:rPr lang="it-IT" dirty="0"/>
-              <a:t>La libreria che abbiamo utilizzato per fare Content è stata Spacy.</a:t>
-            </a:r>
+            <a:endParaRPr lang="it-IT" dirty="0"/>
           </a:p>
         </p:txBody>
       </p:sp>
@@ -3374,7 +4580,7 @@
     </p:spTree>
     <p:extLst>
       <p:ext uri="{BB962C8B-B14F-4D97-AF65-F5344CB8AC3E}">
-        <p14:creationId xmlns:p14="http://schemas.microsoft.com/office/powerpoint/2010/main" val="2929649750"/>
+        <p14:creationId xmlns:p14="http://schemas.microsoft.com/office/powerpoint/2010/main" val="1690919873"/>
       </p:ext>
     </p:extLst>
   </p:cSld>
@@ -3462,7 +4668,7 @@
     </p:spTree>
     <p:extLst>
       <p:ext uri="{BB962C8B-B14F-4D97-AF65-F5344CB8AC3E}">
-        <p14:creationId xmlns:p14="http://schemas.microsoft.com/office/powerpoint/2010/main" val="2906118524"/>
+        <p14:creationId xmlns:p14="http://schemas.microsoft.com/office/powerpoint/2010/main" val="2929649750"/>
       </p:ext>
     </p:extLst>
   </p:cSld>
@@ -3516,7 +4722,10 @@
           <a:bodyPr/>
           <a:lstStyle/>
           <a:p>
-            <a:endParaRPr lang="it-IT" dirty="0"/>
+            <a:r>
+              <a:rPr lang="it-IT" dirty="0"/>
+              <a:t>Che, come visto in precedenza, si sono rivelate essere le parole maggiormente presenti nel dataset.</a:t>
+            </a:r>
           </a:p>
         </p:txBody>
       </p:sp>
@@ -3547,7 +4756,213 @@
     </p:spTree>
     <p:extLst>
       <p:ext uri="{BB962C8B-B14F-4D97-AF65-F5344CB8AC3E}">
-        <p14:creationId xmlns:p14="http://schemas.microsoft.com/office/powerpoint/2010/main" val="2755364451"/>
+        <p14:creationId xmlns:p14="http://schemas.microsoft.com/office/powerpoint/2010/main" val="3825225783"/>
+      </p:ext>
+    </p:extLst>
+  </p:cSld>
+  <p:clrMapOvr>
+    <a:masterClrMapping/>
+  </p:clrMapOvr>
+</p:notes>
+</file>
+
+<file path=ppt/notesSlides/notesSlide28.xml><?xml version="1.0" encoding="utf-8"?>
+<p:notes xmlns:a="http://schemas.openxmlformats.org/drawingml/2006/main" xmlns:r="http://schemas.openxmlformats.org/officeDocument/2006/relationships" xmlns:p="http://schemas.openxmlformats.org/presentationml/2006/main">
+  <p:cSld>
+    <p:spTree>
+      <p:nvGrpSpPr>
+        <p:cNvPr id="1" name=""/>
+        <p:cNvGrpSpPr/>
+        <p:nvPr/>
+      </p:nvGrpSpPr>
+      <p:grpSpPr>
+        <a:xfrm>
+          <a:off x="0" y="0"/>
+          <a:ext cx="0" cy="0"/>
+          <a:chOff x="0" y="0"/>
+          <a:chExt cx="0" cy="0"/>
+        </a:xfrm>
+      </p:grpSpPr>
+      <p:sp>
+        <p:nvSpPr>
+          <p:cNvPr id="2" name="Segnaposto immagine diapositiva 1"/>
+          <p:cNvSpPr>
+            <a:spLocks noGrp="1" noRot="1" noChangeAspect="1"/>
+          </p:cNvSpPr>
+          <p:nvPr>
+            <p:ph type="sldImg"/>
+          </p:nvPr>
+        </p:nvSpPr>
+        <p:spPr/>
+      </p:sp>
+      <p:sp>
+        <p:nvSpPr>
+          <p:cNvPr id="3" name="Segnaposto note 2"/>
+          <p:cNvSpPr>
+            <a:spLocks noGrp="1"/>
+          </p:cNvSpPr>
+          <p:nvPr>
+            <p:ph type="body" idx="1"/>
+          </p:nvPr>
+        </p:nvSpPr>
+        <p:spPr/>
+        <p:txBody>
+          <a:bodyPr/>
+          <a:lstStyle/>
+          <a:p>
+            <a:r>
+              <a:rPr lang="it-IT" dirty="0"/>
+              <a:t>NOVAVAX = VACCINO AMERICANO</a:t>
+            </a:r>
+          </a:p>
+          <a:p>
+            <a:r>
+              <a:rPr lang="it-IT" dirty="0"/>
+              <a:t>SPUTNIK = VACCINO RUSSO</a:t>
+            </a:r>
+          </a:p>
+          <a:p>
+            <a:endParaRPr lang="it-IT" dirty="0"/>
+          </a:p>
+          <a:p>
+            <a:r>
+              <a:rPr lang="it-IT" dirty="0"/>
+              <a:t>USA &gt; RUSSIA	Fonte: Americano Medio</a:t>
+            </a:r>
+          </a:p>
+        </p:txBody>
+      </p:sp>
+      <p:sp>
+        <p:nvSpPr>
+          <p:cNvPr id="4" name="Segnaposto numero diapositiva 3"/>
+          <p:cNvSpPr>
+            <a:spLocks noGrp="1"/>
+          </p:cNvSpPr>
+          <p:nvPr>
+            <p:ph type="sldNum" sz="quarter" idx="10"/>
+          </p:nvPr>
+        </p:nvSpPr>
+        <p:spPr/>
+        <p:txBody>
+          <a:bodyPr/>
+          <a:lstStyle/>
+          <a:p>
+            <a:fld id="{3EBA5BD7-F043-4D1B-AA17-CD412FC534DE}" type="slidenum">
+              <a:rPr lang="it-IT" smtClean="0"/>
+              <a:pPr/>
+              <a:t>28</a:t>
+            </a:fld>
+            <a:endParaRPr lang="it-IT" dirty="0"/>
+          </a:p>
+        </p:txBody>
+      </p:sp>
+    </p:spTree>
+    <p:extLst>
+      <p:ext uri="{BB962C8B-B14F-4D97-AF65-F5344CB8AC3E}">
+        <p14:creationId xmlns:p14="http://schemas.microsoft.com/office/powerpoint/2010/main" val="2437957834"/>
+      </p:ext>
+    </p:extLst>
+  </p:cSld>
+  <p:clrMapOvr>
+    <a:masterClrMapping/>
+  </p:clrMapOvr>
+</p:notes>
+</file>
+
+<file path=ppt/notesSlides/notesSlide29.xml><?xml version="1.0" encoding="utf-8"?>
+<p:notes xmlns:a="http://schemas.openxmlformats.org/drawingml/2006/main" xmlns:r="http://schemas.openxmlformats.org/officeDocument/2006/relationships" xmlns:p="http://schemas.openxmlformats.org/presentationml/2006/main">
+  <p:cSld>
+    <p:spTree>
+      <p:nvGrpSpPr>
+        <p:cNvPr id="1" name=""/>
+        <p:cNvGrpSpPr/>
+        <p:nvPr/>
+      </p:nvGrpSpPr>
+      <p:grpSpPr>
+        <a:xfrm>
+          <a:off x="0" y="0"/>
+          <a:ext cx="0" cy="0"/>
+          <a:chOff x="0" y="0"/>
+          <a:chExt cx="0" cy="0"/>
+        </a:xfrm>
+      </p:grpSpPr>
+      <p:sp>
+        <p:nvSpPr>
+          <p:cNvPr id="2" name="Segnaposto immagine diapositiva 1"/>
+          <p:cNvSpPr>
+            <a:spLocks noGrp="1" noRot="1" noChangeAspect="1"/>
+          </p:cNvSpPr>
+          <p:nvPr>
+            <p:ph type="sldImg"/>
+          </p:nvPr>
+        </p:nvSpPr>
+        <p:spPr/>
+      </p:sp>
+      <p:sp>
+        <p:nvSpPr>
+          <p:cNvPr id="3" name="Segnaposto note 2"/>
+          <p:cNvSpPr>
+            <a:spLocks noGrp="1"/>
+          </p:cNvSpPr>
+          <p:nvPr>
+            <p:ph type="body" idx="1"/>
+          </p:nvPr>
+        </p:nvSpPr>
+        <p:spPr/>
+        <p:txBody>
+          <a:bodyPr/>
+          <a:lstStyle/>
+          <a:p>
+            <a:r>
+              <a:rPr lang="it-IT" dirty="0"/>
+              <a:t>NOVAVAX = VACCINO AMERICANO</a:t>
+            </a:r>
+          </a:p>
+          <a:p>
+            <a:r>
+              <a:rPr lang="it-IT" dirty="0"/>
+              <a:t>SPUTNIK = VACCINO RUSSO</a:t>
+            </a:r>
+          </a:p>
+          <a:p>
+            <a:endParaRPr lang="it-IT" dirty="0"/>
+          </a:p>
+          <a:p>
+            <a:r>
+              <a:rPr lang="it-IT" dirty="0"/>
+              <a:t>USA &gt; RUSSIA	Fonte: Americano Medio</a:t>
+            </a:r>
+          </a:p>
+        </p:txBody>
+      </p:sp>
+      <p:sp>
+        <p:nvSpPr>
+          <p:cNvPr id="4" name="Segnaposto numero diapositiva 3"/>
+          <p:cNvSpPr>
+            <a:spLocks noGrp="1"/>
+          </p:cNvSpPr>
+          <p:nvPr>
+            <p:ph type="sldNum" sz="quarter" idx="10"/>
+          </p:nvPr>
+        </p:nvSpPr>
+        <p:spPr/>
+        <p:txBody>
+          <a:bodyPr/>
+          <a:lstStyle/>
+          <a:p>
+            <a:fld id="{3EBA5BD7-F043-4D1B-AA17-CD412FC534DE}" type="slidenum">
+              <a:rPr lang="it-IT" smtClean="0"/>
+              <a:pPr/>
+              <a:t>29</a:t>
+            </a:fld>
+            <a:endParaRPr lang="it-IT" dirty="0"/>
+          </a:p>
+        </p:txBody>
+      </p:sp>
+    </p:spTree>
+    <p:extLst>
+      <p:ext uri="{BB962C8B-B14F-4D97-AF65-F5344CB8AC3E}">
+        <p14:creationId xmlns:p14="http://schemas.microsoft.com/office/powerpoint/2010/main" val="4181863047"/>
       </p:ext>
     </p:extLst>
   </p:cSld>
@@ -3633,6 +5048,267 @@
     <p:extLst>
       <p:ext uri="{BB962C8B-B14F-4D97-AF65-F5344CB8AC3E}">
         <p14:creationId xmlns:p14="http://schemas.microsoft.com/office/powerpoint/2010/main" val="1211861910"/>
+      </p:ext>
+    </p:extLst>
+  </p:cSld>
+  <p:clrMapOvr>
+    <a:masterClrMapping/>
+  </p:clrMapOvr>
+</p:notes>
+</file>
+
+<file path=ppt/notesSlides/notesSlide30.xml><?xml version="1.0" encoding="utf-8"?>
+<p:notes xmlns:a="http://schemas.openxmlformats.org/drawingml/2006/main" xmlns:r="http://schemas.openxmlformats.org/officeDocument/2006/relationships" xmlns:p="http://schemas.openxmlformats.org/presentationml/2006/main">
+  <p:cSld>
+    <p:spTree>
+      <p:nvGrpSpPr>
+        <p:cNvPr id="1" name=""/>
+        <p:cNvGrpSpPr/>
+        <p:nvPr/>
+      </p:nvGrpSpPr>
+      <p:grpSpPr>
+        <a:xfrm>
+          <a:off x="0" y="0"/>
+          <a:ext cx="0" cy="0"/>
+          <a:chOff x="0" y="0"/>
+          <a:chExt cx="0" cy="0"/>
+        </a:xfrm>
+      </p:grpSpPr>
+      <p:sp>
+        <p:nvSpPr>
+          <p:cNvPr id="2" name="Segnaposto immagine diapositiva 1"/>
+          <p:cNvSpPr>
+            <a:spLocks noGrp="1" noRot="1" noChangeAspect="1"/>
+          </p:cNvSpPr>
+          <p:nvPr>
+            <p:ph type="sldImg"/>
+          </p:nvPr>
+        </p:nvSpPr>
+        <p:spPr/>
+      </p:sp>
+      <p:sp>
+        <p:nvSpPr>
+          <p:cNvPr id="3" name="Segnaposto note 2"/>
+          <p:cNvSpPr>
+            <a:spLocks noGrp="1"/>
+          </p:cNvSpPr>
+          <p:nvPr>
+            <p:ph type="body" idx="1"/>
+          </p:nvPr>
+        </p:nvSpPr>
+        <p:spPr/>
+        <p:txBody>
+          <a:bodyPr/>
+          <a:lstStyle/>
+          <a:p>
+            <a:r>
+              <a:rPr lang="it-IT" dirty="0"/>
+              <a:t>La libreria che abbiamo utilizzato per fare Content è stata Spacy.</a:t>
+            </a:r>
+          </a:p>
+        </p:txBody>
+      </p:sp>
+      <p:sp>
+        <p:nvSpPr>
+          <p:cNvPr id="4" name="Segnaposto numero diapositiva 3"/>
+          <p:cNvSpPr>
+            <a:spLocks noGrp="1"/>
+          </p:cNvSpPr>
+          <p:nvPr>
+            <p:ph type="sldNum" sz="quarter" idx="10"/>
+          </p:nvPr>
+        </p:nvSpPr>
+        <p:spPr/>
+        <p:txBody>
+          <a:bodyPr/>
+          <a:lstStyle/>
+          <a:p>
+            <a:fld id="{3EBA5BD7-F043-4D1B-AA17-CD412FC534DE}" type="slidenum">
+              <a:rPr lang="it-IT" smtClean="0"/>
+              <a:pPr/>
+              <a:t>30</a:t>
+            </a:fld>
+            <a:endParaRPr lang="it-IT" dirty="0"/>
+          </a:p>
+        </p:txBody>
+      </p:sp>
+    </p:spTree>
+    <p:extLst>
+      <p:ext uri="{BB962C8B-B14F-4D97-AF65-F5344CB8AC3E}">
+        <p14:creationId xmlns:p14="http://schemas.microsoft.com/office/powerpoint/2010/main" val="3958588607"/>
+      </p:ext>
+    </p:extLst>
+  </p:cSld>
+  <p:clrMapOvr>
+    <a:masterClrMapping/>
+  </p:clrMapOvr>
+</p:notes>
+</file>
+
+<file path=ppt/notesSlides/notesSlide31.xml><?xml version="1.0" encoding="utf-8"?>
+<p:notes xmlns:a="http://schemas.openxmlformats.org/drawingml/2006/main" xmlns:r="http://schemas.openxmlformats.org/officeDocument/2006/relationships" xmlns:p="http://schemas.openxmlformats.org/presentationml/2006/main">
+  <p:cSld>
+    <p:spTree>
+      <p:nvGrpSpPr>
+        <p:cNvPr id="1" name=""/>
+        <p:cNvGrpSpPr/>
+        <p:nvPr/>
+      </p:nvGrpSpPr>
+      <p:grpSpPr>
+        <a:xfrm>
+          <a:off x="0" y="0"/>
+          <a:ext cx="0" cy="0"/>
+          <a:chOff x="0" y="0"/>
+          <a:chExt cx="0" cy="0"/>
+        </a:xfrm>
+      </p:grpSpPr>
+      <p:sp>
+        <p:nvSpPr>
+          <p:cNvPr id="2" name="Segnaposto immagine diapositiva 1"/>
+          <p:cNvSpPr>
+            <a:spLocks noGrp="1" noRot="1" noChangeAspect="1"/>
+          </p:cNvSpPr>
+          <p:nvPr>
+            <p:ph type="sldImg"/>
+          </p:nvPr>
+        </p:nvSpPr>
+        <p:spPr/>
+      </p:sp>
+      <p:sp>
+        <p:nvSpPr>
+          <p:cNvPr id="3" name="Segnaposto note 2"/>
+          <p:cNvSpPr>
+            <a:spLocks noGrp="1"/>
+          </p:cNvSpPr>
+          <p:nvPr>
+            <p:ph type="body" idx="1"/>
+          </p:nvPr>
+        </p:nvSpPr>
+        <p:spPr/>
+        <p:txBody>
+          <a:bodyPr/>
+          <a:lstStyle/>
+          <a:p>
+            <a:r>
+              <a:rPr lang="it-IT" dirty="0"/>
+              <a:t>La libreria che abbiamo utilizzato per fare Content è stata Spacy.</a:t>
+            </a:r>
+          </a:p>
+        </p:txBody>
+      </p:sp>
+      <p:sp>
+        <p:nvSpPr>
+          <p:cNvPr id="4" name="Segnaposto numero diapositiva 3"/>
+          <p:cNvSpPr>
+            <a:spLocks noGrp="1"/>
+          </p:cNvSpPr>
+          <p:nvPr>
+            <p:ph type="sldNum" sz="quarter" idx="10"/>
+          </p:nvPr>
+        </p:nvSpPr>
+        <p:spPr/>
+        <p:txBody>
+          <a:bodyPr/>
+          <a:lstStyle/>
+          <a:p>
+            <a:fld id="{3EBA5BD7-F043-4D1B-AA17-CD412FC534DE}" type="slidenum">
+              <a:rPr lang="it-IT" smtClean="0"/>
+              <a:pPr/>
+              <a:t>31</a:t>
+            </a:fld>
+            <a:endParaRPr lang="it-IT" dirty="0"/>
+          </a:p>
+        </p:txBody>
+      </p:sp>
+    </p:spTree>
+    <p:extLst>
+      <p:ext uri="{BB962C8B-B14F-4D97-AF65-F5344CB8AC3E}">
+        <p14:creationId xmlns:p14="http://schemas.microsoft.com/office/powerpoint/2010/main" val="2906118524"/>
+      </p:ext>
+    </p:extLst>
+  </p:cSld>
+  <p:clrMapOvr>
+    <a:masterClrMapping/>
+  </p:clrMapOvr>
+</p:notes>
+</file>
+
+<file path=ppt/notesSlides/notesSlide32.xml><?xml version="1.0" encoding="utf-8"?>
+<p:notes xmlns:a="http://schemas.openxmlformats.org/drawingml/2006/main" xmlns:r="http://schemas.openxmlformats.org/officeDocument/2006/relationships" xmlns:p="http://schemas.openxmlformats.org/presentationml/2006/main">
+  <p:cSld>
+    <p:spTree>
+      <p:nvGrpSpPr>
+        <p:cNvPr id="1" name=""/>
+        <p:cNvGrpSpPr/>
+        <p:nvPr/>
+      </p:nvGrpSpPr>
+      <p:grpSpPr>
+        <a:xfrm>
+          <a:off x="0" y="0"/>
+          <a:ext cx="0" cy="0"/>
+          <a:chOff x="0" y="0"/>
+          <a:chExt cx="0" cy="0"/>
+        </a:xfrm>
+      </p:grpSpPr>
+      <p:sp>
+        <p:nvSpPr>
+          <p:cNvPr id="2" name="Segnaposto immagine diapositiva 1"/>
+          <p:cNvSpPr>
+            <a:spLocks noGrp="1" noRot="1" noChangeAspect="1"/>
+          </p:cNvSpPr>
+          <p:nvPr>
+            <p:ph type="sldImg"/>
+          </p:nvPr>
+        </p:nvSpPr>
+        <p:spPr/>
+      </p:sp>
+      <p:sp>
+        <p:nvSpPr>
+          <p:cNvPr id="3" name="Segnaposto note 2"/>
+          <p:cNvSpPr>
+            <a:spLocks noGrp="1"/>
+          </p:cNvSpPr>
+          <p:nvPr>
+            <p:ph type="body" idx="1"/>
+          </p:nvPr>
+        </p:nvSpPr>
+        <p:spPr/>
+        <p:txBody>
+          <a:bodyPr/>
+          <a:lstStyle/>
+          <a:p>
+            <a:endParaRPr lang="it-IT" dirty="0"/>
+          </a:p>
+        </p:txBody>
+      </p:sp>
+      <p:sp>
+        <p:nvSpPr>
+          <p:cNvPr id="4" name="Segnaposto numero diapositiva 3"/>
+          <p:cNvSpPr>
+            <a:spLocks noGrp="1"/>
+          </p:cNvSpPr>
+          <p:nvPr>
+            <p:ph type="sldNum" sz="quarter" idx="10"/>
+          </p:nvPr>
+        </p:nvSpPr>
+        <p:spPr/>
+        <p:txBody>
+          <a:bodyPr/>
+          <a:lstStyle/>
+          <a:p>
+            <a:fld id="{3EBA5BD7-F043-4D1B-AA17-CD412FC534DE}" type="slidenum">
+              <a:rPr lang="it-IT" smtClean="0"/>
+              <a:pPr/>
+              <a:t>32</a:t>
+            </a:fld>
+            <a:endParaRPr lang="it-IT" dirty="0"/>
+          </a:p>
+        </p:txBody>
+      </p:sp>
+    </p:spTree>
+    <p:extLst>
+      <p:ext uri="{BB962C8B-B14F-4D97-AF65-F5344CB8AC3E}">
+        <p14:creationId xmlns:p14="http://schemas.microsoft.com/office/powerpoint/2010/main" val="2755364451"/>
       </p:ext>
     </p:extLst>
   </p:cSld>
@@ -4972,7 +6648,7 @@
             <a:fld id="{3889EF9B-A500-41B6-8F1C-893813E9A898}" type="datetime1">
               <a:rPr lang="it-IT" smtClean="0"/>
               <a:pPr/>
-              <a:t>03/04/2023</a:t>
+              <a:t>08/04/2023</a:t>
             </a:fld>
             <a:endParaRPr lang="it-IT" dirty="0"/>
           </a:p>
@@ -5178,7 +6854,7 @@
             <a:fld id="{6E724BBD-5BEA-4971-A6C4-42E94AF7CB5F}" type="datetime1">
               <a:rPr lang="it-IT" smtClean="0"/>
               <a:pPr/>
-              <a:t>03/04/2023</a:t>
+              <a:t>08/04/2023</a:t>
             </a:fld>
             <a:endParaRPr lang="it-IT" dirty="0"/>
           </a:p>
@@ -5394,7 +7070,7 @@
             <a:fld id="{EF1B2188-7D8C-43C8-B29F-60D01DE77B72}" type="datetime1">
               <a:rPr lang="it-IT" smtClean="0"/>
               <a:pPr/>
-              <a:t>03/04/2023</a:t>
+              <a:t>08/04/2023</a:t>
             </a:fld>
             <a:endParaRPr lang="it-IT" dirty="0"/>
           </a:p>
@@ -5600,7 +7276,7 @@
             <a:fld id="{581DC961-63CE-49AB-921E-1CE3DDEFC80A}" type="datetime1">
               <a:rPr lang="it-IT" smtClean="0"/>
               <a:pPr/>
-              <a:t>03/04/2023</a:t>
+              <a:t>08/04/2023</a:t>
             </a:fld>
             <a:endParaRPr lang="it-IT" dirty="0"/>
           </a:p>
@@ -6044,7 +7720,7 @@
             <a:fld id="{C6066F5F-3C86-4285-A86F-35EFBBDD7800}" type="datetime1">
               <a:rPr lang="it-IT" smtClean="0"/>
               <a:pPr/>
-              <a:t>03/04/2023</a:t>
+              <a:t>08/04/2023</a:t>
             </a:fld>
             <a:endParaRPr lang="it-IT" dirty="0"/>
           </a:p>
@@ -6356,7 +8032,7 @@
             <a:fld id="{0B9BE34E-14EC-4041-A597-EE22FC16794F}" type="datetime1">
               <a:rPr lang="it-IT" smtClean="0"/>
               <a:pPr/>
-              <a:t>03/04/2023</a:t>
+              <a:t>08/04/2023</a:t>
             </a:fld>
             <a:endParaRPr lang="it-IT" dirty="0"/>
           </a:p>
@@ -6820,7 +8496,7 @@
             <a:fld id="{D6FAD192-1BF7-4994-9CBA-74265F19F4C1}" type="datetime1">
               <a:rPr lang="it-IT" smtClean="0"/>
               <a:pPr/>
-              <a:t>03/04/2023</a:t>
+              <a:t>08/04/2023</a:t>
             </a:fld>
             <a:endParaRPr lang="it-IT" dirty="0"/>
           </a:p>
@@ -6958,7 +8634,7 @@
             <a:fld id="{C476DD40-7EBA-46D0-A855-62759524AC7A}" type="datetime1">
               <a:rPr lang="it-IT" smtClean="0"/>
               <a:pPr/>
-              <a:t>03/04/2023</a:t>
+              <a:t>08/04/2023</a:t>
             </a:fld>
             <a:endParaRPr lang="it-IT" dirty="0"/>
           </a:p>
@@ -7072,7 +8748,7 @@
             <a:fld id="{C62E4D95-88E1-4556-89BE-EC650C1D14A8}" type="datetime1">
               <a:rPr lang="it-IT" smtClean="0"/>
               <a:pPr/>
-              <a:t>03/04/2023</a:t>
+              <a:t>08/04/2023</a:t>
             </a:fld>
             <a:endParaRPr lang="it-IT" dirty="0"/>
           </a:p>
@@ -7379,7 +9055,7 @@
             <a:fld id="{1F9867D3-FC26-40B1-8BB9-B19FF8D6CD45}" type="datetime1">
               <a:rPr lang="it-IT" smtClean="0"/>
               <a:pPr/>
-              <a:t>03/04/2023</a:t>
+              <a:t>08/04/2023</a:t>
             </a:fld>
             <a:endParaRPr lang="it-IT" dirty="0"/>
           </a:p>
@@ -7676,7 +9352,7 @@
             <a:fld id="{5B0EE21F-92EE-4289-AFFB-9252D957F459}" type="datetime1">
               <a:rPr lang="it-IT" smtClean="0"/>
               <a:pPr/>
-              <a:t>03/04/2023</a:t>
+              <a:t>08/04/2023</a:t>
             </a:fld>
             <a:endParaRPr lang="it-IT" dirty="0"/>
           </a:p>
@@ -8300,7 +9976,7 @@
             <a:fld id="{8A756645-DD8C-4009-9A84-A4AD56EB55A9}" type="datetime1">
               <a:rPr lang="it-IT" smtClean="0"/>
               <a:pPr/>
-              <a:t>03/04/2023</a:t>
+              <a:t>08/04/2023</a:t>
             </a:fld>
             <a:endParaRPr lang="it-IT" dirty="0"/>
           </a:p>
@@ -11103,7 +12779,7 @@
         <p:spPr/>
         <p:txBody>
           <a:bodyPr numCol="2" rtlCol="0">
-            <a:normAutofit/>
+            <a:normAutofit lnSpcReduction="10000"/>
           </a:bodyPr>
           <a:lstStyle/>
           <a:p>
@@ -11118,7 +12794,7 @@
               <a:buAutoNum type="arabicPeriod"/>
             </a:pPr>
             <a:r>
-              <a:rPr lang="it-IT" sz="3000" dirty="0"/>
+              <a:rPr lang="it-IT" sz="3600" dirty="0"/>
               <a:t>Vaccine</a:t>
             </a:r>
           </a:p>
@@ -11128,7 +12804,7 @@
               <a:buAutoNum type="arabicPeriod"/>
             </a:pPr>
             <a:r>
-              <a:rPr lang="it-IT" sz="3000" dirty="0"/>
+              <a:rPr lang="it-IT" sz="3600" dirty="0"/>
               <a:t>Moderna</a:t>
             </a:r>
           </a:p>
@@ -11138,8 +12814,8 @@
               <a:buAutoNum type="arabicPeriod"/>
             </a:pPr>
             <a:r>
-              <a:rPr lang="it-IT" sz="3000" dirty="0"/>
-              <a:t>Covaxin</a:t>
+              <a:rPr lang="it-IT" sz="3600" dirty="0"/>
+              <a:t>Novavax</a:t>
             </a:r>
           </a:p>
           <a:p>
@@ -11148,7 +12824,7 @@
               <a:buAutoNum type="arabicPeriod"/>
             </a:pPr>
             <a:r>
-              <a:rPr lang="it-IT" sz="3000" dirty="0"/>
+              <a:rPr lang="it-IT" sz="3600" dirty="0"/>
               <a:t>COVID19</a:t>
             </a:r>
           </a:p>
@@ -11158,7 +12834,7 @@
               <a:buAutoNum type="arabicPeriod"/>
             </a:pPr>
             <a:r>
-              <a:rPr lang="it-IT" sz="3000" dirty="0"/>
+              <a:rPr lang="it-IT" sz="3600" dirty="0"/>
               <a:t>SputnikV</a:t>
             </a:r>
           </a:p>
@@ -11167,14 +12843,14 @@
               <a:buFont typeface="+mj-lt"/>
               <a:buAutoNum type="arabicPeriod"/>
             </a:pPr>
-            <a:endParaRPr lang="it-IT" sz="3000" dirty="0"/>
+            <a:endParaRPr lang="it-IT" sz="3600" dirty="0"/>
           </a:p>
           <a:p>
             <a:pPr marL="659603" indent="-514350" algn="just">
               <a:buFont typeface="+mj-lt"/>
               <a:buAutoNum type="arabicPeriod"/>
             </a:pPr>
-            <a:endParaRPr lang="it-IT" sz="3000" dirty="0"/>
+            <a:endParaRPr lang="it-IT" sz="3600" dirty="0"/>
           </a:p>
           <a:p>
             <a:pPr marL="659603" indent="-514350" algn="just">
@@ -11182,7 +12858,7 @@
               <a:buAutoNum type="arabicPeriod"/>
             </a:pPr>
             <a:r>
-              <a:rPr lang="it-IT" sz="3000" dirty="0"/>
+              <a:rPr lang="it-IT" sz="3600" dirty="0"/>
               <a:t>Pfizer</a:t>
             </a:r>
           </a:p>
@@ -11192,7 +12868,7 @@
               <a:buAutoNum type="arabicPeriod"/>
             </a:pPr>
             <a:r>
-              <a:rPr lang="it-IT" sz="3000" dirty="0"/>
+              <a:rPr lang="it-IT" sz="3600" dirty="0"/>
               <a:t>Vaccines</a:t>
             </a:r>
           </a:p>
@@ -11202,7 +12878,7 @@
               <a:buAutoNum type="arabicPeriod"/>
             </a:pPr>
             <a:r>
-              <a:rPr lang="it-IT" sz="3000" dirty="0"/>
+              <a:rPr lang="it-IT" sz="3600" dirty="0"/>
               <a:t>First</a:t>
             </a:r>
           </a:p>
@@ -11212,7 +12888,7 @@
               <a:buAutoNum type="arabicPeriod"/>
             </a:pPr>
             <a:r>
-              <a:rPr lang="it-IT" sz="3000" dirty="0"/>
+              <a:rPr lang="it-IT" sz="3600" dirty="0"/>
               <a:t>Dose</a:t>
             </a:r>
           </a:p>
@@ -11222,8 +12898,8 @@
               <a:buAutoNum type="arabicPeriod"/>
             </a:pPr>
             <a:r>
-              <a:rPr lang="it-IT" sz="3000" dirty="0"/>
-              <a:t> PfizerBioNTech</a:t>
+              <a:rPr lang="it-IT" sz="3600" dirty="0"/>
+              <a:t> Covaxin</a:t>
             </a:r>
           </a:p>
         </p:txBody>
@@ -11351,15 +13027,7 @@
             </a:pPr>
             <a:r>
               <a:rPr lang="it-IT" sz="3000" dirty="0"/>
-              <a:t>Per evitare </a:t>
-            </a:r>
-            <a:r>
-              <a:rPr lang="it-IT" sz="3000"/>
-              <a:t>di contare </a:t>
-            </a:r>
-            <a:r>
-              <a:rPr lang="it-IT" sz="3000" dirty="0"/>
-              <a:t>più volte un sostantivo presente in più frasi, li abbiamo salvati in una variabile di tipo </a:t>
+              <a:t>Per evitare di contare più volte un sostantivo presente in più frasi, li abbiamo salvati in una variabile di tipo </a:t>
             </a:r>
             <a:r>
               <a:rPr lang="it-IT" sz="3000" b="1" dirty="0"/>
@@ -11565,114 +13233,111 @@
         </p:nvSpPr>
         <p:spPr>
           <a:xfrm>
-            <a:off x="1218883" y="260648"/>
-            <a:ext cx="10360501" cy="1223963"/>
+            <a:off x="590125" y="404664"/>
+            <a:ext cx="11008573" cy="4752528"/>
           </a:xfrm>
         </p:spPr>
         <p:txBody>
           <a:bodyPr rtlCol="0">
-            <a:normAutofit/>
+            <a:normAutofit fontScale="90000"/>
           </a:bodyPr>
           <a:lstStyle/>
           <a:p>
-            <a:pPr rtl="0"/>
-            <a:r>
-              <a:rPr lang="it-IT" sz="5000" b="1" dirty="0"/>
-              <a:t>Conclusioni</a:t>
-            </a:r>
-          </a:p>
-        </p:txBody>
-      </p:sp>
-      <p:sp>
-        <p:nvSpPr>
-          <p:cNvPr id="14" name="Segnaposto contenuto 13"/>
-          <p:cNvSpPr>
-            <a:spLocks noGrp="1"/>
-          </p:cNvSpPr>
-          <p:nvPr>
-            <p:ph idx="1"/>
-          </p:nvPr>
-        </p:nvSpPr>
-        <p:spPr/>
-        <p:txBody>
-          <a:bodyPr rtlCol="0">
-            <a:normAutofit lnSpcReduction="10000"/>
-          </a:bodyPr>
-          <a:lstStyle/>
-          <a:p>
-            <a:pPr marL="145253" indent="0" algn="just">
-              <a:buNone/>
-            </a:pPr>
-            <a:endParaRPr lang="en-US" sz="4000" dirty="0"/>
-          </a:p>
-          <a:p>
-            <a:pPr marL="145253" indent="0" algn="just">
-              <a:buNone/>
-            </a:pPr>
-            <a:r>
-              <a:rPr lang="it-IT" sz="3000" dirty="0"/>
-              <a:t>Dai risultati ottenuti da questo caso di studio possiamo affermare che </a:t>
-            </a:r>
-            <a:r>
-              <a:rPr lang="it-IT" sz="3000" b="1" dirty="0"/>
-              <a:t>Content</a:t>
-            </a:r>
-            <a:r>
-              <a:rPr lang="it-IT" sz="3000" dirty="0"/>
-              <a:t> e </a:t>
-            </a:r>
-            <a:r>
-              <a:rPr lang="it-IT" sz="3000" b="1" dirty="0"/>
-              <a:t>Sentiment Analysis </a:t>
-            </a:r>
-            <a:r>
-              <a:rPr lang="it-IT" sz="3000" dirty="0"/>
-              <a:t>ci forniscono moltissime informazioni sul dataset analizzato.</a:t>
-            </a:r>
-          </a:p>
-          <a:p>
-            <a:pPr marL="145253" indent="0" algn="just">
-              <a:buNone/>
-            </a:pPr>
-            <a:endParaRPr lang="it-IT" sz="3000" dirty="0"/>
-          </a:p>
-          <a:p>
-            <a:pPr marL="145253" indent="0" algn="just">
-              <a:buNone/>
-            </a:pPr>
-            <a:r>
-              <a:rPr lang="it-IT" sz="3000" dirty="0"/>
-              <a:t>In particolare sotto due diversi aspetti:</a:t>
-            </a:r>
-          </a:p>
-          <a:p>
-            <a:pPr marL="602453" indent="-457200" algn="just"/>
-            <a:r>
-              <a:rPr lang="it-IT" sz="3000" b="1" dirty="0"/>
-              <a:t>Oggettivo</a:t>
-            </a:r>
-            <a:r>
-              <a:rPr lang="it-IT" sz="3000" dirty="0"/>
-              <a:t> (Content Analysis)</a:t>
-            </a:r>
-          </a:p>
-          <a:p>
-            <a:pPr marL="602453" indent="-457200" algn="just"/>
-            <a:r>
-              <a:rPr lang="it-IT" sz="3000" b="1" dirty="0"/>
-              <a:t>Soggettivo</a:t>
-            </a:r>
-            <a:r>
-              <a:rPr lang="it-IT" sz="3000" dirty="0"/>
-              <a:t> (Sentiment Analysis).</a:t>
-            </a:r>
-          </a:p>
-        </p:txBody>
-      </p:sp>
+            <a:pPr algn="ctr" rtl="0"/>
+            <a:br>
+              <a:rPr lang="it-IT" sz="8800" b="1" dirty="0"/>
+            </a:br>
+            <a:br>
+              <a:rPr lang="it-IT" sz="8800" b="1" dirty="0"/>
+            </a:br>
+            <a:r>
+              <a:rPr lang="it-IT" sz="8800" b="1" dirty="0"/>
+              <a:t>Confronto librerie Sentiment Analysis</a:t>
+            </a:r>
+            <a:br>
+              <a:rPr lang="it-IT" sz="8800" b="1" dirty="0"/>
+            </a:br>
+            <a:br>
+              <a:rPr lang="it-IT" sz="8800" b="1" dirty="0"/>
+            </a:br>
+            <a:endParaRPr lang="it-IT" sz="5000" b="1" dirty="0"/>
+          </a:p>
+        </p:txBody>
+      </p:sp>
+      <p:pic>
+        <p:nvPicPr>
+          <p:cNvPr id="3" name="Immagine 2">
+            <a:extLst>
+              <a:ext uri="{FF2B5EF4-FFF2-40B4-BE49-F238E27FC236}">
+                <a16:creationId xmlns:a16="http://schemas.microsoft.com/office/drawing/2014/main" id="{4E1BA9AD-2CF3-996F-7504-ECFB8ABF62E2}"/>
+              </a:ext>
+            </a:extLst>
+          </p:cNvPr>
+          <p:cNvPicPr>
+            <a:picLocks noChangeAspect="1"/>
+          </p:cNvPicPr>
+          <p:nvPr/>
+        </p:nvPicPr>
+        <p:blipFill>
+          <a:blip r:embed="rId3" cstate="print">
+            <a:extLst>
+              <a:ext uri="{28A0092B-C50C-407E-A947-70E740481C1C}">
+                <a14:useLocalDpi xmlns:a14="http://schemas.microsoft.com/office/drawing/2010/main" val="0"/>
+              </a:ext>
+            </a:extLst>
+          </a:blip>
+          <a:srcRect/>
+          <a:stretch/>
+        </p:blipFill>
+        <p:spPr>
+          <a:xfrm>
+            <a:off x="3286100" y="3810660"/>
+            <a:ext cx="1896531" cy="2256760"/>
+          </a:xfrm>
+          <a:prstGeom prst="rect">
+            <a:avLst/>
+          </a:prstGeom>
+        </p:spPr>
+      </p:pic>
+      <p:pic>
+        <p:nvPicPr>
+          <p:cNvPr id="4" name="Immagine 3">
+            <a:extLst>
+              <a:ext uri="{FF2B5EF4-FFF2-40B4-BE49-F238E27FC236}">
+                <a16:creationId xmlns:a16="http://schemas.microsoft.com/office/drawing/2014/main" id="{275ECE32-6CBB-AF94-6FD2-D43CD1970D18}"/>
+              </a:ext>
+            </a:extLst>
+          </p:cNvPr>
+          <p:cNvPicPr>
+            <a:picLocks noChangeAspect="1"/>
+          </p:cNvPicPr>
+          <p:nvPr/>
+        </p:nvPicPr>
+        <p:blipFill>
+          <a:blip r:embed="rId4">
+            <a:extLst>
+              <a:ext uri="{28A0092B-C50C-407E-A947-70E740481C1C}">
+                <a14:useLocalDpi xmlns:a14="http://schemas.microsoft.com/office/drawing/2010/main" val="0"/>
+              </a:ext>
+            </a:extLst>
+          </a:blip>
+          <a:srcRect/>
+          <a:stretch/>
+        </p:blipFill>
+        <p:spPr>
+          <a:xfrm>
+            <a:off x="6094411" y="3759513"/>
+            <a:ext cx="2572722" cy="2359054"/>
+          </a:xfrm>
+          <a:prstGeom prst="rect">
+            <a:avLst/>
+          </a:prstGeom>
+        </p:spPr>
+      </p:pic>
     </p:spTree>
     <p:extLst>
       <p:ext uri="{BB962C8B-B14F-4D97-AF65-F5344CB8AC3E}">
-        <p14:creationId xmlns:p14="http://schemas.microsoft.com/office/powerpoint/2010/main" val="4227603974"/>
+        <p14:creationId xmlns:p14="http://schemas.microsoft.com/office/powerpoint/2010/main" val="4177547170"/>
       </p:ext>
     </p:extLst>
   </p:cSld>
@@ -11736,6 +13401,1309 @@
             <a:pPr rtl="0"/>
             <a:r>
               <a:rPr lang="it-IT" sz="5000" b="1" dirty="0"/>
+              <a:t>TextBlob</a:t>
+            </a:r>
+          </a:p>
+        </p:txBody>
+      </p:sp>
+      <p:sp>
+        <p:nvSpPr>
+          <p:cNvPr id="14" name="Segnaposto contenuto 13"/>
+          <p:cNvSpPr>
+            <a:spLocks noGrp="1"/>
+          </p:cNvSpPr>
+          <p:nvPr>
+            <p:ph idx="1"/>
+          </p:nvPr>
+        </p:nvSpPr>
+        <p:spPr/>
+        <p:txBody>
+          <a:bodyPr rtlCol="0">
+            <a:noAutofit/>
+          </a:bodyPr>
+          <a:lstStyle/>
+          <a:p>
+            <a:pPr marL="145253" indent="0" algn="just">
+              <a:buNone/>
+            </a:pPr>
+            <a:endParaRPr lang="it-IT" sz="3000" b="0" i="0" dirty="0">
+              <a:solidFill>
+                <a:srgbClr val="DBDEE1"/>
+              </a:solidFill>
+              <a:effectLst/>
+              <a:latin typeface="Calibri (Corpo)"/>
+            </a:endParaRPr>
+          </a:p>
+          <a:p>
+            <a:pPr marL="145253" indent="0" algn="just">
+              <a:buNone/>
+            </a:pPr>
+            <a:r>
+              <a:rPr lang="it-IT" sz="3000" b="0" i="0" dirty="0">
+                <a:solidFill>
+                  <a:srgbClr val="DBDEE1"/>
+                </a:solidFill>
+                <a:effectLst/>
+                <a:latin typeface="Calibri (Corpo)"/>
+              </a:rPr>
+              <a:t>TextBlob è una libreria Python basata su NLTK che semplifica il modello per l'elaborazione del testo naturale.</a:t>
+            </a:r>
+          </a:p>
+          <a:p>
+            <a:pPr marL="145253" indent="0" algn="just">
+              <a:buNone/>
+            </a:pPr>
+            <a:r>
+              <a:rPr lang="it-IT" sz="3000" b="0" i="0" dirty="0">
+                <a:solidFill>
+                  <a:srgbClr val="DBDEE1"/>
+                </a:solidFill>
+                <a:effectLst/>
+                <a:latin typeface="Calibri (Corpo)"/>
+              </a:rPr>
+              <a:t> </a:t>
+            </a:r>
+          </a:p>
+          <a:p>
+            <a:pPr marL="145253" indent="0" algn="just">
+              <a:buNone/>
+            </a:pPr>
+            <a:r>
+              <a:rPr lang="it-IT" sz="3000" b="0" i="0" dirty="0">
+                <a:solidFill>
+                  <a:srgbClr val="DBDEE1"/>
+                </a:solidFill>
+                <a:effectLst/>
+                <a:latin typeface="Calibri (Corpo)"/>
+              </a:rPr>
+              <a:t>TextBlob è più semplice da usare rispetto a NLTK. Viceversa, NLTK è più flessibile e personalizzabile rispetto a TextBlob, offrendo agli utenti un maggior controllo sulle fasi dell'elaborazione del testo. </a:t>
+            </a:r>
+            <a:endParaRPr lang="it-IT" sz="3000" dirty="0">
+              <a:latin typeface="Calibri (Corpo)"/>
+            </a:endParaRPr>
+          </a:p>
+        </p:txBody>
+      </p:sp>
+    </p:spTree>
+    <p:extLst>
+      <p:ext uri="{BB962C8B-B14F-4D97-AF65-F5344CB8AC3E}">
+        <p14:creationId xmlns:p14="http://schemas.microsoft.com/office/powerpoint/2010/main" val="4227603974"/>
+      </p:ext>
+    </p:extLst>
+  </p:cSld>
+  <p:clrMapOvr>
+    <a:masterClrMapping/>
+  </p:clrMapOvr>
+  <mc:AlternateContent xmlns:mc="http://schemas.openxmlformats.org/markup-compatibility/2006" xmlns:p14="http://schemas.microsoft.com/office/powerpoint/2010/main">
+    <mc:Choice Requires="p14">
+      <p:transition spd="med" p14:dur="700">
+        <p:fade/>
+      </p:transition>
+    </mc:Choice>
+    <mc:Fallback xmlns="">
+      <p:transition spd="med">
+        <p:fade/>
+      </p:transition>
+    </mc:Fallback>
+  </mc:AlternateContent>
+</p:sld>
+</file>
+
+<file path=ppt/slides/slide27.xml><?xml version="1.0" encoding="utf-8"?>
+<p:sld xmlns:a="http://schemas.openxmlformats.org/drawingml/2006/main" xmlns:r="http://schemas.openxmlformats.org/officeDocument/2006/relationships" xmlns:p="http://schemas.openxmlformats.org/presentationml/2006/main">
+  <p:cSld>
+    <p:spTree>
+      <p:nvGrpSpPr>
+        <p:cNvPr id="1" name=""/>
+        <p:cNvGrpSpPr/>
+        <p:nvPr/>
+      </p:nvGrpSpPr>
+      <p:grpSpPr>
+        <a:xfrm>
+          <a:off x="0" y="0"/>
+          <a:ext cx="0" cy="0"/>
+          <a:chOff x="0" y="0"/>
+          <a:chExt cx="0" cy="0"/>
+        </a:xfrm>
+      </p:grpSpPr>
+      <p:sp>
+        <p:nvSpPr>
+          <p:cNvPr id="13" name="Titolo 12"/>
+          <p:cNvSpPr>
+            <a:spLocks noGrp="1"/>
+          </p:cNvSpPr>
+          <p:nvPr>
+            <p:ph type="title"/>
+          </p:nvPr>
+        </p:nvSpPr>
+        <p:spPr>
+          <a:xfrm>
+            <a:off x="1218883" y="260648"/>
+            <a:ext cx="10360501" cy="1223963"/>
+          </a:xfrm>
+        </p:spPr>
+        <p:txBody>
+          <a:bodyPr rtlCol="0">
+            <a:normAutofit/>
+          </a:bodyPr>
+          <a:lstStyle/>
+          <a:p>
+            <a:pPr rtl="0"/>
+            <a:r>
+              <a:rPr lang="it-IT" sz="5000" b="1" dirty="0"/>
+              <a:t>Confronto risultati</a:t>
+            </a:r>
+          </a:p>
+        </p:txBody>
+      </p:sp>
+      <p:sp>
+        <p:nvSpPr>
+          <p:cNvPr id="14" name="Segnaposto contenuto 13"/>
+          <p:cNvSpPr>
+            <a:spLocks noGrp="1"/>
+          </p:cNvSpPr>
+          <p:nvPr>
+            <p:ph idx="1"/>
+          </p:nvPr>
+        </p:nvSpPr>
+        <p:spPr/>
+        <p:txBody>
+          <a:bodyPr rtlCol="0">
+            <a:noAutofit/>
+          </a:bodyPr>
+          <a:lstStyle/>
+          <a:p>
+            <a:pPr marL="145253" indent="0" algn="just">
+              <a:buNone/>
+            </a:pPr>
+            <a:endParaRPr lang="it-IT" sz="3000" b="0" i="0" dirty="0">
+              <a:solidFill>
+                <a:srgbClr val="DBDEE1"/>
+              </a:solidFill>
+              <a:effectLst/>
+              <a:latin typeface="Calibri (Corpo)"/>
+            </a:endParaRPr>
+          </a:p>
+          <a:p>
+            <a:pPr marL="145253" indent="0" algn="just">
+              <a:buNone/>
+            </a:pPr>
+            <a:r>
+              <a:rPr lang="it-IT" sz="3000" dirty="0">
+                <a:solidFill>
+                  <a:srgbClr val="DBDEE1"/>
+                </a:solidFill>
+                <a:latin typeface="Calibri (Corpo)"/>
+              </a:rPr>
+              <a:t>Avendo a disposizione i risultati della Content Analysis, abbiamo analizzato il Sentiment relativo le frasi che contengono al proprio interno i nomi dei vaccini.</a:t>
+            </a:r>
+          </a:p>
+          <a:p>
+            <a:pPr marL="145253" indent="0" algn="just">
+              <a:buNone/>
+            </a:pPr>
+            <a:endParaRPr lang="it-IT" sz="3000" dirty="0">
+              <a:solidFill>
+                <a:srgbClr val="DBDEE1"/>
+              </a:solidFill>
+              <a:latin typeface="Calibri (Corpo)"/>
+            </a:endParaRPr>
+          </a:p>
+          <a:p>
+            <a:pPr marL="145253" indent="0" algn="just">
+              <a:buNone/>
+            </a:pPr>
+            <a:r>
+              <a:rPr lang="it-IT" sz="3000" dirty="0">
+                <a:solidFill>
+                  <a:srgbClr val="DBDEE1"/>
+                </a:solidFill>
+                <a:latin typeface="Calibri (Corpo)"/>
+              </a:rPr>
+              <a:t>Abbiamo effettuato il confronto tra le librerie: </a:t>
+            </a:r>
+          </a:p>
+          <a:p>
+            <a:pPr marL="145253" indent="0" algn="just">
+              <a:buNone/>
+            </a:pPr>
+            <a:r>
+              <a:rPr lang="it-IT" sz="3000" b="1" dirty="0">
+                <a:solidFill>
+                  <a:srgbClr val="DBDEE1"/>
+                </a:solidFill>
+                <a:latin typeface="Calibri (Corpo)"/>
+              </a:rPr>
+              <a:t>NLTK</a:t>
+            </a:r>
+            <a:r>
+              <a:rPr lang="it-IT" sz="3000" dirty="0">
+                <a:solidFill>
+                  <a:srgbClr val="DBDEE1"/>
+                </a:solidFill>
+                <a:latin typeface="Calibri (Corpo)"/>
+              </a:rPr>
+              <a:t> e </a:t>
+            </a:r>
+            <a:r>
+              <a:rPr lang="it-IT" sz="3000" b="1" dirty="0">
+                <a:solidFill>
+                  <a:srgbClr val="DBDEE1"/>
+                </a:solidFill>
+                <a:latin typeface="Calibri (Corpo)"/>
+              </a:rPr>
+              <a:t>TextBlob</a:t>
+            </a:r>
+            <a:r>
+              <a:rPr lang="it-IT" sz="3000" dirty="0">
+                <a:solidFill>
+                  <a:srgbClr val="DBDEE1"/>
+                </a:solidFill>
+                <a:latin typeface="Calibri (Corpo)"/>
+              </a:rPr>
+              <a:t>.</a:t>
+            </a:r>
+            <a:endParaRPr lang="it-IT" sz="3000" dirty="0">
+              <a:latin typeface="Calibri (Corpo)"/>
+            </a:endParaRPr>
+          </a:p>
+        </p:txBody>
+      </p:sp>
+    </p:spTree>
+    <p:extLst>
+      <p:ext uri="{BB962C8B-B14F-4D97-AF65-F5344CB8AC3E}">
+        <p14:creationId xmlns:p14="http://schemas.microsoft.com/office/powerpoint/2010/main" val="68039083"/>
+      </p:ext>
+    </p:extLst>
+  </p:cSld>
+  <p:clrMapOvr>
+    <a:masterClrMapping/>
+  </p:clrMapOvr>
+  <mc:AlternateContent xmlns:mc="http://schemas.openxmlformats.org/markup-compatibility/2006">
+    <mc:Choice xmlns:p14="http://schemas.microsoft.com/office/powerpoint/2010/main" Requires="p14">
+      <p:transition spd="med" p14:dur="700">
+        <p:fade/>
+      </p:transition>
+    </mc:Choice>
+    <mc:Fallback>
+      <p:transition spd="med">
+        <p:fade/>
+      </p:transition>
+    </mc:Fallback>
+  </mc:AlternateContent>
+</p:sld>
+</file>
+
+<file path=ppt/slides/slide28.xml><?xml version="1.0" encoding="utf-8"?>
+<p:sld xmlns:a="http://schemas.openxmlformats.org/drawingml/2006/main" xmlns:r="http://schemas.openxmlformats.org/officeDocument/2006/relationships" xmlns:p="http://schemas.openxmlformats.org/presentationml/2006/main">
+  <p:cSld>
+    <p:spTree>
+      <p:nvGrpSpPr>
+        <p:cNvPr id="1" name=""/>
+        <p:cNvGrpSpPr/>
+        <p:nvPr/>
+      </p:nvGrpSpPr>
+      <p:grpSpPr>
+        <a:xfrm>
+          <a:off x="0" y="0"/>
+          <a:ext cx="0" cy="0"/>
+          <a:chOff x="0" y="0"/>
+          <a:chExt cx="0" cy="0"/>
+        </a:xfrm>
+      </p:grpSpPr>
+      <p:sp>
+        <p:nvSpPr>
+          <p:cNvPr id="13" name="Titolo 12"/>
+          <p:cNvSpPr>
+            <a:spLocks noGrp="1"/>
+          </p:cNvSpPr>
+          <p:nvPr>
+            <p:ph type="title"/>
+          </p:nvPr>
+        </p:nvSpPr>
+        <p:spPr>
+          <a:xfrm>
+            <a:off x="1218883" y="260648"/>
+            <a:ext cx="10360501" cy="1223963"/>
+          </a:xfrm>
+        </p:spPr>
+        <p:txBody>
+          <a:bodyPr rtlCol="0">
+            <a:normAutofit/>
+          </a:bodyPr>
+          <a:lstStyle/>
+          <a:p>
+            <a:pPr rtl="0"/>
+            <a:r>
+              <a:rPr lang="it-IT" sz="5000" b="1" dirty="0"/>
+              <a:t>Confronto tra librerie</a:t>
+            </a:r>
+          </a:p>
+        </p:txBody>
+      </p:sp>
+      <p:sp>
+        <p:nvSpPr>
+          <p:cNvPr id="14" name="Segnaposto contenuto 13"/>
+          <p:cNvSpPr>
+            <a:spLocks noGrp="1"/>
+          </p:cNvSpPr>
+          <p:nvPr>
+            <p:ph idx="1"/>
+          </p:nvPr>
+        </p:nvSpPr>
+        <p:spPr>
+          <a:xfrm>
+            <a:off x="1218883" y="1700808"/>
+            <a:ext cx="10360501" cy="4462272"/>
+          </a:xfrm>
+        </p:spPr>
+        <p:txBody>
+          <a:bodyPr rtlCol="0">
+            <a:noAutofit/>
+          </a:bodyPr>
+          <a:lstStyle/>
+          <a:p>
+            <a:pPr marL="145253" indent="0" algn="just">
+              <a:buNone/>
+            </a:pPr>
+            <a:endParaRPr lang="it-IT" sz="3000" b="0" i="0" dirty="0">
+              <a:solidFill>
+                <a:srgbClr val="DBDEE1"/>
+              </a:solidFill>
+              <a:effectLst/>
+              <a:latin typeface="Calibri (Corpo)"/>
+            </a:endParaRPr>
+          </a:p>
+          <a:p>
+            <a:pPr marL="145253" indent="0" algn="just">
+              <a:buNone/>
+            </a:pPr>
+            <a:endParaRPr lang="it-IT" sz="3000" dirty="0">
+              <a:latin typeface="Calibri (Corpo)"/>
+            </a:endParaRPr>
+          </a:p>
+        </p:txBody>
+      </p:sp>
+      <p:graphicFrame>
+        <p:nvGraphicFramePr>
+          <p:cNvPr id="8" name="Tabella 8">
+            <a:extLst>
+              <a:ext uri="{FF2B5EF4-FFF2-40B4-BE49-F238E27FC236}">
+                <a16:creationId xmlns:a16="http://schemas.microsoft.com/office/drawing/2014/main" id="{56119996-C2E4-B3D2-0A23-84A4D9D69621}"/>
+              </a:ext>
+            </a:extLst>
+          </p:cNvPr>
+          <p:cNvGraphicFramePr>
+            <a:graphicFrameLocks noGrp="1"/>
+          </p:cNvGraphicFramePr>
+          <p:nvPr>
+            <p:extLst>
+              <p:ext uri="{D42A27DB-BD31-4B8C-83A1-F6EECF244321}">
+                <p14:modId xmlns:p14="http://schemas.microsoft.com/office/powerpoint/2010/main" val="802988890"/>
+              </p:ext>
+            </p:extLst>
+          </p:nvPr>
+        </p:nvGraphicFramePr>
+        <p:xfrm>
+          <a:off x="1902701" y="1986003"/>
+          <a:ext cx="8383422" cy="3891882"/>
+        </p:xfrm>
+        <a:graphic>
+          <a:graphicData uri="http://schemas.openxmlformats.org/drawingml/2006/table">
+            <a:tbl>
+              <a:tblPr firstRow="1" bandRow="1">
+                <a:tableStyleId>{3B4B98B0-60AC-42C2-AFA5-B58CD77FA1E5}</a:tableStyleId>
+              </a:tblPr>
+              <a:tblGrid>
+                <a:gridCol w="2794474">
+                  <a:extLst>
+                    <a:ext uri="{9D8B030D-6E8A-4147-A177-3AD203B41FA5}">
+                      <a16:colId xmlns:a16="http://schemas.microsoft.com/office/drawing/2014/main" val="2647632689"/>
+                    </a:ext>
+                  </a:extLst>
+                </a:gridCol>
+                <a:gridCol w="2794474">
+                  <a:extLst>
+                    <a:ext uri="{9D8B030D-6E8A-4147-A177-3AD203B41FA5}">
+                      <a16:colId xmlns:a16="http://schemas.microsoft.com/office/drawing/2014/main" val="3898453400"/>
+                    </a:ext>
+                  </a:extLst>
+                </a:gridCol>
+                <a:gridCol w="2794474">
+                  <a:extLst>
+                    <a:ext uri="{9D8B030D-6E8A-4147-A177-3AD203B41FA5}">
+                      <a16:colId xmlns:a16="http://schemas.microsoft.com/office/drawing/2014/main" val="2602062658"/>
+                    </a:ext>
+                  </a:extLst>
+                </a:gridCol>
+              </a:tblGrid>
+              <a:tr h="648647">
+                <a:tc>
+                  <a:txBody>
+                    <a:bodyPr/>
+                    <a:lstStyle/>
+                    <a:p>
+                      <a:pPr algn="ctr">
+                        <a:lnSpc>
+                          <a:spcPct val="150000"/>
+                        </a:lnSpc>
+                      </a:pPr>
+                      <a:r>
+                        <a:rPr lang="it-IT" b="1" dirty="0"/>
+                        <a:t>Vaccino</a:t>
+                      </a:r>
+                    </a:p>
+                  </a:txBody>
+                  <a:tcPr/>
+                </a:tc>
+                <a:tc>
+                  <a:txBody>
+                    <a:bodyPr/>
+                    <a:lstStyle/>
+                    <a:p>
+                      <a:pPr algn="ctr">
+                        <a:lnSpc>
+                          <a:spcPct val="150000"/>
+                        </a:lnSpc>
+                      </a:pPr>
+                      <a:r>
+                        <a:rPr lang="it-IT" b="1" dirty="0"/>
+                        <a:t>NLTK</a:t>
+                      </a:r>
+                    </a:p>
+                  </a:txBody>
+                  <a:tcPr/>
+                </a:tc>
+                <a:tc>
+                  <a:txBody>
+                    <a:bodyPr/>
+                    <a:lstStyle/>
+                    <a:p>
+                      <a:pPr algn="ctr">
+                        <a:lnSpc>
+                          <a:spcPct val="150000"/>
+                        </a:lnSpc>
+                      </a:pPr>
+                      <a:r>
+                        <a:rPr lang="it-IT" b="1" dirty="0"/>
+                        <a:t>TextBlob</a:t>
+                      </a:r>
+                    </a:p>
+                  </a:txBody>
+                  <a:tcPr/>
+                </a:tc>
+                <a:extLst>
+                  <a:ext uri="{0D108BD9-81ED-4DB2-BD59-A6C34878D82A}">
+                    <a16:rowId xmlns:a16="http://schemas.microsoft.com/office/drawing/2014/main" val="1276898294"/>
+                  </a:ext>
+                </a:extLst>
+              </a:tr>
+              <a:tr h="648647">
+                <a:tc>
+                  <a:txBody>
+                    <a:bodyPr/>
+                    <a:lstStyle/>
+                    <a:p>
+                      <a:pPr algn="ctr">
+                        <a:lnSpc>
+                          <a:spcPct val="150000"/>
+                        </a:lnSpc>
+                      </a:pPr>
+                      <a:r>
+                        <a:rPr lang="it-IT" b="1" dirty="0"/>
+                        <a:t>NOVAVAX</a:t>
+                      </a:r>
+                    </a:p>
+                  </a:txBody>
+                  <a:tcPr/>
+                </a:tc>
+                <a:tc>
+                  <a:txBody>
+                    <a:bodyPr/>
+                    <a:lstStyle/>
+                    <a:p>
+                      <a:pPr algn="ctr">
+                        <a:lnSpc>
+                          <a:spcPct val="150000"/>
+                        </a:lnSpc>
+                      </a:pPr>
+                      <a:r>
+                        <a:rPr lang="it-IT" dirty="0"/>
+                        <a:t>0,33</a:t>
+                      </a:r>
+                    </a:p>
+                  </a:txBody>
+                  <a:tcPr/>
+                </a:tc>
+                <a:tc>
+                  <a:txBody>
+                    <a:bodyPr/>
+                    <a:lstStyle/>
+                    <a:p>
+                      <a:pPr algn="ctr">
+                        <a:lnSpc>
+                          <a:spcPct val="150000"/>
+                        </a:lnSpc>
+                      </a:pPr>
+                      <a:r>
+                        <a:rPr lang="it-IT" dirty="0"/>
+                        <a:t>0,30</a:t>
+                      </a:r>
+                    </a:p>
+                  </a:txBody>
+                  <a:tcPr/>
+                </a:tc>
+                <a:extLst>
+                  <a:ext uri="{0D108BD9-81ED-4DB2-BD59-A6C34878D82A}">
+                    <a16:rowId xmlns:a16="http://schemas.microsoft.com/office/drawing/2014/main" val="3741235988"/>
+                  </a:ext>
+                </a:extLst>
+              </a:tr>
+              <a:tr h="648647">
+                <a:tc>
+                  <a:txBody>
+                    <a:bodyPr/>
+                    <a:lstStyle/>
+                    <a:p>
+                      <a:pPr algn="ctr">
+                        <a:lnSpc>
+                          <a:spcPct val="150000"/>
+                        </a:lnSpc>
+                      </a:pPr>
+                      <a:r>
+                        <a:rPr lang="it-IT" b="1" dirty="0"/>
+                        <a:t>J &amp; J</a:t>
+                      </a:r>
+                    </a:p>
+                  </a:txBody>
+                  <a:tcPr/>
+                </a:tc>
+                <a:tc>
+                  <a:txBody>
+                    <a:bodyPr/>
+                    <a:lstStyle/>
+                    <a:p>
+                      <a:pPr algn="ctr">
+                        <a:lnSpc>
+                          <a:spcPct val="150000"/>
+                        </a:lnSpc>
+                      </a:pPr>
+                      <a:r>
+                        <a:rPr lang="it-IT" dirty="0"/>
+                        <a:t>0,25</a:t>
+                      </a:r>
+                    </a:p>
+                  </a:txBody>
+                  <a:tcPr/>
+                </a:tc>
+                <a:tc>
+                  <a:txBody>
+                    <a:bodyPr/>
+                    <a:lstStyle/>
+                    <a:p>
+                      <a:pPr algn="ctr">
+                        <a:lnSpc>
+                          <a:spcPct val="150000"/>
+                        </a:lnSpc>
+                      </a:pPr>
+                      <a:r>
+                        <a:rPr lang="it-IT" dirty="0"/>
+                        <a:t>0,26</a:t>
+                      </a:r>
+                    </a:p>
+                  </a:txBody>
+                  <a:tcPr/>
+                </a:tc>
+                <a:extLst>
+                  <a:ext uri="{0D108BD9-81ED-4DB2-BD59-A6C34878D82A}">
+                    <a16:rowId xmlns:a16="http://schemas.microsoft.com/office/drawing/2014/main" val="1025751684"/>
+                  </a:ext>
+                </a:extLst>
+              </a:tr>
+              <a:tr h="648647">
+                <a:tc>
+                  <a:txBody>
+                    <a:bodyPr/>
+                    <a:lstStyle/>
+                    <a:p>
+                      <a:pPr algn="ctr">
+                        <a:lnSpc>
+                          <a:spcPct val="150000"/>
+                        </a:lnSpc>
+                      </a:pPr>
+                      <a:r>
+                        <a:rPr lang="it-IT" b="1" dirty="0"/>
+                        <a:t>MODERNA</a:t>
+                      </a:r>
+                    </a:p>
+                  </a:txBody>
+                  <a:tcPr/>
+                </a:tc>
+                <a:tc>
+                  <a:txBody>
+                    <a:bodyPr/>
+                    <a:lstStyle/>
+                    <a:p>
+                      <a:pPr algn="ctr">
+                        <a:lnSpc>
+                          <a:spcPct val="150000"/>
+                        </a:lnSpc>
+                      </a:pPr>
+                      <a:r>
+                        <a:rPr lang="it-IT" dirty="0"/>
+                        <a:t>0,15</a:t>
+                      </a:r>
+                    </a:p>
+                  </a:txBody>
+                  <a:tcPr/>
+                </a:tc>
+                <a:tc>
+                  <a:txBody>
+                    <a:bodyPr/>
+                    <a:lstStyle/>
+                    <a:p>
+                      <a:pPr algn="ctr">
+                        <a:lnSpc>
+                          <a:spcPct val="150000"/>
+                        </a:lnSpc>
+                      </a:pPr>
+                      <a:r>
+                        <a:rPr lang="it-IT" dirty="0"/>
+                        <a:t>0,11</a:t>
+                      </a:r>
+                    </a:p>
+                  </a:txBody>
+                  <a:tcPr/>
+                </a:tc>
+                <a:extLst>
+                  <a:ext uri="{0D108BD9-81ED-4DB2-BD59-A6C34878D82A}">
+                    <a16:rowId xmlns:a16="http://schemas.microsoft.com/office/drawing/2014/main" val="547790552"/>
+                  </a:ext>
+                </a:extLst>
+              </a:tr>
+              <a:tr h="648647">
+                <a:tc>
+                  <a:txBody>
+                    <a:bodyPr/>
+                    <a:lstStyle/>
+                    <a:p>
+                      <a:pPr algn="ctr">
+                        <a:lnSpc>
+                          <a:spcPct val="150000"/>
+                        </a:lnSpc>
+                      </a:pPr>
+                      <a:r>
+                        <a:rPr lang="it-IT" b="1" dirty="0"/>
+                        <a:t>PFIZER</a:t>
+                      </a:r>
+                    </a:p>
+                  </a:txBody>
+                  <a:tcPr/>
+                </a:tc>
+                <a:tc>
+                  <a:txBody>
+                    <a:bodyPr/>
+                    <a:lstStyle/>
+                    <a:p>
+                      <a:pPr algn="ctr">
+                        <a:lnSpc>
+                          <a:spcPct val="150000"/>
+                        </a:lnSpc>
+                      </a:pPr>
+                      <a:r>
+                        <a:rPr lang="it-IT" dirty="0"/>
+                        <a:t>0,13</a:t>
+                      </a:r>
+                    </a:p>
+                  </a:txBody>
+                  <a:tcPr/>
+                </a:tc>
+                <a:tc>
+                  <a:txBody>
+                    <a:bodyPr/>
+                    <a:lstStyle/>
+                    <a:p>
+                      <a:pPr algn="ctr">
+                        <a:lnSpc>
+                          <a:spcPct val="150000"/>
+                        </a:lnSpc>
+                      </a:pPr>
+                      <a:r>
+                        <a:rPr lang="it-IT" dirty="0"/>
+                        <a:t>0,11</a:t>
+                      </a:r>
+                    </a:p>
+                  </a:txBody>
+                  <a:tcPr/>
+                </a:tc>
+                <a:extLst>
+                  <a:ext uri="{0D108BD9-81ED-4DB2-BD59-A6C34878D82A}">
+                    <a16:rowId xmlns:a16="http://schemas.microsoft.com/office/drawing/2014/main" val="3852965349"/>
+                  </a:ext>
+                </a:extLst>
+              </a:tr>
+              <a:tr h="648647">
+                <a:tc>
+                  <a:txBody>
+                    <a:bodyPr/>
+                    <a:lstStyle/>
+                    <a:p>
+                      <a:pPr algn="ctr">
+                        <a:lnSpc>
+                          <a:spcPct val="150000"/>
+                        </a:lnSpc>
+                      </a:pPr>
+                      <a:r>
+                        <a:rPr lang="it-IT" b="1" dirty="0"/>
+                        <a:t>SPUTNIKV</a:t>
+                      </a:r>
+                    </a:p>
+                  </a:txBody>
+                  <a:tcPr/>
+                </a:tc>
+                <a:tc>
+                  <a:txBody>
+                    <a:bodyPr/>
+                    <a:lstStyle/>
+                    <a:p>
+                      <a:pPr algn="ctr">
+                        <a:lnSpc>
+                          <a:spcPct val="150000"/>
+                        </a:lnSpc>
+                      </a:pPr>
+                      <a:r>
+                        <a:rPr lang="it-IT" dirty="0"/>
+                        <a:t>0,04</a:t>
+                      </a:r>
+                    </a:p>
+                  </a:txBody>
+                  <a:tcPr/>
+                </a:tc>
+                <a:tc>
+                  <a:txBody>
+                    <a:bodyPr/>
+                    <a:lstStyle/>
+                    <a:p>
+                      <a:pPr algn="ctr">
+                        <a:lnSpc>
+                          <a:spcPct val="150000"/>
+                        </a:lnSpc>
+                      </a:pPr>
+                      <a:r>
+                        <a:rPr lang="it-IT" dirty="0"/>
+                        <a:t>0,09</a:t>
+                      </a:r>
+                    </a:p>
+                  </a:txBody>
+                  <a:tcPr/>
+                </a:tc>
+                <a:extLst>
+                  <a:ext uri="{0D108BD9-81ED-4DB2-BD59-A6C34878D82A}">
+                    <a16:rowId xmlns:a16="http://schemas.microsoft.com/office/drawing/2014/main" val="1705867138"/>
+                  </a:ext>
+                </a:extLst>
+              </a:tr>
+            </a:tbl>
+          </a:graphicData>
+        </a:graphic>
+      </p:graphicFrame>
+    </p:spTree>
+    <p:extLst>
+      <p:ext uri="{BB962C8B-B14F-4D97-AF65-F5344CB8AC3E}">
+        <p14:creationId xmlns:p14="http://schemas.microsoft.com/office/powerpoint/2010/main" val="807559371"/>
+      </p:ext>
+    </p:extLst>
+  </p:cSld>
+  <p:clrMapOvr>
+    <a:masterClrMapping/>
+  </p:clrMapOvr>
+  <mc:AlternateContent xmlns:mc="http://schemas.openxmlformats.org/markup-compatibility/2006">
+    <mc:Choice xmlns:p14="http://schemas.microsoft.com/office/powerpoint/2010/main" Requires="p14">
+      <p:transition spd="med" p14:dur="700">
+        <p:fade/>
+      </p:transition>
+    </mc:Choice>
+    <mc:Fallback>
+      <p:transition spd="med">
+        <p:fade/>
+      </p:transition>
+    </mc:Fallback>
+  </mc:AlternateContent>
+</p:sld>
+</file>
+
+<file path=ppt/slides/slide29.xml><?xml version="1.0" encoding="utf-8"?>
+<p:sld xmlns:a="http://schemas.openxmlformats.org/drawingml/2006/main" xmlns:r="http://schemas.openxmlformats.org/officeDocument/2006/relationships" xmlns:p="http://schemas.openxmlformats.org/presentationml/2006/main">
+  <p:cSld>
+    <p:spTree>
+      <p:nvGrpSpPr>
+        <p:cNvPr id="1" name=""/>
+        <p:cNvGrpSpPr/>
+        <p:nvPr/>
+      </p:nvGrpSpPr>
+      <p:grpSpPr>
+        <a:xfrm>
+          <a:off x="0" y="0"/>
+          <a:ext cx="0" cy="0"/>
+          <a:chOff x="0" y="0"/>
+          <a:chExt cx="0" cy="0"/>
+        </a:xfrm>
+      </p:grpSpPr>
+      <p:sp>
+        <p:nvSpPr>
+          <p:cNvPr id="13" name="Titolo 12"/>
+          <p:cNvSpPr>
+            <a:spLocks noGrp="1"/>
+          </p:cNvSpPr>
+          <p:nvPr>
+            <p:ph type="title"/>
+          </p:nvPr>
+        </p:nvSpPr>
+        <p:spPr>
+          <a:xfrm>
+            <a:off x="1218883" y="260648"/>
+            <a:ext cx="10360501" cy="1223963"/>
+          </a:xfrm>
+        </p:spPr>
+        <p:txBody>
+          <a:bodyPr rtlCol="0">
+            <a:normAutofit/>
+          </a:bodyPr>
+          <a:lstStyle/>
+          <a:p>
+            <a:pPr rtl="0"/>
+            <a:r>
+              <a:rPr lang="it-IT" sz="5000" b="1" dirty="0"/>
+              <a:t>Risultati - Sentiment Analysis</a:t>
+            </a:r>
+          </a:p>
+        </p:txBody>
+      </p:sp>
+      <p:sp>
+        <p:nvSpPr>
+          <p:cNvPr id="14" name="Segnaposto contenuto 13"/>
+          <p:cNvSpPr>
+            <a:spLocks noGrp="1"/>
+          </p:cNvSpPr>
+          <p:nvPr>
+            <p:ph idx="1"/>
+          </p:nvPr>
+        </p:nvSpPr>
+        <p:spPr>
+          <a:xfrm>
+            <a:off x="1218883" y="1700808"/>
+            <a:ext cx="10360501" cy="4462272"/>
+          </a:xfrm>
+        </p:spPr>
+        <p:txBody>
+          <a:bodyPr rtlCol="0">
+            <a:noAutofit/>
+          </a:bodyPr>
+          <a:lstStyle/>
+          <a:p>
+            <a:pPr marL="145253" indent="0" algn="just">
+              <a:buNone/>
+            </a:pPr>
+            <a:endParaRPr lang="it-IT" sz="3000" b="0" i="0" dirty="0">
+              <a:solidFill>
+                <a:srgbClr val="DBDEE1"/>
+              </a:solidFill>
+              <a:effectLst/>
+              <a:latin typeface="Calibri (Corpo)"/>
+            </a:endParaRPr>
+          </a:p>
+          <a:p>
+            <a:pPr marL="145253" indent="0" algn="just">
+              <a:buNone/>
+            </a:pPr>
+            <a:endParaRPr lang="it-IT" sz="3000" dirty="0">
+              <a:latin typeface="Calibri (Corpo)"/>
+            </a:endParaRPr>
+          </a:p>
+        </p:txBody>
+      </p:sp>
+      <p:graphicFrame>
+        <p:nvGraphicFramePr>
+          <p:cNvPr id="4" name="Grafico 3">
+            <a:extLst>
+              <a:ext uri="{FF2B5EF4-FFF2-40B4-BE49-F238E27FC236}">
+                <a16:creationId xmlns:a16="http://schemas.microsoft.com/office/drawing/2014/main" id="{47463877-B6F9-EC80-123C-2F835C8DCF10}"/>
+              </a:ext>
+            </a:extLst>
+          </p:cNvPr>
+          <p:cNvGraphicFramePr/>
+          <p:nvPr>
+            <p:extLst>
+              <p:ext uri="{D42A27DB-BD31-4B8C-83A1-F6EECF244321}">
+                <p14:modId xmlns:p14="http://schemas.microsoft.com/office/powerpoint/2010/main" val="2693052335"/>
+              </p:ext>
+            </p:extLst>
+          </p:nvPr>
+        </p:nvGraphicFramePr>
+        <p:xfrm>
+          <a:off x="1269876" y="1667985"/>
+          <a:ext cx="8800223" cy="4713344"/>
+        </p:xfrm>
+        <a:graphic>
+          <a:graphicData uri="http://schemas.openxmlformats.org/drawingml/2006/chart">
+            <c:chart xmlns:c="http://schemas.openxmlformats.org/drawingml/2006/chart" xmlns:r="http://schemas.openxmlformats.org/officeDocument/2006/relationships" r:id="rId3"/>
+          </a:graphicData>
+        </a:graphic>
+      </p:graphicFrame>
+    </p:spTree>
+    <p:extLst>
+      <p:ext uri="{BB962C8B-B14F-4D97-AF65-F5344CB8AC3E}">
+        <p14:creationId xmlns:p14="http://schemas.microsoft.com/office/powerpoint/2010/main" val="2927996739"/>
+      </p:ext>
+    </p:extLst>
+  </p:cSld>
+  <p:clrMapOvr>
+    <a:masterClrMapping/>
+  </p:clrMapOvr>
+  <mc:AlternateContent xmlns:mc="http://schemas.openxmlformats.org/markup-compatibility/2006">
+    <mc:Choice xmlns:p14="http://schemas.microsoft.com/office/powerpoint/2010/main" Requires="p14">
+      <p:transition spd="med" p14:dur="700">
+        <p:fade/>
+      </p:transition>
+    </mc:Choice>
+    <mc:Fallback>
+      <p:transition spd="med">
+        <p:fade/>
+      </p:transition>
+    </mc:Fallback>
+  </mc:AlternateContent>
+</p:sld>
+</file>
+
+<file path=ppt/slides/slide3.xml><?xml version="1.0" encoding="utf-8"?>
+<p:sld xmlns:a="http://schemas.openxmlformats.org/drawingml/2006/main" xmlns:r="http://schemas.openxmlformats.org/officeDocument/2006/relationships" xmlns:p="http://schemas.openxmlformats.org/presentationml/2006/main">
+  <p:cSld>
+    <p:spTree>
+      <p:nvGrpSpPr>
+        <p:cNvPr id="1" name=""/>
+        <p:cNvGrpSpPr/>
+        <p:nvPr/>
+      </p:nvGrpSpPr>
+      <p:grpSpPr>
+        <a:xfrm>
+          <a:off x="0" y="0"/>
+          <a:ext cx="0" cy="0"/>
+          <a:chOff x="0" y="0"/>
+          <a:chExt cx="0" cy="0"/>
+        </a:xfrm>
+      </p:grpSpPr>
+      <p:sp>
+        <p:nvSpPr>
+          <p:cNvPr id="13" name="Titolo 12"/>
+          <p:cNvSpPr>
+            <a:spLocks noGrp="1"/>
+          </p:cNvSpPr>
+          <p:nvPr>
+            <p:ph type="title"/>
+          </p:nvPr>
+        </p:nvSpPr>
+        <p:spPr/>
+        <p:txBody>
+          <a:bodyPr rtlCol="0">
+            <a:normAutofit/>
+          </a:bodyPr>
+          <a:lstStyle/>
+          <a:p>
+            <a:pPr rtl="0"/>
+            <a:r>
+              <a:rPr lang="it-IT" sz="5000" b="1" dirty="0"/>
+              <a:t>Semantic</a:t>
+            </a:r>
+            <a:r>
+              <a:rPr lang="it-IT" sz="5000" dirty="0"/>
+              <a:t> </a:t>
+            </a:r>
+            <a:r>
+              <a:rPr lang="it-IT" sz="5000" b="1" dirty="0"/>
+              <a:t>Intelligence</a:t>
+            </a:r>
+          </a:p>
+        </p:txBody>
+      </p:sp>
+      <p:sp>
+        <p:nvSpPr>
+          <p:cNvPr id="14" name="Segnaposto contenuto 13"/>
+          <p:cNvSpPr>
+            <a:spLocks noGrp="1"/>
+          </p:cNvSpPr>
+          <p:nvPr>
+            <p:ph idx="1"/>
+          </p:nvPr>
+        </p:nvSpPr>
+        <p:spPr/>
+        <p:txBody>
+          <a:bodyPr rtlCol="0">
+            <a:normAutofit/>
+          </a:bodyPr>
+          <a:lstStyle/>
+          <a:p>
+            <a:pPr marL="0" indent="0" algn="just" rtl="0">
+              <a:buNone/>
+            </a:pPr>
+            <a:endParaRPr lang="it-IT" sz="3000" dirty="0"/>
+          </a:p>
+          <a:p>
+            <a:pPr marL="0" indent="0" algn="just" rtl="0">
+              <a:buNone/>
+            </a:pPr>
+            <a:r>
+              <a:rPr lang="it-IT" sz="3000" dirty="0"/>
+              <a:t>Alcune delle tecniche utilizzate includono la linguistica computazionale, l'elaborazione del linguaggio naturale e l'apprendimento automatico.</a:t>
+            </a:r>
+          </a:p>
+          <a:p>
+            <a:pPr marL="0" indent="0" algn="just" rtl="0">
+              <a:buNone/>
+            </a:pPr>
+            <a:endParaRPr lang="it-IT" sz="3000" dirty="0"/>
+          </a:p>
+          <a:p>
+            <a:pPr marL="0" indent="0" algn="just" rtl="0">
+              <a:buNone/>
+            </a:pPr>
+            <a:r>
+              <a:rPr lang="it-IT" sz="3000" dirty="0"/>
+              <a:t>Ci sono molte applicazioni pratiche della Semantic intelligence, come:</a:t>
+            </a:r>
+          </a:p>
+          <a:p>
+            <a:pPr marL="0" indent="0" algn="just" rtl="0">
+              <a:buNone/>
+            </a:pPr>
+            <a:endParaRPr lang="it-IT" sz="3000" dirty="0"/>
+          </a:p>
+        </p:txBody>
+      </p:sp>
+    </p:spTree>
+    <p:extLst>
+      <p:ext uri="{BB962C8B-B14F-4D97-AF65-F5344CB8AC3E}">
+        <p14:creationId xmlns:p14="http://schemas.microsoft.com/office/powerpoint/2010/main" val="2991762184"/>
+      </p:ext>
+    </p:extLst>
+  </p:cSld>
+  <p:clrMapOvr>
+    <a:masterClrMapping/>
+  </p:clrMapOvr>
+  <mc:AlternateContent xmlns:mc="http://schemas.openxmlformats.org/markup-compatibility/2006" xmlns:p14="http://schemas.microsoft.com/office/powerpoint/2010/main">
+    <mc:Choice Requires="p14">
+      <p:transition spd="med" p14:dur="700">
+        <p:fade/>
+      </p:transition>
+    </mc:Choice>
+    <mc:Fallback xmlns="">
+      <p:transition spd="med">
+        <p:fade/>
+      </p:transition>
+    </mc:Fallback>
+  </mc:AlternateContent>
+</p:sld>
+</file>
+
+<file path=ppt/slides/slide30.xml><?xml version="1.0" encoding="utf-8"?>
+<p:sld xmlns:a="http://schemas.openxmlformats.org/drawingml/2006/main" xmlns:r="http://schemas.openxmlformats.org/officeDocument/2006/relationships" xmlns:p="http://schemas.openxmlformats.org/presentationml/2006/main">
+  <p:cSld>
+    <p:spTree>
+      <p:nvGrpSpPr>
+        <p:cNvPr id="1" name=""/>
+        <p:cNvGrpSpPr/>
+        <p:nvPr/>
+      </p:nvGrpSpPr>
+      <p:grpSpPr>
+        <a:xfrm>
+          <a:off x="0" y="0"/>
+          <a:ext cx="0" cy="0"/>
+          <a:chOff x="0" y="0"/>
+          <a:chExt cx="0" cy="0"/>
+        </a:xfrm>
+      </p:grpSpPr>
+      <p:sp>
+        <p:nvSpPr>
+          <p:cNvPr id="13" name="Titolo 12"/>
+          <p:cNvSpPr>
+            <a:spLocks noGrp="1"/>
+          </p:cNvSpPr>
+          <p:nvPr>
+            <p:ph type="title"/>
+          </p:nvPr>
+        </p:nvSpPr>
+        <p:spPr>
+          <a:xfrm>
+            <a:off x="1218883" y="260648"/>
+            <a:ext cx="10360501" cy="1223963"/>
+          </a:xfrm>
+        </p:spPr>
+        <p:txBody>
+          <a:bodyPr rtlCol="0">
+            <a:normAutofit/>
+          </a:bodyPr>
+          <a:lstStyle/>
+          <a:p>
+            <a:pPr rtl="0"/>
+            <a:r>
+              <a:rPr lang="it-IT" sz="5000" b="1" dirty="0"/>
+              <a:t>Conclusioni</a:t>
+            </a:r>
+          </a:p>
+        </p:txBody>
+      </p:sp>
+      <p:sp>
+        <p:nvSpPr>
+          <p:cNvPr id="14" name="Segnaposto contenuto 13"/>
+          <p:cNvSpPr>
+            <a:spLocks noGrp="1"/>
+          </p:cNvSpPr>
+          <p:nvPr>
+            <p:ph idx="1"/>
+          </p:nvPr>
+        </p:nvSpPr>
+        <p:spPr/>
+        <p:txBody>
+          <a:bodyPr rtlCol="0">
+            <a:normAutofit lnSpcReduction="10000"/>
+          </a:bodyPr>
+          <a:lstStyle/>
+          <a:p>
+            <a:pPr marL="145253" indent="0" algn="just">
+              <a:buNone/>
+            </a:pPr>
+            <a:endParaRPr lang="en-US" sz="4000" dirty="0"/>
+          </a:p>
+          <a:p>
+            <a:pPr marL="145253" indent="0" algn="just">
+              <a:buNone/>
+            </a:pPr>
+            <a:r>
+              <a:rPr lang="it-IT" sz="3000" dirty="0"/>
+              <a:t>Dai risultati ottenuti da questo caso di studio possiamo affermare che </a:t>
+            </a:r>
+            <a:r>
+              <a:rPr lang="it-IT" sz="3000" b="1" dirty="0"/>
+              <a:t>Content</a:t>
+            </a:r>
+            <a:r>
+              <a:rPr lang="it-IT" sz="3000" dirty="0"/>
+              <a:t> e </a:t>
+            </a:r>
+            <a:r>
+              <a:rPr lang="it-IT" sz="3000" b="1" dirty="0"/>
+              <a:t>Sentiment Analysis </a:t>
+            </a:r>
+            <a:r>
+              <a:rPr lang="it-IT" sz="3000" dirty="0"/>
+              <a:t>ci forniscono moltissime informazioni sul dataset analizzato.</a:t>
+            </a:r>
+          </a:p>
+          <a:p>
+            <a:pPr marL="145253" indent="0" algn="just">
+              <a:buNone/>
+            </a:pPr>
+            <a:endParaRPr lang="it-IT" sz="3000" dirty="0"/>
+          </a:p>
+          <a:p>
+            <a:pPr marL="145253" indent="0" algn="just">
+              <a:buNone/>
+            </a:pPr>
+            <a:r>
+              <a:rPr lang="it-IT" sz="3000" dirty="0"/>
+              <a:t>In particolare sotto due diversi aspetti:</a:t>
+            </a:r>
+          </a:p>
+          <a:p>
+            <a:pPr marL="602453" indent="-457200" algn="just"/>
+            <a:r>
+              <a:rPr lang="it-IT" sz="3000" b="1" dirty="0"/>
+              <a:t>Oggettivo</a:t>
+            </a:r>
+            <a:r>
+              <a:rPr lang="it-IT" sz="3000" dirty="0"/>
+              <a:t> (Content Analysis)</a:t>
+            </a:r>
+          </a:p>
+          <a:p>
+            <a:pPr marL="602453" indent="-457200" algn="just"/>
+            <a:r>
+              <a:rPr lang="it-IT" sz="3000" b="1" dirty="0"/>
+              <a:t>Soggettivo</a:t>
+            </a:r>
+            <a:r>
+              <a:rPr lang="it-IT" sz="3000" dirty="0"/>
+              <a:t> (Sentiment Analysis).</a:t>
+            </a:r>
+          </a:p>
+        </p:txBody>
+      </p:sp>
+    </p:spTree>
+    <p:extLst>
+      <p:ext uri="{BB962C8B-B14F-4D97-AF65-F5344CB8AC3E}">
+        <p14:creationId xmlns:p14="http://schemas.microsoft.com/office/powerpoint/2010/main" val="3763322242"/>
+      </p:ext>
+    </p:extLst>
+  </p:cSld>
+  <p:clrMapOvr>
+    <a:masterClrMapping/>
+  </p:clrMapOvr>
+  <mc:AlternateContent xmlns:mc="http://schemas.openxmlformats.org/markup-compatibility/2006">
+    <mc:Choice xmlns:p14="http://schemas.microsoft.com/office/powerpoint/2010/main" Requires="p14">
+      <p:transition spd="med" p14:dur="700">
+        <p:fade/>
+      </p:transition>
+    </mc:Choice>
+    <mc:Fallback>
+      <p:transition spd="med">
+        <p:fade/>
+      </p:transition>
+    </mc:Fallback>
+  </mc:AlternateContent>
+</p:sld>
+</file>
+
+<file path=ppt/slides/slide31.xml><?xml version="1.0" encoding="utf-8"?>
+<p:sld xmlns:a="http://schemas.openxmlformats.org/drawingml/2006/main" xmlns:r="http://schemas.openxmlformats.org/officeDocument/2006/relationships" xmlns:p="http://schemas.openxmlformats.org/presentationml/2006/main">
+  <p:cSld>
+    <p:spTree>
+      <p:nvGrpSpPr>
+        <p:cNvPr id="1" name=""/>
+        <p:cNvGrpSpPr/>
+        <p:nvPr/>
+      </p:nvGrpSpPr>
+      <p:grpSpPr>
+        <a:xfrm>
+          <a:off x="0" y="0"/>
+          <a:ext cx="0" cy="0"/>
+          <a:chOff x="0" y="0"/>
+          <a:chExt cx="0" cy="0"/>
+        </a:xfrm>
+      </p:grpSpPr>
+      <p:sp>
+        <p:nvSpPr>
+          <p:cNvPr id="13" name="Titolo 12"/>
+          <p:cNvSpPr>
+            <a:spLocks noGrp="1"/>
+          </p:cNvSpPr>
+          <p:nvPr>
+            <p:ph type="title"/>
+          </p:nvPr>
+        </p:nvSpPr>
+        <p:spPr>
+          <a:xfrm>
+            <a:off x="1218883" y="260648"/>
+            <a:ext cx="10360501" cy="1223963"/>
+          </a:xfrm>
+        </p:spPr>
+        <p:txBody>
+          <a:bodyPr rtlCol="0">
+            <a:normAutofit/>
+          </a:bodyPr>
+          <a:lstStyle/>
+          <a:p>
+            <a:pPr rtl="0"/>
+            <a:r>
+              <a:rPr lang="it-IT" sz="5000" b="1" dirty="0"/>
               <a:t>Conclusioni</a:t>
             </a:r>
           </a:p>
@@ -11826,7 +14794,7 @@
 </p:sld>
 </file>
 
-<file path=ppt/slides/slide27.xml><?xml version="1.0" encoding="utf-8"?>
+<file path=ppt/slides/slide32.xml><?xml version="1.0" encoding="utf-8"?>
 <p:sld xmlns:a="http://schemas.openxmlformats.org/drawingml/2006/main" xmlns:r="http://schemas.openxmlformats.org/officeDocument/2006/relationships" xmlns:p="http://schemas.openxmlformats.org/presentationml/2006/main">
   <p:cSld>
     <p:spTree>
@@ -11943,135 +14911,6 @@
     <p:extLst>
       <p:ext uri="{BB962C8B-B14F-4D97-AF65-F5344CB8AC3E}">
         <p14:creationId xmlns:p14="http://schemas.microsoft.com/office/powerpoint/2010/main" val="3654026268"/>
-      </p:ext>
-    </p:extLst>
-  </p:cSld>
-  <p:clrMapOvr>
-    <a:masterClrMapping/>
-  </p:clrMapOvr>
-  <mc:AlternateContent xmlns:mc="http://schemas.openxmlformats.org/markup-compatibility/2006" xmlns:p14="http://schemas.microsoft.com/office/powerpoint/2010/main">
-    <mc:Choice Requires="p14">
-      <p:transition spd="med" p14:dur="700">
-        <p:fade/>
-      </p:transition>
-    </mc:Choice>
-    <mc:Fallback xmlns="">
-      <p:transition spd="med">
-        <p:fade/>
-      </p:transition>
-    </mc:Fallback>
-  </mc:AlternateContent>
-</p:sld>
-</file>
-
-<file path=ppt/slides/slide3.xml><?xml version="1.0" encoding="utf-8"?>
-<p:sld xmlns:a="http://schemas.openxmlformats.org/drawingml/2006/main" xmlns:r="http://schemas.openxmlformats.org/officeDocument/2006/relationships" xmlns:p="http://schemas.openxmlformats.org/presentationml/2006/main">
-  <p:cSld>
-    <p:spTree>
-      <p:nvGrpSpPr>
-        <p:cNvPr id="1" name=""/>
-        <p:cNvGrpSpPr/>
-        <p:nvPr/>
-      </p:nvGrpSpPr>
-      <p:grpSpPr>
-        <a:xfrm>
-          <a:off x="0" y="0"/>
-          <a:ext cx="0" cy="0"/>
-          <a:chOff x="0" y="0"/>
-          <a:chExt cx="0" cy="0"/>
-        </a:xfrm>
-      </p:grpSpPr>
-      <p:sp>
-        <p:nvSpPr>
-          <p:cNvPr id="13" name="Titolo 12"/>
-          <p:cNvSpPr>
-            <a:spLocks noGrp="1"/>
-          </p:cNvSpPr>
-          <p:nvPr>
-            <p:ph type="title"/>
-          </p:nvPr>
-        </p:nvSpPr>
-        <p:spPr/>
-        <p:txBody>
-          <a:bodyPr rtlCol="0">
-            <a:normAutofit/>
-          </a:bodyPr>
-          <a:lstStyle/>
-          <a:p>
-            <a:pPr rtl="0"/>
-            <a:r>
-              <a:rPr lang="it-IT" sz="5000" b="1" dirty="0"/>
-              <a:t>Semantic</a:t>
-            </a:r>
-            <a:r>
-              <a:rPr lang="it-IT" sz="5000" dirty="0"/>
-              <a:t> </a:t>
-            </a:r>
-            <a:r>
-              <a:rPr lang="it-IT" sz="5000" b="1" dirty="0"/>
-              <a:t>Intelligence</a:t>
-            </a:r>
-          </a:p>
-        </p:txBody>
-      </p:sp>
-      <p:sp>
-        <p:nvSpPr>
-          <p:cNvPr id="14" name="Segnaposto contenuto 13"/>
-          <p:cNvSpPr>
-            <a:spLocks noGrp="1"/>
-          </p:cNvSpPr>
-          <p:nvPr>
-            <p:ph idx="1"/>
-          </p:nvPr>
-        </p:nvSpPr>
-        <p:spPr/>
-        <p:txBody>
-          <a:bodyPr rtlCol="0">
-            <a:normAutofit/>
-          </a:bodyPr>
-          <a:lstStyle/>
-          <a:p>
-            <a:pPr marL="0" indent="0" algn="just" rtl="0">
-              <a:buNone/>
-            </a:pPr>
-            <a:endParaRPr lang="it-IT" sz="3000" dirty="0"/>
-          </a:p>
-          <a:p>
-            <a:pPr marL="0" indent="0" algn="just" rtl="0">
-              <a:buNone/>
-            </a:pPr>
-            <a:r>
-              <a:rPr lang="it-IT" sz="3000" dirty="0"/>
-              <a:t>Alcune delle tecniche utilizzate includono la linguistica computazionale, l'elaborazione del linguaggio naturale e l'apprendimento automatico.</a:t>
-            </a:r>
-          </a:p>
-          <a:p>
-            <a:pPr marL="0" indent="0" algn="just" rtl="0">
-              <a:buNone/>
-            </a:pPr>
-            <a:endParaRPr lang="it-IT" sz="3000" dirty="0"/>
-          </a:p>
-          <a:p>
-            <a:pPr marL="0" indent="0" algn="just" rtl="0">
-              <a:buNone/>
-            </a:pPr>
-            <a:r>
-              <a:rPr lang="it-IT" sz="3000" dirty="0"/>
-              <a:t>Ci sono molte applicazioni pratiche della Semantic intelligence, come:</a:t>
-            </a:r>
-          </a:p>
-          <a:p>
-            <a:pPr marL="0" indent="0" algn="just" rtl="0">
-              <a:buNone/>
-            </a:pPr>
-            <a:endParaRPr lang="it-IT" sz="3000" dirty="0"/>
-          </a:p>
-        </p:txBody>
-      </p:sp>
-    </p:spTree>
-    <p:extLst>
-      <p:ext uri="{BB962C8B-B14F-4D97-AF65-F5344CB8AC3E}">
-        <p14:creationId xmlns:p14="http://schemas.microsoft.com/office/powerpoint/2010/main" val="2991762184"/>
       </p:ext>
     </p:extLst>
   </p:cSld>
@@ -13973,6 +16812,15 @@
 </file>
 
 <file path=customXml/item2.xml><?xml version="1.0" encoding="utf-8"?>
+<?mso-contentType ?>
+<FormTemplates xmlns="http://schemas.microsoft.com/sharepoint/v3/contenttype/forms">
+  <Display>DocumentLibraryForm</Display>
+  <Edit>AssetEditForm</Edit>
+  <New>DocumentLibraryForm</New>
+</FormTemplates>
+</file>
+
+<file path=customXml/item3.xml><?xml version="1.0" encoding="utf-8"?>
 <ct:contentTypeSchema xmlns:ct="http://schemas.microsoft.com/office/2006/metadata/contentType" xmlns:ma="http://schemas.microsoft.com/office/2006/metadata/properties/metaAttributes" ct:_="" ma:_="" ma:contentTypeName="TemplateFile" ma:contentTypeID="0x0101006EDDDB5EE6D98C44930B742096920B300400F5B6D36B3EF94B4E9A635CDF2A18F5B8" ma:contentTypeVersion="72" ma:contentTypeDescription="Create a new document." ma:contentTypeScope="" ma:versionID="a23e56308344d904b51738559c3d67c9">
   <xsd:schema xmlns:xsd="http://www.w3.org/2001/XMLSchema" xmlns:xs="http://www.w3.org/2001/XMLSchema" xmlns:p="http://schemas.microsoft.com/office/2006/metadata/properties" xmlns:ns2="4873beb7-5857-4685-be1f-d57550cc96cc" targetNamespace="http://schemas.microsoft.com/office/2006/metadata/properties" ma:root="true" ma:fieldsID="cd0908cc4600e77bf5da051303e00c8d" ns2:_="">
     <xsd:import namespace="4873beb7-5857-4685-be1f-d57550cc96cc"/>
@@ -15012,15 +17860,6 @@
 </ct:contentTypeSchema>
 </file>
 
-<file path=customXml/item3.xml><?xml version="1.0" encoding="utf-8"?>
-<?mso-contentType ?>
-<FormTemplates xmlns="http://schemas.microsoft.com/sharepoint/v3/contenttype/forms">
-  <Display>DocumentLibraryForm</Display>
-  <Edit>AssetEditForm</Edit>
-  <New>DocumentLibraryForm</New>
-</FormTemplates>
-</file>
-
 <file path=customXml/itemProps1.xml><?xml version="1.0" encoding="utf-8"?>
 <ds:datastoreItem xmlns:ds="http://schemas.openxmlformats.org/officeDocument/2006/customXml" ds:itemID="{60C67BEE-D13F-4BD2-98A5-34D8A0977F68}">
   <ds:schemaRefs>
@@ -15038,6 +17877,14 @@
 </file>
 
 <file path=customXml/itemProps2.xml><?xml version="1.0" encoding="utf-8"?>
+<ds:datastoreItem xmlns:ds="http://schemas.openxmlformats.org/officeDocument/2006/customXml" ds:itemID="{3836F65B-1B07-41EE-A0E8-BC6EF3855225}">
+  <ds:schemaRefs>
+    <ds:schemaRef ds:uri="http://schemas.microsoft.com/sharepoint/v3/contenttype/forms"/>
+  </ds:schemaRefs>
+</ds:datastoreItem>
+</file>
+
+<file path=customXml/itemProps3.xml><?xml version="1.0" encoding="utf-8"?>
 <ds:datastoreItem xmlns:ds="http://schemas.openxmlformats.org/officeDocument/2006/customXml" ds:itemID="{A09BF4D4-EF60-4196-BFC3-9462D607978C}">
   <ds:schemaRefs>
     <ds:schemaRef ds:uri="http://schemas.microsoft.com/office/2006/metadata/contentType"/>
@@ -15053,12 +17900,4 @@
     <ds:schemaRef ds:uri="http://schemas.microsoft.com/internal/obd"/>
   </ds:schemaRefs>
 </ds:datastoreItem>
-</file>
-
-<file path=customXml/itemProps3.xml><?xml version="1.0" encoding="utf-8"?>
-<ds:datastoreItem xmlns:ds="http://schemas.openxmlformats.org/officeDocument/2006/customXml" ds:itemID="{3836F65B-1B07-41EE-A0E8-BC6EF3855225}">
-  <ds:schemaRefs>
-    <ds:schemaRef ds:uri="http://schemas.microsoft.com/sharepoint/v3/contenttype/forms"/>
-  </ds:schemaRefs>
-</ds:datastoreItem>
 </file>
</xml_diff>